<commit_message>
creation of skin lesion
</commit_message>
<xml_diff>
--- a/app model/Skin app.pptx
+++ b/app model/Skin app.pptx
@@ -209,7 +209,7 @@
           <a:p>
             <a:fld id="{768E3510-DC99-4FCD-8D19-DD2BADF14EF2}" type="datetimeFigureOut">
               <a:rPr lang="en-US" smtClean="0"/>
-              <a:t>7/7/2022</a:t>
+              <a:t>7/28/2022</a:t>
             </a:fld>
             <a:endParaRPr lang="en-US"/>
           </a:p>
@@ -1271,6 +1271,240 @@
           <a:bodyPr/>
           <a:lstStyle/>
           <a:p>
+            <a:r>
+              <a:rPr lang="fr-FR" dirty="0" err="1"/>
+              <a:t>When</a:t>
+            </a:r>
+            <a:r>
+              <a:rPr lang="fr-FR" dirty="0"/>
+              <a:t> </a:t>
+            </a:r>
+            <a:r>
+              <a:rPr lang="fr-FR" dirty="0" err="1"/>
+              <a:t>you</a:t>
+            </a:r>
+            <a:r>
+              <a:rPr lang="fr-FR" dirty="0"/>
+              <a:t> select one of the </a:t>
+            </a:r>
+            <a:r>
+              <a:rPr lang="fr-FR" dirty="0" err="1"/>
+              <a:t>numbe</a:t>
+            </a:r>
+            <a:r>
+              <a:rPr lang="fr-FR" dirty="0"/>
+              <a:t> </a:t>
+            </a:r>
+            <a:r>
+              <a:rPr lang="fr-FR" dirty="0" err="1"/>
+              <a:t>below</a:t>
+            </a:r>
+            <a:r>
+              <a:rPr lang="fr-FR" dirty="0"/>
+              <a:t> one of the </a:t>
+            </a:r>
+            <a:r>
+              <a:rPr lang="fr-FR" dirty="0" err="1"/>
+              <a:t>add</a:t>
+            </a:r>
+            <a:r>
+              <a:rPr lang="fr-FR" dirty="0"/>
+              <a:t> image </a:t>
+            </a:r>
+            <a:r>
+              <a:rPr lang="fr-FR" dirty="0" err="1"/>
+              <a:t>icon</a:t>
+            </a:r>
+            <a:r>
+              <a:rPr lang="fr-FR" dirty="0"/>
+              <a:t>, </a:t>
+            </a:r>
+            <a:r>
+              <a:rPr lang="fr-FR" dirty="0" err="1"/>
+              <a:t>you</a:t>
+            </a:r>
+            <a:r>
+              <a:rPr lang="fr-FR" dirty="0"/>
+              <a:t> can </a:t>
+            </a:r>
+            <a:r>
+              <a:rPr lang="fr-FR" dirty="0" err="1"/>
+              <a:t>modify</a:t>
+            </a:r>
+            <a:r>
+              <a:rPr lang="fr-FR" dirty="0"/>
+              <a:t> the images </a:t>
+            </a:r>
+            <a:r>
+              <a:rPr lang="fr-FR" dirty="0" err="1"/>
+              <a:t>selected</a:t>
+            </a:r>
+            <a:endParaRPr lang="fr-FR" dirty="0"/>
+          </a:p>
+          <a:p>
+            <a:endParaRPr lang="fr-FR" dirty="0"/>
+          </a:p>
+          <a:p>
+            <a:r>
+              <a:rPr lang="fr-FR" dirty="0"/>
+              <a:t>The skin </a:t>
+            </a:r>
+            <a:r>
+              <a:rPr lang="fr-FR" dirty="0" err="1"/>
+              <a:t>lesion</a:t>
+            </a:r>
+            <a:r>
+              <a:rPr lang="fr-FR" dirty="0"/>
+              <a:t> and the images </a:t>
+            </a:r>
+            <a:r>
+              <a:rPr lang="fr-FR" dirty="0" err="1"/>
+              <a:t>will</a:t>
+            </a:r>
+            <a:r>
+              <a:rPr lang="fr-FR" dirty="0"/>
+              <a:t> </a:t>
+            </a:r>
+            <a:r>
+              <a:rPr lang="fr-FR" dirty="0" err="1"/>
+              <a:t>be</a:t>
+            </a:r>
+            <a:r>
+              <a:rPr lang="fr-FR" dirty="0"/>
+              <a:t> </a:t>
+            </a:r>
+            <a:r>
+              <a:rPr lang="fr-FR" dirty="0" err="1"/>
+              <a:t>saved</a:t>
+            </a:r>
+            <a:r>
+              <a:rPr lang="fr-FR" dirty="0"/>
+              <a:t> </a:t>
+            </a:r>
+            <a:r>
+              <a:rPr lang="fr-FR" dirty="0" err="1"/>
+              <a:t>either</a:t>
+            </a:r>
+            <a:r>
+              <a:rPr lang="fr-FR" dirty="0"/>
+              <a:t> </a:t>
+            </a:r>
+            <a:r>
+              <a:rPr lang="fr-FR" dirty="0" err="1"/>
+              <a:t>when</a:t>
+            </a:r>
+            <a:r>
+              <a:rPr lang="fr-FR" dirty="0"/>
+              <a:t> the </a:t>
+            </a:r>
+            <a:r>
+              <a:rPr lang="fr-FR" dirty="0" err="1"/>
+              <a:t>doctor</a:t>
+            </a:r>
+            <a:r>
+              <a:rPr lang="fr-FR" dirty="0"/>
+              <a:t> click on « Complet » or </a:t>
+            </a:r>
+            <a:r>
+              <a:rPr lang="fr-FR" dirty="0" err="1"/>
+              <a:t>when</a:t>
+            </a:r>
+            <a:r>
+              <a:rPr lang="fr-FR" dirty="0"/>
+              <a:t> </a:t>
+            </a:r>
+            <a:r>
+              <a:rPr lang="fr-FR" dirty="0" err="1"/>
+              <a:t>he</a:t>
+            </a:r>
+            <a:r>
+              <a:rPr lang="fr-FR"/>
+              <a:t> tries to use an AI</a:t>
+            </a:r>
+            <a:endParaRPr lang="en-US" dirty="0"/>
+          </a:p>
+        </p:txBody>
+      </p:sp>
+      <p:sp>
+        <p:nvSpPr>
+          <p:cNvPr id="4" name="Espace réservé du numéro de diapositive 3"/>
+          <p:cNvSpPr>
+            <a:spLocks noGrp="1"/>
+          </p:cNvSpPr>
+          <p:nvPr>
+            <p:ph type="sldNum" sz="quarter" idx="5"/>
+          </p:nvPr>
+        </p:nvSpPr>
+        <p:spPr/>
+        <p:txBody>
+          <a:bodyPr/>
+          <a:lstStyle/>
+          <a:p>
+            <a:fld id="{9D00C871-624E-4E53-B0B5-FC39DEC66926}" type="slidenum">
+              <a:rPr lang="en-US" smtClean="0"/>
+              <a:t>10</a:t>
+            </a:fld>
+            <a:endParaRPr lang="en-US"/>
+          </a:p>
+        </p:txBody>
+      </p:sp>
+    </p:spTree>
+    <p:extLst>
+      <p:ext uri="{BB962C8B-B14F-4D97-AF65-F5344CB8AC3E}">
+        <p14:creationId xmlns:p14="http://schemas.microsoft.com/office/powerpoint/2010/main" val="273243335"/>
+      </p:ext>
+    </p:extLst>
+  </p:cSld>
+  <p:clrMapOvr>
+    <a:masterClrMapping/>
+  </p:clrMapOvr>
+</p:notes>
+</file>
+
+<file path=ppt/notesSlides/notesSlide8.xml><?xml version="1.0" encoding="utf-8"?>
+<p:notes xmlns:a="http://schemas.openxmlformats.org/drawingml/2006/main" xmlns:r="http://schemas.openxmlformats.org/officeDocument/2006/relationships" xmlns:p="http://schemas.openxmlformats.org/presentationml/2006/main">
+  <p:cSld>
+    <p:spTree>
+      <p:nvGrpSpPr>
+        <p:cNvPr id="1" name=""/>
+        <p:cNvGrpSpPr/>
+        <p:nvPr/>
+      </p:nvGrpSpPr>
+      <p:grpSpPr>
+        <a:xfrm>
+          <a:off x="0" y="0"/>
+          <a:ext cx="0" cy="0"/>
+          <a:chOff x="0" y="0"/>
+          <a:chExt cx="0" cy="0"/>
+        </a:xfrm>
+      </p:grpSpPr>
+      <p:sp>
+        <p:nvSpPr>
+          <p:cNvPr id="2" name="Espace réservé de l'image des diapositives 1"/>
+          <p:cNvSpPr>
+            <a:spLocks noGrp="1" noRot="1" noChangeAspect="1"/>
+          </p:cNvSpPr>
+          <p:nvPr>
+            <p:ph type="sldImg"/>
+          </p:nvPr>
+        </p:nvSpPr>
+        <p:spPr/>
+      </p:sp>
+      <p:sp>
+        <p:nvSpPr>
+          <p:cNvPr id="3" name="Espace réservé des notes 2"/>
+          <p:cNvSpPr>
+            <a:spLocks noGrp="1"/>
+          </p:cNvSpPr>
+          <p:nvPr>
+            <p:ph type="body" idx="1"/>
+          </p:nvPr>
+        </p:nvSpPr>
+        <p:spPr/>
+        <p:txBody>
+          <a:bodyPr/>
+          <a:lstStyle/>
+          <a:p>
             <a:endParaRPr lang="en-US" dirty="0"/>
           </a:p>
         </p:txBody>
@@ -1496,7 +1730,7 @@
           <a:p>
             <a:fld id="{0FE4FEEF-F4C3-4882-B5BB-2F3842E66E27}" type="datetimeFigureOut">
               <a:rPr lang="en-US" smtClean="0"/>
-              <a:t>7/7/2022</a:t>
+              <a:t>7/28/2022</a:t>
             </a:fld>
             <a:endParaRPr lang="en-US"/>
           </a:p>
@@ -1794,7 +2028,7 @@
           <a:p>
             <a:fld id="{0FE4FEEF-F4C3-4882-B5BB-2F3842E66E27}" type="datetimeFigureOut">
               <a:rPr lang="en-US" smtClean="0"/>
-              <a:t>7/7/2022</a:t>
+              <a:t>7/28/2022</a:t>
             </a:fld>
             <a:endParaRPr lang="en-US"/>
           </a:p>
@@ -1986,7 +2220,7 @@
           <a:p>
             <a:fld id="{0FE4FEEF-F4C3-4882-B5BB-2F3842E66E27}" type="datetimeFigureOut">
               <a:rPr lang="en-US" smtClean="0"/>
-              <a:t>7/7/2022</a:t>
+              <a:t>7/28/2022</a:t>
             </a:fld>
             <a:endParaRPr lang="en-US"/>
           </a:p>
@@ -2247,7 +2481,7 @@
           <a:p>
             <a:fld id="{0FE4FEEF-F4C3-4882-B5BB-2F3842E66E27}" type="datetimeFigureOut">
               <a:rPr lang="en-US" smtClean="0"/>
-              <a:t>7/7/2022</a:t>
+              <a:t>7/28/2022</a:t>
             </a:fld>
             <a:endParaRPr lang="en-US"/>
           </a:p>
@@ -2671,7 +2905,7 @@
           <a:p>
             <a:fld id="{0FE4FEEF-F4C3-4882-B5BB-2F3842E66E27}" type="datetimeFigureOut">
               <a:rPr lang="en-US" smtClean="0"/>
-              <a:t>7/7/2022</a:t>
+              <a:t>7/28/2022</a:t>
             </a:fld>
             <a:endParaRPr lang="en-US"/>
           </a:p>
@@ -3208,7 +3442,7 @@
           <a:p>
             <a:fld id="{0FE4FEEF-F4C3-4882-B5BB-2F3842E66E27}" type="datetimeFigureOut">
               <a:rPr lang="en-US" smtClean="0"/>
-              <a:t>7/7/2022</a:t>
+              <a:t>7/28/2022</a:t>
             </a:fld>
             <a:endParaRPr lang="en-US"/>
           </a:p>
@@ -4072,7 +4306,7 @@
           <a:p>
             <a:fld id="{0FE4FEEF-F4C3-4882-B5BB-2F3842E66E27}" type="datetimeFigureOut">
               <a:rPr lang="en-US" smtClean="0"/>
-              <a:t>7/7/2022</a:t>
+              <a:t>7/28/2022</a:t>
             </a:fld>
             <a:endParaRPr lang="en-US"/>
           </a:p>
@@ -4242,7 +4476,7 @@
           <a:p>
             <a:fld id="{0FE4FEEF-F4C3-4882-B5BB-2F3842E66E27}" type="datetimeFigureOut">
               <a:rPr lang="en-US" smtClean="0"/>
-              <a:t>7/7/2022</a:t>
+              <a:t>7/28/2022</a:t>
             </a:fld>
             <a:endParaRPr lang="en-US"/>
           </a:p>
@@ -4426,7 +4660,7 @@
           <a:p>
             <a:fld id="{0FE4FEEF-F4C3-4882-B5BB-2F3842E66E27}" type="datetimeFigureOut">
               <a:rPr lang="en-US" smtClean="0"/>
-              <a:t>7/7/2022</a:t>
+              <a:t>7/28/2022</a:t>
             </a:fld>
             <a:endParaRPr lang="en-US"/>
           </a:p>
@@ -4596,7 +4830,7 @@
           <a:p>
             <a:fld id="{0FE4FEEF-F4C3-4882-B5BB-2F3842E66E27}" type="datetimeFigureOut">
               <a:rPr lang="en-US" smtClean="0"/>
-              <a:t>7/7/2022</a:t>
+              <a:t>7/28/2022</a:t>
             </a:fld>
             <a:endParaRPr lang="en-US"/>
           </a:p>
@@ -4840,7 +5074,7 @@
           <a:p>
             <a:fld id="{0FE4FEEF-F4C3-4882-B5BB-2F3842E66E27}" type="datetimeFigureOut">
               <a:rPr lang="en-US" smtClean="0"/>
-              <a:t>7/7/2022</a:t>
+              <a:t>7/28/2022</a:t>
             </a:fld>
             <a:endParaRPr lang="en-US"/>
           </a:p>
@@ -5076,7 +5310,7 @@
           <a:p>
             <a:fld id="{0FE4FEEF-F4C3-4882-B5BB-2F3842E66E27}" type="datetimeFigureOut">
               <a:rPr lang="en-US" smtClean="0"/>
-              <a:t>7/7/2022</a:t>
+              <a:t>7/28/2022</a:t>
             </a:fld>
             <a:endParaRPr lang="en-US"/>
           </a:p>
@@ -5542,7 +5776,7 @@
           <a:p>
             <a:fld id="{0FE4FEEF-F4C3-4882-B5BB-2F3842E66E27}" type="datetimeFigureOut">
               <a:rPr lang="en-US" smtClean="0"/>
-              <a:t>7/7/2022</a:t>
+              <a:t>7/28/2022</a:t>
             </a:fld>
             <a:endParaRPr lang="en-US"/>
           </a:p>
@@ -5660,7 +5894,7 @@
           <a:p>
             <a:fld id="{0FE4FEEF-F4C3-4882-B5BB-2F3842E66E27}" type="datetimeFigureOut">
               <a:rPr lang="en-US" smtClean="0"/>
-              <a:t>7/7/2022</a:t>
+              <a:t>7/28/2022</a:t>
             </a:fld>
             <a:endParaRPr lang="en-US"/>
           </a:p>
@@ -5755,7 +5989,7 @@
           <a:p>
             <a:fld id="{0FE4FEEF-F4C3-4882-B5BB-2F3842E66E27}" type="datetimeFigureOut">
               <a:rPr lang="en-US" smtClean="0"/>
-              <a:t>7/7/2022</a:t>
+              <a:t>7/28/2022</a:t>
             </a:fld>
             <a:endParaRPr lang="en-US"/>
           </a:p>
@@ -6010,7 +6244,7 @@
           <a:p>
             <a:fld id="{0FE4FEEF-F4C3-4882-B5BB-2F3842E66E27}" type="datetimeFigureOut">
               <a:rPr lang="en-US" smtClean="0"/>
-              <a:t>7/7/2022</a:t>
+              <a:t>7/28/2022</a:t>
             </a:fld>
             <a:endParaRPr lang="en-US"/>
           </a:p>
@@ -6310,7 +6544,7 @@
           <a:p>
             <a:fld id="{0FE4FEEF-F4C3-4882-B5BB-2F3842E66E27}" type="datetimeFigureOut">
               <a:rPr lang="en-US" smtClean="0"/>
-              <a:t>7/7/2022</a:t>
+              <a:t>7/28/2022</a:t>
             </a:fld>
             <a:endParaRPr lang="en-US"/>
           </a:p>
@@ -6544,7 +6778,7 @@
           <a:p>
             <a:fld id="{0FE4FEEF-F4C3-4882-B5BB-2F3842E66E27}" type="datetimeFigureOut">
               <a:rPr lang="en-US" smtClean="0"/>
-              <a:t>7/7/2022</a:t>
+              <a:t>7/28/2022</a:t>
             </a:fld>
             <a:endParaRPr lang="en-US"/>
           </a:p>
@@ -7563,7 +7797,7 @@
         <p:sp>
           <p:nvSpPr>
             <p:cNvPr id="52" name="Flèche : gauche 51">
-              <a:hlinkClick r:id="rId2" action="ppaction://hlinksldjump"/>
+              <a:hlinkClick r:id="rId3" action="ppaction://hlinksldjump"/>
               <a:extLst>
                 <a:ext uri="{FF2B5EF4-FFF2-40B4-BE49-F238E27FC236}">
                   <a16:creationId xmlns:a16="http://schemas.microsoft.com/office/drawing/2014/main" id="{99F4BFAE-7EB5-9061-E90D-954E0AB284AC}"/>
@@ -7695,13 +7929,13 @@
             <p:nvPr/>
           </p:nvPicPr>
           <p:blipFill>
-            <a:blip r:embed="rId3">
+            <a:blip r:embed="rId4">
               <a:extLst>
                 <a:ext uri="{28A0092B-C50C-407E-A947-70E740481C1C}">
                   <a14:useLocalDpi xmlns:a14="http://schemas.microsoft.com/office/drawing/2010/main" val="0"/>
                 </a:ext>
                 <a:ext uri="{96DAC541-7B7A-43D3-8B79-37D633B846F1}">
-                  <asvg:svgBlip xmlns:asvg="http://schemas.microsoft.com/office/drawing/2016/SVG/main" r:embed="rId4"/>
+                  <asvg:svgBlip xmlns:asvg="http://schemas.microsoft.com/office/drawing/2016/SVG/main" r:embed="rId5"/>
                 </a:ext>
               </a:extLst>
             </a:blip>
@@ -7967,13 +8201,13 @@
               <p:nvPr/>
             </p:nvPicPr>
             <p:blipFill>
-              <a:blip r:embed="rId5">
+              <a:blip r:embed="rId6">
                 <a:extLst>
                   <a:ext uri="{28A0092B-C50C-407E-A947-70E740481C1C}">
                     <a14:useLocalDpi xmlns:a14="http://schemas.microsoft.com/office/drawing/2010/main" val="0"/>
                   </a:ext>
                   <a:ext uri="{96DAC541-7B7A-43D3-8B79-37D633B846F1}">
-                    <asvg:svgBlip xmlns:asvg="http://schemas.microsoft.com/office/drawing/2016/SVG/main" r:embed="rId6"/>
+                    <asvg:svgBlip xmlns:asvg="http://schemas.microsoft.com/office/drawing/2016/SVG/main" r:embed="rId7"/>
                   </a:ext>
                 </a:extLst>
               </a:blip>
@@ -8086,13 +8320,13 @@
               <p:nvPr/>
             </p:nvPicPr>
             <p:blipFill>
-              <a:blip r:embed="rId7">
+              <a:blip r:embed="rId8">
                 <a:extLst>
                   <a:ext uri="{28A0092B-C50C-407E-A947-70E740481C1C}">
                     <a14:useLocalDpi xmlns:a14="http://schemas.microsoft.com/office/drawing/2010/main" val="0"/>
                   </a:ext>
                   <a:ext uri="{96DAC541-7B7A-43D3-8B79-37D633B846F1}">
-                    <asvg:svgBlip xmlns:asvg="http://schemas.microsoft.com/office/drawing/2016/SVG/main" r:embed="rId8"/>
+                    <asvg:svgBlip xmlns:asvg="http://schemas.microsoft.com/office/drawing/2016/SVG/main" r:embed="rId9"/>
                   </a:ext>
                 </a:extLst>
               </a:blip>
@@ -8302,7 +8536,7 @@
           <p:nvPr>
             <p:extLst>
               <p:ext uri="{D42A27DB-BD31-4B8C-83A1-F6EECF244321}">
-                <p14:modId xmlns:p14="http://schemas.microsoft.com/office/powerpoint/2010/main" val="1049710544"/>
+                <p14:modId xmlns:p14="http://schemas.microsoft.com/office/powerpoint/2010/main" val="2526491292"/>
               </p:ext>
             </p:extLst>
           </p:nvPr>
@@ -8340,6 +8574,76 @@
                     <a:lstStyle/>
                     <a:p>
                       <a:pPr algn="l"/>
+                      <a:endParaRPr lang="fr-FR" sz="1100" dirty="0">
+                        <a:solidFill>
+                          <a:schemeClr val="bg2">
+                            <a:lumMod val="75000"/>
+                            <a:lumOff val="25000"/>
+                          </a:schemeClr>
+                        </a:solidFill>
+                        <a:latin typeface="Arial" panose="020B0604020202020204" pitchFamily="34" charset="0"/>
+                        <a:cs typeface="Arial" panose="020B0604020202020204" pitchFamily="34" charset="0"/>
+                      </a:endParaRPr>
+                    </a:p>
+                    <a:p>
+                      <a:pPr algn="l"/>
+                      <a:r>
+                        <a:rPr lang="en-US" sz="1100" dirty="0">
+                          <a:solidFill>
+                            <a:schemeClr val="bg2">
+                              <a:lumMod val="75000"/>
+                              <a:lumOff val="25000"/>
+                            </a:schemeClr>
+                          </a:solidFill>
+                          <a:latin typeface="Arial" panose="020B0604020202020204" pitchFamily="34" charset="0"/>
+                          <a:cs typeface="Arial" panose="020B0604020202020204" pitchFamily="34" charset="0"/>
+                        </a:rPr>
+                        <a:t>Name</a:t>
+                      </a:r>
+                    </a:p>
+                  </a:txBody>
+                  <a:tcPr anchor="ctr"/>
+                </a:tc>
+                <a:tc>
+                  <a:txBody>
+                    <a:bodyPr/>
+                    <a:lstStyle/>
+                    <a:p>
+                      <a:pPr algn="l"/>
+                      <a:r>
+                        <a:rPr lang="fr-FR" sz="1100" dirty="0">
+                          <a:solidFill>
+                            <a:schemeClr val="bg1"/>
+                          </a:solidFill>
+                          <a:latin typeface="Arial" panose="020B0604020202020204" pitchFamily="34" charset="0"/>
+                          <a:cs typeface="Arial" panose="020B0604020202020204" pitchFamily="34" charset="0"/>
+                        </a:rPr>
+                        <a:t>Name</a:t>
+                      </a:r>
+                      <a:endParaRPr lang="en-US" sz="1100" dirty="0">
+                        <a:solidFill>
+                          <a:schemeClr val="bg1"/>
+                        </a:solidFill>
+                        <a:latin typeface="Arial" panose="020B0604020202020204" pitchFamily="34" charset="0"/>
+                        <a:cs typeface="Arial" panose="020B0604020202020204" pitchFamily="34" charset="0"/>
+                      </a:endParaRPr>
+                    </a:p>
+                  </a:txBody>
+                  <a:tcPr anchor="ctr"/>
+                </a:tc>
+                <a:extLst>
+                  <a:ext uri="{0D108BD9-81ED-4DB2-BD59-A6C34878D82A}">
+                    <a16:rowId xmlns:a16="http://schemas.microsoft.com/office/drawing/2014/main" val="488746829"/>
+                  </a:ext>
+                </a:extLst>
+              </a:tr>
+              <a:tr h="343557">
+                <a:tc>
+                  <a:txBody>
+                    <a:bodyPr/>
+                    <a:lstStyle/>
+                    <a:p>
+                      <a:pPr algn="l"/>
                       <a:r>
                         <a:rPr lang="fr-FR" sz="1100" dirty="0">
                           <a:solidFill>
@@ -8365,14 +8669,30 @@
                       </a:endParaRPr>
                     </a:p>
                   </a:txBody>
-                  <a:tcPr/>
+                  <a:tcPr anchor="ctr"/>
                 </a:tc>
                 <a:tc>
                   <a:txBody>
                     <a:bodyPr/>
                     <a:lstStyle/>
                     <a:p>
-                      <a:pPr algn="l"/>
+                      <a:pPr marL="0" marR="0" lvl="0" indent="0" algn="l" defTabSz="457200" rtl="0" eaLnBrk="1" fontAlgn="auto" latinLnBrk="0" hangingPunct="1">
+                        <a:lnSpc>
+                          <a:spcPct val="100000"/>
+                        </a:lnSpc>
+                        <a:spcBef>
+                          <a:spcPts val="0"/>
+                        </a:spcBef>
+                        <a:spcAft>
+                          <a:spcPts val="0"/>
+                        </a:spcAft>
+                        <a:buClrTx/>
+                        <a:buSzTx/>
+                        <a:buFontTx/>
+                        <a:buNone/>
+                        <a:tabLst/>
+                        <a:defRPr/>
+                      </a:pPr>
                       <a:r>
                         <a:rPr lang="fr-FR" sz="1100" dirty="0">
                           <a:solidFill>
@@ -8392,11 +8712,11 @@
                       </a:endParaRPr>
                     </a:p>
                   </a:txBody>
-                  <a:tcPr/>
+                  <a:tcPr anchor="ctr"/>
                 </a:tc>
                 <a:extLst>
                   <a:ext uri="{0D108BD9-81ED-4DB2-BD59-A6C34878D82A}">
-                    <a16:rowId xmlns:a16="http://schemas.microsoft.com/office/drawing/2014/main" val="488746829"/>
+                    <a16:rowId xmlns:a16="http://schemas.microsoft.com/office/drawing/2014/main" val="2114263188"/>
                   </a:ext>
                 </a:extLst>
               </a:tr>
@@ -8432,7 +8752,7 @@
                       </a:endParaRPr>
                     </a:p>
                   </a:txBody>
-                  <a:tcPr/>
+                  <a:tcPr anchor="ctr"/>
                 </a:tc>
                 <a:tc>
                   <a:txBody>
@@ -8459,90 +8779,7 @@
                       </a:endParaRPr>
                     </a:p>
                   </a:txBody>
-                  <a:tcPr/>
-                </a:tc>
-                <a:extLst>
-                  <a:ext uri="{0D108BD9-81ED-4DB2-BD59-A6C34878D82A}">
-                    <a16:rowId xmlns:a16="http://schemas.microsoft.com/office/drawing/2014/main" val="2114263188"/>
-                  </a:ext>
-                </a:extLst>
-              </a:tr>
-              <a:tr h="343557">
-                <a:tc>
-                  <a:txBody>
-                    <a:bodyPr/>
-                    <a:lstStyle/>
-                    <a:p>
-                      <a:pPr algn="l"/>
-                      <a:r>
-                        <a:rPr lang="fr-FR" sz="1100" dirty="0" err="1">
-                          <a:solidFill>
-                            <a:schemeClr val="bg2">
-                              <a:lumMod val="75000"/>
-                              <a:lumOff val="25000"/>
-                            </a:schemeClr>
-                          </a:solidFill>
-                          <a:latin typeface="Arial" panose="020B0604020202020204" pitchFamily="34" charset="0"/>
-                          <a:cs typeface="Arial" panose="020B0604020202020204" pitchFamily="34" charset="0"/>
-                        </a:rPr>
-                        <a:t>Other</a:t>
-                      </a:r>
-                      <a:r>
-                        <a:rPr lang="fr-FR" sz="1100" dirty="0">
-                          <a:solidFill>
-                            <a:schemeClr val="bg2">
-                              <a:lumMod val="75000"/>
-                              <a:lumOff val="25000"/>
-                            </a:schemeClr>
-                          </a:solidFill>
-                          <a:latin typeface="Arial" panose="020B0604020202020204" pitchFamily="34" charset="0"/>
-                          <a:cs typeface="Arial" panose="020B0604020202020204" pitchFamily="34" charset="0"/>
-                        </a:rPr>
-                        <a:t> </a:t>
-                      </a:r>
-                      <a:r>
-                        <a:rPr lang="fr-FR" sz="1100" dirty="0" err="1">
-                          <a:solidFill>
-                            <a:schemeClr val="bg2">
-                              <a:lumMod val="75000"/>
-                              <a:lumOff val="25000"/>
-                            </a:schemeClr>
-                          </a:solidFill>
-                          <a:latin typeface="Arial" panose="020B0604020202020204" pitchFamily="34" charset="0"/>
-                          <a:cs typeface="Arial" panose="020B0604020202020204" pitchFamily="34" charset="0"/>
-                        </a:rPr>
-                        <a:t>annotatios</a:t>
-                      </a:r>
-                      <a:endParaRPr lang="en-US" sz="1100" dirty="0">
-                        <a:solidFill>
-                          <a:schemeClr val="bg2">
-                            <a:lumMod val="75000"/>
-                            <a:lumOff val="25000"/>
-                          </a:schemeClr>
-                        </a:solidFill>
-                        <a:latin typeface="Arial" panose="020B0604020202020204" pitchFamily="34" charset="0"/>
-                        <a:cs typeface="Arial" panose="020B0604020202020204" pitchFamily="34" charset="0"/>
-                      </a:endParaRPr>
-                    </a:p>
-                  </a:txBody>
-                  <a:tcPr/>
-                </a:tc>
-                <a:tc>
-                  <a:txBody>
-                    <a:bodyPr/>
-                    <a:lstStyle/>
-                    <a:p>
-                      <a:pPr algn="l"/>
-                      <a:endParaRPr lang="en-US" sz="1100" dirty="0">
-                        <a:solidFill>
-                          <a:schemeClr val="bg1"/>
-                        </a:solidFill>
-                        <a:latin typeface="Arial" panose="020B0604020202020204" pitchFamily="34" charset="0"/>
-                        <a:cs typeface="Arial" panose="020B0604020202020204" pitchFamily="34" charset="0"/>
-                      </a:endParaRPr>
-                    </a:p>
-                  </a:txBody>
-                  <a:tcPr/>
+                  <a:tcPr anchor="ctr"/>
                 </a:tc>
                 <a:extLst>
                   <a:ext uri="{0D108BD9-81ED-4DB2-BD59-A6C34878D82A}">
@@ -8618,16 +8855,19 @@
             </a:r>
           </a:p>
           <a:p>
-            <a:endParaRPr lang="fr-FR" sz="1100" dirty="0">
-              <a:solidFill>
-                <a:schemeClr val="bg2">
-                  <a:lumMod val="75000"/>
-                  <a:lumOff val="25000"/>
-                </a:schemeClr>
-              </a:solidFill>
-              <a:latin typeface="Arial" panose="020B0604020202020204" pitchFamily="34" charset="0"/>
-              <a:cs typeface="Arial" panose="020B0604020202020204" pitchFamily="34" charset="0"/>
-            </a:endParaRPr>
+            <a:r>
+              <a:rPr lang="fr-FR" sz="1100" dirty="0">
+                <a:solidFill>
+                  <a:schemeClr val="bg2">
+                    <a:lumMod val="75000"/>
+                    <a:lumOff val="25000"/>
+                  </a:schemeClr>
+                </a:solidFill>
+                <a:latin typeface="Arial" panose="020B0604020202020204" pitchFamily="34" charset="0"/>
+                <a:cs typeface="Arial" panose="020B0604020202020204" pitchFamily="34" charset="0"/>
+              </a:rPr>
+              <a:t>Note 1: args</a:t>
+            </a:r>
           </a:p>
           <a:p>
             <a:endParaRPr lang="fr-FR" sz="1100" dirty="0">
@@ -8766,387 +9006,6 @@
           </a:fontRef>
         </p:style>
       </p:cxnSp>
-      <p:grpSp>
-        <p:nvGrpSpPr>
-          <p:cNvPr id="29" name="Groupe 28">
-            <a:extLst>
-              <a:ext uri="{FF2B5EF4-FFF2-40B4-BE49-F238E27FC236}">
-                <a16:creationId xmlns:a16="http://schemas.microsoft.com/office/drawing/2014/main" id="{02DD8DAF-A47B-417C-3D7B-9C9B932C810C}"/>
-              </a:ext>
-            </a:extLst>
-          </p:cNvPr>
-          <p:cNvGrpSpPr/>
-          <p:nvPr/>
-        </p:nvGrpSpPr>
-        <p:grpSpPr>
-          <a:xfrm>
-            <a:off x="6995426" y="3380582"/>
-            <a:ext cx="2538302" cy="720000"/>
-            <a:chOff x="6319726" y="3276871"/>
-            <a:chExt cx="2538302" cy="720000"/>
-          </a:xfrm>
-        </p:grpSpPr>
-        <p:grpSp>
-          <p:nvGrpSpPr>
-            <p:cNvPr id="28" name="Groupe 27">
-              <a:extLst>
-                <a:ext uri="{FF2B5EF4-FFF2-40B4-BE49-F238E27FC236}">
-                  <a16:creationId xmlns:a16="http://schemas.microsoft.com/office/drawing/2014/main" id="{6FE0C56F-BDA8-82B4-9560-449008B9194B}"/>
-                </a:ext>
-              </a:extLst>
-            </p:cNvPr>
-            <p:cNvGrpSpPr/>
-            <p:nvPr/>
-          </p:nvGrpSpPr>
-          <p:grpSpPr>
-            <a:xfrm>
-              <a:off x="6319726" y="3276871"/>
-              <a:ext cx="720000" cy="720000"/>
-              <a:chOff x="4910696" y="3330587"/>
-              <a:chExt cx="720000" cy="720000"/>
-            </a:xfrm>
-          </p:grpSpPr>
-          <p:sp>
-            <p:nvSpPr>
-              <p:cNvPr id="86" name="Rectangle : coins arrondis 85">
-                <a:extLst>
-                  <a:ext uri="{FF2B5EF4-FFF2-40B4-BE49-F238E27FC236}">
-                    <a16:creationId xmlns:a16="http://schemas.microsoft.com/office/drawing/2014/main" id="{2B0DD6F5-B01E-BD00-AB63-7E5B0DF051D8}"/>
-                  </a:ext>
-                </a:extLst>
-              </p:cNvPr>
-              <p:cNvSpPr/>
-              <p:nvPr/>
-            </p:nvSpPr>
-            <p:spPr>
-              <a:xfrm>
-                <a:off x="4910696" y="3330587"/>
-                <a:ext cx="720000" cy="720000"/>
-              </a:xfrm>
-              <a:prstGeom prst="roundRect">
-                <a:avLst>
-                  <a:gd name="adj" fmla="val 6463"/>
-                </a:avLst>
-              </a:prstGeom>
-              <a:solidFill>
-                <a:srgbClr val="4696FD"/>
-              </a:solidFill>
-              <a:ln>
-                <a:noFill/>
-              </a:ln>
-            </p:spPr>
-            <p:style>
-              <a:lnRef idx="2">
-                <a:schemeClr val="accent1">
-                  <a:shade val="50000"/>
-                </a:schemeClr>
-              </a:lnRef>
-              <a:fillRef idx="1">
-                <a:schemeClr val="accent1"/>
-              </a:fillRef>
-              <a:effectRef idx="0">
-                <a:schemeClr val="accent1"/>
-              </a:effectRef>
-              <a:fontRef idx="minor">
-                <a:schemeClr val="lt1"/>
-              </a:fontRef>
-            </p:style>
-            <p:txBody>
-              <a:bodyPr rtlCol="0" anchor="ctr"/>
-              <a:lstStyle/>
-              <a:p>
-                <a:pPr algn="ctr"/>
-                <a:endParaRPr lang="en-US" sz="2000" dirty="0">
-                  <a:latin typeface="Arial" panose="020B0604020202020204" pitchFamily="34" charset="0"/>
-                  <a:cs typeface="Arial" panose="020B0604020202020204" pitchFamily="34" charset="0"/>
-                </a:endParaRPr>
-              </a:p>
-            </p:txBody>
-          </p:sp>
-          <p:pic>
-            <p:nvPicPr>
-              <p:cNvPr id="27" name="Graphique 26" descr="Appareil photo avec un remplissage uni">
-                <a:extLst>
-                  <a:ext uri="{FF2B5EF4-FFF2-40B4-BE49-F238E27FC236}">
-                    <a16:creationId xmlns:a16="http://schemas.microsoft.com/office/drawing/2014/main" id="{1ED5FBCA-1102-6228-387C-0BC49ABADCBE}"/>
-                  </a:ext>
-                </a:extLst>
-              </p:cNvPr>
-              <p:cNvPicPr>
-                <a:picLocks noChangeAspect="1"/>
-              </p:cNvPicPr>
-              <p:nvPr/>
-            </p:nvPicPr>
-            <p:blipFill>
-              <a:blip r:embed="rId9">
-                <a:extLst>
-                  <a:ext uri="{28A0092B-C50C-407E-A947-70E740481C1C}">
-                    <a14:useLocalDpi xmlns:a14="http://schemas.microsoft.com/office/drawing/2010/main" val="0"/>
-                  </a:ext>
-                  <a:ext uri="{96DAC541-7B7A-43D3-8B79-37D633B846F1}">
-                    <asvg:svgBlip xmlns:asvg="http://schemas.microsoft.com/office/drawing/2016/SVG/main" r:embed="rId10"/>
-                  </a:ext>
-                </a:extLst>
-              </a:blip>
-              <a:srcRect/>
-              <a:stretch/>
-            </p:blipFill>
-            <p:spPr>
-              <a:xfrm>
-                <a:off x="4995711" y="3400884"/>
-                <a:ext cx="549970" cy="549970"/>
-              </a:xfrm>
-              <a:prstGeom prst="rect">
-                <a:avLst/>
-              </a:prstGeom>
-            </p:spPr>
-          </p:pic>
-        </p:grpSp>
-        <p:grpSp>
-          <p:nvGrpSpPr>
-            <p:cNvPr id="89" name="Groupe 88">
-              <a:extLst>
-                <a:ext uri="{FF2B5EF4-FFF2-40B4-BE49-F238E27FC236}">
-                  <a16:creationId xmlns:a16="http://schemas.microsoft.com/office/drawing/2014/main" id="{67FB2B5B-069E-C2FF-09EA-EE7F1EDED54A}"/>
-                </a:ext>
-              </a:extLst>
-            </p:cNvPr>
-            <p:cNvGrpSpPr/>
-            <p:nvPr/>
-          </p:nvGrpSpPr>
-          <p:grpSpPr>
-            <a:xfrm>
-              <a:off x="7228877" y="3276871"/>
-              <a:ext cx="720000" cy="720000"/>
-              <a:chOff x="4910696" y="3330587"/>
-              <a:chExt cx="720000" cy="720000"/>
-            </a:xfrm>
-          </p:grpSpPr>
-          <p:sp>
-            <p:nvSpPr>
-              <p:cNvPr id="91" name="Rectangle : coins arrondis 90">
-                <a:extLst>
-                  <a:ext uri="{FF2B5EF4-FFF2-40B4-BE49-F238E27FC236}">
-                    <a16:creationId xmlns:a16="http://schemas.microsoft.com/office/drawing/2014/main" id="{F87AA1C3-0BEF-E78C-1C56-94BCBF9F4D10}"/>
-                  </a:ext>
-                </a:extLst>
-              </p:cNvPr>
-              <p:cNvSpPr/>
-              <p:nvPr/>
-            </p:nvSpPr>
-            <p:spPr>
-              <a:xfrm>
-                <a:off x="4910696" y="3330587"/>
-                <a:ext cx="720000" cy="720000"/>
-              </a:xfrm>
-              <a:prstGeom prst="roundRect">
-                <a:avLst>
-                  <a:gd name="adj" fmla="val 6463"/>
-                </a:avLst>
-              </a:prstGeom>
-              <a:solidFill>
-                <a:srgbClr val="4696FD"/>
-              </a:solidFill>
-              <a:ln>
-                <a:noFill/>
-              </a:ln>
-            </p:spPr>
-            <p:style>
-              <a:lnRef idx="2">
-                <a:schemeClr val="accent1">
-                  <a:shade val="50000"/>
-                </a:schemeClr>
-              </a:lnRef>
-              <a:fillRef idx="1">
-                <a:schemeClr val="accent1"/>
-              </a:fillRef>
-              <a:effectRef idx="0">
-                <a:schemeClr val="accent1"/>
-              </a:effectRef>
-              <a:fontRef idx="minor">
-                <a:schemeClr val="lt1"/>
-              </a:fontRef>
-            </p:style>
-            <p:txBody>
-              <a:bodyPr rtlCol="0" anchor="ctr"/>
-              <a:lstStyle/>
-              <a:p>
-                <a:pPr algn="ctr"/>
-                <a:endParaRPr lang="en-US" sz="2000" dirty="0">
-                  <a:latin typeface="Arial" panose="020B0604020202020204" pitchFamily="34" charset="0"/>
-                  <a:cs typeface="Arial" panose="020B0604020202020204" pitchFamily="34" charset="0"/>
-                </a:endParaRPr>
-              </a:p>
-            </p:txBody>
-          </p:sp>
-          <p:pic>
-            <p:nvPicPr>
-              <p:cNvPr id="92" name="Graphique 91">
-                <a:extLst>
-                  <a:ext uri="{FF2B5EF4-FFF2-40B4-BE49-F238E27FC236}">
-                    <a16:creationId xmlns:a16="http://schemas.microsoft.com/office/drawing/2014/main" id="{AE52E32C-8969-E998-7D33-494DA8C1AC30}"/>
-                  </a:ext>
-                </a:extLst>
-              </p:cNvPr>
-              <p:cNvPicPr>
-                <a:picLocks noChangeAspect="1"/>
-              </p:cNvPicPr>
-              <p:nvPr/>
-            </p:nvPicPr>
-            <p:blipFill>
-              <a:blip r:embed="rId11">
-                <a:extLst>
-                  <a:ext uri="{BEBA8EAE-BF5A-486C-A8C5-ECC9F3942E4B}">
-                    <a14:imgProps xmlns:a14="http://schemas.microsoft.com/office/drawing/2010/main">
-                      <a14:imgLayer r:embed="rId12">
-                        <a14:imgEffect>
-                          <a14:brightnessContrast bright="100000" contrast="100000"/>
-                        </a14:imgEffect>
-                      </a14:imgLayer>
-                    </a14:imgProps>
-                  </a:ext>
-                  <a:ext uri="{28A0092B-C50C-407E-A947-70E740481C1C}">
-                    <a14:useLocalDpi xmlns:a14="http://schemas.microsoft.com/office/drawing/2010/main" val="0"/>
-                  </a:ext>
-                </a:extLst>
-              </a:blip>
-              <a:srcRect/>
-              <a:stretch/>
-            </p:blipFill>
-            <p:spPr>
-              <a:xfrm>
-                <a:off x="4995711" y="3400884"/>
-                <a:ext cx="549970" cy="549970"/>
-              </a:xfrm>
-              <a:prstGeom prst="rect">
-                <a:avLst/>
-              </a:prstGeom>
-            </p:spPr>
-          </p:pic>
-        </p:grpSp>
-        <p:grpSp>
-          <p:nvGrpSpPr>
-            <p:cNvPr id="93" name="Groupe 92">
-              <a:extLst>
-                <a:ext uri="{FF2B5EF4-FFF2-40B4-BE49-F238E27FC236}">
-                  <a16:creationId xmlns:a16="http://schemas.microsoft.com/office/drawing/2014/main" id="{6148D2E6-CA3D-E469-2AE3-73D3914F9BBF}"/>
-                </a:ext>
-              </a:extLst>
-            </p:cNvPr>
-            <p:cNvGrpSpPr/>
-            <p:nvPr/>
-          </p:nvGrpSpPr>
-          <p:grpSpPr>
-            <a:xfrm>
-              <a:off x="8138028" y="3276871"/>
-              <a:ext cx="720000" cy="720000"/>
-              <a:chOff x="4910696" y="3330587"/>
-              <a:chExt cx="720000" cy="720000"/>
-            </a:xfrm>
-          </p:grpSpPr>
-          <p:sp>
-            <p:nvSpPr>
-              <p:cNvPr id="94" name="Rectangle : coins arrondis 93">
-                <a:extLst>
-                  <a:ext uri="{FF2B5EF4-FFF2-40B4-BE49-F238E27FC236}">
-                    <a16:creationId xmlns:a16="http://schemas.microsoft.com/office/drawing/2014/main" id="{F5BDA983-DEE4-AAD5-4AAC-3B047F3F56C9}"/>
-                  </a:ext>
-                </a:extLst>
-              </p:cNvPr>
-              <p:cNvSpPr/>
-              <p:nvPr/>
-            </p:nvSpPr>
-            <p:spPr>
-              <a:xfrm>
-                <a:off x="4910696" y="3330587"/>
-                <a:ext cx="720000" cy="720000"/>
-              </a:xfrm>
-              <a:prstGeom prst="roundRect">
-                <a:avLst>
-                  <a:gd name="adj" fmla="val 6463"/>
-                </a:avLst>
-              </a:prstGeom>
-              <a:solidFill>
-                <a:srgbClr val="4696FD"/>
-              </a:solidFill>
-              <a:ln>
-                <a:noFill/>
-              </a:ln>
-            </p:spPr>
-            <p:style>
-              <a:lnRef idx="2">
-                <a:schemeClr val="accent1">
-                  <a:shade val="50000"/>
-                </a:schemeClr>
-              </a:lnRef>
-              <a:fillRef idx="1">
-                <a:schemeClr val="accent1"/>
-              </a:fillRef>
-              <a:effectRef idx="0">
-                <a:schemeClr val="accent1"/>
-              </a:effectRef>
-              <a:fontRef idx="minor">
-                <a:schemeClr val="lt1"/>
-              </a:fontRef>
-            </p:style>
-            <p:txBody>
-              <a:bodyPr rtlCol="0" anchor="ctr"/>
-              <a:lstStyle/>
-              <a:p>
-                <a:pPr algn="ctr"/>
-                <a:endParaRPr lang="en-US" sz="2000" dirty="0">
-                  <a:latin typeface="Arial" panose="020B0604020202020204" pitchFamily="34" charset="0"/>
-                  <a:cs typeface="Arial" panose="020B0604020202020204" pitchFamily="34" charset="0"/>
-                </a:endParaRPr>
-              </a:p>
-            </p:txBody>
-          </p:sp>
-          <p:pic>
-            <p:nvPicPr>
-              <p:cNvPr id="95" name="Graphique 94">
-                <a:extLst>
-                  <a:ext uri="{FF2B5EF4-FFF2-40B4-BE49-F238E27FC236}">
-                    <a16:creationId xmlns:a16="http://schemas.microsoft.com/office/drawing/2014/main" id="{BFC4D4E3-2418-6DF7-422A-5AAB62EFAE1B}"/>
-                  </a:ext>
-                </a:extLst>
-              </p:cNvPr>
-              <p:cNvPicPr>
-                <a:picLocks noChangeAspect="1"/>
-              </p:cNvPicPr>
-              <p:nvPr/>
-            </p:nvPicPr>
-            <p:blipFill>
-              <a:blip r:embed="rId13">
-                <a:extLst>
-                  <a:ext uri="{BEBA8EAE-BF5A-486C-A8C5-ECC9F3942E4B}">
-                    <a14:imgProps xmlns:a14="http://schemas.microsoft.com/office/drawing/2010/main">
-                      <a14:imgLayer r:embed="rId14">
-                        <a14:imgEffect>
-                          <a14:brightnessContrast bright="100000" contrast="100000"/>
-                        </a14:imgEffect>
-                      </a14:imgLayer>
-                    </a14:imgProps>
-                  </a:ext>
-                  <a:ext uri="{28A0092B-C50C-407E-A947-70E740481C1C}">
-                    <a14:useLocalDpi xmlns:a14="http://schemas.microsoft.com/office/drawing/2010/main" val="0"/>
-                  </a:ext>
-                </a:extLst>
-              </a:blip>
-              <a:srcRect/>
-              <a:stretch/>
-            </p:blipFill>
-            <p:spPr>
-              <a:xfrm>
-                <a:off x="5054075" y="3400884"/>
-                <a:ext cx="433241" cy="549970"/>
-              </a:xfrm>
-              <a:prstGeom prst="rect">
-                <a:avLst/>
-              </a:prstGeom>
-            </p:spPr>
-          </p:pic>
-        </p:grpSp>
-      </p:grpSp>
       <p:cxnSp>
         <p:nvCxnSpPr>
           <p:cNvPr id="97" name="Connecteur droit 96">
@@ -9259,7 +9118,7 @@
         <p:sp>
           <p:nvSpPr>
             <p:cNvPr id="99" name="Rectangle : coins arrondis 98">
-              <a:hlinkClick r:id="rId15" action="ppaction://hlinksldjump"/>
+              <a:hlinkClick r:id="rId10" action="ppaction://hlinksldjump"/>
               <a:extLst>
                 <a:ext uri="{FF2B5EF4-FFF2-40B4-BE49-F238E27FC236}">
                   <a16:creationId xmlns:a16="http://schemas.microsoft.com/office/drawing/2014/main" id="{05618214-0A65-D49B-94D3-38307C9AC08E}"/>
@@ -9324,7 +9183,7 @@
         <p:sp>
           <p:nvSpPr>
             <p:cNvPr id="100" name="Rectangle : coins arrondis 99">
-              <a:hlinkClick r:id="rId15" action="ppaction://hlinksldjump"/>
+              <a:hlinkClick r:id="rId10" action="ppaction://hlinksldjump"/>
               <a:extLst>
                 <a:ext uri="{FF2B5EF4-FFF2-40B4-BE49-F238E27FC236}">
                   <a16:creationId xmlns:a16="http://schemas.microsoft.com/office/drawing/2014/main" id="{0B8E82F0-E235-86B0-FA63-14F80127A4D5}"/>
@@ -9389,7 +9248,7 @@
         <p:sp>
           <p:nvSpPr>
             <p:cNvPr id="101" name="Rectangle : coins arrondis 100">
-              <a:hlinkClick r:id="rId15" action="ppaction://hlinksldjump"/>
+              <a:hlinkClick r:id="rId10" action="ppaction://hlinksldjump"/>
               <a:extLst>
                 <a:ext uri="{FF2B5EF4-FFF2-40B4-BE49-F238E27FC236}">
                   <a16:creationId xmlns:a16="http://schemas.microsoft.com/office/drawing/2014/main" id="{3E6945AD-175D-CE1D-D879-61EF3CCAC2AE}"/>
@@ -9454,7 +9313,7 @@
         <p:sp>
           <p:nvSpPr>
             <p:cNvPr id="102" name="Rectangle : coins arrondis 101">
-              <a:hlinkClick r:id="rId15" action="ppaction://hlinksldjump"/>
+              <a:hlinkClick r:id="rId10" action="ppaction://hlinksldjump"/>
               <a:extLst>
                 <a:ext uri="{FF2B5EF4-FFF2-40B4-BE49-F238E27FC236}">
                   <a16:creationId xmlns:a16="http://schemas.microsoft.com/office/drawing/2014/main" id="{4AB5701A-75D7-8E06-EF86-476C42C4CE6C}"/>
@@ -10048,7 +9907,7 @@
       <p:sp>
         <p:nvSpPr>
           <p:cNvPr id="147" name="Rectangle : coins arrondis 146">
-            <a:hlinkClick r:id="rId16" action="ppaction://hlinksldjump"/>
+            <a:hlinkClick r:id="rId11" action="ppaction://hlinksldjump"/>
             <a:extLst>
               <a:ext uri="{FF2B5EF4-FFF2-40B4-BE49-F238E27FC236}">
                 <a16:creationId xmlns:a16="http://schemas.microsoft.com/office/drawing/2014/main" id="{AD6B16EE-E713-BD4F-0442-8858CE0DB798}"/>
@@ -10197,7 +10056,7 @@
         <p:sp>
           <p:nvSpPr>
             <p:cNvPr id="55" name="ZoneTexte 54">
-              <a:hlinkClick r:id="rId2" action="ppaction://hlinksldjump"/>
+              <a:hlinkClick r:id="rId3" action="ppaction://hlinksldjump"/>
               <a:extLst>
                 <a:ext uri="{FF2B5EF4-FFF2-40B4-BE49-F238E27FC236}">
                   <a16:creationId xmlns:a16="http://schemas.microsoft.com/office/drawing/2014/main" id="{D89A5D99-4111-D5F7-7AE0-490F6C7BB22B}"/>
@@ -10241,6 +10100,757 @@
           </p:txBody>
         </p:sp>
       </p:grpSp>
+      <p:grpSp>
+        <p:nvGrpSpPr>
+          <p:cNvPr id="9" name="Groupe 8">
+            <a:extLst>
+              <a:ext uri="{FF2B5EF4-FFF2-40B4-BE49-F238E27FC236}">
+                <a16:creationId xmlns:a16="http://schemas.microsoft.com/office/drawing/2014/main" id="{F174D3DC-3325-6F65-A628-F3A5764180A6}"/>
+              </a:ext>
+            </a:extLst>
+          </p:cNvPr>
+          <p:cNvGrpSpPr/>
+          <p:nvPr/>
+        </p:nvGrpSpPr>
+        <p:grpSpPr>
+          <a:xfrm>
+            <a:off x="6030809" y="3382960"/>
+            <a:ext cx="4253355" cy="743999"/>
+            <a:chOff x="6311642" y="3363840"/>
+            <a:chExt cx="4253355" cy="743999"/>
+          </a:xfrm>
+        </p:grpSpPr>
+        <p:grpSp>
+          <p:nvGrpSpPr>
+            <p:cNvPr id="8" name="Groupe 7">
+              <a:extLst>
+                <a:ext uri="{FF2B5EF4-FFF2-40B4-BE49-F238E27FC236}">
+                  <a16:creationId xmlns:a16="http://schemas.microsoft.com/office/drawing/2014/main" id="{36071E2A-D39C-311A-8E3A-4EF7A15176D9}"/>
+                </a:ext>
+              </a:extLst>
+            </p:cNvPr>
+            <p:cNvGrpSpPr/>
+            <p:nvPr/>
+          </p:nvGrpSpPr>
+          <p:grpSpPr>
+            <a:xfrm>
+              <a:off x="6311642" y="3363840"/>
+              <a:ext cx="4253355" cy="743999"/>
+              <a:chOff x="6995426" y="3356583"/>
+              <a:chExt cx="4253355" cy="743999"/>
+            </a:xfrm>
+          </p:grpSpPr>
+          <p:grpSp>
+            <p:nvGrpSpPr>
+              <p:cNvPr id="29" name="Groupe 28">
+                <a:extLst>
+                  <a:ext uri="{FF2B5EF4-FFF2-40B4-BE49-F238E27FC236}">
+                    <a16:creationId xmlns:a16="http://schemas.microsoft.com/office/drawing/2014/main" id="{02DD8DAF-A47B-417C-3D7B-9C9B932C810C}"/>
+                  </a:ext>
+                </a:extLst>
+              </p:cNvPr>
+              <p:cNvGrpSpPr/>
+              <p:nvPr/>
+            </p:nvGrpSpPr>
+            <p:grpSpPr>
+              <a:xfrm>
+                <a:off x="6995426" y="3380582"/>
+                <a:ext cx="2538302" cy="720000"/>
+                <a:chOff x="6319726" y="3276871"/>
+                <a:chExt cx="2538302" cy="720000"/>
+              </a:xfrm>
+            </p:grpSpPr>
+            <p:grpSp>
+              <p:nvGrpSpPr>
+                <p:cNvPr id="28" name="Groupe 27">
+                  <a:extLst>
+                    <a:ext uri="{FF2B5EF4-FFF2-40B4-BE49-F238E27FC236}">
+                      <a16:creationId xmlns:a16="http://schemas.microsoft.com/office/drawing/2014/main" id="{6FE0C56F-BDA8-82B4-9560-449008B9194B}"/>
+                    </a:ext>
+                  </a:extLst>
+                </p:cNvPr>
+                <p:cNvGrpSpPr/>
+                <p:nvPr/>
+              </p:nvGrpSpPr>
+              <p:grpSpPr>
+                <a:xfrm>
+                  <a:off x="6319726" y="3276871"/>
+                  <a:ext cx="720000" cy="720000"/>
+                  <a:chOff x="4910696" y="3330587"/>
+                  <a:chExt cx="720000" cy="720000"/>
+                </a:xfrm>
+              </p:grpSpPr>
+              <p:sp>
+                <p:nvSpPr>
+                  <p:cNvPr id="86" name="Rectangle : coins arrondis 85">
+                    <a:extLst>
+                      <a:ext uri="{FF2B5EF4-FFF2-40B4-BE49-F238E27FC236}">
+                        <a16:creationId xmlns:a16="http://schemas.microsoft.com/office/drawing/2014/main" id="{2B0DD6F5-B01E-BD00-AB63-7E5B0DF051D8}"/>
+                      </a:ext>
+                    </a:extLst>
+                  </p:cNvPr>
+                  <p:cNvSpPr/>
+                  <p:nvPr/>
+                </p:nvSpPr>
+                <p:spPr>
+                  <a:xfrm>
+                    <a:off x="4910696" y="3330587"/>
+                    <a:ext cx="720000" cy="720000"/>
+                  </a:xfrm>
+                  <a:prstGeom prst="roundRect">
+                    <a:avLst>
+                      <a:gd name="adj" fmla="val 6463"/>
+                    </a:avLst>
+                  </a:prstGeom>
+                  <a:solidFill>
+                    <a:srgbClr val="4696FD"/>
+                  </a:solidFill>
+                  <a:ln>
+                    <a:noFill/>
+                  </a:ln>
+                </p:spPr>
+                <p:style>
+                  <a:lnRef idx="2">
+                    <a:schemeClr val="accent1">
+                      <a:shade val="50000"/>
+                    </a:schemeClr>
+                  </a:lnRef>
+                  <a:fillRef idx="1">
+                    <a:schemeClr val="accent1"/>
+                  </a:fillRef>
+                  <a:effectRef idx="0">
+                    <a:schemeClr val="accent1"/>
+                  </a:effectRef>
+                  <a:fontRef idx="minor">
+                    <a:schemeClr val="lt1"/>
+                  </a:fontRef>
+                </p:style>
+                <p:txBody>
+                  <a:bodyPr rtlCol="0" anchor="ctr"/>
+                  <a:lstStyle/>
+                  <a:p>
+                    <a:pPr algn="ctr"/>
+                    <a:endParaRPr lang="en-US" sz="2000" dirty="0">
+                      <a:latin typeface="Arial" panose="020B0604020202020204" pitchFamily="34" charset="0"/>
+                      <a:cs typeface="Arial" panose="020B0604020202020204" pitchFamily="34" charset="0"/>
+                    </a:endParaRPr>
+                  </a:p>
+                </p:txBody>
+              </p:sp>
+              <p:pic>
+                <p:nvPicPr>
+                  <p:cNvPr id="27" name="Graphique 26" descr="Appareil photo avec un remplissage uni">
+                    <a:extLst>
+                      <a:ext uri="{FF2B5EF4-FFF2-40B4-BE49-F238E27FC236}">
+                        <a16:creationId xmlns:a16="http://schemas.microsoft.com/office/drawing/2014/main" id="{1ED5FBCA-1102-6228-387C-0BC49ABADCBE}"/>
+                      </a:ext>
+                    </a:extLst>
+                  </p:cNvPr>
+                  <p:cNvPicPr>
+                    <a:picLocks noChangeAspect="1"/>
+                  </p:cNvPicPr>
+                  <p:nvPr/>
+                </p:nvPicPr>
+                <p:blipFill>
+                  <a:blip r:embed="rId12">
+                    <a:extLst>
+                      <a:ext uri="{28A0092B-C50C-407E-A947-70E740481C1C}">
+                        <a14:useLocalDpi xmlns:a14="http://schemas.microsoft.com/office/drawing/2010/main" val="0"/>
+                      </a:ext>
+                      <a:ext uri="{96DAC541-7B7A-43D3-8B79-37D633B846F1}">
+                        <asvg:svgBlip xmlns:asvg="http://schemas.microsoft.com/office/drawing/2016/SVG/main" r:embed="rId13"/>
+                      </a:ext>
+                    </a:extLst>
+                  </a:blip>
+                  <a:srcRect/>
+                  <a:stretch/>
+                </p:blipFill>
+                <p:spPr>
+                  <a:xfrm>
+                    <a:off x="4995711" y="3400884"/>
+                    <a:ext cx="549970" cy="549970"/>
+                  </a:xfrm>
+                  <a:prstGeom prst="rect">
+                    <a:avLst/>
+                  </a:prstGeom>
+                </p:spPr>
+              </p:pic>
+            </p:grpSp>
+            <p:grpSp>
+              <p:nvGrpSpPr>
+                <p:cNvPr id="89" name="Groupe 88">
+                  <a:extLst>
+                    <a:ext uri="{FF2B5EF4-FFF2-40B4-BE49-F238E27FC236}">
+                      <a16:creationId xmlns:a16="http://schemas.microsoft.com/office/drawing/2014/main" id="{67FB2B5B-069E-C2FF-09EA-EE7F1EDED54A}"/>
+                    </a:ext>
+                  </a:extLst>
+                </p:cNvPr>
+                <p:cNvGrpSpPr/>
+                <p:nvPr/>
+              </p:nvGrpSpPr>
+              <p:grpSpPr>
+                <a:xfrm>
+                  <a:off x="7228877" y="3276871"/>
+                  <a:ext cx="720000" cy="720000"/>
+                  <a:chOff x="4910696" y="3330587"/>
+                  <a:chExt cx="720000" cy="720000"/>
+                </a:xfrm>
+              </p:grpSpPr>
+              <p:sp>
+                <p:nvSpPr>
+                  <p:cNvPr id="91" name="Rectangle : coins arrondis 90">
+                    <a:extLst>
+                      <a:ext uri="{FF2B5EF4-FFF2-40B4-BE49-F238E27FC236}">
+                        <a16:creationId xmlns:a16="http://schemas.microsoft.com/office/drawing/2014/main" id="{F87AA1C3-0BEF-E78C-1C56-94BCBF9F4D10}"/>
+                      </a:ext>
+                    </a:extLst>
+                  </p:cNvPr>
+                  <p:cNvSpPr/>
+                  <p:nvPr/>
+                </p:nvSpPr>
+                <p:spPr>
+                  <a:xfrm>
+                    <a:off x="4910696" y="3330587"/>
+                    <a:ext cx="720000" cy="720000"/>
+                  </a:xfrm>
+                  <a:prstGeom prst="roundRect">
+                    <a:avLst>
+                      <a:gd name="adj" fmla="val 6463"/>
+                    </a:avLst>
+                  </a:prstGeom>
+                  <a:solidFill>
+                    <a:srgbClr val="4696FD"/>
+                  </a:solidFill>
+                  <a:ln>
+                    <a:noFill/>
+                  </a:ln>
+                </p:spPr>
+                <p:style>
+                  <a:lnRef idx="2">
+                    <a:schemeClr val="accent1">
+                      <a:shade val="50000"/>
+                    </a:schemeClr>
+                  </a:lnRef>
+                  <a:fillRef idx="1">
+                    <a:schemeClr val="accent1"/>
+                  </a:fillRef>
+                  <a:effectRef idx="0">
+                    <a:schemeClr val="accent1"/>
+                  </a:effectRef>
+                  <a:fontRef idx="minor">
+                    <a:schemeClr val="lt1"/>
+                  </a:fontRef>
+                </p:style>
+                <p:txBody>
+                  <a:bodyPr rtlCol="0" anchor="ctr"/>
+                  <a:lstStyle/>
+                  <a:p>
+                    <a:pPr algn="ctr"/>
+                    <a:endParaRPr lang="en-US" sz="2000" dirty="0">
+                      <a:latin typeface="Arial" panose="020B0604020202020204" pitchFamily="34" charset="0"/>
+                      <a:cs typeface="Arial" panose="020B0604020202020204" pitchFamily="34" charset="0"/>
+                    </a:endParaRPr>
+                  </a:p>
+                </p:txBody>
+              </p:sp>
+              <p:pic>
+                <p:nvPicPr>
+                  <p:cNvPr id="92" name="Graphique 91">
+                    <a:extLst>
+                      <a:ext uri="{FF2B5EF4-FFF2-40B4-BE49-F238E27FC236}">
+                        <a16:creationId xmlns:a16="http://schemas.microsoft.com/office/drawing/2014/main" id="{AE52E32C-8969-E998-7D33-494DA8C1AC30}"/>
+                      </a:ext>
+                    </a:extLst>
+                  </p:cNvPr>
+                  <p:cNvPicPr>
+                    <a:picLocks noChangeAspect="1"/>
+                  </p:cNvPicPr>
+                  <p:nvPr/>
+                </p:nvPicPr>
+                <p:blipFill>
+                  <a:blip r:embed="rId14">
+                    <a:extLst>
+                      <a:ext uri="{BEBA8EAE-BF5A-486C-A8C5-ECC9F3942E4B}">
+                        <a14:imgProps xmlns:a14="http://schemas.microsoft.com/office/drawing/2010/main">
+                          <a14:imgLayer r:embed="rId15">
+                            <a14:imgEffect>
+                              <a14:brightnessContrast bright="100000" contrast="100000"/>
+                            </a14:imgEffect>
+                          </a14:imgLayer>
+                        </a14:imgProps>
+                      </a:ext>
+                      <a:ext uri="{28A0092B-C50C-407E-A947-70E740481C1C}">
+                        <a14:useLocalDpi xmlns:a14="http://schemas.microsoft.com/office/drawing/2010/main" val="0"/>
+                      </a:ext>
+                    </a:extLst>
+                  </a:blip>
+                  <a:srcRect/>
+                  <a:stretch/>
+                </p:blipFill>
+                <p:spPr>
+                  <a:xfrm>
+                    <a:off x="4995711" y="3400884"/>
+                    <a:ext cx="549970" cy="549970"/>
+                  </a:xfrm>
+                  <a:prstGeom prst="rect">
+                    <a:avLst/>
+                  </a:prstGeom>
+                </p:spPr>
+              </p:pic>
+            </p:grpSp>
+            <p:grpSp>
+              <p:nvGrpSpPr>
+                <p:cNvPr id="93" name="Groupe 92">
+                  <a:extLst>
+                    <a:ext uri="{FF2B5EF4-FFF2-40B4-BE49-F238E27FC236}">
+                      <a16:creationId xmlns:a16="http://schemas.microsoft.com/office/drawing/2014/main" id="{6148D2E6-CA3D-E469-2AE3-73D3914F9BBF}"/>
+                    </a:ext>
+                  </a:extLst>
+                </p:cNvPr>
+                <p:cNvGrpSpPr/>
+                <p:nvPr/>
+              </p:nvGrpSpPr>
+              <p:grpSpPr>
+                <a:xfrm>
+                  <a:off x="8138028" y="3276871"/>
+                  <a:ext cx="720000" cy="720000"/>
+                  <a:chOff x="4910696" y="3330587"/>
+                  <a:chExt cx="720000" cy="720000"/>
+                </a:xfrm>
+              </p:grpSpPr>
+              <p:sp>
+                <p:nvSpPr>
+                  <p:cNvPr id="94" name="Rectangle : coins arrondis 93">
+                    <a:extLst>
+                      <a:ext uri="{FF2B5EF4-FFF2-40B4-BE49-F238E27FC236}">
+                        <a16:creationId xmlns:a16="http://schemas.microsoft.com/office/drawing/2014/main" id="{F5BDA983-DEE4-AAD5-4AAC-3B047F3F56C9}"/>
+                      </a:ext>
+                    </a:extLst>
+                  </p:cNvPr>
+                  <p:cNvSpPr/>
+                  <p:nvPr/>
+                </p:nvSpPr>
+                <p:spPr>
+                  <a:xfrm>
+                    <a:off x="4910696" y="3330587"/>
+                    <a:ext cx="720000" cy="720000"/>
+                  </a:xfrm>
+                  <a:prstGeom prst="roundRect">
+                    <a:avLst>
+                      <a:gd name="adj" fmla="val 6463"/>
+                    </a:avLst>
+                  </a:prstGeom>
+                  <a:solidFill>
+                    <a:srgbClr val="4696FD"/>
+                  </a:solidFill>
+                  <a:ln>
+                    <a:noFill/>
+                  </a:ln>
+                </p:spPr>
+                <p:style>
+                  <a:lnRef idx="2">
+                    <a:schemeClr val="accent1">
+                      <a:shade val="50000"/>
+                    </a:schemeClr>
+                  </a:lnRef>
+                  <a:fillRef idx="1">
+                    <a:schemeClr val="accent1"/>
+                  </a:fillRef>
+                  <a:effectRef idx="0">
+                    <a:schemeClr val="accent1"/>
+                  </a:effectRef>
+                  <a:fontRef idx="minor">
+                    <a:schemeClr val="lt1"/>
+                  </a:fontRef>
+                </p:style>
+                <p:txBody>
+                  <a:bodyPr rtlCol="0" anchor="ctr"/>
+                  <a:lstStyle/>
+                  <a:p>
+                    <a:pPr algn="ctr"/>
+                    <a:endParaRPr lang="en-US" sz="2000" dirty="0">
+                      <a:latin typeface="Arial" panose="020B0604020202020204" pitchFamily="34" charset="0"/>
+                      <a:cs typeface="Arial" panose="020B0604020202020204" pitchFamily="34" charset="0"/>
+                    </a:endParaRPr>
+                  </a:p>
+                </p:txBody>
+              </p:sp>
+              <p:pic>
+                <p:nvPicPr>
+                  <p:cNvPr id="95" name="Graphique 94">
+                    <a:extLst>
+                      <a:ext uri="{FF2B5EF4-FFF2-40B4-BE49-F238E27FC236}">
+                        <a16:creationId xmlns:a16="http://schemas.microsoft.com/office/drawing/2014/main" id="{BFC4D4E3-2418-6DF7-422A-5AAB62EFAE1B}"/>
+                      </a:ext>
+                    </a:extLst>
+                  </p:cNvPr>
+                  <p:cNvPicPr>
+                    <a:picLocks noChangeAspect="1"/>
+                  </p:cNvPicPr>
+                  <p:nvPr/>
+                </p:nvPicPr>
+                <p:blipFill>
+                  <a:blip r:embed="rId16">
+                    <a:extLst>
+                      <a:ext uri="{BEBA8EAE-BF5A-486C-A8C5-ECC9F3942E4B}">
+                        <a14:imgProps xmlns:a14="http://schemas.microsoft.com/office/drawing/2010/main">
+                          <a14:imgLayer r:embed="rId17">
+                            <a14:imgEffect>
+                              <a14:brightnessContrast bright="100000" contrast="100000"/>
+                            </a14:imgEffect>
+                          </a14:imgLayer>
+                        </a14:imgProps>
+                      </a:ext>
+                      <a:ext uri="{28A0092B-C50C-407E-A947-70E740481C1C}">
+                        <a14:useLocalDpi xmlns:a14="http://schemas.microsoft.com/office/drawing/2010/main" val="0"/>
+                      </a:ext>
+                    </a:extLst>
+                  </a:blip>
+                  <a:srcRect/>
+                  <a:stretch/>
+                </p:blipFill>
+                <p:spPr>
+                  <a:xfrm>
+                    <a:off x="5054075" y="3400884"/>
+                    <a:ext cx="433241" cy="549970"/>
+                  </a:xfrm>
+                  <a:prstGeom prst="rect">
+                    <a:avLst/>
+                  </a:prstGeom>
+                </p:spPr>
+              </p:pic>
+            </p:grpSp>
+          </p:grpSp>
+          <p:grpSp>
+            <p:nvGrpSpPr>
+              <p:cNvPr id="7" name="Groupe 6">
+                <a:extLst>
+                  <a:ext uri="{FF2B5EF4-FFF2-40B4-BE49-F238E27FC236}">
+                    <a16:creationId xmlns:a16="http://schemas.microsoft.com/office/drawing/2014/main" id="{60C98813-DE64-ACDC-73E1-005D44A19B2F}"/>
+                  </a:ext>
+                </a:extLst>
+              </p:cNvPr>
+              <p:cNvGrpSpPr/>
+              <p:nvPr/>
+            </p:nvGrpSpPr>
+            <p:grpSpPr>
+              <a:xfrm>
+                <a:off x="10528781" y="3356583"/>
+                <a:ext cx="720000" cy="720000"/>
+                <a:chOff x="10528781" y="3356583"/>
+                <a:chExt cx="720000" cy="720000"/>
+              </a:xfrm>
+            </p:grpSpPr>
+            <p:sp>
+              <p:nvSpPr>
+                <p:cNvPr id="56" name="Rectangle : coins arrondis 55">
+                  <a:extLst>
+                    <a:ext uri="{FF2B5EF4-FFF2-40B4-BE49-F238E27FC236}">
+                      <a16:creationId xmlns:a16="http://schemas.microsoft.com/office/drawing/2014/main" id="{04B51DF9-38E9-4F78-107A-903CABF24127}"/>
+                    </a:ext>
+                  </a:extLst>
+                </p:cNvPr>
+                <p:cNvSpPr/>
+                <p:nvPr/>
+              </p:nvSpPr>
+              <p:spPr>
+                <a:xfrm>
+                  <a:off x="10528781" y="3356583"/>
+                  <a:ext cx="720000" cy="720000"/>
+                </a:xfrm>
+                <a:prstGeom prst="roundRect">
+                  <a:avLst>
+                    <a:gd name="adj" fmla="val 6463"/>
+                  </a:avLst>
+                </a:prstGeom>
+                <a:solidFill>
+                  <a:srgbClr val="4696FD"/>
+                </a:solidFill>
+                <a:ln>
+                  <a:noFill/>
+                </a:ln>
+              </p:spPr>
+              <p:style>
+                <a:lnRef idx="2">
+                  <a:schemeClr val="accent1">
+                    <a:shade val="50000"/>
+                  </a:schemeClr>
+                </a:lnRef>
+                <a:fillRef idx="1">
+                  <a:schemeClr val="accent1"/>
+                </a:fillRef>
+                <a:effectRef idx="0">
+                  <a:schemeClr val="accent1"/>
+                </a:effectRef>
+                <a:fontRef idx="minor">
+                  <a:schemeClr val="lt1"/>
+                </a:fontRef>
+              </p:style>
+              <p:txBody>
+                <a:bodyPr rtlCol="0" anchor="ctr"/>
+                <a:lstStyle/>
+                <a:p>
+                  <a:pPr algn="ctr"/>
+                  <a:endParaRPr lang="en-US" sz="2000" dirty="0">
+                    <a:latin typeface="Arial" panose="020B0604020202020204" pitchFamily="34" charset="0"/>
+                    <a:cs typeface="Arial" panose="020B0604020202020204" pitchFamily="34" charset="0"/>
+                  </a:endParaRPr>
+                </a:p>
+              </p:txBody>
+            </p:sp>
+            <p:sp>
+              <p:nvSpPr>
+                <p:cNvPr id="3" name="Croix 2">
+                  <a:extLst>
+                    <a:ext uri="{FF2B5EF4-FFF2-40B4-BE49-F238E27FC236}">
+                      <a16:creationId xmlns:a16="http://schemas.microsoft.com/office/drawing/2014/main" id="{86402263-30DA-33EE-7930-A7644D550E53}"/>
+                    </a:ext>
+                  </a:extLst>
+                </p:cNvPr>
+                <p:cNvSpPr/>
+                <p:nvPr/>
+              </p:nvSpPr>
+              <p:spPr>
+                <a:xfrm>
+                  <a:off x="10686450" y="3493349"/>
+                  <a:ext cx="434165" cy="434165"/>
+                </a:xfrm>
+                <a:prstGeom prst="plus">
+                  <a:avLst>
+                    <a:gd name="adj" fmla="val 46527"/>
+                  </a:avLst>
+                </a:prstGeom>
+                <a:solidFill>
+                  <a:schemeClr val="tx1"/>
+                </a:solidFill>
+                <a:ln>
+                  <a:noFill/>
+                </a:ln>
+              </p:spPr>
+              <p:style>
+                <a:lnRef idx="2">
+                  <a:schemeClr val="accent1">
+                    <a:shade val="50000"/>
+                  </a:schemeClr>
+                </a:lnRef>
+                <a:fillRef idx="1">
+                  <a:schemeClr val="accent1"/>
+                </a:fillRef>
+                <a:effectRef idx="0">
+                  <a:schemeClr val="accent1"/>
+                </a:effectRef>
+                <a:fontRef idx="minor">
+                  <a:schemeClr val="lt1"/>
+                </a:fontRef>
+              </p:style>
+              <p:txBody>
+                <a:bodyPr rtlCol="0" anchor="ctr"/>
+                <a:lstStyle/>
+                <a:p>
+                  <a:pPr algn="ctr"/>
+                  <a:endParaRPr lang="en-US"/>
+                </a:p>
+              </p:txBody>
+            </p:sp>
+          </p:grpSp>
+        </p:grpSp>
+        <p:sp>
+          <p:nvSpPr>
+            <p:cNvPr id="60" name="Rectangle : coins arrondis 59">
+              <a:extLst>
+                <a:ext uri="{FF2B5EF4-FFF2-40B4-BE49-F238E27FC236}">
+                  <a16:creationId xmlns:a16="http://schemas.microsoft.com/office/drawing/2014/main" id="{8F56EFC7-72DC-C628-938B-9C80B8683602}"/>
+                </a:ext>
+              </a:extLst>
+            </p:cNvPr>
+            <p:cNvSpPr/>
+            <p:nvPr/>
+          </p:nvSpPr>
+          <p:spPr>
+            <a:xfrm>
+              <a:off x="8984323" y="3370868"/>
+              <a:ext cx="720000" cy="720000"/>
+            </a:xfrm>
+            <a:prstGeom prst="roundRect">
+              <a:avLst>
+                <a:gd name="adj" fmla="val 6463"/>
+              </a:avLst>
+            </a:prstGeom>
+            <a:solidFill>
+              <a:srgbClr val="4696FD"/>
+            </a:solidFill>
+            <a:ln>
+              <a:noFill/>
+            </a:ln>
+          </p:spPr>
+          <p:style>
+            <a:lnRef idx="2">
+              <a:schemeClr val="accent1">
+                <a:shade val="50000"/>
+              </a:schemeClr>
+            </a:lnRef>
+            <a:fillRef idx="1">
+              <a:schemeClr val="accent1"/>
+            </a:fillRef>
+            <a:effectRef idx="0">
+              <a:schemeClr val="accent1"/>
+            </a:effectRef>
+            <a:fontRef idx="minor">
+              <a:schemeClr val="lt1"/>
+            </a:fontRef>
+          </p:style>
+          <p:txBody>
+            <a:bodyPr rtlCol="0" anchor="ctr"/>
+            <a:lstStyle/>
+            <a:p>
+              <a:pPr algn="ctr"/>
+              <a:r>
+                <a:rPr lang="fr-FR" sz="2000" dirty="0">
+                  <a:latin typeface="Arial" panose="020B0604020202020204" pitchFamily="34" charset="0"/>
+                  <a:cs typeface="Arial" panose="020B0604020202020204" pitchFamily="34" charset="0"/>
+                </a:rPr>
+                <a:t>New</a:t>
+              </a:r>
+              <a:endParaRPr lang="en-US" sz="2000" dirty="0">
+                <a:latin typeface="Arial" panose="020B0604020202020204" pitchFamily="34" charset="0"/>
+                <a:cs typeface="Arial" panose="020B0604020202020204" pitchFamily="34" charset="0"/>
+              </a:endParaRPr>
+            </a:p>
+          </p:txBody>
+        </p:sp>
+      </p:grpSp>
+      <p:sp>
+        <p:nvSpPr>
+          <p:cNvPr id="62" name="ZoneTexte 61">
+            <a:extLst>
+              <a:ext uri="{FF2B5EF4-FFF2-40B4-BE49-F238E27FC236}">
+                <a16:creationId xmlns:a16="http://schemas.microsoft.com/office/drawing/2014/main" id="{6E3261F9-7064-27EC-8A34-5078D2AAFF84}"/>
+              </a:ext>
+            </a:extLst>
+          </p:cNvPr>
+          <p:cNvSpPr txBox="1">
+            <a:spLocks/>
+          </p:cNvSpPr>
+          <p:nvPr/>
+        </p:nvSpPr>
+        <p:spPr>
+          <a:xfrm>
+            <a:off x="6225408" y="4097523"/>
+            <a:ext cx="383648" cy="246221"/>
+          </a:xfrm>
+          <a:prstGeom prst="rect">
+            <a:avLst/>
+          </a:prstGeom>
+          <a:noFill/>
+        </p:spPr>
+        <p:txBody>
+          <a:bodyPr wrap="square" rtlCol="0">
+            <a:spAutoFit/>
+          </a:bodyPr>
+          <a:lstStyle/>
+          <a:p>
+            <a:pPr algn="ctr"/>
+            <a:r>
+              <a:rPr lang="fr-FR" sz="1000" u="sng" dirty="0">
+                <a:solidFill>
+                  <a:srgbClr val="00B050"/>
+                </a:solidFill>
+                <a:latin typeface="Arial" panose="020B0604020202020204" pitchFamily="34" charset="0"/>
+                <a:cs typeface="Arial" panose="020B0604020202020204" pitchFamily="34" charset="0"/>
+              </a:rPr>
+              <a:t>2</a:t>
+            </a:r>
+          </a:p>
+        </p:txBody>
+      </p:sp>
+      <p:sp>
+        <p:nvSpPr>
+          <p:cNvPr id="63" name="ZoneTexte 62">
+            <a:extLst>
+              <a:ext uri="{FF2B5EF4-FFF2-40B4-BE49-F238E27FC236}">
+                <a16:creationId xmlns:a16="http://schemas.microsoft.com/office/drawing/2014/main" id="{E7D696A8-2239-20E2-C3B9-D183FF6202E1}"/>
+              </a:ext>
+            </a:extLst>
+          </p:cNvPr>
+          <p:cNvSpPr txBox="1">
+            <a:spLocks/>
+          </p:cNvSpPr>
+          <p:nvPr/>
+        </p:nvSpPr>
+        <p:spPr>
+          <a:xfrm>
+            <a:off x="7114325" y="4120486"/>
+            <a:ext cx="383648" cy="246221"/>
+          </a:xfrm>
+          <a:prstGeom prst="rect">
+            <a:avLst/>
+          </a:prstGeom>
+          <a:noFill/>
+        </p:spPr>
+        <p:txBody>
+          <a:bodyPr wrap="square" rtlCol="0">
+            <a:spAutoFit/>
+          </a:bodyPr>
+          <a:lstStyle/>
+          <a:p>
+            <a:pPr algn="ctr"/>
+            <a:r>
+              <a:rPr lang="fr-FR" sz="1000" dirty="0">
+                <a:solidFill>
+                  <a:srgbClr val="00B050"/>
+                </a:solidFill>
+                <a:latin typeface="Arial" panose="020B0604020202020204" pitchFamily="34" charset="0"/>
+                <a:cs typeface="Arial" panose="020B0604020202020204" pitchFamily="34" charset="0"/>
+              </a:rPr>
+              <a:t>5</a:t>
+            </a:r>
+          </a:p>
+        </p:txBody>
+      </p:sp>
+      <p:sp>
+        <p:nvSpPr>
+          <p:cNvPr id="64" name="ZoneTexte 63">
+            <a:extLst>
+              <a:ext uri="{FF2B5EF4-FFF2-40B4-BE49-F238E27FC236}">
+                <a16:creationId xmlns:a16="http://schemas.microsoft.com/office/drawing/2014/main" id="{282DAC59-91BE-A8C4-B439-319AD211ED6B}"/>
+              </a:ext>
+            </a:extLst>
+          </p:cNvPr>
+          <p:cNvSpPr txBox="1">
+            <a:spLocks/>
+          </p:cNvSpPr>
+          <p:nvPr/>
+        </p:nvSpPr>
+        <p:spPr>
+          <a:xfrm>
+            <a:off x="8023476" y="4113948"/>
+            <a:ext cx="383648" cy="246221"/>
+          </a:xfrm>
+          <a:prstGeom prst="rect">
+            <a:avLst/>
+          </a:prstGeom>
+          <a:noFill/>
+        </p:spPr>
+        <p:txBody>
+          <a:bodyPr wrap="square" rtlCol="0">
+            <a:spAutoFit/>
+          </a:bodyPr>
+          <a:lstStyle/>
+          <a:p>
+            <a:pPr algn="ctr"/>
+            <a:r>
+              <a:rPr lang="fr-FR" sz="1000" dirty="0">
+                <a:solidFill>
+                  <a:srgbClr val="00B050"/>
+                </a:solidFill>
+                <a:latin typeface="Arial" panose="020B0604020202020204" pitchFamily="34" charset="0"/>
+                <a:cs typeface="Arial" panose="020B0604020202020204" pitchFamily="34" charset="0"/>
+              </a:rPr>
+              <a:t>48</a:t>
+            </a:r>
+          </a:p>
+        </p:txBody>
+      </p:sp>
     </p:spTree>
     <p:extLst>
       <p:ext uri="{BB962C8B-B14F-4D97-AF65-F5344CB8AC3E}">

</xml_diff>

<commit_message>
add views changed to upsert views
</commit_message>
<xml_diff>
--- a/app model/Skin app.pptx
+++ b/app model/Skin app.pptx
@@ -7666,8 +7666,8 @@
         </p:nvSpPr>
         <p:spPr>
           <a:xfrm>
-            <a:off x="5364874" y="156997"/>
-            <a:ext cx="1462260" cy="338554"/>
+            <a:off x="5315184" y="156997"/>
+            <a:ext cx="1561646" cy="338554"/>
           </a:xfrm>
           <a:prstGeom prst="rect">
             <a:avLst/>
@@ -7715,8 +7715,41 @@
                 <a:latin typeface="Arial" panose="020B0604020202020204" pitchFamily="34" charset="0"/>
                 <a:cs typeface="Arial" panose="020B0604020202020204" pitchFamily="34" charset="0"/>
               </a:rPr>
-              <a:t> body part</a:t>
+              <a:t> skin </a:t>
             </a:r>
+            <a:r>
+              <a:rPr lang="fr-FR" sz="1600" b="0" cap="none" spc="0" dirty="0" err="1">
+                <a:ln w="0"/>
+                <a:solidFill>
+                  <a:schemeClr val="bg1"/>
+                </a:solidFill>
+                <a:effectLst>
+                  <a:outerShdw blurRad="38100" dist="19050" dir="2700000" algn="tl" rotWithShape="0">
+                    <a:schemeClr val="dk1">
+                      <a:alpha val="40000"/>
+                    </a:schemeClr>
+                  </a:outerShdw>
+                </a:effectLst>
+                <a:latin typeface="Arial" panose="020B0604020202020204" pitchFamily="34" charset="0"/>
+                <a:cs typeface="Arial" panose="020B0604020202020204" pitchFamily="34" charset="0"/>
+              </a:rPr>
+              <a:t>lesion</a:t>
+            </a:r>
+            <a:endParaRPr lang="fr-FR" sz="1600" b="0" cap="none" spc="0" dirty="0">
+              <a:ln w="0"/>
+              <a:solidFill>
+                <a:schemeClr val="bg1"/>
+              </a:solidFill>
+              <a:effectLst>
+                <a:outerShdw blurRad="38100" dist="19050" dir="2700000" algn="tl" rotWithShape="0">
+                  <a:schemeClr val="dk1">
+                    <a:alpha val="40000"/>
+                  </a:schemeClr>
+                </a:outerShdw>
+              </a:effectLst>
+              <a:latin typeface="Arial" panose="020B0604020202020204" pitchFamily="34" charset="0"/>
+              <a:cs typeface="Arial" panose="020B0604020202020204" pitchFamily="34" charset="0"/>
+            </a:endParaRPr>
           </a:p>
         </p:txBody>
       </p:sp>
@@ -8493,7 +8526,7 @@
         </p:nvSpPr>
         <p:spPr>
           <a:xfrm>
-            <a:off x="6868659" y="792068"/>
+            <a:off x="4988832" y="996462"/>
             <a:ext cx="2577657" cy="276999"/>
           </a:xfrm>
           <a:prstGeom prst="rect">
@@ -8509,15 +8542,22 @@
           <a:p>
             <a:pPr algn="ctr"/>
             <a:r>
-              <a:rPr lang="fr-FR" sz="1200" b="1" dirty="0">
+              <a:rPr lang="fr-FR" sz="1200" b="1" dirty="0" err="1">
                 <a:solidFill>
                   <a:schemeClr val="bg1"/>
                 </a:solidFill>
                 <a:latin typeface="Arial" panose="020B0604020202020204" pitchFamily="34" charset="0"/>
                 <a:cs typeface="Arial" panose="020B0604020202020204" pitchFamily="34" charset="0"/>
               </a:rPr>
-              <a:t>Annotations</a:t>
+              <a:t>Caracteristics</a:t>
             </a:r>
+            <a:endParaRPr lang="fr-FR" sz="1200" b="1" dirty="0">
+              <a:solidFill>
+                <a:schemeClr val="bg1"/>
+              </a:solidFill>
+              <a:latin typeface="Arial" panose="020B0604020202020204" pitchFamily="34" charset="0"/>
+              <a:cs typeface="Arial" panose="020B0604020202020204" pitchFamily="34" charset="0"/>
+            </a:endParaRPr>
           </a:p>
         </p:txBody>
       </p:sp>
@@ -8536,13 +8576,13 @@
           <p:nvPr>
             <p:extLst>
               <p:ext uri="{D42A27DB-BD31-4B8C-83A1-F6EECF244321}">
-                <p14:modId xmlns:p14="http://schemas.microsoft.com/office/powerpoint/2010/main" val="2526491292"/>
+                <p14:modId xmlns:p14="http://schemas.microsoft.com/office/powerpoint/2010/main" val="1263524539"/>
               </p:ext>
             </p:extLst>
           </p:nvPr>
         </p:nvGraphicFramePr>
         <p:xfrm>
-          <a:off x="4586700" y="1407907"/>
+          <a:off x="4960067" y="1471759"/>
           <a:ext cx="2635186" cy="1113834"/>
         </p:xfrm>
         <a:graphic>
@@ -8598,7 +8638,7 @@
                           <a:latin typeface="Arial" panose="020B0604020202020204" pitchFamily="34" charset="0"/>
                           <a:cs typeface="Arial" panose="020B0604020202020204" pitchFamily="34" charset="0"/>
                         </a:rPr>
-                        <a:t>Name</a:t>
+                        <a:t>Diameter</a:t>
                       </a:r>
                     </a:p>
                   </a:txBody>
@@ -8618,7 +8658,7 @@
                           <a:latin typeface="Arial" panose="020B0604020202020204" pitchFamily="34" charset="0"/>
                           <a:cs typeface="Arial" panose="020B0604020202020204" pitchFamily="34" charset="0"/>
                         </a:rPr>
-                        <a:t>Name</a:t>
+                        <a:t>2mm</a:t>
                       </a:r>
                       <a:endParaRPr lang="en-US" sz="1100" dirty="0">
                         <a:solidFill>
@@ -8655,7 +8695,7 @@
                           <a:latin typeface="Arial" panose="020B0604020202020204" pitchFamily="34" charset="0"/>
                           <a:cs typeface="Arial" panose="020B0604020202020204" pitchFamily="34" charset="0"/>
                         </a:rPr>
-                        <a:t>Risk</a:t>
+                        <a:t>Apparition</a:t>
                       </a:r>
                       <a:endParaRPr lang="en-US" sz="1100" dirty="0">
                         <a:solidFill>
@@ -8701,7 +8741,37 @@
                           <a:latin typeface="Arial" panose="020B0604020202020204" pitchFamily="34" charset="0"/>
                           <a:cs typeface="Arial" panose="020B0604020202020204" pitchFamily="34" charset="0"/>
                         </a:rPr>
-                        <a:t>INDETERMINATE</a:t>
+                        <a:t>3 </a:t>
+                      </a:r>
+                      <a:r>
+                        <a:rPr lang="fr-FR" sz="1100" dirty="0" err="1">
+                          <a:solidFill>
+                            <a:schemeClr val="bg1"/>
+                          </a:solidFill>
+                          <a:latin typeface="Arial" panose="020B0604020202020204" pitchFamily="34" charset="0"/>
+                          <a:cs typeface="Arial" panose="020B0604020202020204" pitchFamily="34" charset="0"/>
+                        </a:rPr>
+                        <a:t>weeks</a:t>
+                      </a:r>
+                      <a:r>
+                        <a:rPr lang="fr-FR" sz="1100" dirty="0">
+                          <a:solidFill>
+                            <a:schemeClr val="bg1"/>
+                          </a:solidFill>
+                          <a:latin typeface="Arial" panose="020B0604020202020204" pitchFamily="34" charset="0"/>
+                          <a:cs typeface="Arial" panose="020B0604020202020204" pitchFamily="34" charset="0"/>
+                        </a:rPr>
+                        <a:t> </a:t>
+                      </a:r>
+                      <a:r>
+                        <a:rPr lang="fr-FR" sz="1100" dirty="0" err="1">
+                          <a:solidFill>
+                            <a:schemeClr val="bg1"/>
+                          </a:solidFill>
+                          <a:latin typeface="Arial" panose="020B0604020202020204" pitchFamily="34" charset="0"/>
+                          <a:cs typeface="Arial" panose="020B0604020202020204" pitchFamily="34" charset="0"/>
+                        </a:rPr>
+                        <a:t>ago</a:t>
                       </a:r>
                       <a:endParaRPr lang="en-US" sz="1100" dirty="0">
                         <a:solidFill>
@@ -8721,31 +8791,64 @@
                 </a:extLst>
               </a:tr>
               <a:tr h="343557">
-                <a:tc>
+                <a:tc gridSpan="2">
                   <a:txBody>
                     <a:bodyPr/>
                     <a:lstStyle/>
                     <a:p>
-                      <a:pPr algn="l"/>
+                      <a:pPr algn="ctr"/>
                       <a:r>
                         <a:rPr lang="fr-FR" sz="1100" dirty="0">
                           <a:solidFill>
-                            <a:schemeClr val="bg2">
-                              <a:lumMod val="75000"/>
-                              <a:lumOff val="25000"/>
-                            </a:schemeClr>
+                            <a:schemeClr val="tx1"/>
+                          </a:solidFill>
+                          <a:highlight>
+                            <a:srgbClr val="4696FD"/>
+                          </a:highlight>
+                          <a:latin typeface="Arial" panose="020B0604020202020204" pitchFamily="34" charset="0"/>
+                          <a:cs typeface="Arial" panose="020B0604020202020204" pitchFamily="34" charset="0"/>
+                        </a:rPr>
+                        <a:t>   </a:t>
+                      </a:r>
+                      <a:r>
+                        <a:rPr lang="fr-FR" sz="1100" dirty="0" err="1">
+                          <a:solidFill>
+                            <a:schemeClr val="tx1"/>
+                          </a:solidFill>
+                          <a:highlight>
+                            <a:srgbClr val="4696FD"/>
+                          </a:highlight>
+                          <a:latin typeface="Arial" panose="020B0604020202020204" pitchFamily="34" charset="0"/>
+                          <a:cs typeface="Arial" panose="020B0604020202020204" pitchFamily="34" charset="0"/>
+                        </a:rPr>
+                        <a:t>Add</a:t>
+                      </a:r>
+                      <a:r>
+                        <a:rPr lang="fr-FR" sz="1100" dirty="0">
+                          <a:solidFill>
+                            <a:schemeClr val="tx1"/>
+                          </a:solidFill>
+                          <a:highlight>
+                            <a:srgbClr val="4696FD"/>
+                          </a:highlight>
+                          <a:latin typeface="Arial" panose="020B0604020202020204" pitchFamily="34" charset="0"/>
+                          <a:cs typeface="Arial" panose="020B0604020202020204" pitchFamily="34" charset="0"/>
+                        </a:rPr>
+                        <a:t>..       </a:t>
+                      </a:r>
+                      <a:r>
+                        <a:rPr lang="fr-FR" sz="1100" dirty="0">
+                          <a:solidFill>
+                            <a:schemeClr val="tx1"/>
                           </a:solidFill>
                           <a:latin typeface="Arial" panose="020B0604020202020204" pitchFamily="34" charset="0"/>
                           <a:cs typeface="Arial" panose="020B0604020202020204" pitchFamily="34" charset="0"/>
                         </a:rPr>
-                        <a:t>Type</a:t>
+                        <a:t> </a:t>
                       </a:r>
                       <a:endParaRPr lang="en-US" sz="1100" dirty="0">
                         <a:solidFill>
-                          <a:schemeClr val="bg2">
-                            <a:lumMod val="75000"/>
-                            <a:lumOff val="25000"/>
-                          </a:schemeClr>
+                          <a:schemeClr val="tx1"/>
                         </a:solidFill>
                         <a:latin typeface="Arial" panose="020B0604020202020204" pitchFamily="34" charset="0"/>
                         <a:cs typeface="Arial" panose="020B0604020202020204" pitchFamily="34" charset="0"/>
@@ -8754,7 +8857,7 @@
                   </a:txBody>
                   <a:tcPr anchor="ctr"/>
                 </a:tc>
-                <a:tc>
+                <a:tc hMerge="1">
                   <a:txBody>
                     <a:bodyPr/>
                     <a:lstStyle/>
@@ -8791,182 +8894,12 @@
           </a:graphicData>
         </a:graphic>
       </p:graphicFrame>
-      <p:sp>
-        <p:nvSpPr>
-          <p:cNvPr id="82" name="Rectangle 81">
+      <p:cxnSp>
+        <p:nvCxnSpPr>
+          <p:cNvPr id="97" name="Connecteur droit 96">
             <a:extLst>
               <a:ext uri="{FF2B5EF4-FFF2-40B4-BE49-F238E27FC236}">
-                <a16:creationId xmlns:a16="http://schemas.microsoft.com/office/drawing/2014/main" id="{3A154D37-D599-B5E9-8AFA-0D2D17A44EC1}"/>
-              </a:ext>
-            </a:extLst>
-          </p:cNvPr>
-          <p:cNvSpPr/>
-          <p:nvPr/>
-        </p:nvSpPr>
-        <p:spPr>
-          <a:xfrm>
-            <a:off x="7378751" y="1411286"/>
-            <a:ext cx="4136973" cy="1110455"/>
-          </a:xfrm>
-          <a:prstGeom prst="rect">
-            <a:avLst/>
-          </a:prstGeom>
-          <a:solidFill>
-            <a:schemeClr val="tx1">
-              <a:lumMod val="95000"/>
-            </a:schemeClr>
-          </a:solidFill>
-          <a:ln>
-            <a:noFill/>
-          </a:ln>
-        </p:spPr>
-        <p:style>
-          <a:lnRef idx="2">
-            <a:schemeClr val="accent1">
-              <a:shade val="50000"/>
-            </a:schemeClr>
-          </a:lnRef>
-          <a:fillRef idx="1">
-            <a:schemeClr val="accent1"/>
-          </a:fillRef>
-          <a:effectRef idx="0">
-            <a:schemeClr val="accent1"/>
-          </a:effectRef>
-          <a:fontRef idx="minor">
-            <a:schemeClr val="lt1"/>
-          </a:fontRef>
-        </p:style>
-        <p:txBody>
-          <a:bodyPr rtlCol="0" anchor="ctr"/>
-          <a:lstStyle/>
-          <a:p>
-            <a:r>
-              <a:rPr lang="fr-FR" sz="1100" dirty="0">
-                <a:solidFill>
-                  <a:schemeClr val="bg2">
-                    <a:lumMod val="75000"/>
-                    <a:lumOff val="25000"/>
-                  </a:schemeClr>
-                </a:solidFill>
-                <a:latin typeface="Arial" panose="020B0604020202020204" pitchFamily="34" charset="0"/>
-                <a:cs typeface="Arial" panose="020B0604020202020204" pitchFamily="34" charset="0"/>
-              </a:rPr>
-              <a:t>Notes:</a:t>
-            </a:r>
-          </a:p>
-          <a:p>
-            <a:r>
-              <a:rPr lang="fr-FR" sz="1100" dirty="0">
-                <a:solidFill>
-                  <a:schemeClr val="bg2">
-                    <a:lumMod val="75000"/>
-                    <a:lumOff val="25000"/>
-                  </a:schemeClr>
-                </a:solidFill>
-                <a:latin typeface="Arial" panose="020B0604020202020204" pitchFamily="34" charset="0"/>
-                <a:cs typeface="Arial" panose="020B0604020202020204" pitchFamily="34" charset="0"/>
-              </a:rPr>
-              <a:t>Note 1: args</a:t>
-            </a:r>
-          </a:p>
-          <a:p>
-            <a:endParaRPr lang="fr-FR" sz="1100" dirty="0">
-              <a:solidFill>
-                <a:schemeClr val="bg2">
-                  <a:lumMod val="75000"/>
-                  <a:lumOff val="25000"/>
-                </a:schemeClr>
-              </a:solidFill>
-              <a:latin typeface="Arial" panose="020B0604020202020204" pitchFamily="34" charset="0"/>
-              <a:cs typeface="Arial" panose="020B0604020202020204" pitchFamily="34" charset="0"/>
-            </a:endParaRPr>
-          </a:p>
-          <a:p>
-            <a:endParaRPr lang="fr-FR" sz="1100" dirty="0">
-              <a:solidFill>
-                <a:schemeClr val="bg2">
-                  <a:lumMod val="75000"/>
-                  <a:lumOff val="25000"/>
-                </a:schemeClr>
-              </a:solidFill>
-              <a:latin typeface="Arial" panose="020B0604020202020204" pitchFamily="34" charset="0"/>
-              <a:cs typeface="Arial" panose="020B0604020202020204" pitchFamily="34" charset="0"/>
-            </a:endParaRPr>
-          </a:p>
-          <a:p>
-            <a:endParaRPr lang="en-US" dirty="0">
-              <a:solidFill>
-                <a:schemeClr val="bg2">
-                  <a:lumMod val="75000"/>
-                  <a:lumOff val="25000"/>
-                </a:schemeClr>
-              </a:solidFill>
-              <a:latin typeface="Arial" panose="020B0604020202020204" pitchFamily="34" charset="0"/>
-              <a:cs typeface="Arial" panose="020B0604020202020204" pitchFamily="34" charset="0"/>
-            </a:endParaRPr>
-          </a:p>
-        </p:txBody>
-      </p:sp>
-      <p:sp>
-        <p:nvSpPr>
-          <p:cNvPr id="84" name="ZoneTexte 83">
-            <a:extLst>
-              <a:ext uri="{FF2B5EF4-FFF2-40B4-BE49-F238E27FC236}">
-                <a16:creationId xmlns:a16="http://schemas.microsoft.com/office/drawing/2014/main" id="{43173BA7-F16A-07E9-EFB0-B061087CA540}"/>
-              </a:ext>
-            </a:extLst>
-          </p:cNvPr>
-          <p:cNvSpPr txBox="1">
-            <a:spLocks/>
-          </p:cNvSpPr>
-          <p:nvPr/>
-        </p:nvSpPr>
-        <p:spPr>
-          <a:xfrm>
-            <a:off x="6868659" y="2989548"/>
-            <a:ext cx="2577657" cy="276999"/>
-          </a:xfrm>
-          <a:prstGeom prst="rect">
-            <a:avLst/>
-          </a:prstGeom>
-          <a:noFill/>
-        </p:spPr>
-        <p:txBody>
-          <a:bodyPr wrap="square" rtlCol="0">
-            <a:spAutoFit/>
-          </a:bodyPr>
-          <a:lstStyle/>
-          <a:p>
-            <a:pPr algn="ctr"/>
-            <a:r>
-              <a:rPr lang="fr-FR" sz="1200" b="1" dirty="0" err="1">
-                <a:solidFill>
-                  <a:schemeClr val="bg1"/>
-                </a:solidFill>
-                <a:latin typeface="Arial" panose="020B0604020202020204" pitchFamily="34" charset="0"/>
-                <a:cs typeface="Arial" panose="020B0604020202020204" pitchFamily="34" charset="0"/>
-              </a:rPr>
-              <a:t>Add</a:t>
-            </a:r>
-            <a:r>
-              <a:rPr lang="fr-FR" sz="1200" b="1" dirty="0">
-                <a:solidFill>
-                  <a:schemeClr val="bg1"/>
-                </a:solidFill>
-                <a:latin typeface="Arial" panose="020B0604020202020204" pitchFamily="34" charset="0"/>
-                <a:cs typeface="Arial" panose="020B0604020202020204" pitchFamily="34" charset="0"/>
-              </a:rPr>
-              <a:t> images</a:t>
-            </a:r>
-          </a:p>
-        </p:txBody>
-      </p:sp>
-      <p:cxnSp>
-        <p:nvCxnSpPr>
-          <p:cNvPr id="85" name="Connecteur droit 84">
-            <a:extLst>
-              <a:ext uri="{FF2B5EF4-FFF2-40B4-BE49-F238E27FC236}">
-                <a16:creationId xmlns:a16="http://schemas.microsoft.com/office/drawing/2014/main" id="{83304A25-A859-5DCC-7576-740844781DB6}"/>
+                <a16:creationId xmlns:a16="http://schemas.microsoft.com/office/drawing/2014/main" id="{D8884E1D-085C-C9C2-9809-232C367D70DE}"/>
               </a:ext>
             </a:extLst>
           </p:cNvPr>
@@ -8977,8 +8910,8 @@
         </p:nvCxnSpPr>
         <p:spPr>
           <a:xfrm>
-            <a:off x="4879099" y="2822132"/>
-            <a:ext cx="6779559" cy="0"/>
+            <a:off x="4132288" y="3936557"/>
+            <a:ext cx="7531682" cy="0"/>
           </a:xfrm>
           <a:prstGeom prst="line">
             <a:avLst/>
@@ -9006,101 +8939,12 @@
           </a:fontRef>
         </p:style>
       </p:cxnSp>
-      <p:cxnSp>
-        <p:nvCxnSpPr>
-          <p:cNvPr id="97" name="Connecteur droit 96">
+      <p:grpSp>
+        <p:nvGrpSpPr>
+          <p:cNvPr id="12" name="Groupe 11">
             <a:extLst>
               <a:ext uri="{FF2B5EF4-FFF2-40B4-BE49-F238E27FC236}">
-                <a16:creationId xmlns:a16="http://schemas.microsoft.com/office/drawing/2014/main" id="{D8884E1D-085C-C9C2-9809-232C367D70DE}"/>
-              </a:ext>
-            </a:extLst>
-          </p:cNvPr>
-          <p:cNvCxnSpPr>
-            <a:cxnSpLocks/>
-          </p:cNvCxnSpPr>
-          <p:nvPr/>
-        </p:nvCxnSpPr>
-        <p:spPr>
-          <a:xfrm>
-            <a:off x="4879098" y="4384232"/>
-            <a:ext cx="6779559" cy="0"/>
-          </a:xfrm>
-          <a:prstGeom prst="line">
-            <a:avLst/>
-          </a:prstGeom>
-          <a:ln>
-            <a:solidFill>
-              <a:schemeClr val="tx2">
-                <a:lumMod val="75000"/>
-              </a:schemeClr>
-            </a:solidFill>
-          </a:ln>
-        </p:spPr>
-        <p:style>
-          <a:lnRef idx="1">
-            <a:schemeClr val="accent1"/>
-          </a:lnRef>
-          <a:fillRef idx="0">
-            <a:schemeClr val="accent1"/>
-          </a:fillRef>
-          <a:effectRef idx="0">
-            <a:schemeClr val="accent1"/>
-          </a:effectRef>
-          <a:fontRef idx="minor">
-            <a:schemeClr val="tx1"/>
-          </a:fontRef>
-        </p:style>
-      </p:cxnSp>
-      <p:sp>
-        <p:nvSpPr>
-          <p:cNvPr id="98" name="ZoneTexte 97">
-            <a:extLst>
-              <a:ext uri="{FF2B5EF4-FFF2-40B4-BE49-F238E27FC236}">
-                <a16:creationId xmlns:a16="http://schemas.microsoft.com/office/drawing/2014/main" id="{E6D592BF-794B-109A-39E8-443CE763725A}"/>
-              </a:ext>
-            </a:extLst>
-          </p:cNvPr>
-          <p:cNvSpPr txBox="1">
-            <a:spLocks/>
-          </p:cNvSpPr>
-          <p:nvPr/>
-        </p:nvSpPr>
-        <p:spPr>
-          <a:xfrm>
-            <a:off x="6868659" y="4564380"/>
-            <a:ext cx="2577657" cy="276999"/>
-          </a:xfrm>
-          <a:prstGeom prst="rect">
-            <a:avLst/>
-          </a:prstGeom>
-          <a:noFill/>
-        </p:spPr>
-        <p:txBody>
-          <a:bodyPr wrap="square" rtlCol="0">
-            <a:spAutoFit/>
-          </a:bodyPr>
-          <a:lstStyle/>
-          <a:p>
-            <a:pPr algn="ctr"/>
-            <a:r>
-              <a:rPr lang="fr-FR" sz="1200" b="1" dirty="0">
-                <a:solidFill>
-                  <a:schemeClr val="bg1"/>
-                </a:solidFill>
-                <a:latin typeface="Arial" panose="020B0604020202020204" pitchFamily="34" charset="0"/>
-                <a:cs typeface="Arial" panose="020B0604020202020204" pitchFamily="34" charset="0"/>
-              </a:rPr>
-              <a:t>Launch AI</a:t>
-            </a:r>
-          </a:p>
-        </p:txBody>
-      </p:sp>
-      <p:grpSp>
-        <p:nvGrpSpPr>
-          <p:cNvPr id="30" name="Groupe 29">
-            <a:extLst>
-              <a:ext uri="{FF2B5EF4-FFF2-40B4-BE49-F238E27FC236}">
-                <a16:creationId xmlns:a16="http://schemas.microsoft.com/office/drawing/2014/main" id="{1C6C830F-8B9C-D688-BFE4-80AB61DC5563}"/>
+                <a16:creationId xmlns:a16="http://schemas.microsoft.com/office/drawing/2014/main" id="{891BA38D-77C2-1771-C960-120BF7421086}"/>
               </a:ext>
             </a:extLst>
           </p:cNvPr>
@@ -9109,876 +8953,866 @@
         </p:nvGrpSpPr>
         <p:grpSpPr>
           <a:xfrm>
-            <a:off x="4879098" y="4985014"/>
-            <a:ext cx="6828699" cy="723538"/>
-            <a:chOff x="4860544" y="5087010"/>
-            <a:chExt cx="6828699" cy="723538"/>
+            <a:off x="4799121" y="4189884"/>
+            <a:ext cx="6973167" cy="2293620"/>
+            <a:chOff x="4799121" y="4564380"/>
+            <a:chExt cx="6973167" cy="2293620"/>
           </a:xfrm>
         </p:grpSpPr>
         <p:sp>
           <p:nvSpPr>
-            <p:cNvPr id="99" name="Rectangle : coins arrondis 98">
-              <a:hlinkClick r:id="rId10" action="ppaction://hlinksldjump"/>
+            <p:cNvPr id="98" name="ZoneTexte 97">
               <a:extLst>
                 <a:ext uri="{FF2B5EF4-FFF2-40B4-BE49-F238E27FC236}">
-                  <a16:creationId xmlns:a16="http://schemas.microsoft.com/office/drawing/2014/main" id="{05618214-0A65-D49B-94D3-38307C9AC08E}"/>
+                  <a16:creationId xmlns:a16="http://schemas.microsoft.com/office/drawing/2014/main" id="{E6D592BF-794B-109A-39E8-443CE763725A}"/>
                 </a:ext>
               </a:extLst>
             </p:cNvPr>
-            <p:cNvSpPr/>
+            <p:cNvSpPr txBox="1">
+              <a:spLocks/>
+            </p:cNvSpPr>
             <p:nvPr/>
           </p:nvSpPr>
           <p:spPr>
             <a:xfrm>
-              <a:off x="4860544" y="5087010"/>
-              <a:ext cx="1260000" cy="720000"/>
+              <a:off x="6868659" y="4564380"/>
+              <a:ext cx="2577657" cy="276999"/>
             </a:xfrm>
-            <a:prstGeom prst="roundRect">
-              <a:avLst>
-                <a:gd name="adj" fmla="val 6463"/>
-              </a:avLst>
+            <a:prstGeom prst="rect">
+              <a:avLst/>
             </a:prstGeom>
-            <a:solidFill>
-              <a:srgbClr val="4696FD"/>
-            </a:solidFill>
+            <a:noFill/>
+          </p:spPr>
+          <p:txBody>
+            <a:bodyPr wrap="square" rtlCol="0">
+              <a:spAutoFit/>
+            </a:bodyPr>
+            <a:lstStyle/>
+            <a:p>
+              <a:pPr algn="ctr"/>
+              <a:r>
+                <a:rPr lang="fr-FR" sz="1200" b="1" dirty="0">
+                  <a:solidFill>
+                    <a:schemeClr val="bg1"/>
+                  </a:solidFill>
+                  <a:latin typeface="Arial" panose="020B0604020202020204" pitchFamily="34" charset="0"/>
+                  <a:cs typeface="Arial" panose="020B0604020202020204" pitchFamily="34" charset="0"/>
+                </a:rPr>
+                <a:t>Launch AI</a:t>
+              </a:r>
+            </a:p>
+          </p:txBody>
+        </p:sp>
+        <p:grpSp>
+          <p:nvGrpSpPr>
+            <p:cNvPr id="30" name="Groupe 29">
+              <a:extLst>
+                <a:ext uri="{FF2B5EF4-FFF2-40B4-BE49-F238E27FC236}">
+                  <a16:creationId xmlns:a16="http://schemas.microsoft.com/office/drawing/2014/main" id="{1C6C830F-8B9C-D688-BFE4-80AB61DC5563}"/>
+                </a:ext>
+              </a:extLst>
+            </p:cNvPr>
+            <p:cNvGrpSpPr/>
+            <p:nvPr/>
+          </p:nvGrpSpPr>
+          <p:grpSpPr>
+            <a:xfrm>
+              <a:off x="4879098" y="4985014"/>
+              <a:ext cx="6828699" cy="723538"/>
+              <a:chOff x="4860544" y="5087010"/>
+              <a:chExt cx="6828699" cy="723538"/>
+            </a:xfrm>
+          </p:grpSpPr>
+          <p:sp>
+            <p:nvSpPr>
+              <p:cNvPr id="99" name="Rectangle : coins arrondis 98">
+                <a:hlinkClick r:id="rId10" action="ppaction://hlinksldjump"/>
+                <a:extLst>
+                  <a:ext uri="{FF2B5EF4-FFF2-40B4-BE49-F238E27FC236}">
+                    <a16:creationId xmlns:a16="http://schemas.microsoft.com/office/drawing/2014/main" id="{05618214-0A65-D49B-94D3-38307C9AC08E}"/>
+                  </a:ext>
+                </a:extLst>
+              </p:cNvPr>
+              <p:cNvSpPr/>
+              <p:nvPr/>
+            </p:nvSpPr>
+            <p:spPr>
+              <a:xfrm>
+                <a:off x="4860544" y="5087010"/>
+                <a:ext cx="1260000" cy="720000"/>
+              </a:xfrm>
+              <a:prstGeom prst="roundRect">
+                <a:avLst>
+                  <a:gd name="adj" fmla="val 6463"/>
+                </a:avLst>
+              </a:prstGeom>
+              <a:solidFill>
+                <a:srgbClr val="4696FD"/>
+              </a:solidFill>
+              <a:ln>
+                <a:noFill/>
+              </a:ln>
+            </p:spPr>
+            <p:style>
+              <a:lnRef idx="2">
+                <a:schemeClr val="accent1">
+                  <a:shade val="50000"/>
+                </a:schemeClr>
+              </a:lnRef>
+              <a:fillRef idx="1">
+                <a:schemeClr val="accent1"/>
+              </a:fillRef>
+              <a:effectRef idx="0">
+                <a:schemeClr val="accent1"/>
+              </a:effectRef>
+              <a:fontRef idx="minor">
+                <a:schemeClr val="lt1"/>
+              </a:fontRef>
+            </p:style>
+            <p:txBody>
+              <a:bodyPr rtlCol="0" anchor="ctr"/>
+              <a:lstStyle/>
+              <a:p>
+                <a:pPr algn="ctr"/>
+                <a:r>
+                  <a:rPr lang="fr-FR" sz="2000" dirty="0">
+                    <a:latin typeface="Arial" panose="020B0604020202020204" pitchFamily="34" charset="0"/>
+                    <a:cs typeface="Arial" panose="020B0604020202020204" pitchFamily="34" charset="0"/>
+                  </a:rPr>
+                  <a:t>AI-1</a:t>
+                </a:r>
+                <a:endParaRPr lang="en-US" sz="2000" dirty="0">
+                  <a:latin typeface="Arial" panose="020B0604020202020204" pitchFamily="34" charset="0"/>
+                  <a:cs typeface="Arial" panose="020B0604020202020204" pitchFamily="34" charset="0"/>
+                </a:endParaRPr>
+              </a:p>
+            </p:txBody>
+          </p:sp>
+          <p:sp>
+            <p:nvSpPr>
+              <p:cNvPr id="100" name="Rectangle : coins arrondis 99">
+                <a:hlinkClick r:id="rId10" action="ppaction://hlinksldjump"/>
+                <a:extLst>
+                  <a:ext uri="{FF2B5EF4-FFF2-40B4-BE49-F238E27FC236}">
+                    <a16:creationId xmlns:a16="http://schemas.microsoft.com/office/drawing/2014/main" id="{0B8E82F0-E235-86B0-FA63-14F80127A4D5}"/>
+                  </a:ext>
+                </a:extLst>
+              </p:cNvPr>
+              <p:cNvSpPr/>
+              <p:nvPr/>
+            </p:nvSpPr>
+            <p:spPr>
+              <a:xfrm>
+                <a:off x="6714905" y="5090548"/>
+                <a:ext cx="1261872" cy="720000"/>
+              </a:xfrm>
+              <a:prstGeom prst="roundRect">
+                <a:avLst>
+                  <a:gd name="adj" fmla="val 6463"/>
+                </a:avLst>
+              </a:prstGeom>
+              <a:solidFill>
+                <a:srgbClr val="4696FD"/>
+              </a:solidFill>
+              <a:ln>
+                <a:noFill/>
+              </a:ln>
+            </p:spPr>
+            <p:style>
+              <a:lnRef idx="2">
+                <a:schemeClr val="accent1">
+                  <a:shade val="50000"/>
+                </a:schemeClr>
+              </a:lnRef>
+              <a:fillRef idx="1">
+                <a:schemeClr val="accent1"/>
+              </a:fillRef>
+              <a:effectRef idx="0">
+                <a:schemeClr val="accent1"/>
+              </a:effectRef>
+              <a:fontRef idx="minor">
+                <a:schemeClr val="lt1"/>
+              </a:fontRef>
+            </p:style>
+            <p:txBody>
+              <a:bodyPr rtlCol="0" anchor="ctr"/>
+              <a:lstStyle/>
+              <a:p>
+                <a:pPr algn="ctr"/>
+                <a:r>
+                  <a:rPr lang="fr-FR" sz="2000" dirty="0">
+                    <a:latin typeface="Arial" panose="020B0604020202020204" pitchFamily="34" charset="0"/>
+                    <a:cs typeface="Arial" panose="020B0604020202020204" pitchFamily="34" charset="0"/>
+                  </a:rPr>
+                  <a:t>AI-2</a:t>
+                </a:r>
+                <a:endParaRPr lang="en-US" sz="2000" dirty="0">
+                  <a:latin typeface="Arial" panose="020B0604020202020204" pitchFamily="34" charset="0"/>
+                  <a:cs typeface="Arial" panose="020B0604020202020204" pitchFamily="34" charset="0"/>
+                </a:endParaRPr>
+              </a:p>
+            </p:txBody>
+          </p:sp>
+          <p:sp>
+            <p:nvSpPr>
+              <p:cNvPr id="101" name="Rectangle : coins arrondis 100">
+                <a:hlinkClick r:id="rId10" action="ppaction://hlinksldjump"/>
+                <a:extLst>
+                  <a:ext uri="{FF2B5EF4-FFF2-40B4-BE49-F238E27FC236}">
+                    <a16:creationId xmlns:a16="http://schemas.microsoft.com/office/drawing/2014/main" id="{3E6945AD-175D-CE1D-D879-61EF3CCAC2AE}"/>
+                  </a:ext>
+                </a:extLst>
+              </p:cNvPr>
+              <p:cNvSpPr/>
+              <p:nvPr/>
+            </p:nvSpPr>
+            <p:spPr>
+              <a:xfrm>
+                <a:off x="8571138" y="5090548"/>
+                <a:ext cx="1261872" cy="720000"/>
+              </a:xfrm>
+              <a:prstGeom prst="roundRect">
+                <a:avLst>
+                  <a:gd name="adj" fmla="val 6463"/>
+                </a:avLst>
+              </a:prstGeom>
+              <a:solidFill>
+                <a:srgbClr val="4696FD"/>
+              </a:solidFill>
+              <a:ln>
+                <a:noFill/>
+              </a:ln>
+            </p:spPr>
+            <p:style>
+              <a:lnRef idx="2">
+                <a:schemeClr val="accent1">
+                  <a:shade val="50000"/>
+                </a:schemeClr>
+              </a:lnRef>
+              <a:fillRef idx="1">
+                <a:schemeClr val="accent1"/>
+              </a:fillRef>
+              <a:effectRef idx="0">
+                <a:schemeClr val="accent1"/>
+              </a:effectRef>
+              <a:fontRef idx="minor">
+                <a:schemeClr val="lt1"/>
+              </a:fontRef>
+            </p:style>
+            <p:txBody>
+              <a:bodyPr rtlCol="0" anchor="ctr"/>
+              <a:lstStyle/>
+              <a:p>
+                <a:pPr algn="ctr"/>
+                <a:r>
+                  <a:rPr lang="fr-FR" sz="2000" dirty="0">
+                    <a:latin typeface="Arial" panose="020B0604020202020204" pitchFamily="34" charset="0"/>
+                    <a:cs typeface="Arial" panose="020B0604020202020204" pitchFamily="34" charset="0"/>
+                  </a:rPr>
+                  <a:t>AI-3</a:t>
+                </a:r>
+                <a:endParaRPr lang="en-US" sz="2000" dirty="0">
+                  <a:latin typeface="Arial" panose="020B0604020202020204" pitchFamily="34" charset="0"/>
+                  <a:cs typeface="Arial" panose="020B0604020202020204" pitchFamily="34" charset="0"/>
+                </a:endParaRPr>
+              </a:p>
+            </p:txBody>
+          </p:sp>
+          <p:sp>
+            <p:nvSpPr>
+              <p:cNvPr id="102" name="Rectangle : coins arrondis 101">
+                <a:hlinkClick r:id="rId10" action="ppaction://hlinksldjump"/>
+                <a:extLst>
+                  <a:ext uri="{FF2B5EF4-FFF2-40B4-BE49-F238E27FC236}">
+                    <a16:creationId xmlns:a16="http://schemas.microsoft.com/office/drawing/2014/main" id="{4AB5701A-75D7-8E06-EF86-476C42C4CE6C}"/>
+                  </a:ext>
+                </a:extLst>
+              </p:cNvPr>
+              <p:cNvSpPr/>
+              <p:nvPr/>
+            </p:nvSpPr>
+            <p:spPr>
+              <a:xfrm>
+                <a:off x="10427371" y="5087010"/>
+                <a:ext cx="1261872" cy="720000"/>
+              </a:xfrm>
+              <a:prstGeom prst="roundRect">
+                <a:avLst>
+                  <a:gd name="adj" fmla="val 6463"/>
+                </a:avLst>
+              </a:prstGeom>
+              <a:solidFill>
+                <a:srgbClr val="4696FD"/>
+              </a:solidFill>
+              <a:ln>
+                <a:noFill/>
+              </a:ln>
+            </p:spPr>
+            <p:style>
+              <a:lnRef idx="2">
+                <a:schemeClr val="accent1">
+                  <a:shade val="50000"/>
+                </a:schemeClr>
+              </a:lnRef>
+              <a:fillRef idx="1">
+                <a:schemeClr val="accent1"/>
+              </a:fillRef>
+              <a:effectRef idx="0">
+                <a:schemeClr val="accent1"/>
+              </a:effectRef>
+              <a:fontRef idx="minor">
+                <a:schemeClr val="lt1"/>
+              </a:fontRef>
+            </p:style>
+            <p:txBody>
+              <a:bodyPr rtlCol="0" anchor="ctr"/>
+              <a:lstStyle/>
+              <a:p>
+                <a:pPr algn="ctr"/>
+                <a:r>
+                  <a:rPr lang="fr-FR" sz="2000" dirty="0">
+                    <a:latin typeface="Arial" panose="020B0604020202020204" pitchFamily="34" charset="0"/>
+                    <a:cs typeface="Arial" panose="020B0604020202020204" pitchFamily="34" charset="0"/>
+                  </a:rPr>
+                  <a:t>AI-4</a:t>
+                </a:r>
+                <a:endParaRPr lang="en-US" sz="2000" dirty="0">
+                  <a:latin typeface="Arial" panose="020B0604020202020204" pitchFamily="34" charset="0"/>
+                  <a:cs typeface="Arial" panose="020B0604020202020204" pitchFamily="34" charset="0"/>
+                </a:endParaRPr>
+              </a:p>
+            </p:txBody>
+          </p:sp>
+        </p:grpSp>
+        <p:cxnSp>
+          <p:nvCxnSpPr>
+            <p:cNvPr id="32" name="Connecteur droit 31">
+              <a:extLst>
+                <a:ext uri="{FF2B5EF4-FFF2-40B4-BE49-F238E27FC236}">
+                  <a16:creationId xmlns:a16="http://schemas.microsoft.com/office/drawing/2014/main" id="{5F9011B3-4608-BE70-DE5D-166B6E08166A}"/>
+                </a:ext>
+              </a:extLst>
+            </p:cNvPr>
+            <p:cNvCxnSpPr>
+              <a:cxnSpLocks/>
+            </p:cNvCxnSpPr>
+            <p:nvPr/>
+          </p:nvCxnSpPr>
+          <p:spPr>
+            <a:xfrm>
+              <a:off x="6467255" y="5789450"/>
+              <a:ext cx="0" cy="1068550"/>
+            </a:xfrm>
+            <a:prstGeom prst="line">
+              <a:avLst/>
+            </a:prstGeom>
             <a:ln>
-              <a:noFill/>
+              <a:solidFill>
+                <a:schemeClr val="bg2">
+                  <a:lumMod val="50000"/>
+                  <a:lumOff val="50000"/>
+                </a:schemeClr>
+              </a:solidFill>
             </a:ln>
           </p:spPr>
           <p:style>
-            <a:lnRef idx="2">
-              <a:schemeClr val="accent1">
-                <a:shade val="50000"/>
-              </a:schemeClr>
+            <a:lnRef idx="1">
+              <a:schemeClr val="accent1"/>
             </a:lnRef>
-            <a:fillRef idx="1">
+            <a:fillRef idx="0">
               <a:schemeClr val="accent1"/>
             </a:fillRef>
             <a:effectRef idx="0">
               <a:schemeClr val="accent1"/>
             </a:effectRef>
             <a:fontRef idx="minor">
-              <a:schemeClr val="lt1"/>
+              <a:schemeClr val="tx1"/>
             </a:fontRef>
           </p:style>
-          <p:txBody>
-            <a:bodyPr rtlCol="0" anchor="ctr"/>
-            <a:lstStyle/>
-            <a:p>
-              <a:pPr algn="ctr"/>
-              <a:r>
-                <a:rPr lang="fr-FR" sz="2000" dirty="0">
-                  <a:latin typeface="Arial" panose="020B0604020202020204" pitchFamily="34" charset="0"/>
-                  <a:cs typeface="Arial" panose="020B0604020202020204" pitchFamily="34" charset="0"/>
-                </a:rPr>
-                <a:t>AI-1</a:t>
-              </a:r>
-              <a:endParaRPr lang="en-US" sz="2000" dirty="0">
-                <a:latin typeface="Arial" panose="020B0604020202020204" pitchFamily="34" charset="0"/>
-                <a:cs typeface="Arial" panose="020B0604020202020204" pitchFamily="34" charset="0"/>
-              </a:endParaRPr>
-            </a:p>
-          </p:txBody>
-        </p:sp>
-        <p:sp>
-          <p:nvSpPr>
-            <p:cNvPr id="100" name="Rectangle : coins arrondis 99">
-              <a:hlinkClick r:id="rId10" action="ppaction://hlinksldjump"/>
+        </p:cxnSp>
+        <p:cxnSp>
+          <p:nvCxnSpPr>
+            <p:cNvPr id="112" name="Connecteur droit 111">
               <a:extLst>
                 <a:ext uri="{FF2B5EF4-FFF2-40B4-BE49-F238E27FC236}">
-                  <a16:creationId xmlns:a16="http://schemas.microsoft.com/office/drawing/2014/main" id="{0B8E82F0-E235-86B0-FA63-14F80127A4D5}"/>
+                  <a16:creationId xmlns:a16="http://schemas.microsoft.com/office/drawing/2014/main" id="{D130F221-CAAF-9397-FA30-DB18B35CB49D}"/>
                 </a:ext>
               </a:extLst>
             </p:cNvPr>
-            <p:cNvSpPr/>
+            <p:cNvCxnSpPr>
+              <a:cxnSpLocks/>
+            </p:cNvCxnSpPr>
             <p:nvPr/>
-          </p:nvSpPr>
+          </p:nvCxnSpPr>
           <p:spPr>
             <a:xfrm>
-              <a:off x="6714905" y="5090548"/>
-              <a:ext cx="1261872" cy="720000"/>
+              <a:off x="8356160" y="5789450"/>
+              <a:ext cx="0" cy="1068550"/>
             </a:xfrm>
-            <a:prstGeom prst="roundRect">
-              <a:avLst>
-                <a:gd name="adj" fmla="val 6463"/>
-              </a:avLst>
+            <a:prstGeom prst="line">
+              <a:avLst/>
             </a:prstGeom>
-            <a:solidFill>
-              <a:srgbClr val="4696FD"/>
-            </a:solidFill>
             <a:ln>
-              <a:noFill/>
+              <a:solidFill>
+                <a:schemeClr val="bg2">
+                  <a:lumMod val="50000"/>
+                  <a:lumOff val="50000"/>
+                </a:schemeClr>
+              </a:solidFill>
             </a:ln>
           </p:spPr>
           <p:style>
-            <a:lnRef idx="2">
-              <a:schemeClr val="accent1">
-                <a:shade val="50000"/>
-              </a:schemeClr>
+            <a:lnRef idx="1">
+              <a:schemeClr val="accent1"/>
             </a:lnRef>
-            <a:fillRef idx="1">
+            <a:fillRef idx="0">
               <a:schemeClr val="accent1"/>
             </a:fillRef>
             <a:effectRef idx="0">
               <a:schemeClr val="accent1"/>
             </a:effectRef>
             <a:fontRef idx="minor">
-              <a:schemeClr val="lt1"/>
+              <a:schemeClr val="tx1"/>
             </a:fontRef>
           </p:style>
-          <p:txBody>
-            <a:bodyPr rtlCol="0" anchor="ctr"/>
-            <a:lstStyle/>
-            <a:p>
-              <a:pPr algn="ctr"/>
-              <a:r>
-                <a:rPr lang="fr-FR" sz="2000" dirty="0">
-                  <a:latin typeface="Arial" panose="020B0604020202020204" pitchFamily="34" charset="0"/>
-                  <a:cs typeface="Arial" panose="020B0604020202020204" pitchFamily="34" charset="0"/>
-                </a:rPr>
-                <a:t>AI-2</a:t>
-              </a:r>
-              <a:endParaRPr lang="en-US" sz="2000" dirty="0">
-                <a:latin typeface="Arial" panose="020B0604020202020204" pitchFamily="34" charset="0"/>
-                <a:cs typeface="Arial" panose="020B0604020202020204" pitchFamily="34" charset="0"/>
-              </a:endParaRPr>
-            </a:p>
-          </p:txBody>
-        </p:sp>
-        <p:sp>
-          <p:nvSpPr>
-            <p:cNvPr id="101" name="Rectangle : coins arrondis 100">
-              <a:hlinkClick r:id="rId10" action="ppaction://hlinksldjump"/>
+        </p:cxnSp>
+        <p:cxnSp>
+          <p:nvCxnSpPr>
+            <p:cNvPr id="142" name="Connecteur droit 141">
               <a:extLst>
                 <a:ext uri="{FF2B5EF4-FFF2-40B4-BE49-F238E27FC236}">
-                  <a16:creationId xmlns:a16="http://schemas.microsoft.com/office/drawing/2014/main" id="{3E6945AD-175D-CE1D-D879-61EF3CCAC2AE}"/>
+                  <a16:creationId xmlns:a16="http://schemas.microsoft.com/office/drawing/2014/main" id="{3AFF5976-BC87-C03D-4DD3-29CBF6EAD314}"/>
                 </a:ext>
               </a:extLst>
             </p:cNvPr>
-            <p:cNvSpPr/>
+            <p:cNvCxnSpPr>
+              <a:cxnSpLocks/>
+            </p:cNvCxnSpPr>
             <p:nvPr/>
-          </p:nvSpPr>
+          </p:nvCxnSpPr>
           <p:spPr>
             <a:xfrm>
-              <a:off x="8571138" y="5090548"/>
-              <a:ext cx="1261872" cy="720000"/>
+              <a:off x="10204997" y="5789450"/>
+              <a:ext cx="0" cy="1068550"/>
             </a:xfrm>
-            <a:prstGeom prst="roundRect">
-              <a:avLst>
-                <a:gd name="adj" fmla="val 6463"/>
-              </a:avLst>
+            <a:prstGeom prst="line">
+              <a:avLst/>
             </a:prstGeom>
-            <a:solidFill>
-              <a:srgbClr val="4696FD"/>
-            </a:solidFill>
             <a:ln>
-              <a:noFill/>
+              <a:solidFill>
+                <a:schemeClr val="bg2">
+                  <a:lumMod val="50000"/>
+                  <a:lumOff val="50000"/>
+                </a:schemeClr>
+              </a:solidFill>
             </a:ln>
           </p:spPr>
           <p:style>
-            <a:lnRef idx="2">
-              <a:schemeClr val="accent1">
-                <a:shade val="50000"/>
-              </a:schemeClr>
+            <a:lnRef idx="1">
+              <a:schemeClr val="accent1"/>
             </a:lnRef>
-            <a:fillRef idx="1">
+            <a:fillRef idx="0">
               <a:schemeClr val="accent1"/>
             </a:fillRef>
             <a:effectRef idx="0">
               <a:schemeClr val="accent1"/>
             </a:effectRef>
             <a:fontRef idx="minor">
-              <a:schemeClr val="lt1"/>
+              <a:schemeClr val="tx1"/>
             </a:fontRef>
           </p:style>
+        </p:cxnSp>
+        <p:sp>
+          <p:nvSpPr>
+            <p:cNvPr id="143" name="ZoneTexte 142">
+              <a:extLst>
+                <a:ext uri="{FF2B5EF4-FFF2-40B4-BE49-F238E27FC236}">
+                  <a16:creationId xmlns:a16="http://schemas.microsoft.com/office/drawing/2014/main" id="{E13CBD2F-86E3-76D5-B0E9-6DC5E80E2C8E}"/>
+                </a:ext>
+              </a:extLst>
+            </p:cNvPr>
+            <p:cNvSpPr txBox="1">
+              <a:spLocks/>
+            </p:cNvSpPr>
+            <p:nvPr/>
+          </p:nvSpPr>
+          <p:spPr>
+            <a:xfrm>
+              <a:off x="4799121" y="5796059"/>
+              <a:ext cx="1390855" cy="830997"/>
+            </a:xfrm>
+            <a:prstGeom prst="rect">
+              <a:avLst/>
+            </a:prstGeom>
+            <a:noFill/>
+          </p:spPr>
           <p:txBody>
-            <a:bodyPr rtlCol="0" anchor="ctr"/>
+            <a:bodyPr wrap="square" rtlCol="0">
+              <a:spAutoFit/>
+            </a:bodyPr>
             <a:lstStyle/>
             <a:p>
               <a:pPr algn="ctr"/>
               <a:r>
-                <a:rPr lang="fr-FR" sz="2000" dirty="0">
+                <a:rPr lang="fr-FR" sz="1200" dirty="0">
+                  <a:solidFill>
+                    <a:schemeClr val="bg1"/>
+                  </a:solidFill>
                   <a:latin typeface="Arial" panose="020B0604020202020204" pitchFamily="34" charset="0"/>
                   <a:cs typeface="Arial" panose="020B0604020202020204" pitchFamily="34" charset="0"/>
                 </a:rPr>
-                <a:t>AI-3</a:t>
+                <a:t>Description</a:t>
               </a:r>
-              <a:endParaRPr lang="en-US" sz="2000" dirty="0">
-                <a:latin typeface="Arial" panose="020B0604020202020204" pitchFamily="34" charset="0"/>
-                <a:cs typeface="Arial" panose="020B0604020202020204" pitchFamily="34" charset="0"/>
-              </a:endParaRPr>
+            </a:p>
+            <a:p>
+              <a:pPr algn="ctr"/>
+              <a:r>
+                <a:rPr lang="fr-FR" sz="1200" dirty="0">
+                  <a:solidFill>
+                    <a:schemeClr val="bg1"/>
+                  </a:solidFill>
+                  <a:latin typeface="Arial" panose="020B0604020202020204" pitchFamily="34" charset="0"/>
+                  <a:cs typeface="Arial" panose="020B0604020202020204" pitchFamily="34" charset="0"/>
+                </a:rPr>
+                <a:t>……</a:t>
+              </a:r>
+            </a:p>
+            <a:p>
+              <a:pPr algn="ctr"/>
+              <a:r>
+                <a:rPr lang="fr-FR" sz="1200" dirty="0">
+                  <a:solidFill>
+                    <a:schemeClr val="bg1"/>
+                  </a:solidFill>
+                  <a:latin typeface="Arial" panose="020B0604020202020204" pitchFamily="34" charset="0"/>
+                  <a:cs typeface="Arial" panose="020B0604020202020204" pitchFamily="34" charset="0"/>
+                </a:rPr>
+                <a:t>….</a:t>
+              </a:r>
+            </a:p>
+            <a:p>
+              <a:pPr algn="ctr"/>
+              <a:r>
+                <a:rPr lang="fr-FR" sz="1200" dirty="0">
+                  <a:solidFill>
+                    <a:schemeClr val="bg1"/>
+                  </a:solidFill>
+                  <a:latin typeface="Arial" panose="020B0604020202020204" pitchFamily="34" charset="0"/>
+                  <a:cs typeface="Arial" panose="020B0604020202020204" pitchFamily="34" charset="0"/>
+                </a:rPr>
+                <a:t>………</a:t>
+              </a:r>
             </a:p>
           </p:txBody>
         </p:sp>
         <p:sp>
           <p:nvSpPr>
-            <p:cNvPr id="102" name="Rectangle : coins arrondis 101">
-              <a:hlinkClick r:id="rId10" action="ppaction://hlinksldjump"/>
+            <p:cNvPr id="144" name="ZoneTexte 143">
               <a:extLst>
                 <a:ext uri="{FF2B5EF4-FFF2-40B4-BE49-F238E27FC236}">
-                  <a16:creationId xmlns:a16="http://schemas.microsoft.com/office/drawing/2014/main" id="{4AB5701A-75D7-8E06-EF86-476C42C4CE6C}"/>
+                  <a16:creationId xmlns:a16="http://schemas.microsoft.com/office/drawing/2014/main" id="{45D23426-9E37-4F5F-E5B0-C2398A5D8C36}"/>
                 </a:ext>
               </a:extLst>
             </p:cNvPr>
-            <p:cNvSpPr/>
+            <p:cNvSpPr txBox="1">
+              <a:spLocks/>
+            </p:cNvSpPr>
             <p:nvPr/>
           </p:nvSpPr>
           <p:spPr>
             <a:xfrm>
-              <a:off x="10427371" y="5087010"/>
-              <a:ext cx="1261872" cy="720000"/>
+              <a:off x="6714716" y="5786018"/>
+              <a:ext cx="1390855" cy="954107"/>
             </a:xfrm>
-            <a:prstGeom prst="roundRect">
-              <a:avLst>
-                <a:gd name="adj" fmla="val 6463"/>
-              </a:avLst>
+            <a:prstGeom prst="rect">
+              <a:avLst/>
             </a:prstGeom>
-            <a:solidFill>
-              <a:srgbClr val="4696FD"/>
-            </a:solidFill>
-            <a:ln>
-              <a:noFill/>
-            </a:ln>
+            <a:noFill/>
           </p:spPr>
-          <p:style>
-            <a:lnRef idx="2">
-              <a:schemeClr val="accent1">
-                <a:shade val="50000"/>
-              </a:schemeClr>
-            </a:lnRef>
-            <a:fillRef idx="1">
-              <a:schemeClr val="accent1"/>
-            </a:fillRef>
-            <a:effectRef idx="0">
-              <a:schemeClr val="accent1"/>
-            </a:effectRef>
-            <a:fontRef idx="minor">
-              <a:schemeClr val="lt1"/>
-            </a:fontRef>
-          </p:style>
           <p:txBody>
-            <a:bodyPr rtlCol="0" anchor="ctr"/>
+            <a:bodyPr wrap="square" rtlCol="0">
+              <a:spAutoFit/>
+            </a:bodyPr>
             <a:lstStyle/>
             <a:p>
               <a:pPr algn="ctr"/>
               <a:r>
-                <a:rPr lang="fr-FR" sz="2000" dirty="0">
+                <a:rPr lang="fr-FR" sz="1200" dirty="0" err="1">
+                  <a:solidFill>
+                    <a:schemeClr val="bg1"/>
+                  </a:solidFill>
                   <a:latin typeface="Arial" panose="020B0604020202020204" pitchFamily="34" charset="0"/>
                   <a:cs typeface="Arial" panose="020B0604020202020204" pitchFamily="34" charset="0"/>
                 </a:rPr>
-                <a:t>AI-4</a:t>
+                <a:t>Results</a:t>
               </a:r>
-              <a:endParaRPr lang="en-US" sz="2000" dirty="0">
-                <a:latin typeface="Arial" panose="020B0604020202020204" pitchFamily="34" charset="0"/>
-                <a:cs typeface="Arial" panose="020B0604020202020204" pitchFamily="34" charset="0"/>
-              </a:endParaRPr>
-            </a:p>
-          </p:txBody>
-        </p:sp>
-      </p:grpSp>
-      <p:cxnSp>
-        <p:nvCxnSpPr>
-          <p:cNvPr id="32" name="Connecteur droit 31">
-            <a:extLst>
-              <a:ext uri="{FF2B5EF4-FFF2-40B4-BE49-F238E27FC236}">
-                <a16:creationId xmlns:a16="http://schemas.microsoft.com/office/drawing/2014/main" id="{5F9011B3-4608-BE70-DE5D-166B6E08166A}"/>
-              </a:ext>
-            </a:extLst>
-          </p:cNvPr>
-          <p:cNvCxnSpPr>
-            <a:cxnSpLocks/>
-          </p:cNvCxnSpPr>
-          <p:nvPr/>
-        </p:nvCxnSpPr>
-        <p:spPr>
-          <a:xfrm>
-            <a:off x="6467255" y="5789450"/>
-            <a:ext cx="0" cy="1068550"/>
-          </a:xfrm>
-          <a:prstGeom prst="line">
-            <a:avLst/>
-          </a:prstGeom>
-          <a:ln>
-            <a:solidFill>
-              <a:schemeClr val="bg2">
-                <a:lumMod val="50000"/>
-                <a:lumOff val="50000"/>
-              </a:schemeClr>
-            </a:solidFill>
-          </a:ln>
-        </p:spPr>
-        <p:style>
-          <a:lnRef idx="1">
-            <a:schemeClr val="accent1"/>
-          </a:lnRef>
-          <a:fillRef idx="0">
-            <a:schemeClr val="accent1"/>
-          </a:fillRef>
-          <a:effectRef idx="0">
-            <a:schemeClr val="accent1"/>
-          </a:effectRef>
-          <a:fontRef idx="minor">
-            <a:schemeClr val="tx1"/>
-          </a:fontRef>
-        </p:style>
-      </p:cxnSp>
-      <p:cxnSp>
-        <p:nvCxnSpPr>
-          <p:cNvPr id="112" name="Connecteur droit 111">
-            <a:extLst>
-              <a:ext uri="{FF2B5EF4-FFF2-40B4-BE49-F238E27FC236}">
-                <a16:creationId xmlns:a16="http://schemas.microsoft.com/office/drawing/2014/main" id="{D130F221-CAAF-9397-FA30-DB18B35CB49D}"/>
-              </a:ext>
-            </a:extLst>
-          </p:cNvPr>
-          <p:cNvCxnSpPr>
-            <a:cxnSpLocks/>
-          </p:cNvCxnSpPr>
-          <p:nvPr/>
-        </p:nvCxnSpPr>
-        <p:spPr>
-          <a:xfrm>
-            <a:off x="8356160" y="5789450"/>
-            <a:ext cx="0" cy="1068550"/>
-          </a:xfrm>
-          <a:prstGeom prst="line">
-            <a:avLst/>
-          </a:prstGeom>
-          <a:ln>
-            <a:solidFill>
-              <a:schemeClr val="bg2">
-                <a:lumMod val="50000"/>
-                <a:lumOff val="50000"/>
-              </a:schemeClr>
-            </a:solidFill>
-          </a:ln>
-        </p:spPr>
-        <p:style>
-          <a:lnRef idx="1">
-            <a:schemeClr val="accent1"/>
-          </a:lnRef>
-          <a:fillRef idx="0">
-            <a:schemeClr val="accent1"/>
-          </a:fillRef>
-          <a:effectRef idx="0">
-            <a:schemeClr val="accent1"/>
-          </a:effectRef>
-          <a:fontRef idx="minor">
-            <a:schemeClr val="tx1"/>
-          </a:fontRef>
-        </p:style>
-      </p:cxnSp>
-      <p:cxnSp>
-        <p:nvCxnSpPr>
-          <p:cNvPr id="142" name="Connecteur droit 141">
-            <a:extLst>
-              <a:ext uri="{FF2B5EF4-FFF2-40B4-BE49-F238E27FC236}">
-                <a16:creationId xmlns:a16="http://schemas.microsoft.com/office/drawing/2014/main" id="{3AFF5976-BC87-C03D-4DD3-29CBF6EAD314}"/>
-              </a:ext>
-            </a:extLst>
-          </p:cNvPr>
-          <p:cNvCxnSpPr>
-            <a:cxnSpLocks/>
-          </p:cNvCxnSpPr>
-          <p:nvPr/>
-        </p:nvCxnSpPr>
-        <p:spPr>
-          <a:xfrm>
-            <a:off x="10204997" y="5789450"/>
-            <a:ext cx="0" cy="1068550"/>
-          </a:xfrm>
-          <a:prstGeom prst="line">
-            <a:avLst/>
-          </a:prstGeom>
-          <a:ln>
-            <a:solidFill>
-              <a:schemeClr val="bg2">
-                <a:lumMod val="50000"/>
-                <a:lumOff val="50000"/>
-              </a:schemeClr>
-            </a:solidFill>
-          </a:ln>
-        </p:spPr>
-        <p:style>
-          <a:lnRef idx="1">
-            <a:schemeClr val="accent1"/>
-          </a:lnRef>
-          <a:fillRef idx="0">
-            <a:schemeClr val="accent1"/>
-          </a:fillRef>
-          <a:effectRef idx="0">
-            <a:schemeClr val="accent1"/>
-          </a:effectRef>
-          <a:fontRef idx="minor">
-            <a:schemeClr val="tx1"/>
-          </a:fontRef>
-        </p:style>
-      </p:cxnSp>
-      <p:sp>
-        <p:nvSpPr>
-          <p:cNvPr id="143" name="ZoneTexte 142">
-            <a:extLst>
-              <a:ext uri="{FF2B5EF4-FFF2-40B4-BE49-F238E27FC236}">
-                <a16:creationId xmlns:a16="http://schemas.microsoft.com/office/drawing/2014/main" id="{E13CBD2F-86E3-76D5-B0E9-6DC5E80E2C8E}"/>
-              </a:ext>
-            </a:extLst>
-          </p:cNvPr>
-          <p:cNvSpPr txBox="1">
-            <a:spLocks/>
-          </p:cNvSpPr>
-          <p:nvPr/>
-        </p:nvSpPr>
-        <p:spPr>
-          <a:xfrm>
-            <a:off x="4799121" y="5796059"/>
-            <a:ext cx="1390855" cy="830997"/>
-          </a:xfrm>
-          <a:prstGeom prst="rect">
-            <a:avLst/>
-          </a:prstGeom>
-          <a:noFill/>
-        </p:spPr>
-        <p:txBody>
-          <a:bodyPr wrap="square" rtlCol="0">
-            <a:spAutoFit/>
-          </a:bodyPr>
-          <a:lstStyle/>
-          <a:p>
-            <a:pPr algn="ctr"/>
-            <a:r>
-              <a:rPr lang="fr-FR" sz="1200" dirty="0">
+              <a:endParaRPr lang="fr-FR" sz="1100" dirty="0">
                 <a:solidFill>
                   <a:schemeClr val="bg1"/>
                 </a:solidFill>
                 <a:latin typeface="Arial" panose="020B0604020202020204" pitchFamily="34" charset="0"/>
                 <a:cs typeface="Arial" panose="020B0604020202020204" pitchFamily="34" charset="0"/>
-              </a:rPr>
-              <a:t>Description</a:t>
-            </a:r>
-          </a:p>
-          <a:p>
-            <a:pPr algn="ctr"/>
-            <a:r>
-              <a:rPr lang="fr-FR" sz="1200" dirty="0">
+              </a:endParaRPr>
+            </a:p>
+            <a:p>
+              <a:pPr algn="ctr"/>
+              <a:endParaRPr lang="fr-FR" sz="1100" dirty="0">
                 <a:solidFill>
                   <a:schemeClr val="bg1"/>
                 </a:solidFill>
                 <a:latin typeface="Arial" panose="020B0604020202020204" pitchFamily="34" charset="0"/>
                 <a:cs typeface="Arial" panose="020B0604020202020204" pitchFamily="34" charset="0"/>
-              </a:rPr>
-              <a:t>……</a:t>
-            </a:r>
-          </a:p>
-          <a:p>
-            <a:pPr algn="ctr"/>
-            <a:r>
-              <a:rPr lang="fr-FR" sz="1200" dirty="0">
+              </a:endParaRPr>
+            </a:p>
+            <a:p>
+              <a:r>
+                <a:rPr lang="fr-FR" sz="1100" dirty="0">
+                  <a:solidFill>
+                    <a:schemeClr val="bg2"/>
+                  </a:solidFill>
+                  <a:latin typeface="Arial" panose="020B0604020202020204" pitchFamily="34" charset="0"/>
+                  <a:cs typeface="Arial" panose="020B0604020202020204" pitchFamily="34" charset="0"/>
+                </a:rPr>
+                <a:t>Risk: </a:t>
+              </a:r>
+              <a:r>
+                <a:rPr lang="fr-FR" sz="1100" dirty="0">
+                  <a:solidFill>
+                    <a:srgbClr val="C00000"/>
+                  </a:solidFill>
+                  <a:latin typeface="Arial" panose="020B0604020202020204" pitchFamily="34" charset="0"/>
+                  <a:cs typeface="Arial" panose="020B0604020202020204" pitchFamily="34" charset="0"/>
+                </a:rPr>
+                <a:t>MALIGNANT</a:t>
+              </a:r>
+              <a:endParaRPr lang="fr-FR" sz="1100" dirty="0">
                 <a:solidFill>
-                  <a:schemeClr val="bg1"/>
+                  <a:srgbClr val="00B050"/>
                 </a:solidFill>
                 <a:latin typeface="Arial" panose="020B0604020202020204" pitchFamily="34" charset="0"/>
                 <a:cs typeface="Arial" panose="020B0604020202020204" pitchFamily="34" charset="0"/>
-              </a:rPr>
-              <a:t>….</a:t>
-            </a:r>
-          </a:p>
-          <a:p>
-            <a:pPr algn="ctr"/>
-            <a:r>
-              <a:rPr lang="fr-FR" sz="1200" dirty="0">
-                <a:solidFill>
-                  <a:schemeClr val="bg1"/>
-                </a:solidFill>
-                <a:latin typeface="Arial" panose="020B0604020202020204" pitchFamily="34" charset="0"/>
-                <a:cs typeface="Arial" panose="020B0604020202020204" pitchFamily="34" charset="0"/>
-              </a:rPr>
-              <a:t>………</a:t>
-            </a:r>
-          </a:p>
-        </p:txBody>
-      </p:sp>
-      <p:sp>
-        <p:nvSpPr>
-          <p:cNvPr id="144" name="ZoneTexte 143">
-            <a:extLst>
-              <a:ext uri="{FF2B5EF4-FFF2-40B4-BE49-F238E27FC236}">
-                <a16:creationId xmlns:a16="http://schemas.microsoft.com/office/drawing/2014/main" id="{45D23426-9E37-4F5F-E5B0-C2398A5D8C36}"/>
-              </a:ext>
-            </a:extLst>
-          </p:cNvPr>
-          <p:cNvSpPr txBox="1">
-            <a:spLocks/>
-          </p:cNvSpPr>
-          <p:nvPr/>
-        </p:nvSpPr>
-        <p:spPr>
-          <a:xfrm>
-            <a:off x="6714716" y="5786018"/>
-            <a:ext cx="1390855" cy="954107"/>
-          </a:xfrm>
-          <a:prstGeom prst="rect">
-            <a:avLst/>
-          </a:prstGeom>
-          <a:noFill/>
-        </p:spPr>
-        <p:txBody>
-          <a:bodyPr wrap="square" rtlCol="0">
-            <a:spAutoFit/>
-          </a:bodyPr>
-          <a:lstStyle/>
-          <a:p>
-            <a:pPr algn="ctr"/>
-            <a:r>
-              <a:rPr lang="fr-FR" sz="1200" dirty="0" err="1">
-                <a:solidFill>
-                  <a:schemeClr val="bg1"/>
-                </a:solidFill>
-                <a:latin typeface="Arial" panose="020B0604020202020204" pitchFamily="34" charset="0"/>
-                <a:cs typeface="Arial" panose="020B0604020202020204" pitchFamily="34" charset="0"/>
-              </a:rPr>
-              <a:t>Results</a:t>
-            </a:r>
-            <a:endParaRPr lang="fr-FR" sz="1100" dirty="0">
-              <a:solidFill>
-                <a:schemeClr val="bg1"/>
-              </a:solidFill>
-              <a:latin typeface="Arial" panose="020B0604020202020204" pitchFamily="34" charset="0"/>
-              <a:cs typeface="Arial" panose="020B0604020202020204" pitchFamily="34" charset="0"/>
-            </a:endParaRPr>
-          </a:p>
-          <a:p>
-            <a:pPr algn="ctr"/>
-            <a:endParaRPr lang="fr-FR" sz="1100" dirty="0">
-              <a:solidFill>
-                <a:schemeClr val="bg1"/>
-              </a:solidFill>
-              <a:latin typeface="Arial" panose="020B0604020202020204" pitchFamily="34" charset="0"/>
-              <a:cs typeface="Arial" panose="020B0604020202020204" pitchFamily="34" charset="0"/>
-            </a:endParaRPr>
-          </a:p>
-          <a:p>
-            <a:r>
-              <a:rPr lang="fr-FR" sz="1100" dirty="0">
+              </a:endParaRPr>
+            </a:p>
+            <a:p>
+              <a:r>
+                <a:rPr lang="fr-FR" sz="1100" dirty="0">
+                  <a:solidFill>
+                    <a:schemeClr val="bg2"/>
+                  </a:solidFill>
+                  <a:latin typeface="Arial" panose="020B0604020202020204" pitchFamily="34" charset="0"/>
+                  <a:cs typeface="Arial" panose="020B0604020202020204" pitchFamily="34" charset="0"/>
+                </a:rPr>
+                <a:t>Type: </a:t>
+              </a:r>
+              <a:r>
+                <a:rPr lang="fr-FR" sz="1100" dirty="0" err="1">
+                  <a:solidFill>
+                    <a:schemeClr val="bg2"/>
+                  </a:solidFill>
+                  <a:latin typeface="Arial" panose="020B0604020202020204" pitchFamily="34" charset="0"/>
+                  <a:cs typeface="Arial" panose="020B0604020202020204" pitchFamily="34" charset="0"/>
+                </a:rPr>
+                <a:t>Melanoma</a:t>
+              </a:r>
+              <a:endParaRPr lang="fr-FR" sz="1100" dirty="0">
                 <a:solidFill>
                   <a:schemeClr val="bg2"/>
                 </a:solidFill>
                 <a:latin typeface="Arial" panose="020B0604020202020204" pitchFamily="34" charset="0"/>
                 <a:cs typeface="Arial" panose="020B0604020202020204" pitchFamily="34" charset="0"/>
-              </a:rPr>
-              <a:t>Risk: </a:t>
-            </a:r>
-            <a:r>
-              <a:rPr lang="fr-FR" sz="1100" dirty="0">
-                <a:solidFill>
-                  <a:srgbClr val="C00000"/>
-                </a:solidFill>
-                <a:latin typeface="Arial" panose="020B0604020202020204" pitchFamily="34" charset="0"/>
-                <a:cs typeface="Arial" panose="020B0604020202020204" pitchFamily="34" charset="0"/>
-              </a:rPr>
-              <a:t>MALIGNANT</a:t>
-            </a:r>
-            <a:endParaRPr lang="fr-FR" sz="1100" dirty="0">
-              <a:solidFill>
-                <a:srgbClr val="00B050"/>
-              </a:solidFill>
-              <a:latin typeface="Arial" panose="020B0604020202020204" pitchFamily="34" charset="0"/>
-              <a:cs typeface="Arial" panose="020B0604020202020204" pitchFamily="34" charset="0"/>
-            </a:endParaRPr>
-          </a:p>
-          <a:p>
-            <a:r>
-              <a:rPr lang="fr-FR" sz="1100" dirty="0">
-                <a:solidFill>
-                  <a:schemeClr val="bg2"/>
-                </a:solidFill>
-                <a:latin typeface="Arial" panose="020B0604020202020204" pitchFamily="34" charset="0"/>
-                <a:cs typeface="Arial" panose="020B0604020202020204" pitchFamily="34" charset="0"/>
-              </a:rPr>
-              <a:t>Type: </a:t>
-            </a:r>
-            <a:r>
-              <a:rPr lang="fr-FR" sz="1100" dirty="0" err="1">
-                <a:solidFill>
-                  <a:schemeClr val="bg2"/>
-                </a:solidFill>
-                <a:latin typeface="Arial" panose="020B0604020202020204" pitchFamily="34" charset="0"/>
-                <a:cs typeface="Arial" panose="020B0604020202020204" pitchFamily="34" charset="0"/>
-              </a:rPr>
-              <a:t>Melanoma</a:t>
-            </a:r>
-            <a:endParaRPr lang="fr-FR" sz="1100" dirty="0">
-              <a:solidFill>
-                <a:schemeClr val="bg2"/>
-              </a:solidFill>
-              <a:latin typeface="Arial" panose="020B0604020202020204" pitchFamily="34" charset="0"/>
-              <a:cs typeface="Arial" panose="020B0604020202020204" pitchFamily="34" charset="0"/>
-            </a:endParaRPr>
-          </a:p>
-          <a:p>
-            <a:r>
-              <a:rPr lang="fr-FR" sz="1100" dirty="0" err="1">
-                <a:solidFill>
-                  <a:schemeClr val="bg2"/>
-                </a:solidFill>
-                <a:latin typeface="Arial" panose="020B0604020202020204" pitchFamily="34" charset="0"/>
-                <a:cs typeface="Arial" panose="020B0604020202020204" pitchFamily="34" charset="0"/>
-              </a:rPr>
-              <a:t>Accurance</a:t>
-            </a:r>
-            <a:r>
-              <a:rPr lang="fr-FR" sz="1100" dirty="0">
-                <a:solidFill>
-                  <a:schemeClr val="bg2"/>
-                </a:solidFill>
-                <a:latin typeface="Arial" panose="020B0604020202020204" pitchFamily="34" charset="0"/>
-                <a:cs typeface="Arial" panose="020B0604020202020204" pitchFamily="34" charset="0"/>
-              </a:rPr>
-              <a:t>: 87% </a:t>
-            </a:r>
-          </a:p>
-        </p:txBody>
-      </p:sp>
-      <p:sp>
-        <p:nvSpPr>
-          <p:cNvPr id="145" name="ZoneTexte 144">
-            <a:extLst>
-              <a:ext uri="{FF2B5EF4-FFF2-40B4-BE49-F238E27FC236}">
-                <a16:creationId xmlns:a16="http://schemas.microsoft.com/office/drawing/2014/main" id="{BF5B3604-AEC6-7ED5-2B5D-75A7067C0838}"/>
-              </a:ext>
-            </a:extLst>
-          </p:cNvPr>
-          <p:cNvSpPr txBox="1">
-            <a:spLocks/>
-          </p:cNvSpPr>
-          <p:nvPr/>
-        </p:nvSpPr>
-        <p:spPr>
-          <a:xfrm>
-            <a:off x="8520663" y="5796059"/>
-            <a:ext cx="1390855" cy="830997"/>
-          </a:xfrm>
-          <a:prstGeom prst="rect">
-            <a:avLst/>
-          </a:prstGeom>
-          <a:noFill/>
-        </p:spPr>
-        <p:txBody>
-          <a:bodyPr wrap="square" rtlCol="0">
-            <a:spAutoFit/>
-          </a:bodyPr>
-          <a:lstStyle/>
-          <a:p>
-            <a:pPr algn="ctr"/>
-            <a:r>
-              <a:rPr lang="fr-FR" sz="1200" dirty="0">
-                <a:solidFill>
-                  <a:schemeClr val="bg1"/>
-                </a:solidFill>
-                <a:latin typeface="Arial" panose="020B0604020202020204" pitchFamily="34" charset="0"/>
-                <a:cs typeface="Arial" panose="020B0604020202020204" pitchFamily="34" charset="0"/>
-              </a:rPr>
-              <a:t>Description</a:t>
-            </a:r>
-          </a:p>
-          <a:p>
-            <a:pPr algn="ctr"/>
-            <a:r>
-              <a:rPr lang="fr-FR" sz="1200" dirty="0">
-                <a:solidFill>
-                  <a:schemeClr val="bg1"/>
-                </a:solidFill>
-                <a:latin typeface="Arial" panose="020B0604020202020204" pitchFamily="34" charset="0"/>
-                <a:cs typeface="Arial" panose="020B0604020202020204" pitchFamily="34" charset="0"/>
-              </a:rPr>
-              <a:t>……</a:t>
-            </a:r>
-          </a:p>
-          <a:p>
-            <a:pPr algn="ctr"/>
-            <a:r>
-              <a:rPr lang="fr-FR" sz="1200" dirty="0">
-                <a:solidFill>
-                  <a:schemeClr val="bg1"/>
-                </a:solidFill>
-                <a:latin typeface="Arial" panose="020B0604020202020204" pitchFamily="34" charset="0"/>
-                <a:cs typeface="Arial" panose="020B0604020202020204" pitchFamily="34" charset="0"/>
-              </a:rPr>
-              <a:t>….</a:t>
-            </a:r>
-          </a:p>
-          <a:p>
-            <a:pPr algn="ctr"/>
-            <a:r>
-              <a:rPr lang="fr-FR" sz="1200" dirty="0">
-                <a:solidFill>
-                  <a:schemeClr val="bg1"/>
-                </a:solidFill>
-                <a:latin typeface="Arial" panose="020B0604020202020204" pitchFamily="34" charset="0"/>
-                <a:cs typeface="Arial" panose="020B0604020202020204" pitchFamily="34" charset="0"/>
-              </a:rPr>
-              <a:t>………</a:t>
-            </a:r>
-          </a:p>
-        </p:txBody>
-      </p:sp>
-      <p:sp>
-        <p:nvSpPr>
-          <p:cNvPr id="146" name="ZoneTexte 145">
-            <a:extLst>
-              <a:ext uri="{FF2B5EF4-FFF2-40B4-BE49-F238E27FC236}">
-                <a16:creationId xmlns:a16="http://schemas.microsoft.com/office/drawing/2014/main" id="{33FC395D-BA20-670E-1CA4-B7CA98D2F41C}"/>
-              </a:ext>
-            </a:extLst>
-          </p:cNvPr>
-          <p:cNvSpPr txBox="1">
-            <a:spLocks/>
-          </p:cNvSpPr>
-          <p:nvPr/>
-        </p:nvSpPr>
-        <p:spPr>
-          <a:xfrm>
-            <a:off x="10381433" y="5796059"/>
-            <a:ext cx="1390855" cy="830997"/>
-          </a:xfrm>
-          <a:prstGeom prst="rect">
-            <a:avLst/>
-          </a:prstGeom>
-          <a:noFill/>
-        </p:spPr>
-        <p:txBody>
-          <a:bodyPr wrap="square" rtlCol="0">
-            <a:spAutoFit/>
-          </a:bodyPr>
-          <a:lstStyle/>
-          <a:p>
-            <a:pPr algn="ctr"/>
-            <a:r>
-              <a:rPr lang="fr-FR" sz="1200" dirty="0">
-                <a:solidFill>
-                  <a:schemeClr val="bg1"/>
-                </a:solidFill>
-                <a:latin typeface="Arial" panose="020B0604020202020204" pitchFamily="34" charset="0"/>
-                <a:cs typeface="Arial" panose="020B0604020202020204" pitchFamily="34" charset="0"/>
-              </a:rPr>
-              <a:t>Description</a:t>
-            </a:r>
-          </a:p>
-          <a:p>
-            <a:pPr algn="ctr"/>
-            <a:r>
-              <a:rPr lang="fr-FR" sz="1200" dirty="0">
-                <a:solidFill>
-                  <a:schemeClr val="bg1"/>
-                </a:solidFill>
-                <a:latin typeface="Arial" panose="020B0604020202020204" pitchFamily="34" charset="0"/>
-                <a:cs typeface="Arial" panose="020B0604020202020204" pitchFamily="34" charset="0"/>
-              </a:rPr>
-              <a:t>……</a:t>
-            </a:r>
-          </a:p>
-          <a:p>
-            <a:pPr algn="ctr"/>
-            <a:r>
-              <a:rPr lang="fr-FR" sz="1200" dirty="0">
-                <a:solidFill>
-                  <a:schemeClr val="bg1"/>
-                </a:solidFill>
-                <a:latin typeface="Arial" panose="020B0604020202020204" pitchFamily="34" charset="0"/>
-                <a:cs typeface="Arial" panose="020B0604020202020204" pitchFamily="34" charset="0"/>
-              </a:rPr>
-              <a:t>….</a:t>
-            </a:r>
-          </a:p>
-          <a:p>
-            <a:pPr algn="ctr"/>
-            <a:r>
-              <a:rPr lang="fr-FR" sz="1200" dirty="0">
-                <a:solidFill>
-                  <a:schemeClr val="bg1"/>
-                </a:solidFill>
-                <a:latin typeface="Arial" panose="020B0604020202020204" pitchFamily="34" charset="0"/>
-                <a:cs typeface="Arial" panose="020B0604020202020204" pitchFamily="34" charset="0"/>
-              </a:rPr>
-              <a:t>………</a:t>
-            </a:r>
-          </a:p>
-        </p:txBody>
-      </p:sp>
-      <p:sp>
-        <p:nvSpPr>
-          <p:cNvPr id="147" name="Rectangle : coins arrondis 146">
-            <a:hlinkClick r:id="rId11" action="ppaction://hlinksldjump"/>
-            <a:extLst>
-              <a:ext uri="{FF2B5EF4-FFF2-40B4-BE49-F238E27FC236}">
-                <a16:creationId xmlns:a16="http://schemas.microsoft.com/office/drawing/2014/main" id="{AD6B16EE-E713-BD4F-0442-8858CE0DB798}"/>
-              </a:ext>
-            </a:extLst>
-          </p:cNvPr>
-          <p:cNvSpPr/>
-          <p:nvPr/>
-        </p:nvSpPr>
-        <p:spPr>
-          <a:xfrm>
-            <a:off x="10490887" y="3902185"/>
-            <a:ext cx="1024837" cy="360000"/>
-          </a:xfrm>
-          <a:prstGeom prst="roundRect">
-            <a:avLst>
-              <a:gd name="adj" fmla="val 6463"/>
-            </a:avLst>
-          </a:prstGeom>
-          <a:solidFill>
-            <a:schemeClr val="accent1">
-              <a:lumMod val="60000"/>
-              <a:lumOff val="40000"/>
-            </a:schemeClr>
-          </a:solidFill>
-          <a:ln>
+              </a:endParaRPr>
+            </a:p>
+            <a:p>
+              <a:r>
+                <a:rPr lang="fr-FR" sz="1100" dirty="0" err="1">
+                  <a:solidFill>
+                    <a:schemeClr val="bg2"/>
+                  </a:solidFill>
+                  <a:latin typeface="Arial" panose="020B0604020202020204" pitchFamily="34" charset="0"/>
+                  <a:cs typeface="Arial" panose="020B0604020202020204" pitchFamily="34" charset="0"/>
+                </a:rPr>
+                <a:t>Accurance</a:t>
+              </a:r>
+              <a:r>
+                <a:rPr lang="fr-FR" sz="1100" dirty="0">
+                  <a:solidFill>
+                    <a:schemeClr val="bg2"/>
+                  </a:solidFill>
+                  <a:latin typeface="Arial" panose="020B0604020202020204" pitchFamily="34" charset="0"/>
+                  <a:cs typeface="Arial" panose="020B0604020202020204" pitchFamily="34" charset="0"/>
+                </a:rPr>
+                <a:t>: 87% </a:t>
+              </a:r>
+            </a:p>
+          </p:txBody>
+        </p:sp>
+        <p:sp>
+          <p:nvSpPr>
+            <p:cNvPr id="145" name="ZoneTexte 144">
+              <a:extLst>
+                <a:ext uri="{FF2B5EF4-FFF2-40B4-BE49-F238E27FC236}">
+                  <a16:creationId xmlns:a16="http://schemas.microsoft.com/office/drawing/2014/main" id="{BF5B3604-AEC6-7ED5-2B5D-75A7067C0838}"/>
+                </a:ext>
+              </a:extLst>
+            </p:cNvPr>
+            <p:cNvSpPr txBox="1">
+              <a:spLocks/>
+            </p:cNvSpPr>
+            <p:nvPr/>
+          </p:nvSpPr>
+          <p:spPr>
+            <a:xfrm>
+              <a:off x="8520663" y="5796059"/>
+              <a:ext cx="1390855" cy="830997"/>
+            </a:xfrm>
+            <a:prstGeom prst="rect">
+              <a:avLst/>
+            </a:prstGeom>
             <a:noFill/>
-          </a:ln>
-        </p:spPr>
-        <p:style>
-          <a:lnRef idx="2">
-            <a:schemeClr val="accent1">
-              <a:shade val="50000"/>
-            </a:schemeClr>
-          </a:lnRef>
-          <a:fillRef idx="1">
-            <a:schemeClr val="accent1"/>
-          </a:fillRef>
-          <a:effectRef idx="0">
-            <a:schemeClr val="accent1"/>
-          </a:effectRef>
-          <a:fontRef idx="minor">
-            <a:schemeClr val="lt1"/>
-          </a:fontRef>
-        </p:style>
-        <p:txBody>
-          <a:bodyPr rtlCol="0" anchor="ctr"/>
-          <a:lstStyle/>
-          <a:p>
-            <a:pPr algn="ctr"/>
-            <a:r>
-              <a:rPr lang="fr-FR" sz="1100" b="1" dirty="0" err="1">
-                <a:latin typeface="Arial" panose="020B0604020202020204" pitchFamily="34" charset="0"/>
-                <a:cs typeface="Arial" panose="020B0604020202020204" pitchFamily="34" charset="0"/>
-              </a:rPr>
-              <a:t>See</a:t>
-            </a:r>
-            <a:r>
-              <a:rPr lang="fr-FR" sz="1100" b="1" dirty="0">
-                <a:latin typeface="Arial" panose="020B0604020202020204" pitchFamily="34" charset="0"/>
-                <a:cs typeface="Arial" panose="020B0604020202020204" pitchFamily="34" charset="0"/>
-              </a:rPr>
-              <a:t> images</a:t>
-            </a:r>
-            <a:endParaRPr lang="en-US" sz="1100" b="1" dirty="0">
-              <a:latin typeface="Arial" panose="020B0604020202020204" pitchFamily="34" charset="0"/>
-              <a:cs typeface="Arial" panose="020B0604020202020204" pitchFamily="34" charset="0"/>
-            </a:endParaRPr>
-          </a:p>
-        </p:txBody>
-      </p:sp>
+          </p:spPr>
+          <p:txBody>
+            <a:bodyPr wrap="square" rtlCol="0">
+              <a:spAutoFit/>
+            </a:bodyPr>
+            <a:lstStyle/>
+            <a:p>
+              <a:pPr algn="ctr"/>
+              <a:r>
+                <a:rPr lang="fr-FR" sz="1200" dirty="0">
+                  <a:solidFill>
+                    <a:schemeClr val="bg1"/>
+                  </a:solidFill>
+                  <a:latin typeface="Arial" panose="020B0604020202020204" pitchFamily="34" charset="0"/>
+                  <a:cs typeface="Arial" panose="020B0604020202020204" pitchFamily="34" charset="0"/>
+                </a:rPr>
+                <a:t>Description</a:t>
+              </a:r>
+            </a:p>
+            <a:p>
+              <a:pPr algn="ctr"/>
+              <a:r>
+                <a:rPr lang="fr-FR" sz="1200" dirty="0">
+                  <a:solidFill>
+                    <a:schemeClr val="bg1"/>
+                  </a:solidFill>
+                  <a:latin typeface="Arial" panose="020B0604020202020204" pitchFamily="34" charset="0"/>
+                  <a:cs typeface="Arial" panose="020B0604020202020204" pitchFamily="34" charset="0"/>
+                </a:rPr>
+                <a:t>……</a:t>
+              </a:r>
+            </a:p>
+            <a:p>
+              <a:pPr algn="ctr"/>
+              <a:r>
+                <a:rPr lang="fr-FR" sz="1200" dirty="0">
+                  <a:solidFill>
+                    <a:schemeClr val="bg1"/>
+                  </a:solidFill>
+                  <a:latin typeface="Arial" panose="020B0604020202020204" pitchFamily="34" charset="0"/>
+                  <a:cs typeface="Arial" panose="020B0604020202020204" pitchFamily="34" charset="0"/>
+                </a:rPr>
+                <a:t>….</a:t>
+              </a:r>
+            </a:p>
+            <a:p>
+              <a:pPr algn="ctr"/>
+              <a:r>
+                <a:rPr lang="fr-FR" sz="1200" dirty="0">
+                  <a:solidFill>
+                    <a:schemeClr val="bg1"/>
+                  </a:solidFill>
+                  <a:latin typeface="Arial" panose="020B0604020202020204" pitchFamily="34" charset="0"/>
+                  <a:cs typeface="Arial" panose="020B0604020202020204" pitchFamily="34" charset="0"/>
+                </a:rPr>
+                <a:t>………</a:t>
+              </a:r>
+            </a:p>
+          </p:txBody>
+        </p:sp>
+        <p:sp>
+          <p:nvSpPr>
+            <p:cNvPr id="146" name="ZoneTexte 145">
+              <a:extLst>
+                <a:ext uri="{FF2B5EF4-FFF2-40B4-BE49-F238E27FC236}">
+                  <a16:creationId xmlns:a16="http://schemas.microsoft.com/office/drawing/2014/main" id="{33FC395D-BA20-670E-1CA4-B7CA98D2F41C}"/>
+                </a:ext>
+              </a:extLst>
+            </p:cNvPr>
+            <p:cNvSpPr txBox="1">
+              <a:spLocks/>
+            </p:cNvSpPr>
+            <p:nvPr/>
+          </p:nvSpPr>
+          <p:spPr>
+            <a:xfrm>
+              <a:off x="10381433" y="5796059"/>
+              <a:ext cx="1390855" cy="830997"/>
+            </a:xfrm>
+            <a:prstGeom prst="rect">
+              <a:avLst/>
+            </a:prstGeom>
+            <a:noFill/>
+          </p:spPr>
+          <p:txBody>
+            <a:bodyPr wrap="square" rtlCol="0">
+              <a:spAutoFit/>
+            </a:bodyPr>
+            <a:lstStyle/>
+            <a:p>
+              <a:pPr algn="ctr"/>
+              <a:r>
+                <a:rPr lang="fr-FR" sz="1200" dirty="0">
+                  <a:solidFill>
+                    <a:schemeClr val="bg1"/>
+                  </a:solidFill>
+                  <a:latin typeface="Arial" panose="020B0604020202020204" pitchFamily="34" charset="0"/>
+                  <a:cs typeface="Arial" panose="020B0604020202020204" pitchFamily="34" charset="0"/>
+                </a:rPr>
+                <a:t>Description</a:t>
+              </a:r>
+            </a:p>
+            <a:p>
+              <a:pPr algn="ctr"/>
+              <a:r>
+                <a:rPr lang="fr-FR" sz="1200" dirty="0">
+                  <a:solidFill>
+                    <a:schemeClr val="bg1"/>
+                  </a:solidFill>
+                  <a:latin typeface="Arial" panose="020B0604020202020204" pitchFamily="34" charset="0"/>
+                  <a:cs typeface="Arial" panose="020B0604020202020204" pitchFamily="34" charset="0"/>
+                </a:rPr>
+                <a:t>……</a:t>
+              </a:r>
+            </a:p>
+            <a:p>
+              <a:pPr algn="ctr"/>
+              <a:r>
+                <a:rPr lang="fr-FR" sz="1200" dirty="0">
+                  <a:solidFill>
+                    <a:schemeClr val="bg1"/>
+                  </a:solidFill>
+                  <a:latin typeface="Arial" panose="020B0604020202020204" pitchFamily="34" charset="0"/>
+                  <a:cs typeface="Arial" panose="020B0604020202020204" pitchFamily="34" charset="0"/>
+                </a:rPr>
+                <a:t>….</a:t>
+              </a:r>
+            </a:p>
+            <a:p>
+              <a:pPr algn="ctr"/>
+              <a:r>
+                <a:rPr lang="fr-FR" sz="1200" dirty="0">
+                  <a:solidFill>
+                    <a:schemeClr val="bg1"/>
+                  </a:solidFill>
+                  <a:latin typeface="Arial" panose="020B0604020202020204" pitchFamily="34" charset="0"/>
+                  <a:cs typeface="Arial" panose="020B0604020202020204" pitchFamily="34" charset="0"/>
+                </a:rPr>
+                <a:t>………</a:t>
+              </a:r>
+            </a:p>
+          </p:txBody>
+        </p:sp>
+      </p:grpSp>
       <p:grpSp>
         <p:nvGrpSpPr>
           <p:cNvPr id="53" name="Groupe 52">
@@ -10102,10 +9936,10 @@
       </p:grpSp>
       <p:grpSp>
         <p:nvGrpSpPr>
-          <p:cNvPr id="9" name="Groupe 8">
+          <p:cNvPr id="11" name="Groupe 10">
             <a:extLst>
               <a:ext uri="{FF2B5EF4-FFF2-40B4-BE49-F238E27FC236}">
-                <a16:creationId xmlns:a16="http://schemas.microsoft.com/office/drawing/2014/main" id="{F174D3DC-3325-6F65-A628-F3A5764180A6}"/>
+                <a16:creationId xmlns:a16="http://schemas.microsoft.com/office/drawing/2014/main" id="{5F2357A1-2A4C-C478-FBD7-52DDB6122498}"/>
               </a:ext>
             </a:extLst>
           </p:cNvPr>
@@ -10114,18 +9948,72 @@
         </p:nvGrpSpPr>
         <p:grpSpPr>
           <a:xfrm>
-            <a:off x="6030809" y="3382960"/>
-            <a:ext cx="4253355" cy="743999"/>
-            <a:chOff x="6311642" y="3363840"/>
-            <a:chExt cx="4253355" cy="743999"/>
+            <a:off x="8520663" y="962472"/>
+            <a:ext cx="2592588" cy="2300949"/>
+            <a:chOff x="8269352" y="905357"/>
+            <a:chExt cx="2592588" cy="2300949"/>
           </a:xfrm>
         </p:grpSpPr>
+        <p:sp>
+          <p:nvSpPr>
+            <p:cNvPr id="84" name="ZoneTexte 83">
+              <a:extLst>
+                <a:ext uri="{FF2B5EF4-FFF2-40B4-BE49-F238E27FC236}">
+                  <a16:creationId xmlns:a16="http://schemas.microsoft.com/office/drawing/2014/main" id="{43173BA7-F16A-07E9-EFB0-B061087CA540}"/>
+                </a:ext>
+              </a:extLst>
+            </p:cNvPr>
+            <p:cNvSpPr txBox="1">
+              <a:spLocks/>
+            </p:cNvSpPr>
+            <p:nvPr/>
+          </p:nvSpPr>
+          <p:spPr>
+            <a:xfrm>
+              <a:off x="8284283" y="905357"/>
+              <a:ext cx="2577657" cy="276999"/>
+            </a:xfrm>
+            <a:prstGeom prst="rect">
+              <a:avLst/>
+            </a:prstGeom>
+            <a:noFill/>
+          </p:spPr>
+          <p:txBody>
+            <a:bodyPr wrap="square" rtlCol="0">
+              <a:spAutoFit/>
+            </a:bodyPr>
+            <a:lstStyle/>
+            <a:p>
+              <a:pPr algn="ctr"/>
+              <a:r>
+                <a:rPr lang="fr-FR" sz="1200" b="1" dirty="0" err="1">
+                  <a:solidFill>
+                    <a:schemeClr val="bg1"/>
+                  </a:solidFill>
+                  <a:latin typeface="Arial" panose="020B0604020202020204" pitchFamily="34" charset="0"/>
+                  <a:cs typeface="Arial" panose="020B0604020202020204" pitchFamily="34" charset="0"/>
+                </a:rPr>
+                <a:t>Add</a:t>
+              </a:r>
+              <a:r>
+                <a:rPr lang="fr-FR" sz="1200" b="1" dirty="0">
+                  <a:solidFill>
+                    <a:schemeClr val="bg1"/>
+                  </a:solidFill>
+                  <a:latin typeface="Arial" panose="020B0604020202020204" pitchFamily="34" charset="0"/>
+                  <a:cs typeface="Arial" panose="020B0604020202020204" pitchFamily="34" charset="0"/>
+                </a:rPr>
+                <a:t> images</a:t>
+              </a:r>
+            </a:p>
+          </p:txBody>
+        </p:sp>
         <p:grpSp>
           <p:nvGrpSpPr>
-            <p:cNvPr id="8" name="Groupe 7">
+            <p:cNvPr id="2" name="Groupe 1">
               <a:extLst>
                 <a:ext uri="{FF2B5EF4-FFF2-40B4-BE49-F238E27FC236}">
-                  <a16:creationId xmlns:a16="http://schemas.microsoft.com/office/drawing/2014/main" id="{36071E2A-D39C-311A-8E3A-4EF7A15176D9}"/>
+                  <a16:creationId xmlns:a16="http://schemas.microsoft.com/office/drawing/2014/main" id="{3B4A64E0-01DE-BF0E-53ED-D4A411F38AEF}"/>
                 </a:ext>
               </a:extLst>
             </p:cNvPr>
@@ -10134,18 +10022,18 @@
           </p:nvGrpSpPr>
           <p:grpSpPr>
             <a:xfrm>
-              <a:off x="6311642" y="3363840"/>
-              <a:ext cx="4253355" cy="743999"/>
-              <a:chOff x="6995426" y="3356583"/>
-              <a:chExt cx="4253355" cy="743999"/>
+              <a:off x="8269352" y="1382043"/>
+              <a:ext cx="2567184" cy="1824263"/>
+              <a:chOff x="8269352" y="1382043"/>
+              <a:chExt cx="2567184" cy="1824263"/>
             </a:xfrm>
           </p:grpSpPr>
           <p:grpSp>
             <p:nvGrpSpPr>
-              <p:cNvPr id="29" name="Groupe 28">
+              <p:cNvPr id="9" name="Groupe 8">
                 <a:extLst>
                   <a:ext uri="{FF2B5EF4-FFF2-40B4-BE49-F238E27FC236}">
-                    <a16:creationId xmlns:a16="http://schemas.microsoft.com/office/drawing/2014/main" id="{02DD8DAF-A47B-417C-3D7B-9C9B932C810C}"/>
+                    <a16:creationId xmlns:a16="http://schemas.microsoft.com/office/drawing/2014/main" id="{F174D3DC-3325-6F65-A628-F3A5764180A6}"/>
                   </a:ext>
                 </a:extLst>
               </p:cNvPr>
@@ -10154,18 +10042,18 @@
             </p:nvGrpSpPr>
             <p:grpSpPr>
               <a:xfrm>
-                <a:off x="6995426" y="3380582"/>
-                <a:ext cx="2538302" cy="720000"/>
-                <a:chOff x="6319726" y="3276871"/>
-                <a:chExt cx="2538302" cy="720000"/>
+                <a:off x="8269352" y="1382043"/>
+                <a:ext cx="2567184" cy="1824263"/>
+                <a:chOff x="6282760" y="3387839"/>
+                <a:chExt cx="2567184" cy="1824263"/>
               </a:xfrm>
             </p:grpSpPr>
             <p:grpSp>
               <p:nvGrpSpPr>
-                <p:cNvPr id="28" name="Groupe 27">
+                <p:cNvPr id="8" name="Groupe 7">
                   <a:extLst>
                     <a:ext uri="{FF2B5EF4-FFF2-40B4-BE49-F238E27FC236}">
-                      <a16:creationId xmlns:a16="http://schemas.microsoft.com/office/drawing/2014/main" id="{6FE0C56F-BDA8-82B4-9560-449008B9194B}"/>
+                      <a16:creationId xmlns:a16="http://schemas.microsoft.com/office/drawing/2014/main" id="{36071E2A-D39C-311A-8E3A-4EF7A15176D9}"/>
                     </a:ext>
                   </a:extLst>
                 </p:cNvPr>
@@ -10174,379 +10062,532 @@
               </p:nvGrpSpPr>
               <p:grpSpPr>
                 <a:xfrm>
-                  <a:off x="6319726" y="3276871"/>
-                  <a:ext cx="720000" cy="720000"/>
-                  <a:chOff x="4910696" y="3330587"/>
-                  <a:chExt cx="720000" cy="720000"/>
+                  <a:off x="6311642" y="3387839"/>
+                  <a:ext cx="2538302" cy="1824263"/>
+                  <a:chOff x="6995426" y="3380582"/>
+                  <a:chExt cx="2538302" cy="1824263"/>
                 </a:xfrm>
               </p:grpSpPr>
-              <p:sp>
-                <p:nvSpPr>
-                  <p:cNvPr id="86" name="Rectangle : coins arrondis 85">
+              <p:grpSp>
+                <p:nvGrpSpPr>
+                  <p:cNvPr id="29" name="Groupe 28">
                     <a:extLst>
                       <a:ext uri="{FF2B5EF4-FFF2-40B4-BE49-F238E27FC236}">
-                        <a16:creationId xmlns:a16="http://schemas.microsoft.com/office/drawing/2014/main" id="{2B0DD6F5-B01E-BD00-AB63-7E5B0DF051D8}"/>
+                        <a16:creationId xmlns:a16="http://schemas.microsoft.com/office/drawing/2014/main" id="{02DD8DAF-A47B-417C-3D7B-9C9B932C810C}"/>
                       </a:ext>
                     </a:extLst>
                   </p:cNvPr>
-                  <p:cNvSpPr/>
+                  <p:cNvGrpSpPr/>
                   <p:nvPr/>
-                </p:nvSpPr>
-                <p:spPr>
+                </p:nvGrpSpPr>
+                <p:grpSpPr>
                   <a:xfrm>
-                    <a:off x="4910696" y="3330587"/>
-                    <a:ext cx="720000" cy="720000"/>
+                    <a:off x="6995426" y="3380582"/>
+                    <a:ext cx="2538302" cy="720000"/>
+                    <a:chOff x="6319726" y="3276871"/>
+                    <a:chExt cx="2538302" cy="720000"/>
                   </a:xfrm>
-                  <a:prstGeom prst="roundRect">
-                    <a:avLst>
-                      <a:gd name="adj" fmla="val 6463"/>
-                    </a:avLst>
-                  </a:prstGeom>
-                  <a:solidFill>
-                    <a:srgbClr val="4696FD"/>
-                  </a:solidFill>
-                  <a:ln>
-                    <a:noFill/>
-                  </a:ln>
-                </p:spPr>
-                <p:style>
-                  <a:lnRef idx="2">
-                    <a:schemeClr val="accent1">
-                      <a:shade val="50000"/>
-                    </a:schemeClr>
-                  </a:lnRef>
-                  <a:fillRef idx="1">
-                    <a:schemeClr val="accent1"/>
-                  </a:fillRef>
-                  <a:effectRef idx="0">
-                    <a:schemeClr val="accent1"/>
-                  </a:effectRef>
-                  <a:fontRef idx="minor">
-                    <a:schemeClr val="lt1"/>
-                  </a:fontRef>
-                </p:style>
-                <p:txBody>
-                  <a:bodyPr rtlCol="0" anchor="ctr"/>
-                  <a:lstStyle/>
-                  <a:p>
-                    <a:pPr algn="ctr"/>
-                    <a:endParaRPr lang="en-US" sz="2000" dirty="0">
-                      <a:latin typeface="Arial" panose="020B0604020202020204" pitchFamily="34" charset="0"/>
-                      <a:cs typeface="Arial" panose="020B0604020202020204" pitchFamily="34" charset="0"/>
-                    </a:endParaRPr>
-                  </a:p>
-                </p:txBody>
-              </p:sp>
-              <p:pic>
-                <p:nvPicPr>
-                  <p:cNvPr id="27" name="Graphique 26" descr="Appareil photo avec un remplissage uni">
+                </p:grpSpPr>
+                <p:grpSp>
+                  <p:nvGrpSpPr>
+                    <p:cNvPr id="28" name="Groupe 27">
+                      <a:extLst>
+                        <a:ext uri="{FF2B5EF4-FFF2-40B4-BE49-F238E27FC236}">
+                          <a16:creationId xmlns:a16="http://schemas.microsoft.com/office/drawing/2014/main" id="{6FE0C56F-BDA8-82B4-9560-449008B9194B}"/>
+                        </a:ext>
+                      </a:extLst>
+                    </p:cNvPr>
+                    <p:cNvGrpSpPr/>
+                    <p:nvPr/>
+                  </p:nvGrpSpPr>
+                  <p:grpSpPr>
+                    <a:xfrm>
+                      <a:off x="6319726" y="3276871"/>
+                      <a:ext cx="720000" cy="720000"/>
+                      <a:chOff x="4910696" y="3330587"/>
+                      <a:chExt cx="720000" cy="720000"/>
+                    </a:xfrm>
+                  </p:grpSpPr>
+                  <p:sp>
+                    <p:nvSpPr>
+                      <p:cNvPr id="86" name="Rectangle : coins arrondis 85">
+                        <a:extLst>
+                          <a:ext uri="{FF2B5EF4-FFF2-40B4-BE49-F238E27FC236}">
+                            <a16:creationId xmlns:a16="http://schemas.microsoft.com/office/drawing/2014/main" id="{2B0DD6F5-B01E-BD00-AB63-7E5B0DF051D8}"/>
+                          </a:ext>
+                        </a:extLst>
+                      </p:cNvPr>
+                      <p:cNvSpPr/>
+                      <p:nvPr/>
+                    </p:nvSpPr>
+                    <p:spPr>
+                      <a:xfrm>
+                        <a:off x="4910696" y="3330587"/>
+                        <a:ext cx="720000" cy="720000"/>
+                      </a:xfrm>
+                      <a:prstGeom prst="roundRect">
+                        <a:avLst>
+                          <a:gd name="adj" fmla="val 6463"/>
+                        </a:avLst>
+                      </a:prstGeom>
+                      <a:solidFill>
+                        <a:srgbClr val="4696FD"/>
+                      </a:solidFill>
+                      <a:ln>
+                        <a:noFill/>
+                      </a:ln>
+                    </p:spPr>
+                    <p:style>
+                      <a:lnRef idx="2">
+                        <a:schemeClr val="accent1">
+                          <a:shade val="50000"/>
+                        </a:schemeClr>
+                      </a:lnRef>
+                      <a:fillRef idx="1">
+                        <a:schemeClr val="accent1"/>
+                      </a:fillRef>
+                      <a:effectRef idx="0">
+                        <a:schemeClr val="accent1"/>
+                      </a:effectRef>
+                      <a:fontRef idx="minor">
+                        <a:schemeClr val="lt1"/>
+                      </a:fontRef>
+                    </p:style>
+                    <p:txBody>
+                      <a:bodyPr rtlCol="0" anchor="ctr"/>
+                      <a:lstStyle/>
+                      <a:p>
+                        <a:pPr algn="ctr"/>
+                        <a:endParaRPr lang="en-US" sz="2000" dirty="0">
+                          <a:latin typeface="Arial" panose="020B0604020202020204" pitchFamily="34" charset="0"/>
+                          <a:cs typeface="Arial" panose="020B0604020202020204" pitchFamily="34" charset="0"/>
+                        </a:endParaRPr>
+                      </a:p>
+                    </p:txBody>
+                  </p:sp>
+                  <p:pic>
+                    <p:nvPicPr>
+                      <p:cNvPr id="27" name="Graphique 26" descr="Appareil photo avec un remplissage uni">
+                        <a:extLst>
+                          <a:ext uri="{FF2B5EF4-FFF2-40B4-BE49-F238E27FC236}">
+                            <a16:creationId xmlns:a16="http://schemas.microsoft.com/office/drawing/2014/main" id="{1ED5FBCA-1102-6228-387C-0BC49ABADCBE}"/>
+                          </a:ext>
+                        </a:extLst>
+                      </p:cNvPr>
+                      <p:cNvPicPr>
+                        <a:picLocks noChangeAspect="1"/>
+                      </p:cNvPicPr>
+                      <p:nvPr/>
+                    </p:nvPicPr>
+                    <p:blipFill>
+                      <a:blip r:embed="rId11">
+                        <a:extLst>
+                          <a:ext uri="{28A0092B-C50C-407E-A947-70E740481C1C}">
+                            <a14:useLocalDpi xmlns:a14="http://schemas.microsoft.com/office/drawing/2010/main" val="0"/>
+                          </a:ext>
+                          <a:ext uri="{96DAC541-7B7A-43D3-8B79-37D633B846F1}">
+                            <asvg:svgBlip xmlns:asvg="http://schemas.microsoft.com/office/drawing/2016/SVG/main" r:embed="rId12"/>
+                          </a:ext>
+                        </a:extLst>
+                      </a:blip>
+                      <a:srcRect/>
+                      <a:stretch/>
+                    </p:blipFill>
+                    <p:spPr>
+                      <a:xfrm>
+                        <a:off x="4995711" y="3400884"/>
+                        <a:ext cx="549970" cy="549970"/>
+                      </a:xfrm>
+                      <a:prstGeom prst="rect">
+                        <a:avLst/>
+                      </a:prstGeom>
+                    </p:spPr>
+                  </p:pic>
+                </p:grpSp>
+                <p:grpSp>
+                  <p:nvGrpSpPr>
+                    <p:cNvPr id="89" name="Groupe 88">
+                      <a:extLst>
+                        <a:ext uri="{FF2B5EF4-FFF2-40B4-BE49-F238E27FC236}">
+                          <a16:creationId xmlns:a16="http://schemas.microsoft.com/office/drawing/2014/main" id="{67FB2B5B-069E-C2FF-09EA-EE7F1EDED54A}"/>
+                        </a:ext>
+                      </a:extLst>
+                    </p:cNvPr>
+                    <p:cNvGrpSpPr/>
+                    <p:nvPr/>
+                  </p:nvGrpSpPr>
+                  <p:grpSpPr>
+                    <a:xfrm>
+                      <a:off x="7228877" y="3276871"/>
+                      <a:ext cx="720000" cy="720000"/>
+                      <a:chOff x="4910696" y="3330587"/>
+                      <a:chExt cx="720000" cy="720000"/>
+                    </a:xfrm>
+                  </p:grpSpPr>
+                  <p:sp>
+                    <p:nvSpPr>
+                      <p:cNvPr id="91" name="Rectangle : coins arrondis 90">
+                        <a:extLst>
+                          <a:ext uri="{FF2B5EF4-FFF2-40B4-BE49-F238E27FC236}">
+                            <a16:creationId xmlns:a16="http://schemas.microsoft.com/office/drawing/2014/main" id="{F87AA1C3-0BEF-E78C-1C56-94BCBF9F4D10}"/>
+                          </a:ext>
+                        </a:extLst>
+                      </p:cNvPr>
+                      <p:cNvSpPr/>
+                      <p:nvPr/>
+                    </p:nvSpPr>
+                    <p:spPr>
+                      <a:xfrm>
+                        <a:off x="4910696" y="3330587"/>
+                        <a:ext cx="720000" cy="720000"/>
+                      </a:xfrm>
+                      <a:prstGeom prst="roundRect">
+                        <a:avLst>
+                          <a:gd name="adj" fmla="val 6463"/>
+                        </a:avLst>
+                      </a:prstGeom>
+                      <a:solidFill>
+                        <a:srgbClr val="4696FD"/>
+                      </a:solidFill>
+                      <a:ln>
+                        <a:noFill/>
+                      </a:ln>
+                    </p:spPr>
+                    <p:style>
+                      <a:lnRef idx="2">
+                        <a:schemeClr val="accent1">
+                          <a:shade val="50000"/>
+                        </a:schemeClr>
+                      </a:lnRef>
+                      <a:fillRef idx="1">
+                        <a:schemeClr val="accent1"/>
+                      </a:fillRef>
+                      <a:effectRef idx="0">
+                        <a:schemeClr val="accent1"/>
+                      </a:effectRef>
+                      <a:fontRef idx="minor">
+                        <a:schemeClr val="lt1"/>
+                      </a:fontRef>
+                    </p:style>
+                    <p:txBody>
+                      <a:bodyPr rtlCol="0" anchor="ctr"/>
+                      <a:lstStyle/>
+                      <a:p>
+                        <a:pPr algn="ctr"/>
+                        <a:endParaRPr lang="en-US" sz="2000" dirty="0">
+                          <a:latin typeface="Arial" panose="020B0604020202020204" pitchFamily="34" charset="0"/>
+                          <a:cs typeface="Arial" panose="020B0604020202020204" pitchFamily="34" charset="0"/>
+                        </a:endParaRPr>
+                      </a:p>
+                    </p:txBody>
+                  </p:sp>
+                  <p:pic>
+                    <p:nvPicPr>
+                      <p:cNvPr id="92" name="Graphique 91">
+                        <a:extLst>
+                          <a:ext uri="{FF2B5EF4-FFF2-40B4-BE49-F238E27FC236}">
+                            <a16:creationId xmlns:a16="http://schemas.microsoft.com/office/drawing/2014/main" id="{AE52E32C-8969-E998-7D33-494DA8C1AC30}"/>
+                          </a:ext>
+                        </a:extLst>
+                      </p:cNvPr>
+                      <p:cNvPicPr>
+                        <a:picLocks noChangeAspect="1"/>
+                      </p:cNvPicPr>
+                      <p:nvPr/>
+                    </p:nvPicPr>
+                    <p:blipFill>
+                      <a:blip r:embed="rId13">
+                        <a:extLst>
+                          <a:ext uri="{BEBA8EAE-BF5A-486C-A8C5-ECC9F3942E4B}">
+                            <a14:imgProps xmlns:a14="http://schemas.microsoft.com/office/drawing/2010/main">
+                              <a14:imgLayer r:embed="rId14">
+                                <a14:imgEffect>
+                                  <a14:brightnessContrast bright="100000" contrast="100000"/>
+                                </a14:imgEffect>
+                              </a14:imgLayer>
+                            </a14:imgProps>
+                          </a:ext>
+                          <a:ext uri="{28A0092B-C50C-407E-A947-70E740481C1C}">
+                            <a14:useLocalDpi xmlns:a14="http://schemas.microsoft.com/office/drawing/2010/main" val="0"/>
+                          </a:ext>
+                        </a:extLst>
+                      </a:blip>
+                      <a:srcRect/>
+                      <a:stretch/>
+                    </p:blipFill>
+                    <p:spPr>
+                      <a:xfrm>
+                        <a:off x="4995711" y="3400884"/>
+                        <a:ext cx="549970" cy="549970"/>
+                      </a:xfrm>
+                      <a:prstGeom prst="rect">
+                        <a:avLst/>
+                      </a:prstGeom>
+                    </p:spPr>
+                  </p:pic>
+                </p:grpSp>
+                <p:grpSp>
+                  <p:nvGrpSpPr>
+                    <p:cNvPr id="93" name="Groupe 92">
+                      <a:extLst>
+                        <a:ext uri="{FF2B5EF4-FFF2-40B4-BE49-F238E27FC236}">
+                          <a16:creationId xmlns:a16="http://schemas.microsoft.com/office/drawing/2014/main" id="{6148D2E6-CA3D-E469-2AE3-73D3914F9BBF}"/>
+                        </a:ext>
+                      </a:extLst>
+                    </p:cNvPr>
+                    <p:cNvGrpSpPr/>
+                    <p:nvPr/>
+                  </p:nvGrpSpPr>
+                  <p:grpSpPr>
+                    <a:xfrm>
+                      <a:off x="8138028" y="3276871"/>
+                      <a:ext cx="720000" cy="720000"/>
+                      <a:chOff x="4910696" y="3330587"/>
+                      <a:chExt cx="720000" cy="720000"/>
+                    </a:xfrm>
+                  </p:grpSpPr>
+                  <p:sp>
+                    <p:nvSpPr>
+                      <p:cNvPr id="94" name="Rectangle : coins arrondis 93">
+                        <a:extLst>
+                          <a:ext uri="{FF2B5EF4-FFF2-40B4-BE49-F238E27FC236}">
+                            <a16:creationId xmlns:a16="http://schemas.microsoft.com/office/drawing/2014/main" id="{F5BDA983-DEE4-AAD5-4AAC-3B047F3F56C9}"/>
+                          </a:ext>
+                        </a:extLst>
+                      </p:cNvPr>
+                      <p:cNvSpPr/>
+                      <p:nvPr/>
+                    </p:nvSpPr>
+                    <p:spPr>
+                      <a:xfrm>
+                        <a:off x="4910696" y="3330587"/>
+                        <a:ext cx="720000" cy="720000"/>
+                      </a:xfrm>
+                      <a:prstGeom prst="roundRect">
+                        <a:avLst>
+                          <a:gd name="adj" fmla="val 6463"/>
+                        </a:avLst>
+                      </a:prstGeom>
+                      <a:solidFill>
+                        <a:srgbClr val="4696FD"/>
+                      </a:solidFill>
+                      <a:ln>
+                        <a:noFill/>
+                      </a:ln>
+                    </p:spPr>
+                    <p:style>
+                      <a:lnRef idx="2">
+                        <a:schemeClr val="accent1">
+                          <a:shade val="50000"/>
+                        </a:schemeClr>
+                      </a:lnRef>
+                      <a:fillRef idx="1">
+                        <a:schemeClr val="accent1"/>
+                      </a:fillRef>
+                      <a:effectRef idx="0">
+                        <a:schemeClr val="accent1"/>
+                      </a:effectRef>
+                      <a:fontRef idx="minor">
+                        <a:schemeClr val="lt1"/>
+                      </a:fontRef>
+                    </p:style>
+                    <p:txBody>
+                      <a:bodyPr rtlCol="0" anchor="ctr"/>
+                      <a:lstStyle/>
+                      <a:p>
+                        <a:pPr algn="ctr"/>
+                        <a:endParaRPr lang="en-US" sz="2000" dirty="0">
+                          <a:latin typeface="Arial" panose="020B0604020202020204" pitchFamily="34" charset="0"/>
+                          <a:cs typeface="Arial" panose="020B0604020202020204" pitchFamily="34" charset="0"/>
+                        </a:endParaRPr>
+                      </a:p>
+                    </p:txBody>
+                  </p:sp>
+                  <p:pic>
+                    <p:nvPicPr>
+                      <p:cNvPr id="95" name="Graphique 94">
+                        <a:extLst>
+                          <a:ext uri="{FF2B5EF4-FFF2-40B4-BE49-F238E27FC236}">
+                            <a16:creationId xmlns:a16="http://schemas.microsoft.com/office/drawing/2014/main" id="{BFC4D4E3-2418-6DF7-422A-5AAB62EFAE1B}"/>
+                          </a:ext>
+                        </a:extLst>
+                      </p:cNvPr>
+                      <p:cNvPicPr>
+                        <a:picLocks noChangeAspect="1"/>
+                      </p:cNvPicPr>
+                      <p:nvPr/>
+                    </p:nvPicPr>
+                    <p:blipFill>
+                      <a:blip r:embed="rId15">
+                        <a:extLst>
+                          <a:ext uri="{BEBA8EAE-BF5A-486C-A8C5-ECC9F3942E4B}">
+                            <a14:imgProps xmlns:a14="http://schemas.microsoft.com/office/drawing/2010/main">
+                              <a14:imgLayer r:embed="rId16">
+                                <a14:imgEffect>
+                                  <a14:brightnessContrast bright="100000" contrast="100000"/>
+                                </a14:imgEffect>
+                              </a14:imgLayer>
+                            </a14:imgProps>
+                          </a:ext>
+                          <a:ext uri="{28A0092B-C50C-407E-A947-70E740481C1C}">
+                            <a14:useLocalDpi xmlns:a14="http://schemas.microsoft.com/office/drawing/2010/main" val="0"/>
+                          </a:ext>
+                        </a:extLst>
+                      </a:blip>
+                      <a:srcRect/>
+                      <a:stretch/>
+                    </p:blipFill>
+                    <p:spPr>
+                      <a:xfrm>
+                        <a:off x="5054075" y="3400884"/>
+                        <a:ext cx="433241" cy="549970"/>
+                      </a:xfrm>
+                      <a:prstGeom prst="rect">
+                        <a:avLst/>
+                      </a:prstGeom>
+                    </p:spPr>
+                  </p:pic>
+                </p:grpSp>
+              </p:grpSp>
+              <p:grpSp>
+                <p:nvGrpSpPr>
+                  <p:cNvPr id="7" name="Groupe 6">
                     <a:extLst>
                       <a:ext uri="{FF2B5EF4-FFF2-40B4-BE49-F238E27FC236}">
-                        <a16:creationId xmlns:a16="http://schemas.microsoft.com/office/drawing/2014/main" id="{1ED5FBCA-1102-6228-387C-0BC49ABADCBE}"/>
+                        <a16:creationId xmlns:a16="http://schemas.microsoft.com/office/drawing/2014/main" id="{60C98813-DE64-ACDC-73E1-005D44A19B2F}"/>
                       </a:ext>
                     </a:extLst>
                   </p:cNvPr>
-                  <p:cNvPicPr>
-                    <a:picLocks noChangeAspect="1"/>
-                  </p:cNvPicPr>
+                  <p:cNvGrpSpPr/>
                   <p:nvPr/>
-                </p:nvPicPr>
-                <p:blipFill>
-                  <a:blip r:embed="rId12">
-                    <a:extLst>
-                      <a:ext uri="{28A0092B-C50C-407E-A947-70E740481C1C}">
-                        <a14:useLocalDpi xmlns:a14="http://schemas.microsoft.com/office/drawing/2010/main" val="0"/>
-                      </a:ext>
-                      <a:ext uri="{96DAC541-7B7A-43D3-8B79-37D633B846F1}">
-                        <asvg:svgBlip xmlns:asvg="http://schemas.microsoft.com/office/drawing/2016/SVG/main" r:embed="rId13"/>
-                      </a:ext>
-                    </a:extLst>
-                  </a:blip>
-                  <a:srcRect/>
-                  <a:stretch/>
-                </p:blipFill>
-                <p:spPr>
+                </p:nvGrpSpPr>
+                <p:grpSpPr>
                   <a:xfrm>
-                    <a:off x="4995711" y="3400884"/>
-                    <a:ext cx="549970" cy="549970"/>
+                    <a:off x="7916315" y="4484845"/>
+                    <a:ext cx="720000" cy="720000"/>
+                    <a:chOff x="7916315" y="4484845"/>
+                    <a:chExt cx="720000" cy="720000"/>
                   </a:xfrm>
-                  <a:prstGeom prst="rect">
-                    <a:avLst/>
-                  </a:prstGeom>
-                </p:spPr>
-              </p:pic>
+                </p:grpSpPr>
+                <p:sp>
+                  <p:nvSpPr>
+                    <p:cNvPr id="56" name="Rectangle : coins arrondis 55">
+                      <a:extLst>
+                        <a:ext uri="{FF2B5EF4-FFF2-40B4-BE49-F238E27FC236}">
+                          <a16:creationId xmlns:a16="http://schemas.microsoft.com/office/drawing/2014/main" id="{04B51DF9-38E9-4F78-107A-903CABF24127}"/>
+                        </a:ext>
+                      </a:extLst>
+                    </p:cNvPr>
+                    <p:cNvSpPr/>
+                    <p:nvPr/>
+                  </p:nvSpPr>
+                  <p:spPr>
+                    <a:xfrm>
+                      <a:off x="7916315" y="4484845"/>
+                      <a:ext cx="720000" cy="720000"/>
+                    </a:xfrm>
+                    <a:prstGeom prst="roundRect">
+                      <a:avLst>
+                        <a:gd name="adj" fmla="val 6463"/>
+                      </a:avLst>
+                    </a:prstGeom>
+                    <a:solidFill>
+                      <a:srgbClr val="4696FD"/>
+                    </a:solidFill>
+                    <a:ln>
+                      <a:noFill/>
+                    </a:ln>
+                  </p:spPr>
+                  <p:style>
+                    <a:lnRef idx="2">
+                      <a:schemeClr val="accent1">
+                        <a:shade val="50000"/>
+                      </a:schemeClr>
+                    </a:lnRef>
+                    <a:fillRef idx="1">
+                      <a:schemeClr val="accent1"/>
+                    </a:fillRef>
+                    <a:effectRef idx="0">
+                      <a:schemeClr val="accent1"/>
+                    </a:effectRef>
+                    <a:fontRef idx="minor">
+                      <a:schemeClr val="lt1"/>
+                    </a:fontRef>
+                  </p:style>
+                  <p:txBody>
+                    <a:bodyPr rtlCol="0" anchor="ctr"/>
+                    <a:lstStyle/>
+                    <a:p>
+                      <a:pPr algn="ctr"/>
+                      <a:endParaRPr lang="en-US" sz="2000" dirty="0">
+                        <a:latin typeface="Arial" panose="020B0604020202020204" pitchFamily="34" charset="0"/>
+                        <a:cs typeface="Arial" panose="020B0604020202020204" pitchFamily="34" charset="0"/>
+                      </a:endParaRPr>
+                    </a:p>
+                  </p:txBody>
+                </p:sp>
+                <p:sp>
+                  <p:nvSpPr>
+                    <p:cNvPr id="3" name="Croix 2">
+                      <a:extLst>
+                        <a:ext uri="{FF2B5EF4-FFF2-40B4-BE49-F238E27FC236}">
+                          <a16:creationId xmlns:a16="http://schemas.microsoft.com/office/drawing/2014/main" id="{86402263-30DA-33EE-7930-A7644D550E53}"/>
+                        </a:ext>
+                      </a:extLst>
+                    </p:cNvPr>
+                    <p:cNvSpPr/>
+                    <p:nvPr/>
+                  </p:nvSpPr>
+                  <p:spPr>
+                    <a:xfrm>
+                      <a:off x="8073984" y="4621611"/>
+                      <a:ext cx="434165" cy="434165"/>
+                    </a:xfrm>
+                    <a:prstGeom prst="plus">
+                      <a:avLst>
+                        <a:gd name="adj" fmla="val 46527"/>
+                      </a:avLst>
+                    </a:prstGeom>
+                    <a:solidFill>
+                      <a:schemeClr val="tx1"/>
+                    </a:solidFill>
+                    <a:ln>
+                      <a:noFill/>
+                    </a:ln>
+                  </p:spPr>
+                  <p:style>
+                    <a:lnRef idx="2">
+                      <a:schemeClr val="accent1">
+                        <a:shade val="50000"/>
+                      </a:schemeClr>
+                    </a:lnRef>
+                    <a:fillRef idx="1">
+                      <a:schemeClr val="accent1"/>
+                    </a:fillRef>
+                    <a:effectRef idx="0">
+                      <a:schemeClr val="accent1"/>
+                    </a:effectRef>
+                    <a:fontRef idx="minor">
+                      <a:schemeClr val="lt1"/>
+                    </a:fontRef>
+                  </p:style>
+                  <p:txBody>
+                    <a:bodyPr rtlCol="0" anchor="ctr"/>
+                    <a:lstStyle/>
+                    <a:p>
+                      <a:pPr algn="ctr"/>
+                      <a:endParaRPr lang="en-US"/>
+                    </a:p>
+                  </p:txBody>
+                </p:sp>
+              </p:grpSp>
             </p:grpSp>
-            <p:grpSp>
-              <p:nvGrpSpPr>
-                <p:cNvPr id="89" name="Groupe 88">
+            <p:sp>
+              <p:nvSpPr>
+                <p:cNvPr id="60" name="Rectangle : coins arrondis 59">
                   <a:extLst>
                     <a:ext uri="{FF2B5EF4-FFF2-40B4-BE49-F238E27FC236}">
-                      <a16:creationId xmlns:a16="http://schemas.microsoft.com/office/drawing/2014/main" id="{67FB2B5B-069E-C2FF-09EA-EE7F1EDED54A}"/>
-                    </a:ext>
-                  </a:extLst>
-                </p:cNvPr>
-                <p:cNvGrpSpPr/>
-                <p:nvPr/>
-              </p:nvGrpSpPr>
-              <p:grpSpPr>
-                <a:xfrm>
-                  <a:off x="7228877" y="3276871"/>
-                  <a:ext cx="720000" cy="720000"/>
-                  <a:chOff x="4910696" y="3330587"/>
-                  <a:chExt cx="720000" cy="720000"/>
-                </a:xfrm>
-              </p:grpSpPr>
-              <p:sp>
-                <p:nvSpPr>
-                  <p:cNvPr id="91" name="Rectangle : coins arrondis 90">
-                    <a:extLst>
-                      <a:ext uri="{FF2B5EF4-FFF2-40B4-BE49-F238E27FC236}">
-                        <a16:creationId xmlns:a16="http://schemas.microsoft.com/office/drawing/2014/main" id="{F87AA1C3-0BEF-E78C-1C56-94BCBF9F4D10}"/>
-                      </a:ext>
-                    </a:extLst>
-                  </p:cNvPr>
-                  <p:cNvSpPr/>
-                  <p:nvPr/>
-                </p:nvSpPr>
-                <p:spPr>
-                  <a:xfrm>
-                    <a:off x="4910696" y="3330587"/>
-                    <a:ext cx="720000" cy="720000"/>
-                  </a:xfrm>
-                  <a:prstGeom prst="roundRect">
-                    <a:avLst>
-                      <a:gd name="adj" fmla="val 6463"/>
-                    </a:avLst>
-                  </a:prstGeom>
-                  <a:solidFill>
-                    <a:srgbClr val="4696FD"/>
-                  </a:solidFill>
-                  <a:ln>
-                    <a:noFill/>
-                  </a:ln>
-                </p:spPr>
-                <p:style>
-                  <a:lnRef idx="2">
-                    <a:schemeClr val="accent1">
-                      <a:shade val="50000"/>
-                    </a:schemeClr>
-                  </a:lnRef>
-                  <a:fillRef idx="1">
-                    <a:schemeClr val="accent1"/>
-                  </a:fillRef>
-                  <a:effectRef idx="0">
-                    <a:schemeClr val="accent1"/>
-                  </a:effectRef>
-                  <a:fontRef idx="minor">
-                    <a:schemeClr val="lt1"/>
-                  </a:fontRef>
-                </p:style>
-                <p:txBody>
-                  <a:bodyPr rtlCol="0" anchor="ctr"/>
-                  <a:lstStyle/>
-                  <a:p>
-                    <a:pPr algn="ctr"/>
-                    <a:endParaRPr lang="en-US" sz="2000" dirty="0">
-                      <a:latin typeface="Arial" panose="020B0604020202020204" pitchFamily="34" charset="0"/>
-                      <a:cs typeface="Arial" panose="020B0604020202020204" pitchFamily="34" charset="0"/>
-                    </a:endParaRPr>
-                  </a:p>
-                </p:txBody>
-              </p:sp>
-              <p:pic>
-                <p:nvPicPr>
-                  <p:cNvPr id="92" name="Graphique 91">
-                    <a:extLst>
-                      <a:ext uri="{FF2B5EF4-FFF2-40B4-BE49-F238E27FC236}">
-                        <a16:creationId xmlns:a16="http://schemas.microsoft.com/office/drawing/2014/main" id="{AE52E32C-8969-E998-7D33-494DA8C1AC30}"/>
-                      </a:ext>
-                    </a:extLst>
-                  </p:cNvPr>
-                  <p:cNvPicPr>
-                    <a:picLocks noChangeAspect="1"/>
-                  </p:cNvPicPr>
-                  <p:nvPr/>
-                </p:nvPicPr>
-                <p:blipFill>
-                  <a:blip r:embed="rId14">
-                    <a:extLst>
-                      <a:ext uri="{BEBA8EAE-BF5A-486C-A8C5-ECC9F3942E4B}">
-                        <a14:imgProps xmlns:a14="http://schemas.microsoft.com/office/drawing/2010/main">
-                          <a14:imgLayer r:embed="rId15">
-                            <a14:imgEffect>
-                              <a14:brightnessContrast bright="100000" contrast="100000"/>
-                            </a14:imgEffect>
-                          </a14:imgLayer>
-                        </a14:imgProps>
-                      </a:ext>
-                      <a:ext uri="{28A0092B-C50C-407E-A947-70E740481C1C}">
-                        <a14:useLocalDpi xmlns:a14="http://schemas.microsoft.com/office/drawing/2010/main" val="0"/>
-                      </a:ext>
-                    </a:extLst>
-                  </a:blip>
-                  <a:srcRect/>
-                  <a:stretch/>
-                </p:blipFill>
-                <p:spPr>
-                  <a:xfrm>
-                    <a:off x="4995711" y="3400884"/>
-                    <a:ext cx="549970" cy="549970"/>
-                  </a:xfrm>
-                  <a:prstGeom prst="rect">
-                    <a:avLst/>
-                  </a:prstGeom>
-                </p:spPr>
-              </p:pic>
-            </p:grpSp>
-            <p:grpSp>
-              <p:nvGrpSpPr>
-                <p:cNvPr id="93" name="Groupe 92">
-                  <a:extLst>
-                    <a:ext uri="{FF2B5EF4-FFF2-40B4-BE49-F238E27FC236}">
-                      <a16:creationId xmlns:a16="http://schemas.microsoft.com/office/drawing/2014/main" id="{6148D2E6-CA3D-E469-2AE3-73D3914F9BBF}"/>
-                    </a:ext>
-                  </a:extLst>
-                </p:cNvPr>
-                <p:cNvGrpSpPr/>
-                <p:nvPr/>
-              </p:nvGrpSpPr>
-              <p:grpSpPr>
-                <a:xfrm>
-                  <a:off x="8138028" y="3276871"/>
-                  <a:ext cx="720000" cy="720000"/>
-                  <a:chOff x="4910696" y="3330587"/>
-                  <a:chExt cx="720000" cy="720000"/>
-                </a:xfrm>
-              </p:grpSpPr>
-              <p:sp>
-                <p:nvSpPr>
-                  <p:cNvPr id="94" name="Rectangle : coins arrondis 93">
-                    <a:extLst>
-                      <a:ext uri="{FF2B5EF4-FFF2-40B4-BE49-F238E27FC236}">
-                        <a16:creationId xmlns:a16="http://schemas.microsoft.com/office/drawing/2014/main" id="{F5BDA983-DEE4-AAD5-4AAC-3B047F3F56C9}"/>
-                      </a:ext>
-                    </a:extLst>
-                  </p:cNvPr>
-                  <p:cNvSpPr/>
-                  <p:nvPr/>
-                </p:nvSpPr>
-                <p:spPr>
-                  <a:xfrm>
-                    <a:off x="4910696" y="3330587"/>
-                    <a:ext cx="720000" cy="720000"/>
-                  </a:xfrm>
-                  <a:prstGeom prst="roundRect">
-                    <a:avLst>
-                      <a:gd name="adj" fmla="val 6463"/>
-                    </a:avLst>
-                  </a:prstGeom>
-                  <a:solidFill>
-                    <a:srgbClr val="4696FD"/>
-                  </a:solidFill>
-                  <a:ln>
-                    <a:noFill/>
-                  </a:ln>
-                </p:spPr>
-                <p:style>
-                  <a:lnRef idx="2">
-                    <a:schemeClr val="accent1">
-                      <a:shade val="50000"/>
-                    </a:schemeClr>
-                  </a:lnRef>
-                  <a:fillRef idx="1">
-                    <a:schemeClr val="accent1"/>
-                  </a:fillRef>
-                  <a:effectRef idx="0">
-                    <a:schemeClr val="accent1"/>
-                  </a:effectRef>
-                  <a:fontRef idx="minor">
-                    <a:schemeClr val="lt1"/>
-                  </a:fontRef>
-                </p:style>
-                <p:txBody>
-                  <a:bodyPr rtlCol="0" anchor="ctr"/>
-                  <a:lstStyle/>
-                  <a:p>
-                    <a:pPr algn="ctr"/>
-                    <a:endParaRPr lang="en-US" sz="2000" dirty="0">
-                      <a:latin typeface="Arial" panose="020B0604020202020204" pitchFamily="34" charset="0"/>
-                      <a:cs typeface="Arial" panose="020B0604020202020204" pitchFamily="34" charset="0"/>
-                    </a:endParaRPr>
-                  </a:p>
-                </p:txBody>
-              </p:sp>
-              <p:pic>
-                <p:nvPicPr>
-                  <p:cNvPr id="95" name="Graphique 94">
-                    <a:extLst>
-                      <a:ext uri="{FF2B5EF4-FFF2-40B4-BE49-F238E27FC236}">
-                        <a16:creationId xmlns:a16="http://schemas.microsoft.com/office/drawing/2014/main" id="{BFC4D4E3-2418-6DF7-422A-5AAB62EFAE1B}"/>
-                      </a:ext>
-                    </a:extLst>
-                  </p:cNvPr>
-                  <p:cNvPicPr>
-                    <a:picLocks noChangeAspect="1"/>
-                  </p:cNvPicPr>
-                  <p:nvPr/>
-                </p:nvPicPr>
-                <p:blipFill>
-                  <a:blip r:embed="rId16">
-                    <a:extLst>
-                      <a:ext uri="{BEBA8EAE-BF5A-486C-A8C5-ECC9F3942E4B}">
-                        <a14:imgProps xmlns:a14="http://schemas.microsoft.com/office/drawing/2010/main">
-                          <a14:imgLayer r:embed="rId17">
-                            <a14:imgEffect>
-                              <a14:brightnessContrast bright="100000" contrast="100000"/>
-                            </a14:imgEffect>
-                          </a14:imgLayer>
-                        </a14:imgProps>
-                      </a:ext>
-                      <a:ext uri="{28A0092B-C50C-407E-A947-70E740481C1C}">
-                        <a14:useLocalDpi xmlns:a14="http://schemas.microsoft.com/office/drawing/2010/main" val="0"/>
-                      </a:ext>
-                    </a:extLst>
-                  </a:blip>
-                  <a:srcRect/>
-                  <a:stretch/>
-                </p:blipFill>
-                <p:spPr>
-                  <a:xfrm>
-                    <a:off x="5054075" y="3400884"/>
-                    <a:ext cx="433241" cy="549970"/>
-                  </a:xfrm>
-                  <a:prstGeom prst="rect">
-                    <a:avLst/>
-                  </a:prstGeom>
-                </p:spPr>
-              </p:pic>
-            </p:grpSp>
-          </p:grpSp>
-          <p:grpSp>
-            <p:nvGrpSpPr>
-              <p:cNvPr id="7" name="Groupe 6">
-                <a:extLst>
-                  <a:ext uri="{FF2B5EF4-FFF2-40B4-BE49-F238E27FC236}">
-                    <a16:creationId xmlns:a16="http://schemas.microsoft.com/office/drawing/2014/main" id="{60C98813-DE64-ACDC-73E1-005D44A19B2F}"/>
-                  </a:ext>
-                </a:extLst>
-              </p:cNvPr>
-              <p:cNvGrpSpPr/>
-              <p:nvPr/>
-            </p:nvGrpSpPr>
-            <p:grpSpPr>
-              <a:xfrm>
-                <a:off x="10528781" y="3356583"/>
-                <a:ext cx="720000" cy="720000"/>
-                <a:chOff x="10528781" y="3356583"/>
-                <a:chExt cx="720000" cy="720000"/>
-              </a:xfrm>
-            </p:grpSpPr>
-            <p:sp>
-              <p:nvSpPr>
-                <p:cNvPr id="56" name="Rectangle : coins arrondis 55">
-                  <a:extLst>
-                    <a:ext uri="{FF2B5EF4-FFF2-40B4-BE49-F238E27FC236}">
-                      <a16:creationId xmlns:a16="http://schemas.microsoft.com/office/drawing/2014/main" id="{04B51DF9-38E9-4F78-107A-903CABF24127}"/>
+                      <a16:creationId xmlns:a16="http://schemas.microsoft.com/office/drawing/2014/main" id="{8F56EFC7-72DC-C628-938B-9C80B8683602}"/>
                     </a:ext>
                   </a:extLst>
                 </p:cNvPr>
@@ -10555,7 +10596,7 @@
               </p:nvSpPr>
               <p:spPr>
                 <a:xfrm>
-                  <a:off x="10528781" y="3356583"/>
+                  <a:off x="6282760" y="4466032"/>
                   <a:ext cx="720000" cy="720000"/>
                 </a:xfrm>
                 <a:prstGeom prst="roundRect">
@@ -10591,266 +10632,201 @@
                 <a:lstStyle/>
                 <a:p>
                   <a:pPr algn="ctr"/>
-                  <a:endParaRPr lang="en-US" sz="2000" dirty="0">
+                  <a:r>
+                    <a:rPr lang="fr-FR" sz="1600" dirty="0" err="1">
+                      <a:latin typeface="Arial" panose="020B0604020202020204" pitchFamily="34" charset="0"/>
+                      <a:cs typeface="Arial" panose="020B0604020202020204" pitchFamily="34" charset="0"/>
+                    </a:rPr>
+                    <a:t>Other</a:t>
+                  </a:r>
+                  <a:endParaRPr lang="en-US" sz="1600" dirty="0">
                     <a:latin typeface="Arial" panose="020B0604020202020204" pitchFamily="34" charset="0"/>
                     <a:cs typeface="Arial" panose="020B0604020202020204" pitchFamily="34" charset="0"/>
                   </a:endParaRPr>
                 </a:p>
               </p:txBody>
             </p:sp>
-            <p:sp>
-              <p:nvSpPr>
-                <p:cNvPr id="3" name="Croix 2">
-                  <a:extLst>
-                    <a:ext uri="{FF2B5EF4-FFF2-40B4-BE49-F238E27FC236}">
-                      <a16:creationId xmlns:a16="http://schemas.microsoft.com/office/drawing/2014/main" id="{86402263-30DA-33EE-7930-A7644D550E53}"/>
-                    </a:ext>
-                  </a:extLst>
-                </p:cNvPr>
-                <p:cNvSpPr/>
-                <p:nvPr/>
-              </p:nvSpPr>
-              <p:spPr>
-                <a:xfrm>
-                  <a:off x="10686450" y="3493349"/>
-                  <a:ext cx="434165" cy="434165"/>
-                </a:xfrm>
-                <a:prstGeom prst="plus">
-                  <a:avLst>
-                    <a:gd name="adj" fmla="val 46527"/>
-                  </a:avLst>
-                </a:prstGeom>
-                <a:solidFill>
-                  <a:schemeClr val="tx1"/>
-                </a:solidFill>
-                <a:ln>
-                  <a:noFill/>
-                </a:ln>
-              </p:spPr>
-              <p:style>
-                <a:lnRef idx="2">
-                  <a:schemeClr val="accent1">
-                    <a:shade val="50000"/>
-                  </a:schemeClr>
-                </a:lnRef>
-                <a:fillRef idx="1">
-                  <a:schemeClr val="accent1"/>
-                </a:fillRef>
-                <a:effectRef idx="0">
-                  <a:schemeClr val="accent1"/>
-                </a:effectRef>
-                <a:fontRef idx="minor">
-                  <a:schemeClr val="lt1"/>
-                </a:fontRef>
-              </p:style>
-              <p:txBody>
-                <a:bodyPr rtlCol="0" anchor="ctr"/>
-                <a:lstStyle/>
-                <a:p>
-                  <a:pPr algn="ctr"/>
-                  <a:endParaRPr lang="en-US"/>
-                </a:p>
-              </p:txBody>
-            </p:sp>
           </p:grpSp>
+          <p:sp>
+            <p:nvSpPr>
+              <p:cNvPr id="62" name="ZoneTexte 61">
+                <a:extLst>
+                  <a:ext uri="{FF2B5EF4-FFF2-40B4-BE49-F238E27FC236}">
+                    <a16:creationId xmlns:a16="http://schemas.microsoft.com/office/drawing/2014/main" id="{6E3261F9-7064-27EC-8A34-5078D2AAFF84}"/>
+                  </a:ext>
+                </a:extLst>
+              </p:cNvPr>
+              <p:cNvSpPr txBox="1">
+                <a:spLocks/>
+              </p:cNvSpPr>
+              <p:nvPr/>
+            </p:nvSpPr>
+            <p:spPr>
+              <a:xfrm>
+                <a:off x="8477387" y="2056479"/>
+                <a:ext cx="383648" cy="246221"/>
+              </a:xfrm>
+              <a:prstGeom prst="rect">
+                <a:avLst/>
+              </a:prstGeom>
+              <a:noFill/>
+            </p:spPr>
+            <p:txBody>
+              <a:bodyPr wrap="square" rtlCol="0">
+                <a:spAutoFit/>
+              </a:bodyPr>
+              <a:lstStyle/>
+              <a:p>
+                <a:pPr algn="ctr"/>
+                <a:r>
+                  <a:rPr lang="fr-FR" sz="1000" u="sng" dirty="0">
+                    <a:solidFill>
+                      <a:srgbClr val="00B050"/>
+                    </a:solidFill>
+                    <a:latin typeface="Arial" panose="020B0604020202020204" pitchFamily="34" charset="0"/>
+                    <a:cs typeface="Arial" panose="020B0604020202020204" pitchFamily="34" charset="0"/>
+                  </a:rPr>
+                  <a:t>2</a:t>
+                </a:r>
+              </a:p>
+            </p:txBody>
+          </p:sp>
+          <p:sp>
+            <p:nvSpPr>
+              <p:cNvPr id="63" name="ZoneTexte 62">
+                <a:extLst>
+                  <a:ext uri="{FF2B5EF4-FFF2-40B4-BE49-F238E27FC236}">
+                    <a16:creationId xmlns:a16="http://schemas.microsoft.com/office/drawing/2014/main" id="{E7D696A8-2239-20E2-C3B9-D183FF6202E1}"/>
+                  </a:ext>
+                </a:extLst>
+              </p:cNvPr>
+              <p:cNvSpPr txBox="1">
+                <a:spLocks/>
+              </p:cNvSpPr>
+              <p:nvPr/>
+            </p:nvSpPr>
+            <p:spPr>
+              <a:xfrm>
+                <a:off x="9369612" y="2049229"/>
+                <a:ext cx="383648" cy="246221"/>
+              </a:xfrm>
+              <a:prstGeom prst="rect">
+                <a:avLst/>
+              </a:prstGeom>
+              <a:noFill/>
+            </p:spPr>
+            <p:txBody>
+              <a:bodyPr wrap="square" rtlCol="0">
+                <a:spAutoFit/>
+              </a:bodyPr>
+              <a:lstStyle/>
+              <a:p>
+                <a:pPr algn="ctr"/>
+                <a:r>
+                  <a:rPr lang="fr-FR" sz="1000" dirty="0">
+                    <a:solidFill>
+                      <a:srgbClr val="00B050"/>
+                    </a:solidFill>
+                    <a:latin typeface="Arial" panose="020B0604020202020204" pitchFamily="34" charset="0"/>
+                    <a:cs typeface="Arial" panose="020B0604020202020204" pitchFamily="34" charset="0"/>
+                  </a:rPr>
+                  <a:t>5</a:t>
+                </a:r>
+              </a:p>
+            </p:txBody>
+          </p:sp>
+          <p:sp>
+            <p:nvSpPr>
+              <p:cNvPr id="64" name="ZoneTexte 63">
+                <a:extLst>
+                  <a:ext uri="{FF2B5EF4-FFF2-40B4-BE49-F238E27FC236}">
+                    <a16:creationId xmlns:a16="http://schemas.microsoft.com/office/drawing/2014/main" id="{282DAC59-91BE-A8C4-B439-319AD211ED6B}"/>
+                  </a:ext>
+                </a:extLst>
+              </p:cNvPr>
+              <p:cNvSpPr txBox="1">
+                <a:spLocks/>
+              </p:cNvSpPr>
+              <p:nvPr/>
+            </p:nvSpPr>
+            <p:spPr>
+              <a:xfrm>
+                <a:off x="10309508" y="2093068"/>
+                <a:ext cx="383648" cy="246221"/>
+              </a:xfrm>
+              <a:prstGeom prst="rect">
+                <a:avLst/>
+              </a:prstGeom>
+              <a:noFill/>
+            </p:spPr>
+            <p:txBody>
+              <a:bodyPr wrap="square" rtlCol="0">
+                <a:spAutoFit/>
+              </a:bodyPr>
+              <a:lstStyle/>
+              <a:p>
+                <a:pPr algn="ctr"/>
+                <a:r>
+                  <a:rPr lang="fr-FR" sz="1000" dirty="0">
+                    <a:solidFill>
+                      <a:srgbClr val="00B050"/>
+                    </a:solidFill>
+                    <a:latin typeface="Arial" panose="020B0604020202020204" pitchFamily="34" charset="0"/>
+                    <a:cs typeface="Arial" panose="020B0604020202020204" pitchFamily="34" charset="0"/>
+                  </a:rPr>
+                  <a:t>48</a:t>
+                </a:r>
+              </a:p>
+            </p:txBody>
+          </p:sp>
         </p:grpSp>
-        <p:sp>
-          <p:nvSpPr>
-            <p:cNvPr id="60" name="Rectangle : coins arrondis 59">
-              <a:extLst>
-                <a:ext uri="{FF2B5EF4-FFF2-40B4-BE49-F238E27FC236}">
-                  <a16:creationId xmlns:a16="http://schemas.microsoft.com/office/drawing/2014/main" id="{8F56EFC7-72DC-C628-938B-9C80B8683602}"/>
-                </a:ext>
-              </a:extLst>
-            </p:cNvPr>
-            <p:cNvSpPr/>
-            <p:nvPr/>
-          </p:nvSpPr>
-          <p:spPr>
-            <a:xfrm>
-              <a:off x="8984323" y="3370868"/>
-              <a:ext cx="720000" cy="720000"/>
-            </a:xfrm>
-            <a:prstGeom prst="roundRect">
-              <a:avLst>
-                <a:gd name="adj" fmla="val 6463"/>
-              </a:avLst>
-            </a:prstGeom>
-            <a:solidFill>
-              <a:srgbClr val="4696FD"/>
-            </a:solidFill>
-            <a:ln>
-              <a:noFill/>
-            </a:ln>
-          </p:spPr>
-          <p:style>
-            <a:lnRef idx="2">
-              <a:schemeClr val="accent1">
-                <a:shade val="50000"/>
-              </a:schemeClr>
-            </a:lnRef>
-            <a:fillRef idx="1">
-              <a:schemeClr val="accent1"/>
-            </a:fillRef>
-            <a:effectRef idx="0">
-              <a:schemeClr val="accent1"/>
-            </a:effectRef>
-            <a:fontRef idx="minor">
-              <a:schemeClr val="lt1"/>
-            </a:fontRef>
-          </p:style>
-          <p:txBody>
-            <a:bodyPr rtlCol="0" anchor="ctr"/>
-            <a:lstStyle/>
-            <a:p>
-              <a:pPr algn="ctr"/>
-              <a:r>
-                <a:rPr lang="fr-FR" sz="2000" dirty="0">
-                  <a:latin typeface="Arial" panose="020B0604020202020204" pitchFamily="34" charset="0"/>
-                  <a:cs typeface="Arial" panose="020B0604020202020204" pitchFamily="34" charset="0"/>
-                </a:rPr>
-                <a:t>New</a:t>
-              </a:r>
-              <a:endParaRPr lang="en-US" sz="2000" dirty="0">
-                <a:latin typeface="Arial" panose="020B0604020202020204" pitchFamily="34" charset="0"/>
-                <a:cs typeface="Arial" panose="020B0604020202020204" pitchFamily="34" charset="0"/>
-              </a:endParaRPr>
-            </a:p>
-          </p:txBody>
-        </p:sp>
       </p:grpSp>
-      <p:sp>
-        <p:nvSpPr>
-          <p:cNvPr id="62" name="ZoneTexte 61">
+      <p:cxnSp>
+        <p:nvCxnSpPr>
+          <p:cNvPr id="67" name="Connecteur droit 66">
             <a:extLst>
               <a:ext uri="{FF2B5EF4-FFF2-40B4-BE49-F238E27FC236}">
-                <a16:creationId xmlns:a16="http://schemas.microsoft.com/office/drawing/2014/main" id="{6E3261F9-7064-27EC-8A34-5078D2AAFF84}"/>
+                <a16:creationId xmlns:a16="http://schemas.microsoft.com/office/drawing/2014/main" id="{CD330F49-0CB7-0A3B-09DD-7083EDF124F7}"/>
               </a:ext>
             </a:extLst>
           </p:cNvPr>
-          <p:cNvSpPr txBox="1">
-            <a:spLocks/>
-          </p:cNvSpPr>
+          <p:cNvCxnSpPr>
+            <a:cxnSpLocks/>
+          </p:cNvCxnSpPr>
           <p:nvPr/>
-        </p:nvSpPr>
+        </p:nvCxnSpPr>
         <p:spPr>
           <a:xfrm>
-            <a:off x="6225408" y="4097523"/>
-            <a:ext cx="383648" cy="246221"/>
+            <a:off x="7856563" y="746297"/>
+            <a:ext cx="0" cy="3190260"/>
           </a:xfrm>
-          <a:prstGeom prst="rect">
+          <a:prstGeom prst="line">
             <a:avLst/>
           </a:prstGeom>
-          <a:noFill/>
+          <a:ln>
+            <a:solidFill>
+              <a:schemeClr val="bg2">
+                <a:lumMod val="50000"/>
+                <a:lumOff val="50000"/>
+              </a:schemeClr>
+            </a:solidFill>
+          </a:ln>
         </p:spPr>
-        <p:txBody>
-          <a:bodyPr wrap="square" rtlCol="0">
-            <a:spAutoFit/>
-          </a:bodyPr>
-          <a:lstStyle/>
-          <a:p>
-            <a:pPr algn="ctr"/>
-            <a:r>
-              <a:rPr lang="fr-FR" sz="1000" u="sng" dirty="0">
-                <a:solidFill>
-                  <a:srgbClr val="00B050"/>
-                </a:solidFill>
-                <a:latin typeface="Arial" panose="020B0604020202020204" pitchFamily="34" charset="0"/>
-                <a:cs typeface="Arial" panose="020B0604020202020204" pitchFamily="34" charset="0"/>
-              </a:rPr>
-              <a:t>2</a:t>
-            </a:r>
-          </a:p>
-        </p:txBody>
-      </p:sp>
-      <p:sp>
-        <p:nvSpPr>
-          <p:cNvPr id="63" name="ZoneTexte 62">
-            <a:extLst>
-              <a:ext uri="{FF2B5EF4-FFF2-40B4-BE49-F238E27FC236}">
-                <a16:creationId xmlns:a16="http://schemas.microsoft.com/office/drawing/2014/main" id="{E7D696A8-2239-20E2-C3B9-D183FF6202E1}"/>
-              </a:ext>
-            </a:extLst>
-          </p:cNvPr>
-          <p:cNvSpPr txBox="1">
-            <a:spLocks/>
-          </p:cNvSpPr>
-          <p:nvPr/>
-        </p:nvSpPr>
-        <p:spPr>
-          <a:xfrm>
-            <a:off x="7114325" y="4120486"/>
-            <a:ext cx="383648" cy="246221"/>
-          </a:xfrm>
-          <a:prstGeom prst="rect">
-            <a:avLst/>
-          </a:prstGeom>
-          <a:noFill/>
-        </p:spPr>
-        <p:txBody>
-          <a:bodyPr wrap="square" rtlCol="0">
-            <a:spAutoFit/>
-          </a:bodyPr>
-          <a:lstStyle/>
-          <a:p>
-            <a:pPr algn="ctr"/>
-            <a:r>
-              <a:rPr lang="fr-FR" sz="1000" dirty="0">
-                <a:solidFill>
-                  <a:srgbClr val="00B050"/>
-                </a:solidFill>
-                <a:latin typeface="Arial" panose="020B0604020202020204" pitchFamily="34" charset="0"/>
-                <a:cs typeface="Arial" panose="020B0604020202020204" pitchFamily="34" charset="0"/>
-              </a:rPr>
-              <a:t>5</a:t>
-            </a:r>
-          </a:p>
-        </p:txBody>
-      </p:sp>
-      <p:sp>
-        <p:nvSpPr>
-          <p:cNvPr id="64" name="ZoneTexte 63">
-            <a:extLst>
-              <a:ext uri="{FF2B5EF4-FFF2-40B4-BE49-F238E27FC236}">
-                <a16:creationId xmlns:a16="http://schemas.microsoft.com/office/drawing/2014/main" id="{282DAC59-91BE-A8C4-B439-319AD211ED6B}"/>
-              </a:ext>
-            </a:extLst>
-          </p:cNvPr>
-          <p:cNvSpPr txBox="1">
-            <a:spLocks/>
-          </p:cNvSpPr>
-          <p:nvPr/>
-        </p:nvSpPr>
-        <p:spPr>
-          <a:xfrm>
-            <a:off x="8023476" y="4113948"/>
-            <a:ext cx="383648" cy="246221"/>
-          </a:xfrm>
-          <a:prstGeom prst="rect">
-            <a:avLst/>
-          </a:prstGeom>
-          <a:noFill/>
-        </p:spPr>
-        <p:txBody>
-          <a:bodyPr wrap="square" rtlCol="0">
-            <a:spAutoFit/>
-          </a:bodyPr>
-          <a:lstStyle/>
-          <a:p>
-            <a:pPr algn="ctr"/>
-            <a:r>
-              <a:rPr lang="fr-FR" sz="1000" dirty="0">
-                <a:solidFill>
-                  <a:srgbClr val="00B050"/>
-                </a:solidFill>
-                <a:latin typeface="Arial" panose="020B0604020202020204" pitchFamily="34" charset="0"/>
-                <a:cs typeface="Arial" panose="020B0604020202020204" pitchFamily="34" charset="0"/>
-              </a:rPr>
-              <a:t>48</a:t>
-            </a:r>
-          </a:p>
-        </p:txBody>
-      </p:sp>
+        <p:style>
+          <a:lnRef idx="1">
+            <a:schemeClr val="accent1"/>
+          </a:lnRef>
+          <a:fillRef idx="0">
+            <a:schemeClr val="accent1"/>
+          </a:fillRef>
+          <a:effectRef idx="0">
+            <a:schemeClr val="accent1"/>
+          </a:effectRef>
+          <a:fontRef idx="minor">
+            <a:schemeClr val="tx1"/>
+          </a:fontRef>
+        </p:style>
+      </p:cxnSp>
     </p:spTree>
     <p:extLst>
       <p:ext uri="{BB962C8B-B14F-4D97-AF65-F5344CB8AC3E}">

</xml_diff>

<commit_message>
before changing to layout
</commit_message>
<xml_diff>
--- a/app model/Skin app.pptx
+++ b/app model/Skin app.pptx
@@ -209,7 +209,7 @@
           <a:p>
             <a:fld id="{768E3510-DC99-4FCD-8D19-DD2BADF14EF2}" type="datetimeFigureOut">
               <a:rPr lang="en-US" smtClean="0"/>
-              <a:t>7/28/2022</a:t>
+              <a:t>7/29/2022</a:t>
             </a:fld>
             <a:endParaRPr lang="en-US"/>
           </a:p>
@@ -1730,7 +1730,7 @@
           <a:p>
             <a:fld id="{0FE4FEEF-F4C3-4882-B5BB-2F3842E66E27}" type="datetimeFigureOut">
               <a:rPr lang="en-US" smtClean="0"/>
-              <a:t>7/28/2022</a:t>
+              <a:t>7/29/2022</a:t>
             </a:fld>
             <a:endParaRPr lang="en-US"/>
           </a:p>
@@ -2028,7 +2028,7 @@
           <a:p>
             <a:fld id="{0FE4FEEF-F4C3-4882-B5BB-2F3842E66E27}" type="datetimeFigureOut">
               <a:rPr lang="en-US" smtClean="0"/>
-              <a:t>7/28/2022</a:t>
+              <a:t>7/29/2022</a:t>
             </a:fld>
             <a:endParaRPr lang="en-US"/>
           </a:p>
@@ -2220,7 +2220,7 @@
           <a:p>
             <a:fld id="{0FE4FEEF-F4C3-4882-B5BB-2F3842E66E27}" type="datetimeFigureOut">
               <a:rPr lang="en-US" smtClean="0"/>
-              <a:t>7/28/2022</a:t>
+              <a:t>7/29/2022</a:t>
             </a:fld>
             <a:endParaRPr lang="en-US"/>
           </a:p>
@@ -2481,7 +2481,7 @@
           <a:p>
             <a:fld id="{0FE4FEEF-F4C3-4882-B5BB-2F3842E66E27}" type="datetimeFigureOut">
               <a:rPr lang="en-US" smtClean="0"/>
-              <a:t>7/28/2022</a:t>
+              <a:t>7/29/2022</a:t>
             </a:fld>
             <a:endParaRPr lang="en-US"/>
           </a:p>
@@ -2905,7 +2905,7 @@
           <a:p>
             <a:fld id="{0FE4FEEF-F4C3-4882-B5BB-2F3842E66E27}" type="datetimeFigureOut">
               <a:rPr lang="en-US" smtClean="0"/>
-              <a:t>7/28/2022</a:t>
+              <a:t>7/29/2022</a:t>
             </a:fld>
             <a:endParaRPr lang="en-US"/>
           </a:p>
@@ -3442,7 +3442,7 @@
           <a:p>
             <a:fld id="{0FE4FEEF-F4C3-4882-B5BB-2F3842E66E27}" type="datetimeFigureOut">
               <a:rPr lang="en-US" smtClean="0"/>
-              <a:t>7/28/2022</a:t>
+              <a:t>7/29/2022</a:t>
             </a:fld>
             <a:endParaRPr lang="en-US"/>
           </a:p>
@@ -4306,7 +4306,7 @@
           <a:p>
             <a:fld id="{0FE4FEEF-F4C3-4882-B5BB-2F3842E66E27}" type="datetimeFigureOut">
               <a:rPr lang="en-US" smtClean="0"/>
-              <a:t>7/28/2022</a:t>
+              <a:t>7/29/2022</a:t>
             </a:fld>
             <a:endParaRPr lang="en-US"/>
           </a:p>
@@ -4476,7 +4476,7 @@
           <a:p>
             <a:fld id="{0FE4FEEF-F4C3-4882-B5BB-2F3842E66E27}" type="datetimeFigureOut">
               <a:rPr lang="en-US" smtClean="0"/>
-              <a:t>7/28/2022</a:t>
+              <a:t>7/29/2022</a:t>
             </a:fld>
             <a:endParaRPr lang="en-US"/>
           </a:p>
@@ -4660,7 +4660,7 @@
           <a:p>
             <a:fld id="{0FE4FEEF-F4C3-4882-B5BB-2F3842E66E27}" type="datetimeFigureOut">
               <a:rPr lang="en-US" smtClean="0"/>
-              <a:t>7/28/2022</a:t>
+              <a:t>7/29/2022</a:t>
             </a:fld>
             <a:endParaRPr lang="en-US"/>
           </a:p>
@@ -4830,7 +4830,7 @@
           <a:p>
             <a:fld id="{0FE4FEEF-F4C3-4882-B5BB-2F3842E66E27}" type="datetimeFigureOut">
               <a:rPr lang="en-US" smtClean="0"/>
-              <a:t>7/28/2022</a:t>
+              <a:t>7/29/2022</a:t>
             </a:fld>
             <a:endParaRPr lang="en-US"/>
           </a:p>
@@ -5074,7 +5074,7 @@
           <a:p>
             <a:fld id="{0FE4FEEF-F4C3-4882-B5BB-2F3842E66E27}" type="datetimeFigureOut">
               <a:rPr lang="en-US" smtClean="0"/>
-              <a:t>7/28/2022</a:t>
+              <a:t>7/29/2022</a:t>
             </a:fld>
             <a:endParaRPr lang="en-US"/>
           </a:p>
@@ -5310,7 +5310,7 @@
           <a:p>
             <a:fld id="{0FE4FEEF-F4C3-4882-B5BB-2F3842E66E27}" type="datetimeFigureOut">
               <a:rPr lang="en-US" smtClean="0"/>
-              <a:t>7/28/2022</a:t>
+              <a:t>7/29/2022</a:t>
             </a:fld>
             <a:endParaRPr lang="en-US"/>
           </a:p>
@@ -5776,7 +5776,7 @@
           <a:p>
             <a:fld id="{0FE4FEEF-F4C3-4882-B5BB-2F3842E66E27}" type="datetimeFigureOut">
               <a:rPr lang="en-US" smtClean="0"/>
-              <a:t>7/28/2022</a:t>
+              <a:t>7/29/2022</a:t>
             </a:fld>
             <a:endParaRPr lang="en-US"/>
           </a:p>
@@ -5894,7 +5894,7 @@
           <a:p>
             <a:fld id="{0FE4FEEF-F4C3-4882-B5BB-2F3842E66E27}" type="datetimeFigureOut">
               <a:rPr lang="en-US" smtClean="0"/>
-              <a:t>7/28/2022</a:t>
+              <a:t>7/29/2022</a:t>
             </a:fld>
             <a:endParaRPr lang="en-US"/>
           </a:p>
@@ -5989,7 +5989,7 @@
           <a:p>
             <a:fld id="{0FE4FEEF-F4C3-4882-B5BB-2F3842E66E27}" type="datetimeFigureOut">
               <a:rPr lang="en-US" smtClean="0"/>
-              <a:t>7/28/2022</a:t>
+              <a:t>7/29/2022</a:t>
             </a:fld>
             <a:endParaRPr lang="en-US"/>
           </a:p>
@@ -6244,7 +6244,7 @@
           <a:p>
             <a:fld id="{0FE4FEEF-F4C3-4882-B5BB-2F3842E66E27}" type="datetimeFigureOut">
               <a:rPr lang="en-US" smtClean="0"/>
-              <a:t>7/28/2022</a:t>
+              <a:t>7/29/2022</a:t>
             </a:fld>
             <a:endParaRPr lang="en-US"/>
           </a:p>
@@ -6544,7 +6544,7 @@
           <a:p>
             <a:fld id="{0FE4FEEF-F4C3-4882-B5BB-2F3842E66E27}" type="datetimeFigureOut">
               <a:rPr lang="en-US" smtClean="0"/>
-              <a:t>7/28/2022</a:t>
+              <a:t>7/29/2022</a:t>
             </a:fld>
             <a:endParaRPr lang="en-US"/>
           </a:p>
@@ -6778,7 +6778,7 @@
           <a:p>
             <a:fld id="{0FE4FEEF-F4C3-4882-B5BB-2F3842E66E27}" type="datetimeFigureOut">
               <a:rPr lang="en-US" smtClean="0"/>
-              <a:t>7/28/2022</a:t>
+              <a:t>7/29/2022</a:t>
             </a:fld>
             <a:endParaRPr lang="en-US"/>
           </a:p>
@@ -7890,13 +7890,15 @@
               </a:ext>
             </a:extLst>
           </p:cNvPr>
-          <p:cNvCxnSpPr/>
+          <p:cNvCxnSpPr>
+            <a:cxnSpLocks/>
+          </p:cNvCxnSpPr>
           <p:nvPr/>
         </p:nvCxnSpPr>
         <p:spPr>
           <a:xfrm>
-            <a:off x="4132288" y="809222"/>
-            <a:ext cx="0" cy="5642810"/>
+            <a:off x="4132288" y="746297"/>
+            <a:ext cx="0" cy="6111703"/>
           </a:xfrm>
           <a:prstGeom prst="line">
             <a:avLst/>
@@ -7935,7 +7937,7 @@
             </a:extLst>
           </p:cNvPr>
           <p:cNvGrpSpPr>
-            <a:grpSpLocks noGrp="1" noUngrp="1" noRot="1" noMove="1" noResize="1"/>
+            <a:grpSpLocks/>
           </p:cNvGrpSpPr>
           <p:nvPr/>
         </p:nvGrpSpPr>
@@ -7957,7 +7959,7 @@
               </a:extLst>
             </p:cNvPr>
             <p:cNvPicPr>
-              <a:picLocks noGrp="1" noRot="1" noChangeAspect="1" noMove="1" noResize="1" noEditPoints="1" noAdjustHandles="1" noChangeArrowheads="1" noChangeShapeType="1" noCrop="1"/>
+              <a:picLocks noChangeAspect="1"/>
             </p:cNvPicPr>
             <p:nvPr/>
           </p:nvPicPr>
@@ -7996,7 +7998,7 @@
               </a:extLst>
             </p:cNvPr>
             <p:cNvGrpSpPr>
-              <a:grpSpLocks noGrp="1" noUngrp="1" noRot="1" noMove="1" noResize="1"/>
+              <a:grpSpLocks/>
             </p:cNvGrpSpPr>
             <p:nvPr/>
           </p:nvGrpSpPr>
@@ -8018,7 +8020,7 @@
                 </a:extLst>
               </p:cNvPr>
               <p:cNvGrpSpPr>
-                <a:grpSpLocks noGrp="1" noUngrp="1" noRot="1" noMove="1" noResize="1"/>
+                <a:grpSpLocks/>
               </p:cNvGrpSpPr>
               <p:nvPr/>
             </p:nvGrpSpPr>
@@ -8040,7 +8042,7 @@
                   </a:extLst>
                 </p:cNvPr>
                 <p:cNvSpPr>
-                  <a:spLocks noGrp="1" noRot="1" noMove="1" noResize="1" noEditPoints="1" noAdjustHandles="1" noChangeArrowheads="1" noChangeShapeType="1"/>
+                  <a:spLocks/>
                 </p:cNvSpPr>
                 <p:nvPr/>
               </p:nvSpPr>
@@ -8096,7 +8098,7 @@
                   </a:extLst>
                 </p:cNvPr>
                 <p:cNvSpPr>
-                  <a:spLocks noGrp="1" noRot="1" noMove="1" noResize="1" noEditPoints="1" noAdjustHandles="1" noChangeArrowheads="1" noChangeShapeType="1"/>
+                  <a:spLocks/>
                 </p:cNvSpPr>
                 <p:nvPr/>
               </p:nvSpPr>
@@ -8162,7 +8164,7 @@
                   </a:extLst>
                 </p:cNvPr>
                 <p:cNvSpPr>
-                  <a:spLocks noGrp="1" noRot="1" noMove="1" noResize="1" noEditPoints="1" noAdjustHandles="1" noChangeArrowheads="1" noChangeShapeType="1"/>
+                  <a:spLocks/>
                 </p:cNvSpPr>
                 <p:nvPr/>
               </p:nvSpPr>
@@ -8229,7 +8231,7 @@
                 </a:extLst>
               </p:cNvPr>
               <p:cNvPicPr>
-                <a:picLocks noGrp="1" noRot="1" noChangeAspect="1" noMove="1" noResize="1" noEditPoints="1" noAdjustHandles="1" noChangeArrowheads="1" noChangeShapeType="1" noCrop="1"/>
+                <a:picLocks noChangeAspect="1"/>
               </p:cNvPicPr>
               <p:nvPr/>
             </p:nvPicPr>
@@ -8269,7 +8271,7 @@
               </a:extLst>
             </p:cNvPr>
             <p:cNvGrpSpPr>
-              <a:grpSpLocks noGrp="1" noUngrp="1" noRot="1" noMove="1" noResize="1"/>
+              <a:grpSpLocks/>
             </p:cNvGrpSpPr>
             <p:nvPr/>
           </p:nvGrpSpPr>
@@ -8291,7 +8293,7 @@
                 </a:extLst>
               </p:cNvPr>
               <p:cNvSpPr>
-                <a:spLocks noGrp="1" noRot="1" noMove="1" noResize="1" noEditPoints="1" noAdjustHandles="1" noChangeArrowheads="1" noChangeShapeType="1"/>
+                <a:spLocks/>
               </p:cNvSpPr>
               <p:nvPr/>
             </p:nvSpPr>
@@ -8348,7 +8350,7 @@
                 </a:extLst>
               </p:cNvPr>
               <p:cNvPicPr>
-                <a:picLocks noGrp="1" noRot="1" noChangeAspect="1" noMove="1" noResize="1" noEditPoints="1" noAdjustHandles="1" noChangeArrowheads="1" noChangeShapeType="1" noCrop="1"/>
+                <a:picLocks noChangeAspect="1"/>
               </p:cNvPicPr>
               <p:nvPr/>
             </p:nvPicPr>
@@ -8911,7 +8913,7 @@
         <p:spPr>
           <a:xfrm>
             <a:off x="4132288" y="3936557"/>
-            <a:ext cx="7531682" cy="0"/>
+            <a:ext cx="8059712" cy="0"/>
           </a:xfrm>
           <a:prstGeom prst="line">
             <a:avLst/>
@@ -9018,9 +9020,9 @@
           <p:grpSpPr>
             <a:xfrm>
               <a:off x="4879098" y="4985014"/>
-              <a:ext cx="6828699" cy="723538"/>
+              <a:ext cx="6828699" cy="436611"/>
               <a:chOff x="4860544" y="5087010"/>
-              <a:chExt cx="6828699" cy="723538"/>
+              <a:chExt cx="6828699" cy="436611"/>
             </a:xfrm>
           </p:grpSpPr>
           <p:sp>
@@ -9039,7 +9041,7 @@
             <p:spPr>
               <a:xfrm>
                 <a:off x="4860544" y="5087010"/>
-                <a:ext cx="1260000" cy="720000"/>
+                <a:ext cx="1260000" cy="436611"/>
               </a:xfrm>
               <a:prstGeom prst="roundRect">
                 <a:avLst>
@@ -9104,7 +9106,7 @@
             <p:spPr>
               <a:xfrm>
                 <a:off x="6714905" y="5090548"/>
-                <a:ext cx="1261872" cy="720000"/>
+                <a:ext cx="1261872" cy="433071"/>
               </a:xfrm>
               <a:prstGeom prst="roundRect">
                 <a:avLst>
@@ -9169,7 +9171,7 @@
             <p:spPr>
               <a:xfrm>
                 <a:off x="8571138" y="5090548"/>
-                <a:ext cx="1261872" cy="720000"/>
+                <a:ext cx="1261872" cy="426764"/>
               </a:xfrm>
               <a:prstGeom prst="roundRect">
                 <a:avLst>
@@ -9234,7 +9236,7 @@
             <p:spPr>
               <a:xfrm>
                 <a:off x="10427371" y="5087010"/>
-                <a:ext cx="1261872" cy="720000"/>
+                <a:ext cx="1261872" cy="436609"/>
               </a:xfrm>
               <a:prstGeom prst="roundRect">
                 <a:avLst>
@@ -9438,7 +9440,7 @@
           </p:nvSpPr>
           <p:spPr>
             <a:xfrm>
-              <a:off x="4799121" y="5796059"/>
+              <a:off x="4799121" y="5551871"/>
               <a:ext cx="1390855" cy="830997"/>
             </a:xfrm>
             <a:prstGeom prst="rect">
@@ -9521,7 +9523,7 @@
           </p:nvSpPr>
           <p:spPr>
             <a:xfrm>
-              <a:off x="6714716" y="5786018"/>
+              <a:off x="6714716" y="5541830"/>
               <a:ext cx="1390855" cy="954107"/>
             </a:xfrm>
             <a:prstGeom prst="rect">
@@ -9662,7 +9664,7 @@
           </p:nvSpPr>
           <p:spPr>
             <a:xfrm>
-              <a:off x="8520663" y="5796059"/>
+              <a:off x="8520663" y="5551871"/>
               <a:ext cx="1390855" cy="830997"/>
             </a:xfrm>
             <a:prstGeom prst="rect">
@@ -9745,7 +9747,7 @@
           </p:nvSpPr>
           <p:spPr>
             <a:xfrm>
-              <a:off x="10381433" y="5796059"/>
+              <a:off x="10381433" y="5551871"/>
               <a:ext cx="1390855" cy="830997"/>
             </a:xfrm>
             <a:prstGeom prst="rect">
@@ -10781,52 +10783,6 @@
           </p:sp>
         </p:grpSp>
       </p:grpSp>
-      <p:cxnSp>
-        <p:nvCxnSpPr>
-          <p:cNvPr id="67" name="Connecteur droit 66">
-            <a:extLst>
-              <a:ext uri="{FF2B5EF4-FFF2-40B4-BE49-F238E27FC236}">
-                <a16:creationId xmlns:a16="http://schemas.microsoft.com/office/drawing/2014/main" id="{CD330F49-0CB7-0A3B-09DD-7083EDF124F7}"/>
-              </a:ext>
-            </a:extLst>
-          </p:cNvPr>
-          <p:cNvCxnSpPr>
-            <a:cxnSpLocks/>
-          </p:cNvCxnSpPr>
-          <p:nvPr/>
-        </p:nvCxnSpPr>
-        <p:spPr>
-          <a:xfrm>
-            <a:off x="7856563" y="746297"/>
-            <a:ext cx="0" cy="3190260"/>
-          </a:xfrm>
-          <a:prstGeom prst="line">
-            <a:avLst/>
-          </a:prstGeom>
-          <a:ln>
-            <a:solidFill>
-              <a:schemeClr val="bg2">
-                <a:lumMod val="50000"/>
-                <a:lumOff val="50000"/>
-              </a:schemeClr>
-            </a:solidFill>
-          </a:ln>
-        </p:spPr>
-        <p:style>
-          <a:lnRef idx="1">
-            <a:schemeClr val="accent1"/>
-          </a:lnRef>
-          <a:fillRef idx="0">
-            <a:schemeClr val="accent1"/>
-          </a:fillRef>
-          <a:effectRef idx="0">
-            <a:schemeClr val="accent1"/>
-          </a:effectRef>
-          <a:fontRef idx="minor">
-            <a:schemeClr val="tx1"/>
-          </a:fontRef>
-        </p:style>
-      </p:cxnSp>
     </p:spTree>
     <p:extLst>
       <p:ext uri="{BB962C8B-B14F-4D97-AF65-F5344CB8AC3E}">

</xml_diff>

<commit_message>
pagination size controllers added
</commit_message>
<xml_diff>
--- a/app model/Skin app.pptx
+++ b/app model/Skin app.pptx
@@ -209,7 +209,7 @@
           <a:p>
             <a:fld id="{768E3510-DC99-4FCD-8D19-DD2BADF14EF2}" type="datetimeFigureOut">
               <a:rPr lang="en-US" smtClean="0"/>
-              <a:t>7/29/2022</a:t>
+              <a:t>8/3/2022</a:t>
             </a:fld>
             <a:endParaRPr lang="en-US"/>
           </a:p>
@@ -1730,7 +1730,7 @@
           <a:p>
             <a:fld id="{0FE4FEEF-F4C3-4882-B5BB-2F3842E66E27}" type="datetimeFigureOut">
               <a:rPr lang="en-US" smtClean="0"/>
-              <a:t>7/29/2022</a:t>
+              <a:t>8/3/2022</a:t>
             </a:fld>
             <a:endParaRPr lang="en-US"/>
           </a:p>
@@ -2028,7 +2028,7 @@
           <a:p>
             <a:fld id="{0FE4FEEF-F4C3-4882-B5BB-2F3842E66E27}" type="datetimeFigureOut">
               <a:rPr lang="en-US" smtClean="0"/>
-              <a:t>7/29/2022</a:t>
+              <a:t>8/3/2022</a:t>
             </a:fld>
             <a:endParaRPr lang="en-US"/>
           </a:p>
@@ -2220,7 +2220,7 @@
           <a:p>
             <a:fld id="{0FE4FEEF-F4C3-4882-B5BB-2F3842E66E27}" type="datetimeFigureOut">
               <a:rPr lang="en-US" smtClean="0"/>
-              <a:t>7/29/2022</a:t>
+              <a:t>8/3/2022</a:t>
             </a:fld>
             <a:endParaRPr lang="en-US"/>
           </a:p>
@@ -2481,7 +2481,7 @@
           <a:p>
             <a:fld id="{0FE4FEEF-F4C3-4882-B5BB-2F3842E66E27}" type="datetimeFigureOut">
               <a:rPr lang="en-US" smtClean="0"/>
-              <a:t>7/29/2022</a:t>
+              <a:t>8/3/2022</a:t>
             </a:fld>
             <a:endParaRPr lang="en-US"/>
           </a:p>
@@ -2905,7 +2905,7 @@
           <a:p>
             <a:fld id="{0FE4FEEF-F4C3-4882-B5BB-2F3842E66E27}" type="datetimeFigureOut">
               <a:rPr lang="en-US" smtClean="0"/>
-              <a:t>7/29/2022</a:t>
+              <a:t>8/3/2022</a:t>
             </a:fld>
             <a:endParaRPr lang="en-US"/>
           </a:p>
@@ -3442,7 +3442,7 @@
           <a:p>
             <a:fld id="{0FE4FEEF-F4C3-4882-B5BB-2F3842E66E27}" type="datetimeFigureOut">
               <a:rPr lang="en-US" smtClean="0"/>
-              <a:t>7/29/2022</a:t>
+              <a:t>8/3/2022</a:t>
             </a:fld>
             <a:endParaRPr lang="en-US"/>
           </a:p>
@@ -4306,7 +4306,7 @@
           <a:p>
             <a:fld id="{0FE4FEEF-F4C3-4882-B5BB-2F3842E66E27}" type="datetimeFigureOut">
               <a:rPr lang="en-US" smtClean="0"/>
-              <a:t>7/29/2022</a:t>
+              <a:t>8/3/2022</a:t>
             </a:fld>
             <a:endParaRPr lang="en-US"/>
           </a:p>
@@ -4476,7 +4476,7 @@
           <a:p>
             <a:fld id="{0FE4FEEF-F4C3-4882-B5BB-2F3842E66E27}" type="datetimeFigureOut">
               <a:rPr lang="en-US" smtClean="0"/>
-              <a:t>7/29/2022</a:t>
+              <a:t>8/3/2022</a:t>
             </a:fld>
             <a:endParaRPr lang="en-US"/>
           </a:p>
@@ -4660,7 +4660,7 @@
           <a:p>
             <a:fld id="{0FE4FEEF-F4C3-4882-B5BB-2F3842E66E27}" type="datetimeFigureOut">
               <a:rPr lang="en-US" smtClean="0"/>
-              <a:t>7/29/2022</a:t>
+              <a:t>8/3/2022</a:t>
             </a:fld>
             <a:endParaRPr lang="en-US"/>
           </a:p>
@@ -4830,7 +4830,7 @@
           <a:p>
             <a:fld id="{0FE4FEEF-F4C3-4882-B5BB-2F3842E66E27}" type="datetimeFigureOut">
               <a:rPr lang="en-US" smtClean="0"/>
-              <a:t>7/29/2022</a:t>
+              <a:t>8/3/2022</a:t>
             </a:fld>
             <a:endParaRPr lang="en-US"/>
           </a:p>
@@ -5074,7 +5074,7 @@
           <a:p>
             <a:fld id="{0FE4FEEF-F4C3-4882-B5BB-2F3842E66E27}" type="datetimeFigureOut">
               <a:rPr lang="en-US" smtClean="0"/>
-              <a:t>7/29/2022</a:t>
+              <a:t>8/3/2022</a:t>
             </a:fld>
             <a:endParaRPr lang="en-US"/>
           </a:p>
@@ -5310,7 +5310,7 @@
           <a:p>
             <a:fld id="{0FE4FEEF-F4C3-4882-B5BB-2F3842E66E27}" type="datetimeFigureOut">
               <a:rPr lang="en-US" smtClean="0"/>
-              <a:t>7/29/2022</a:t>
+              <a:t>8/3/2022</a:t>
             </a:fld>
             <a:endParaRPr lang="en-US"/>
           </a:p>
@@ -5776,7 +5776,7 @@
           <a:p>
             <a:fld id="{0FE4FEEF-F4C3-4882-B5BB-2F3842E66E27}" type="datetimeFigureOut">
               <a:rPr lang="en-US" smtClean="0"/>
-              <a:t>7/29/2022</a:t>
+              <a:t>8/3/2022</a:t>
             </a:fld>
             <a:endParaRPr lang="en-US"/>
           </a:p>
@@ -5894,7 +5894,7 @@
           <a:p>
             <a:fld id="{0FE4FEEF-F4C3-4882-B5BB-2F3842E66E27}" type="datetimeFigureOut">
               <a:rPr lang="en-US" smtClean="0"/>
-              <a:t>7/29/2022</a:t>
+              <a:t>8/3/2022</a:t>
             </a:fld>
             <a:endParaRPr lang="en-US"/>
           </a:p>
@@ -5989,7 +5989,7 @@
           <a:p>
             <a:fld id="{0FE4FEEF-F4C3-4882-B5BB-2F3842E66E27}" type="datetimeFigureOut">
               <a:rPr lang="en-US" smtClean="0"/>
-              <a:t>7/29/2022</a:t>
+              <a:t>8/3/2022</a:t>
             </a:fld>
             <a:endParaRPr lang="en-US"/>
           </a:p>
@@ -6244,7 +6244,7 @@
           <a:p>
             <a:fld id="{0FE4FEEF-F4C3-4882-B5BB-2F3842E66E27}" type="datetimeFigureOut">
               <a:rPr lang="en-US" smtClean="0"/>
-              <a:t>7/29/2022</a:t>
+              <a:t>8/3/2022</a:t>
             </a:fld>
             <a:endParaRPr lang="en-US"/>
           </a:p>
@@ -6544,7 +6544,7 @@
           <a:p>
             <a:fld id="{0FE4FEEF-F4C3-4882-B5BB-2F3842E66E27}" type="datetimeFigureOut">
               <a:rPr lang="en-US" smtClean="0"/>
-              <a:t>7/29/2022</a:t>
+              <a:t>8/3/2022</a:t>
             </a:fld>
             <a:endParaRPr lang="en-US"/>
           </a:p>
@@ -6778,7 +6778,7 @@
           <a:p>
             <a:fld id="{0FE4FEEF-F4C3-4882-B5BB-2F3842E66E27}" type="datetimeFigureOut">
               <a:rPr lang="en-US" smtClean="0"/>
-              <a:t>7/29/2022</a:t>
+              <a:t>8/3/2022</a:t>
             </a:fld>
             <a:endParaRPr lang="en-US"/>
           </a:p>
@@ -14471,71 +14471,12 @@
           </a:p>
         </p:txBody>
       </p:sp>
-      <p:sp>
-        <p:nvSpPr>
-          <p:cNvPr id="7" name="Rectangle : avec coin arrondi 6">
+      <p:grpSp>
+        <p:nvGrpSpPr>
+          <p:cNvPr id="9" name="Groupe 8">
             <a:extLst>
               <a:ext uri="{FF2B5EF4-FFF2-40B4-BE49-F238E27FC236}">
-                <a16:creationId xmlns:a16="http://schemas.microsoft.com/office/drawing/2014/main" id="{5D8D3D05-EF6C-AC8D-BD9E-7C599D0705B6}"/>
-              </a:ext>
-            </a:extLst>
-          </p:cNvPr>
-          <p:cNvSpPr>
-            <a:spLocks/>
-          </p:cNvSpPr>
-          <p:nvPr/>
-        </p:nvSpPr>
-        <p:spPr>
-          <a:xfrm>
-            <a:off x="0" y="1"/>
-            <a:ext cx="3240000" cy="2156146"/>
-          </a:xfrm>
-          <a:prstGeom prst="round1Rect">
-            <a:avLst>
-              <a:gd name="adj" fmla="val 0"/>
-            </a:avLst>
-          </a:prstGeom>
-          <a:solidFill>
-            <a:schemeClr val="bg2">
-              <a:lumMod val="25000"/>
-              <a:lumOff val="75000"/>
-            </a:schemeClr>
-          </a:solidFill>
-          <a:ln>
-            <a:noFill/>
-          </a:ln>
-        </p:spPr>
-        <p:style>
-          <a:lnRef idx="2">
-            <a:schemeClr val="accent1">
-              <a:shade val="50000"/>
-            </a:schemeClr>
-          </a:lnRef>
-          <a:fillRef idx="1">
-            <a:schemeClr val="accent1"/>
-          </a:fillRef>
-          <a:effectRef idx="0">
-            <a:schemeClr val="accent1"/>
-          </a:effectRef>
-          <a:fontRef idx="minor">
-            <a:schemeClr val="lt1"/>
-          </a:fontRef>
-        </p:style>
-        <p:txBody>
-          <a:bodyPr rtlCol="0" anchor="ctr"/>
-          <a:lstStyle/>
-          <a:p>
-            <a:pPr algn="ctr"/>
-            <a:endParaRPr lang="en-US"/>
-          </a:p>
-        </p:txBody>
-      </p:sp>
-      <p:grpSp>
-        <p:nvGrpSpPr>
-          <p:cNvPr id="3" name="Groupe 2">
-            <a:extLst>
-              <a:ext uri="{FF2B5EF4-FFF2-40B4-BE49-F238E27FC236}">
-                <a16:creationId xmlns:a16="http://schemas.microsoft.com/office/drawing/2014/main" id="{6D60210E-5ACD-3533-85BF-8AD9FE5810F2}"/>
+                <a16:creationId xmlns:a16="http://schemas.microsoft.com/office/drawing/2014/main" id="{68E51A6A-9905-2BD1-91AC-89993D1CB560}"/>
               </a:ext>
             </a:extLst>
           </p:cNvPr>
@@ -14544,91 +14485,97 @@
         </p:nvGrpSpPr>
         <p:grpSpPr>
           <a:xfrm>
-            <a:off x="25323" y="340451"/>
-            <a:ext cx="3239999" cy="1502392"/>
-            <a:chOff x="24093" y="158273"/>
-            <a:chExt cx="3239999" cy="1502392"/>
+            <a:off x="0" y="1285751"/>
+            <a:ext cx="3265322" cy="2156146"/>
+            <a:chOff x="0" y="1"/>
+            <a:chExt cx="3265322" cy="2156146"/>
           </a:xfrm>
         </p:grpSpPr>
         <p:sp>
           <p:nvSpPr>
-            <p:cNvPr id="8" name="ZoneTexte 7">
+            <p:cNvPr id="7" name="Rectangle : avec coin arrondi 6">
               <a:extLst>
                 <a:ext uri="{FF2B5EF4-FFF2-40B4-BE49-F238E27FC236}">
-                  <a16:creationId xmlns:a16="http://schemas.microsoft.com/office/drawing/2014/main" id="{AD272AE6-F946-85A5-F6D5-B87C017934F3}"/>
+                  <a16:creationId xmlns:a16="http://schemas.microsoft.com/office/drawing/2014/main" id="{5D8D3D05-EF6C-AC8D-BD9E-7C599D0705B6}"/>
                 </a:ext>
               </a:extLst>
             </p:cNvPr>
-            <p:cNvSpPr txBox="1">
+            <p:cNvSpPr>
               <a:spLocks/>
             </p:cNvSpPr>
             <p:nvPr/>
           </p:nvSpPr>
           <p:spPr>
             <a:xfrm>
-              <a:off x="24093" y="158273"/>
-              <a:ext cx="3239999" cy="261610"/>
+              <a:off x="0" y="1"/>
+              <a:ext cx="3240000" cy="2156146"/>
             </a:xfrm>
-            <a:prstGeom prst="rect">
-              <a:avLst/>
+            <a:prstGeom prst="round1Rect">
+              <a:avLst>
+                <a:gd name="adj" fmla="val 0"/>
+              </a:avLst>
             </a:prstGeom>
-            <a:noFill/>
+            <a:solidFill>
+              <a:schemeClr val="bg2">
+                <a:lumMod val="25000"/>
+                <a:lumOff val="75000"/>
+              </a:schemeClr>
+            </a:solidFill>
+            <a:ln>
+              <a:noFill/>
+            </a:ln>
           </p:spPr>
+          <p:style>
+            <a:lnRef idx="2">
+              <a:schemeClr val="accent1">
+                <a:shade val="50000"/>
+              </a:schemeClr>
+            </a:lnRef>
+            <a:fillRef idx="1">
+              <a:schemeClr val="accent1"/>
+            </a:fillRef>
+            <a:effectRef idx="0">
+              <a:schemeClr val="accent1"/>
+            </a:effectRef>
+            <a:fontRef idx="minor">
+              <a:schemeClr val="lt1"/>
+            </a:fontRef>
+          </p:style>
           <p:txBody>
-            <a:bodyPr wrap="square" rtlCol="0">
-              <a:spAutoFit/>
-            </a:bodyPr>
+            <a:bodyPr rtlCol="0" anchor="ctr"/>
             <a:lstStyle/>
             <a:p>
               <a:pPr algn="ctr"/>
-              <a:r>
-                <a:rPr lang="fr-FR" sz="1100" b="1" dirty="0" err="1">
-                  <a:solidFill>
-                    <a:schemeClr val="bg1"/>
-                  </a:solidFill>
-                  <a:latin typeface="Arial" panose="020B0604020202020204" pitchFamily="34" charset="0"/>
-                  <a:cs typeface="Arial" panose="020B0604020202020204" pitchFamily="34" charset="0"/>
-                </a:rPr>
-                <a:t>Filters</a:t>
-              </a:r>
-              <a:endParaRPr lang="fr-FR" sz="1100" b="1" dirty="0">
-                <a:solidFill>
-                  <a:schemeClr val="bg1"/>
-                </a:solidFill>
-                <a:latin typeface="Arial" panose="020B0604020202020204" pitchFamily="34" charset="0"/>
-                <a:cs typeface="Arial" panose="020B0604020202020204" pitchFamily="34" charset="0"/>
-              </a:endParaRPr>
+              <a:endParaRPr lang="en-US"/>
             </a:p>
           </p:txBody>
         </p:sp>
         <p:grpSp>
           <p:nvGrpSpPr>
-            <p:cNvPr id="49" name="Groupe 48">
+            <p:cNvPr id="3" name="Groupe 2">
               <a:extLst>
                 <a:ext uri="{FF2B5EF4-FFF2-40B4-BE49-F238E27FC236}">
-                  <a16:creationId xmlns:a16="http://schemas.microsoft.com/office/drawing/2014/main" id="{3F69DC67-DE5B-688F-945A-6E7E14A16AB1}"/>
+                  <a16:creationId xmlns:a16="http://schemas.microsoft.com/office/drawing/2014/main" id="{6D60210E-5ACD-3533-85BF-8AD9FE5810F2}"/>
                 </a:ext>
               </a:extLst>
             </p:cNvPr>
-            <p:cNvGrpSpPr>
-              <a:grpSpLocks/>
-            </p:cNvGrpSpPr>
+            <p:cNvGrpSpPr/>
             <p:nvPr/>
           </p:nvGrpSpPr>
           <p:grpSpPr>
             <a:xfrm>
-              <a:off x="166967" y="447931"/>
-              <a:ext cx="3097125" cy="1212734"/>
-              <a:chOff x="133350" y="4971038"/>
-              <a:chExt cx="3097125" cy="1212734"/>
+              <a:off x="25323" y="340451"/>
+              <a:ext cx="3239999" cy="1502392"/>
+              <a:chOff x="24093" y="158273"/>
+              <a:chExt cx="3239999" cy="1502392"/>
             </a:xfrm>
           </p:grpSpPr>
           <p:sp>
             <p:nvSpPr>
-              <p:cNvPr id="38" name="ZoneTexte 37">
+              <p:cNvPr id="8" name="ZoneTexte 7">
                 <a:extLst>
                   <a:ext uri="{FF2B5EF4-FFF2-40B4-BE49-F238E27FC236}">
-                    <a16:creationId xmlns:a16="http://schemas.microsoft.com/office/drawing/2014/main" id="{6CB5251D-D47D-2C67-3FA1-351CBC712275}"/>
+                    <a16:creationId xmlns:a16="http://schemas.microsoft.com/office/drawing/2014/main" id="{AD272AE6-F946-85A5-F6D5-B87C017934F3}"/>
                   </a:ext>
                 </a:extLst>
               </p:cNvPr>
@@ -14639,8 +14586,8 @@
             </p:nvSpPr>
             <p:spPr>
               <a:xfrm>
-                <a:off x="133350" y="4971038"/>
-                <a:ext cx="3097125" cy="261610"/>
+                <a:off x="24093" y="158273"/>
+                <a:ext cx="3239999" cy="261610"/>
               </a:xfrm>
               <a:prstGeom prst="rect">
                 <a:avLst/>
@@ -14653,25 +14600,33 @@
               </a:bodyPr>
               <a:lstStyle/>
               <a:p>
+                <a:pPr algn="ctr"/>
                 <a:r>
-                  <a:rPr lang="fr-FR" sz="1100" u="sng" dirty="0">
+                  <a:rPr lang="fr-FR" sz="1100" b="1" dirty="0" err="1">
                     <a:solidFill>
                       <a:schemeClr val="bg1"/>
                     </a:solidFill>
                     <a:latin typeface="Arial" panose="020B0604020202020204" pitchFamily="34" charset="0"/>
                     <a:cs typeface="Arial" panose="020B0604020202020204" pitchFamily="34" charset="0"/>
                   </a:rPr>
-                  <a:t>Type</a:t>
+                  <a:t>Filters</a:t>
                 </a:r>
+                <a:endParaRPr lang="fr-FR" sz="1100" b="1" dirty="0">
+                  <a:solidFill>
+                    <a:schemeClr val="bg1"/>
+                  </a:solidFill>
+                  <a:latin typeface="Arial" panose="020B0604020202020204" pitchFamily="34" charset="0"/>
+                  <a:cs typeface="Arial" panose="020B0604020202020204" pitchFamily="34" charset="0"/>
+                </a:endParaRPr>
               </a:p>
             </p:txBody>
           </p:sp>
           <p:grpSp>
             <p:nvGrpSpPr>
-              <p:cNvPr id="41" name="Groupe 40">
+              <p:cNvPr id="49" name="Groupe 48">
                 <a:extLst>
                   <a:ext uri="{FF2B5EF4-FFF2-40B4-BE49-F238E27FC236}">
-                    <a16:creationId xmlns:a16="http://schemas.microsoft.com/office/drawing/2014/main" id="{B9E04803-37A0-79F2-D4BB-A573D31F00B6}"/>
+                    <a16:creationId xmlns:a16="http://schemas.microsoft.com/office/drawing/2014/main" id="{3F69DC67-DE5B-688F-945A-6E7E14A16AB1}"/>
                   </a:ext>
                 </a:extLst>
               </p:cNvPr>
@@ -14682,79 +14637,18 @@
             </p:nvGrpSpPr>
             <p:grpSpPr>
               <a:xfrm>
-                <a:off x="431763" y="5345897"/>
-                <a:ext cx="2677197" cy="261610"/>
-                <a:chOff x="431763" y="5345897"/>
-                <a:chExt cx="2677197" cy="261610"/>
+                <a:off x="166967" y="447931"/>
+                <a:ext cx="3097125" cy="1212734"/>
+                <a:chOff x="133350" y="4971038"/>
+                <a:chExt cx="3097125" cy="1212734"/>
               </a:xfrm>
             </p:grpSpPr>
             <p:sp>
               <p:nvSpPr>
-                <p:cNvPr id="39" name="Rectangle : coins arrondis 38">
+                <p:cNvPr id="38" name="ZoneTexte 37">
                   <a:extLst>
                     <a:ext uri="{FF2B5EF4-FFF2-40B4-BE49-F238E27FC236}">
-                      <a16:creationId xmlns:a16="http://schemas.microsoft.com/office/drawing/2014/main" id="{96A3957E-1495-AD8D-9A13-15911FF6A227}"/>
-                    </a:ext>
-                  </a:extLst>
-                </p:cNvPr>
-                <p:cNvSpPr>
-                  <a:spLocks/>
-                </p:cNvSpPr>
-                <p:nvPr/>
-              </p:nvSpPr>
-              <p:spPr>
-                <a:xfrm>
-                  <a:off x="431763" y="5386702"/>
-                  <a:ext cx="180000" cy="180000"/>
-                </a:xfrm>
-                <a:prstGeom prst="roundRect">
-                  <a:avLst>
-                    <a:gd name="adj" fmla="val 7623"/>
-                  </a:avLst>
-                </a:prstGeom>
-                <a:solidFill>
-                  <a:schemeClr val="tx1"/>
-                </a:solidFill>
-                <a:ln>
-                  <a:solidFill>
-                    <a:schemeClr val="bg2">
-                      <a:lumMod val="75000"/>
-                      <a:lumOff val="25000"/>
-                    </a:schemeClr>
-                  </a:solidFill>
-                </a:ln>
-              </p:spPr>
-              <p:style>
-                <a:lnRef idx="2">
-                  <a:schemeClr val="accent1">
-                    <a:shade val="50000"/>
-                  </a:schemeClr>
-                </a:lnRef>
-                <a:fillRef idx="1">
-                  <a:schemeClr val="accent1"/>
-                </a:fillRef>
-                <a:effectRef idx="0">
-                  <a:schemeClr val="accent1"/>
-                </a:effectRef>
-                <a:fontRef idx="minor">
-                  <a:schemeClr val="lt1"/>
-                </a:fontRef>
-              </p:style>
-              <p:txBody>
-                <a:bodyPr rtlCol="0" anchor="ctr"/>
-                <a:lstStyle/>
-                <a:p>
-                  <a:pPr algn="ctr"/>
-                  <a:endParaRPr lang="en-US"/>
-                </a:p>
-              </p:txBody>
-            </p:sp>
-            <p:sp>
-              <p:nvSpPr>
-                <p:cNvPr id="40" name="ZoneTexte 39">
-                  <a:extLst>
-                    <a:ext uri="{FF2B5EF4-FFF2-40B4-BE49-F238E27FC236}">
-                      <a16:creationId xmlns:a16="http://schemas.microsoft.com/office/drawing/2014/main" id="{7ED3C262-2F75-3755-CBC8-89CAC0E7D5D6}"/>
+                      <a16:creationId xmlns:a16="http://schemas.microsoft.com/office/drawing/2014/main" id="{6CB5251D-D47D-2C67-3FA1-351CBC712275}"/>
                     </a:ext>
                   </a:extLst>
                 </p:cNvPr>
@@ -14765,8 +14659,8 @@
               </p:nvSpPr>
               <p:spPr>
                 <a:xfrm>
-                  <a:off x="673569" y="5345897"/>
-                  <a:ext cx="2435391" cy="261610"/>
+                  <a:off x="133350" y="4971038"/>
+                  <a:ext cx="3097125" cy="261610"/>
                 </a:xfrm>
                 <a:prstGeom prst="rect">
                   <a:avLst/>
@@ -14780,307 +14674,434 @@
                 <a:lstStyle/>
                 <a:p>
                   <a:r>
-                    <a:rPr lang="fr-FR" sz="1100" dirty="0">
+                    <a:rPr lang="fr-FR" sz="1100" u="sng" dirty="0">
                       <a:solidFill>
-                        <a:schemeClr val="bg2">
-                          <a:lumMod val="75000"/>
-                          <a:lumOff val="25000"/>
-                        </a:schemeClr>
+                        <a:schemeClr val="bg1"/>
                       </a:solidFill>
                       <a:latin typeface="Arial" panose="020B0604020202020204" pitchFamily="34" charset="0"/>
                       <a:cs typeface="Arial" panose="020B0604020202020204" pitchFamily="34" charset="0"/>
                     </a:rPr>
-                    <a:t>Photo (120/300)</a:t>
+                    <a:t>Type</a:t>
                   </a:r>
                 </a:p>
               </p:txBody>
             </p:sp>
-          </p:grpSp>
-          <p:grpSp>
-            <p:nvGrpSpPr>
-              <p:cNvPr id="42" name="Groupe 41">
-                <a:extLst>
-                  <a:ext uri="{FF2B5EF4-FFF2-40B4-BE49-F238E27FC236}">
-                    <a16:creationId xmlns:a16="http://schemas.microsoft.com/office/drawing/2014/main" id="{2B76BBCF-61B9-507A-DBC7-1A6690E0A866}"/>
-                  </a:ext>
-                </a:extLst>
-              </p:cNvPr>
-              <p:cNvGrpSpPr>
-                <a:grpSpLocks/>
-              </p:cNvGrpSpPr>
-              <p:nvPr/>
-            </p:nvGrpSpPr>
-            <p:grpSpPr>
-              <a:xfrm>
-                <a:off x="431763" y="5634030"/>
-                <a:ext cx="2677197" cy="261610"/>
-                <a:chOff x="431763" y="5345897"/>
-                <a:chExt cx="2677197" cy="261610"/>
-              </a:xfrm>
-            </p:grpSpPr>
-            <p:sp>
-              <p:nvSpPr>
-                <p:cNvPr id="43" name="Rectangle : coins arrondis 42">
+            <p:grpSp>
+              <p:nvGrpSpPr>
+                <p:cNvPr id="41" name="Groupe 40">
                   <a:extLst>
                     <a:ext uri="{FF2B5EF4-FFF2-40B4-BE49-F238E27FC236}">
-                      <a16:creationId xmlns:a16="http://schemas.microsoft.com/office/drawing/2014/main" id="{F768445E-1210-FD77-9652-E9D80346DF8A}"/>
+                      <a16:creationId xmlns:a16="http://schemas.microsoft.com/office/drawing/2014/main" id="{B9E04803-37A0-79F2-D4BB-A573D31F00B6}"/>
                     </a:ext>
                   </a:extLst>
                 </p:cNvPr>
-                <p:cNvSpPr>
-                  <a:spLocks/>
-                </p:cNvSpPr>
+                <p:cNvGrpSpPr>
+                  <a:grpSpLocks/>
+                </p:cNvGrpSpPr>
                 <p:nvPr/>
-              </p:nvSpPr>
-              <p:spPr>
+              </p:nvGrpSpPr>
+              <p:grpSpPr>
                 <a:xfrm>
-                  <a:off x="431763" y="5386702"/>
-                  <a:ext cx="180000" cy="180000"/>
+                  <a:off x="431763" y="5345897"/>
+                  <a:ext cx="2677197" cy="261610"/>
+                  <a:chOff x="431763" y="5345897"/>
+                  <a:chExt cx="2677197" cy="261610"/>
                 </a:xfrm>
-                <a:prstGeom prst="roundRect">
-                  <a:avLst>
-                    <a:gd name="adj" fmla="val 7623"/>
-                  </a:avLst>
-                </a:prstGeom>
-                <a:solidFill>
-                  <a:schemeClr val="tx1"/>
-                </a:solidFill>
-                <a:ln>
+              </p:grpSpPr>
+              <p:sp>
+                <p:nvSpPr>
+                  <p:cNvPr id="39" name="Rectangle : coins arrondis 38">
+                    <a:extLst>
+                      <a:ext uri="{FF2B5EF4-FFF2-40B4-BE49-F238E27FC236}">
+                        <a16:creationId xmlns:a16="http://schemas.microsoft.com/office/drawing/2014/main" id="{96A3957E-1495-AD8D-9A13-15911FF6A227}"/>
+                      </a:ext>
+                    </a:extLst>
+                  </p:cNvPr>
+                  <p:cNvSpPr>
+                    <a:spLocks/>
+                  </p:cNvSpPr>
+                  <p:nvPr/>
+                </p:nvSpPr>
+                <p:spPr>
+                  <a:xfrm>
+                    <a:off x="431763" y="5386702"/>
+                    <a:ext cx="180000" cy="180000"/>
+                  </a:xfrm>
+                  <a:prstGeom prst="roundRect">
+                    <a:avLst>
+                      <a:gd name="adj" fmla="val 7623"/>
+                    </a:avLst>
+                  </a:prstGeom>
                   <a:solidFill>
-                    <a:schemeClr val="bg2">
-                      <a:lumMod val="75000"/>
-                      <a:lumOff val="25000"/>
+                    <a:schemeClr val="tx1"/>
+                  </a:solidFill>
+                  <a:ln>
+                    <a:solidFill>
+                      <a:schemeClr val="bg2">
+                        <a:lumMod val="75000"/>
+                        <a:lumOff val="25000"/>
+                      </a:schemeClr>
+                    </a:solidFill>
+                  </a:ln>
+                </p:spPr>
+                <p:style>
+                  <a:lnRef idx="2">
+                    <a:schemeClr val="accent1">
+                      <a:shade val="50000"/>
                     </a:schemeClr>
-                  </a:solidFill>
-                </a:ln>
-              </p:spPr>
-              <p:style>
-                <a:lnRef idx="2">
-                  <a:schemeClr val="accent1">
-                    <a:shade val="50000"/>
-                  </a:schemeClr>
-                </a:lnRef>
-                <a:fillRef idx="1">
-                  <a:schemeClr val="accent1"/>
-                </a:fillRef>
-                <a:effectRef idx="0">
-                  <a:schemeClr val="accent1"/>
-                </a:effectRef>
-                <a:fontRef idx="minor">
-                  <a:schemeClr val="lt1"/>
-                </a:fontRef>
-              </p:style>
-              <p:txBody>
-                <a:bodyPr rtlCol="0" anchor="ctr"/>
-                <a:lstStyle/>
-                <a:p>
-                  <a:pPr algn="ctr"/>
-                  <a:endParaRPr lang="en-US"/>
-                </a:p>
-              </p:txBody>
-            </p:sp>
-            <p:sp>
-              <p:nvSpPr>
-                <p:cNvPr id="44" name="ZoneTexte 43">
+                  </a:lnRef>
+                  <a:fillRef idx="1">
+                    <a:schemeClr val="accent1"/>
+                  </a:fillRef>
+                  <a:effectRef idx="0">
+                    <a:schemeClr val="accent1"/>
+                  </a:effectRef>
+                  <a:fontRef idx="minor">
+                    <a:schemeClr val="lt1"/>
+                  </a:fontRef>
+                </p:style>
+                <p:txBody>
+                  <a:bodyPr rtlCol="0" anchor="ctr"/>
+                  <a:lstStyle/>
+                  <a:p>
+                    <a:pPr algn="ctr"/>
+                    <a:endParaRPr lang="en-US"/>
+                  </a:p>
+                </p:txBody>
+              </p:sp>
+              <p:sp>
+                <p:nvSpPr>
+                  <p:cNvPr id="40" name="ZoneTexte 39">
+                    <a:extLst>
+                      <a:ext uri="{FF2B5EF4-FFF2-40B4-BE49-F238E27FC236}">
+                        <a16:creationId xmlns:a16="http://schemas.microsoft.com/office/drawing/2014/main" id="{7ED3C262-2F75-3755-CBC8-89CAC0E7D5D6}"/>
+                      </a:ext>
+                    </a:extLst>
+                  </p:cNvPr>
+                  <p:cNvSpPr txBox="1">
+                    <a:spLocks/>
+                  </p:cNvSpPr>
+                  <p:nvPr/>
+                </p:nvSpPr>
+                <p:spPr>
+                  <a:xfrm>
+                    <a:off x="673569" y="5345897"/>
+                    <a:ext cx="2435391" cy="261610"/>
+                  </a:xfrm>
+                  <a:prstGeom prst="rect">
+                    <a:avLst/>
+                  </a:prstGeom>
+                  <a:noFill/>
+                </p:spPr>
+                <p:txBody>
+                  <a:bodyPr wrap="square" rtlCol="0">
+                    <a:spAutoFit/>
+                  </a:bodyPr>
+                  <a:lstStyle/>
+                  <a:p>
+                    <a:r>
+                      <a:rPr lang="fr-FR" sz="1100" dirty="0">
+                        <a:solidFill>
+                          <a:schemeClr val="bg2">
+                            <a:lumMod val="75000"/>
+                            <a:lumOff val="25000"/>
+                          </a:schemeClr>
+                        </a:solidFill>
+                        <a:latin typeface="Arial" panose="020B0604020202020204" pitchFamily="34" charset="0"/>
+                        <a:cs typeface="Arial" panose="020B0604020202020204" pitchFamily="34" charset="0"/>
+                      </a:rPr>
+                      <a:t>Photo (120/300)</a:t>
+                    </a:r>
+                  </a:p>
+                </p:txBody>
+              </p:sp>
+            </p:grpSp>
+            <p:grpSp>
+              <p:nvGrpSpPr>
+                <p:cNvPr id="42" name="Groupe 41">
                   <a:extLst>
                     <a:ext uri="{FF2B5EF4-FFF2-40B4-BE49-F238E27FC236}">
-                      <a16:creationId xmlns:a16="http://schemas.microsoft.com/office/drawing/2014/main" id="{62DD77CE-76E3-4B4D-10BD-D510F8A3C304}"/>
+                      <a16:creationId xmlns:a16="http://schemas.microsoft.com/office/drawing/2014/main" id="{2B76BBCF-61B9-507A-DBC7-1A6690E0A866}"/>
                     </a:ext>
                   </a:extLst>
                 </p:cNvPr>
-                <p:cNvSpPr txBox="1">
-                  <a:spLocks/>
-                </p:cNvSpPr>
+                <p:cNvGrpSpPr>
+                  <a:grpSpLocks/>
+                </p:cNvGrpSpPr>
                 <p:nvPr/>
-              </p:nvSpPr>
-              <p:spPr>
+              </p:nvGrpSpPr>
+              <p:grpSpPr>
                 <a:xfrm>
-                  <a:off x="673569" y="5345897"/>
-                  <a:ext cx="2435391" cy="261610"/>
+                  <a:off x="431763" y="5634030"/>
+                  <a:ext cx="2677197" cy="261610"/>
+                  <a:chOff x="431763" y="5345897"/>
+                  <a:chExt cx="2677197" cy="261610"/>
                 </a:xfrm>
-                <a:prstGeom prst="rect">
-                  <a:avLst/>
-                </a:prstGeom>
-                <a:noFill/>
-              </p:spPr>
-              <p:txBody>
-                <a:bodyPr wrap="square" rtlCol="0">
-                  <a:spAutoFit/>
-                </a:bodyPr>
-                <a:lstStyle/>
-                <a:p>
-                  <a:r>
-                    <a:rPr lang="fr-FR" sz="1100" dirty="0" err="1">
-                      <a:solidFill>
-                        <a:schemeClr val="bg2">
-                          <a:lumMod val="75000"/>
-                          <a:lumOff val="25000"/>
-                        </a:schemeClr>
-                      </a:solidFill>
-                      <a:latin typeface="Arial" panose="020B0604020202020204" pitchFamily="34" charset="0"/>
-                      <a:cs typeface="Arial" panose="020B0604020202020204" pitchFamily="34" charset="0"/>
-                    </a:rPr>
-                    <a:t>Dermatology</a:t>
-                  </a:r>
-                  <a:r>
-                    <a:rPr lang="fr-FR" sz="1100" dirty="0">
-                      <a:solidFill>
-                        <a:schemeClr val="bg2">
-                          <a:lumMod val="75000"/>
-                          <a:lumOff val="25000"/>
-                        </a:schemeClr>
-                      </a:solidFill>
-                      <a:latin typeface="Arial" panose="020B0604020202020204" pitchFamily="34" charset="0"/>
-                      <a:cs typeface="Arial" panose="020B0604020202020204" pitchFamily="34" charset="0"/>
-                    </a:rPr>
-                    <a:t> (150/300)</a:t>
-                  </a:r>
-                </a:p>
-              </p:txBody>
-            </p:sp>
-          </p:grpSp>
-          <p:grpSp>
-            <p:nvGrpSpPr>
-              <p:cNvPr id="45" name="Groupe 44">
-                <a:extLst>
-                  <a:ext uri="{FF2B5EF4-FFF2-40B4-BE49-F238E27FC236}">
-                    <a16:creationId xmlns:a16="http://schemas.microsoft.com/office/drawing/2014/main" id="{605B66C1-5BE0-5DC9-E8AE-D59A66C90174}"/>
-                  </a:ext>
-                </a:extLst>
-              </p:cNvPr>
-              <p:cNvGrpSpPr>
-                <a:grpSpLocks/>
-              </p:cNvGrpSpPr>
-              <p:nvPr/>
-            </p:nvGrpSpPr>
-            <p:grpSpPr>
-              <a:xfrm>
-                <a:off x="431763" y="5922162"/>
-                <a:ext cx="2677197" cy="261610"/>
-                <a:chOff x="431763" y="5345897"/>
-                <a:chExt cx="2677197" cy="261610"/>
-              </a:xfrm>
-            </p:grpSpPr>
-            <p:sp>
-              <p:nvSpPr>
-                <p:cNvPr id="46" name="Rectangle : coins arrondis 45">
+              </p:grpSpPr>
+              <p:sp>
+                <p:nvSpPr>
+                  <p:cNvPr id="43" name="Rectangle : coins arrondis 42">
+                    <a:extLst>
+                      <a:ext uri="{FF2B5EF4-FFF2-40B4-BE49-F238E27FC236}">
+                        <a16:creationId xmlns:a16="http://schemas.microsoft.com/office/drawing/2014/main" id="{F768445E-1210-FD77-9652-E9D80346DF8A}"/>
+                      </a:ext>
+                    </a:extLst>
+                  </p:cNvPr>
+                  <p:cNvSpPr>
+                    <a:spLocks/>
+                  </p:cNvSpPr>
+                  <p:nvPr/>
+                </p:nvSpPr>
+                <p:spPr>
+                  <a:xfrm>
+                    <a:off x="431763" y="5386702"/>
+                    <a:ext cx="180000" cy="180000"/>
+                  </a:xfrm>
+                  <a:prstGeom prst="roundRect">
+                    <a:avLst>
+                      <a:gd name="adj" fmla="val 7623"/>
+                    </a:avLst>
+                  </a:prstGeom>
+                  <a:solidFill>
+                    <a:schemeClr val="tx1"/>
+                  </a:solidFill>
+                  <a:ln>
+                    <a:solidFill>
+                      <a:schemeClr val="bg2">
+                        <a:lumMod val="75000"/>
+                        <a:lumOff val="25000"/>
+                      </a:schemeClr>
+                    </a:solidFill>
+                  </a:ln>
+                </p:spPr>
+                <p:style>
+                  <a:lnRef idx="2">
+                    <a:schemeClr val="accent1">
+                      <a:shade val="50000"/>
+                    </a:schemeClr>
+                  </a:lnRef>
+                  <a:fillRef idx="1">
+                    <a:schemeClr val="accent1"/>
+                  </a:fillRef>
+                  <a:effectRef idx="0">
+                    <a:schemeClr val="accent1"/>
+                  </a:effectRef>
+                  <a:fontRef idx="minor">
+                    <a:schemeClr val="lt1"/>
+                  </a:fontRef>
+                </p:style>
+                <p:txBody>
+                  <a:bodyPr rtlCol="0" anchor="ctr"/>
+                  <a:lstStyle/>
+                  <a:p>
+                    <a:pPr algn="ctr"/>
+                    <a:endParaRPr lang="en-US"/>
+                  </a:p>
+                </p:txBody>
+              </p:sp>
+              <p:sp>
+                <p:nvSpPr>
+                  <p:cNvPr id="44" name="ZoneTexte 43">
+                    <a:extLst>
+                      <a:ext uri="{FF2B5EF4-FFF2-40B4-BE49-F238E27FC236}">
+                        <a16:creationId xmlns:a16="http://schemas.microsoft.com/office/drawing/2014/main" id="{62DD77CE-76E3-4B4D-10BD-D510F8A3C304}"/>
+                      </a:ext>
+                    </a:extLst>
+                  </p:cNvPr>
+                  <p:cNvSpPr txBox="1">
+                    <a:spLocks/>
+                  </p:cNvSpPr>
+                  <p:nvPr/>
+                </p:nvSpPr>
+                <p:spPr>
+                  <a:xfrm>
+                    <a:off x="673569" y="5345897"/>
+                    <a:ext cx="2435391" cy="261610"/>
+                  </a:xfrm>
+                  <a:prstGeom prst="rect">
+                    <a:avLst/>
+                  </a:prstGeom>
+                  <a:noFill/>
+                </p:spPr>
+                <p:txBody>
+                  <a:bodyPr wrap="square" rtlCol="0">
+                    <a:spAutoFit/>
+                  </a:bodyPr>
+                  <a:lstStyle/>
+                  <a:p>
+                    <a:r>
+                      <a:rPr lang="fr-FR" sz="1100" dirty="0" err="1">
+                        <a:solidFill>
+                          <a:schemeClr val="bg2">
+                            <a:lumMod val="75000"/>
+                            <a:lumOff val="25000"/>
+                          </a:schemeClr>
+                        </a:solidFill>
+                        <a:latin typeface="Arial" panose="020B0604020202020204" pitchFamily="34" charset="0"/>
+                        <a:cs typeface="Arial" panose="020B0604020202020204" pitchFamily="34" charset="0"/>
+                      </a:rPr>
+                      <a:t>Dermatology</a:t>
+                    </a:r>
+                    <a:r>
+                      <a:rPr lang="fr-FR" sz="1100" dirty="0">
+                        <a:solidFill>
+                          <a:schemeClr val="bg2">
+                            <a:lumMod val="75000"/>
+                            <a:lumOff val="25000"/>
+                          </a:schemeClr>
+                        </a:solidFill>
+                        <a:latin typeface="Arial" panose="020B0604020202020204" pitchFamily="34" charset="0"/>
+                        <a:cs typeface="Arial" panose="020B0604020202020204" pitchFamily="34" charset="0"/>
+                      </a:rPr>
+                      <a:t> (150/300)</a:t>
+                    </a:r>
+                  </a:p>
+                </p:txBody>
+              </p:sp>
+            </p:grpSp>
+            <p:grpSp>
+              <p:nvGrpSpPr>
+                <p:cNvPr id="45" name="Groupe 44">
                   <a:extLst>
                     <a:ext uri="{FF2B5EF4-FFF2-40B4-BE49-F238E27FC236}">
-                      <a16:creationId xmlns:a16="http://schemas.microsoft.com/office/drawing/2014/main" id="{37F080F6-B7B2-E004-F1FC-C1D570749CAF}"/>
+                      <a16:creationId xmlns:a16="http://schemas.microsoft.com/office/drawing/2014/main" id="{605B66C1-5BE0-5DC9-E8AE-D59A66C90174}"/>
                     </a:ext>
                   </a:extLst>
                 </p:cNvPr>
-                <p:cNvSpPr>
-                  <a:spLocks/>
-                </p:cNvSpPr>
+                <p:cNvGrpSpPr>
+                  <a:grpSpLocks/>
+                </p:cNvGrpSpPr>
                 <p:nvPr/>
-              </p:nvSpPr>
-              <p:spPr>
+              </p:nvGrpSpPr>
+              <p:grpSpPr>
                 <a:xfrm>
-                  <a:off x="431763" y="5386702"/>
-                  <a:ext cx="180000" cy="180000"/>
+                  <a:off x="431763" y="5922162"/>
+                  <a:ext cx="2677197" cy="261610"/>
+                  <a:chOff x="431763" y="5345897"/>
+                  <a:chExt cx="2677197" cy="261610"/>
                 </a:xfrm>
-                <a:prstGeom prst="roundRect">
-                  <a:avLst>
-                    <a:gd name="adj" fmla="val 7623"/>
-                  </a:avLst>
-                </a:prstGeom>
-                <a:solidFill>
-                  <a:schemeClr val="tx1"/>
-                </a:solidFill>
-                <a:ln>
+              </p:grpSpPr>
+              <p:sp>
+                <p:nvSpPr>
+                  <p:cNvPr id="46" name="Rectangle : coins arrondis 45">
+                    <a:extLst>
+                      <a:ext uri="{FF2B5EF4-FFF2-40B4-BE49-F238E27FC236}">
+                        <a16:creationId xmlns:a16="http://schemas.microsoft.com/office/drawing/2014/main" id="{37F080F6-B7B2-E004-F1FC-C1D570749CAF}"/>
+                      </a:ext>
+                    </a:extLst>
+                  </p:cNvPr>
+                  <p:cNvSpPr>
+                    <a:spLocks/>
+                  </p:cNvSpPr>
+                  <p:nvPr/>
+                </p:nvSpPr>
+                <p:spPr>
+                  <a:xfrm>
+                    <a:off x="431763" y="5386702"/>
+                    <a:ext cx="180000" cy="180000"/>
+                  </a:xfrm>
+                  <a:prstGeom prst="roundRect">
+                    <a:avLst>
+                      <a:gd name="adj" fmla="val 7623"/>
+                    </a:avLst>
+                  </a:prstGeom>
                   <a:solidFill>
-                    <a:schemeClr val="bg2">
-                      <a:lumMod val="75000"/>
-                      <a:lumOff val="25000"/>
+                    <a:schemeClr val="tx1"/>
+                  </a:solidFill>
+                  <a:ln>
+                    <a:solidFill>
+                      <a:schemeClr val="bg2">
+                        <a:lumMod val="75000"/>
+                        <a:lumOff val="25000"/>
+                      </a:schemeClr>
+                    </a:solidFill>
+                  </a:ln>
+                </p:spPr>
+                <p:style>
+                  <a:lnRef idx="2">
+                    <a:schemeClr val="accent1">
+                      <a:shade val="50000"/>
                     </a:schemeClr>
-                  </a:solidFill>
-                </a:ln>
-              </p:spPr>
-              <p:style>
-                <a:lnRef idx="2">
-                  <a:schemeClr val="accent1">
-                    <a:shade val="50000"/>
-                  </a:schemeClr>
-                </a:lnRef>
-                <a:fillRef idx="1">
-                  <a:schemeClr val="accent1"/>
-                </a:fillRef>
-                <a:effectRef idx="0">
-                  <a:schemeClr val="accent1"/>
-                </a:effectRef>
-                <a:fontRef idx="minor">
-                  <a:schemeClr val="lt1"/>
-                </a:fontRef>
-              </p:style>
-              <p:txBody>
-                <a:bodyPr rtlCol="0" anchor="ctr"/>
-                <a:lstStyle/>
-                <a:p>
-                  <a:pPr algn="ctr"/>
-                  <a:endParaRPr lang="en-US"/>
-                </a:p>
-              </p:txBody>
-            </p:sp>
-            <p:sp>
-              <p:nvSpPr>
-                <p:cNvPr id="47" name="ZoneTexte 46">
-                  <a:extLst>
-                    <a:ext uri="{FF2B5EF4-FFF2-40B4-BE49-F238E27FC236}">
-                      <a16:creationId xmlns:a16="http://schemas.microsoft.com/office/drawing/2014/main" id="{EB98A6DC-6C31-1C43-4881-F79D70C65DE8}"/>
-                    </a:ext>
-                  </a:extLst>
-                </p:cNvPr>
-                <p:cNvSpPr txBox="1">
-                  <a:spLocks/>
-                </p:cNvSpPr>
-                <p:nvPr/>
-              </p:nvSpPr>
-              <p:spPr>
-                <a:xfrm>
-                  <a:off x="673569" y="5345897"/>
-                  <a:ext cx="2435391" cy="261610"/>
-                </a:xfrm>
-                <a:prstGeom prst="rect">
-                  <a:avLst/>
-                </a:prstGeom>
-                <a:noFill/>
-              </p:spPr>
-              <p:txBody>
-                <a:bodyPr wrap="square" rtlCol="0">
-                  <a:spAutoFit/>
-                </a:bodyPr>
-                <a:lstStyle/>
-                <a:p>
-                  <a:r>
-                    <a:rPr lang="fr-FR" sz="1100" dirty="0" err="1">
-                      <a:solidFill>
-                        <a:schemeClr val="bg2">
-                          <a:lumMod val="75000"/>
-                          <a:lumOff val="25000"/>
-                        </a:schemeClr>
-                      </a:solidFill>
-                      <a:latin typeface="Arial" panose="020B0604020202020204" pitchFamily="34" charset="0"/>
-                      <a:cs typeface="Arial" panose="020B0604020202020204" pitchFamily="34" charset="0"/>
-                    </a:rPr>
-                    <a:t>Microscopy</a:t>
-                  </a:r>
-                  <a:r>
-                    <a:rPr lang="fr-FR" sz="1100" dirty="0">
-                      <a:solidFill>
-                        <a:schemeClr val="bg2">
-                          <a:lumMod val="75000"/>
-                          <a:lumOff val="25000"/>
-                        </a:schemeClr>
-                      </a:solidFill>
-                      <a:latin typeface="Arial" panose="020B0604020202020204" pitchFamily="34" charset="0"/>
-                      <a:cs typeface="Arial" panose="020B0604020202020204" pitchFamily="34" charset="0"/>
-                    </a:rPr>
-                    <a:t> (30/300)</a:t>
-                  </a:r>
-                </a:p>
-              </p:txBody>
-            </p:sp>
+                  </a:lnRef>
+                  <a:fillRef idx="1">
+                    <a:schemeClr val="accent1"/>
+                  </a:fillRef>
+                  <a:effectRef idx="0">
+                    <a:schemeClr val="accent1"/>
+                  </a:effectRef>
+                  <a:fontRef idx="minor">
+                    <a:schemeClr val="lt1"/>
+                  </a:fontRef>
+                </p:style>
+                <p:txBody>
+                  <a:bodyPr rtlCol="0" anchor="ctr"/>
+                  <a:lstStyle/>
+                  <a:p>
+                    <a:pPr algn="ctr"/>
+                    <a:endParaRPr lang="en-US"/>
+                  </a:p>
+                </p:txBody>
+              </p:sp>
+              <p:sp>
+                <p:nvSpPr>
+                  <p:cNvPr id="47" name="ZoneTexte 46">
+                    <a:extLst>
+                      <a:ext uri="{FF2B5EF4-FFF2-40B4-BE49-F238E27FC236}">
+                        <a16:creationId xmlns:a16="http://schemas.microsoft.com/office/drawing/2014/main" id="{EB98A6DC-6C31-1C43-4881-F79D70C65DE8}"/>
+                      </a:ext>
+                    </a:extLst>
+                  </p:cNvPr>
+                  <p:cNvSpPr txBox="1">
+                    <a:spLocks/>
+                  </p:cNvSpPr>
+                  <p:nvPr/>
+                </p:nvSpPr>
+                <p:spPr>
+                  <a:xfrm>
+                    <a:off x="673569" y="5345897"/>
+                    <a:ext cx="2435391" cy="261610"/>
+                  </a:xfrm>
+                  <a:prstGeom prst="rect">
+                    <a:avLst/>
+                  </a:prstGeom>
+                  <a:noFill/>
+                </p:spPr>
+                <p:txBody>
+                  <a:bodyPr wrap="square" rtlCol="0">
+                    <a:spAutoFit/>
+                  </a:bodyPr>
+                  <a:lstStyle/>
+                  <a:p>
+                    <a:r>
+                      <a:rPr lang="fr-FR" sz="1100" dirty="0" err="1">
+                        <a:solidFill>
+                          <a:schemeClr val="bg2">
+                            <a:lumMod val="75000"/>
+                            <a:lumOff val="25000"/>
+                          </a:schemeClr>
+                        </a:solidFill>
+                        <a:latin typeface="Arial" panose="020B0604020202020204" pitchFamily="34" charset="0"/>
+                        <a:cs typeface="Arial" panose="020B0604020202020204" pitchFamily="34" charset="0"/>
+                      </a:rPr>
+                      <a:t>Microscopy</a:t>
+                    </a:r>
+                    <a:r>
+                      <a:rPr lang="fr-FR" sz="1100" dirty="0">
+                        <a:solidFill>
+                          <a:schemeClr val="bg2">
+                            <a:lumMod val="75000"/>
+                            <a:lumOff val="25000"/>
+                          </a:schemeClr>
+                        </a:solidFill>
+                        <a:latin typeface="Arial" panose="020B0604020202020204" pitchFamily="34" charset="0"/>
+                        <a:cs typeface="Arial" panose="020B0604020202020204" pitchFamily="34" charset="0"/>
+                      </a:rPr>
+                      <a:t> (30/300)</a:t>
+                    </a:r>
+                  </a:p>
+                </p:txBody>
+              </p:sp>
+            </p:grpSp>
           </p:grpSp>
         </p:grpSp>
       </p:grpSp>
@@ -15560,8 +15581,8 @@
         </p:nvSpPr>
         <p:spPr>
           <a:xfrm>
-            <a:off x="-1185" y="2156147"/>
-            <a:ext cx="3240000" cy="4701854"/>
+            <a:off x="-1185" y="3441897"/>
+            <a:ext cx="3240000" cy="3416104"/>
           </a:xfrm>
           <a:prstGeom prst="round1Rect">
             <a:avLst>
@@ -15617,7 +15638,7 @@
         </p:nvGrpSpPr>
         <p:grpSpPr>
           <a:xfrm>
-            <a:off x="-58517" y="2363995"/>
+            <a:off x="-96192" y="3770834"/>
             <a:ext cx="3239999" cy="1404942"/>
             <a:chOff x="-58517" y="2855607"/>
             <a:chExt cx="3239999" cy="1404942"/>
@@ -15770,70 +15791,6 @@
           </p:txBody>
         </p:sp>
       </p:grpSp>
-      <p:sp>
-        <p:nvSpPr>
-          <p:cNvPr id="106" name="Rectangle : coins arrondis 105">
-            <a:extLst>
-              <a:ext uri="{FF2B5EF4-FFF2-40B4-BE49-F238E27FC236}">
-                <a16:creationId xmlns:a16="http://schemas.microsoft.com/office/drawing/2014/main" id="{D3B87A01-8FA0-5E95-E804-2A5EE56E56DA}"/>
-              </a:ext>
-            </a:extLst>
-          </p:cNvPr>
-          <p:cNvSpPr/>
-          <p:nvPr/>
-        </p:nvSpPr>
-        <p:spPr>
-          <a:xfrm>
-            <a:off x="-1185" y="3892035"/>
-            <a:ext cx="3240001" cy="2965963"/>
-          </a:xfrm>
-          <a:prstGeom prst="roundRect">
-            <a:avLst>
-              <a:gd name="adj" fmla="val 0"/>
-            </a:avLst>
-          </a:prstGeom>
-          <a:solidFill>
-            <a:srgbClr val="4696FD"/>
-          </a:solidFill>
-          <a:ln>
-            <a:noFill/>
-          </a:ln>
-        </p:spPr>
-        <p:style>
-          <a:lnRef idx="2">
-            <a:schemeClr val="accent1">
-              <a:shade val="50000"/>
-            </a:schemeClr>
-          </a:lnRef>
-          <a:fillRef idx="1">
-            <a:schemeClr val="accent1"/>
-          </a:fillRef>
-          <a:effectRef idx="0">
-            <a:schemeClr val="accent1"/>
-          </a:effectRef>
-          <a:fontRef idx="minor">
-            <a:schemeClr val="lt1"/>
-          </a:fontRef>
-        </p:style>
-        <p:txBody>
-          <a:bodyPr rtlCol="0" anchor="ctr"/>
-          <a:lstStyle/>
-          <a:p>
-            <a:pPr algn="ctr"/>
-            <a:r>
-              <a:rPr lang="fr-FR" sz="2000" dirty="0" err="1">
-                <a:latin typeface="Arial" panose="020B0604020202020204" pitchFamily="34" charset="0"/>
-                <a:cs typeface="Arial" panose="020B0604020202020204" pitchFamily="34" charset="0"/>
-              </a:rPr>
-              <a:t>Preview</a:t>
-            </a:r>
-            <a:endParaRPr lang="en-US" sz="2000" dirty="0">
-              <a:latin typeface="Arial" panose="020B0604020202020204" pitchFamily="34" charset="0"/>
-              <a:cs typeface="Arial" panose="020B0604020202020204" pitchFamily="34" charset="0"/>
-            </a:endParaRPr>
-          </a:p>
-        </p:txBody>
-      </p:sp>
       <p:grpSp>
         <p:nvGrpSpPr>
           <p:cNvPr id="63" name="Groupe 62">
@@ -17730,67 +17687,6 @@
           </p:txBody>
         </p:sp>
       </p:grpSp>
-      <p:sp>
-        <p:nvSpPr>
-          <p:cNvPr id="84" name="ZoneTexte 83">
-            <a:extLst>
-              <a:ext uri="{FF2B5EF4-FFF2-40B4-BE49-F238E27FC236}">
-                <a16:creationId xmlns:a16="http://schemas.microsoft.com/office/drawing/2014/main" id="{43173BA7-F16A-07E9-EFB0-B061087CA540}"/>
-              </a:ext>
-            </a:extLst>
-          </p:cNvPr>
-          <p:cNvSpPr txBox="1">
-            <a:spLocks/>
-          </p:cNvSpPr>
-          <p:nvPr/>
-        </p:nvSpPr>
-        <p:spPr>
-          <a:xfrm>
-            <a:off x="4895059" y="1151569"/>
-            <a:ext cx="2577657" cy="276999"/>
-          </a:xfrm>
-          <a:prstGeom prst="rect">
-            <a:avLst/>
-          </a:prstGeom>
-          <a:noFill/>
-        </p:spPr>
-        <p:txBody>
-          <a:bodyPr wrap="square" rtlCol="0">
-            <a:spAutoFit/>
-          </a:bodyPr>
-          <a:lstStyle/>
-          <a:p>
-            <a:pPr algn="ctr"/>
-            <a:r>
-              <a:rPr lang="fr-FR" sz="1200" b="1" dirty="0">
-                <a:solidFill>
-                  <a:schemeClr val="bg1"/>
-                </a:solidFill>
-                <a:latin typeface="Arial" panose="020B0604020202020204" pitchFamily="34" charset="0"/>
-                <a:cs typeface="Arial" panose="020B0604020202020204" pitchFamily="34" charset="0"/>
-              </a:rPr>
-              <a:t>Information </a:t>
-            </a:r>
-            <a:r>
-              <a:rPr lang="fr-FR" sz="1200" b="1" dirty="0" err="1">
-                <a:solidFill>
-                  <a:schemeClr val="bg1"/>
-                </a:solidFill>
-                <a:latin typeface="Arial" panose="020B0604020202020204" pitchFamily="34" charset="0"/>
-                <a:cs typeface="Arial" panose="020B0604020202020204" pitchFamily="34" charset="0"/>
-              </a:rPr>
-              <a:t>required</a:t>
-            </a:r>
-            <a:endParaRPr lang="fr-FR" sz="1200" b="1" dirty="0">
-              <a:solidFill>
-                <a:schemeClr val="bg1"/>
-              </a:solidFill>
-              <a:latin typeface="Arial" panose="020B0604020202020204" pitchFamily="34" charset="0"/>
-              <a:cs typeface="Arial" panose="020B0604020202020204" pitchFamily="34" charset="0"/>
-            </a:endParaRPr>
-          </a:p>
-        </p:txBody>
-      </p:sp>
       <p:graphicFrame>
         <p:nvGraphicFramePr>
           <p:cNvPr id="53" name="Tableau 38">
@@ -18504,6 +18400,16 @@
                 <a:p>
                   <a:pPr algn="ctr"/>
                   <a:r>
+                    <a:rPr lang="fr-FR" sz="1200" dirty="0" err="1">
+                      <a:solidFill>
+                        <a:schemeClr val="bg1"/>
+                      </a:solidFill>
+                      <a:latin typeface="Arial" panose="020B0604020202020204" pitchFamily="34" charset="0"/>
+                      <a:cs typeface="Arial" panose="020B0604020202020204" pitchFamily="34" charset="0"/>
+                    </a:rPr>
+                    <a:t>Medical</a:t>
+                  </a:r>
+                  <a:r>
                     <a:rPr lang="fr-FR" sz="1200" dirty="0">
                       <a:solidFill>
                         <a:schemeClr val="bg1"/>
@@ -18511,7 +18417,7 @@
                       <a:latin typeface="Arial" panose="020B0604020202020204" pitchFamily="34" charset="0"/>
                       <a:cs typeface="Arial" panose="020B0604020202020204" pitchFamily="34" charset="0"/>
                     </a:rPr>
-                    <a:t>Photos</a:t>
+                    <a:t> image</a:t>
                   </a:r>
                 </a:p>
               </p:txBody>
@@ -18768,7 +18674,7 @@
                       <a:latin typeface="Arial" panose="020B0604020202020204" pitchFamily="34" charset="0"/>
                       <a:cs typeface="Arial" panose="020B0604020202020204" pitchFamily="34" charset="0"/>
                     </a:rPr>
-                    <a:t>Dermatoscope</a:t>
+                    <a:t>Dermatoscopy</a:t>
                   </a:r>
                   <a:endParaRPr lang="fr-FR" sz="1200" dirty="0">
                     <a:solidFill>
@@ -19220,6 +19126,562 @@
           </a:p>
         </p:txBody>
       </p:sp>
+      <p:grpSp>
+        <p:nvGrpSpPr>
+          <p:cNvPr id="13" name="Groupe 12">
+            <a:extLst>
+              <a:ext uri="{FF2B5EF4-FFF2-40B4-BE49-F238E27FC236}">
+                <a16:creationId xmlns:a16="http://schemas.microsoft.com/office/drawing/2014/main" id="{7F770CA5-2524-126E-BC8D-B0D5B2F2F19D}"/>
+              </a:ext>
+            </a:extLst>
+          </p:cNvPr>
+          <p:cNvGrpSpPr/>
+          <p:nvPr/>
+        </p:nvGrpSpPr>
+        <p:grpSpPr>
+          <a:xfrm>
+            <a:off x="7557900" y="1294140"/>
+            <a:ext cx="3002862" cy="979970"/>
+            <a:chOff x="8014762" y="1297973"/>
+            <a:chExt cx="3002862" cy="979970"/>
+          </a:xfrm>
+        </p:grpSpPr>
+        <p:sp>
+          <p:nvSpPr>
+            <p:cNvPr id="36" name="ZoneTexte 35">
+              <a:extLst>
+                <a:ext uri="{FF2B5EF4-FFF2-40B4-BE49-F238E27FC236}">
+                  <a16:creationId xmlns:a16="http://schemas.microsoft.com/office/drawing/2014/main" id="{BDE65B3D-0DC1-3A16-0536-F1AC86214B3E}"/>
+                </a:ext>
+              </a:extLst>
+            </p:cNvPr>
+            <p:cNvSpPr txBox="1">
+              <a:spLocks/>
+            </p:cNvSpPr>
+            <p:nvPr/>
+          </p:nvSpPr>
+          <p:spPr>
+            <a:xfrm>
+              <a:off x="8014762" y="1297973"/>
+              <a:ext cx="3002862" cy="276999"/>
+            </a:xfrm>
+            <a:prstGeom prst="rect">
+              <a:avLst/>
+            </a:prstGeom>
+            <a:noFill/>
+          </p:spPr>
+          <p:txBody>
+            <a:bodyPr wrap="square" rtlCol="0">
+              <a:spAutoFit/>
+            </a:bodyPr>
+            <a:lstStyle/>
+            <a:p>
+              <a:pPr algn="ctr"/>
+              <a:r>
+                <a:rPr lang="fr-FR" sz="1200" b="1" dirty="0">
+                  <a:solidFill>
+                    <a:schemeClr val="bg1"/>
+                  </a:solidFill>
+                  <a:latin typeface="Arial" panose="020B0604020202020204" pitchFamily="34" charset="0"/>
+                  <a:cs typeface="Arial" panose="020B0604020202020204" pitchFamily="34" charset="0"/>
+                </a:rPr>
+                <a:t>Skin </a:t>
+              </a:r>
+              <a:r>
+                <a:rPr lang="fr-FR" sz="1200" b="1" dirty="0" err="1">
+                  <a:solidFill>
+                    <a:schemeClr val="bg1"/>
+                  </a:solidFill>
+                  <a:latin typeface="Arial" panose="020B0604020202020204" pitchFamily="34" charset="0"/>
+                  <a:cs typeface="Arial" panose="020B0604020202020204" pitchFamily="34" charset="0"/>
+                </a:rPr>
+                <a:t>lesion</a:t>
+              </a:r>
+              <a:r>
+                <a:rPr lang="fr-FR" sz="1200" b="1" dirty="0">
+                  <a:solidFill>
+                    <a:schemeClr val="bg1"/>
+                  </a:solidFill>
+                  <a:latin typeface="Arial" panose="020B0604020202020204" pitchFamily="34" charset="0"/>
+                  <a:cs typeface="Arial" panose="020B0604020202020204" pitchFamily="34" charset="0"/>
+                </a:rPr>
+                <a:t> </a:t>
+              </a:r>
+              <a:r>
+                <a:rPr lang="fr-FR" sz="1200" b="1" dirty="0" err="1">
+                  <a:solidFill>
+                    <a:schemeClr val="bg1"/>
+                  </a:solidFill>
+                  <a:latin typeface="Arial" panose="020B0604020202020204" pitchFamily="34" charset="0"/>
+                  <a:cs typeface="Arial" panose="020B0604020202020204" pitchFamily="34" charset="0"/>
+                </a:rPr>
+                <a:t>caracteristics</a:t>
+              </a:r>
+              <a:r>
+                <a:rPr lang="fr-FR" sz="1200" b="1" dirty="0">
+                  <a:solidFill>
+                    <a:schemeClr val="bg1"/>
+                  </a:solidFill>
+                  <a:latin typeface="Arial" panose="020B0604020202020204" pitchFamily="34" charset="0"/>
+                  <a:cs typeface="Arial" panose="020B0604020202020204" pitchFamily="34" charset="0"/>
+                </a:rPr>
+                <a:t> </a:t>
+              </a:r>
+              <a:r>
+                <a:rPr lang="fr-FR" sz="1200" b="1" dirty="0" err="1">
+                  <a:solidFill>
+                    <a:schemeClr val="bg1"/>
+                  </a:solidFill>
+                  <a:latin typeface="Arial" panose="020B0604020202020204" pitchFamily="34" charset="0"/>
+                  <a:cs typeface="Arial" panose="020B0604020202020204" pitchFamily="34" charset="0"/>
+                </a:rPr>
+                <a:t>requires</a:t>
+              </a:r>
+              <a:endParaRPr lang="fr-FR" sz="1200" b="1" dirty="0">
+                <a:solidFill>
+                  <a:schemeClr val="bg1"/>
+                </a:solidFill>
+                <a:latin typeface="Arial" panose="020B0604020202020204" pitchFamily="34" charset="0"/>
+                <a:cs typeface="Arial" panose="020B0604020202020204" pitchFamily="34" charset="0"/>
+              </a:endParaRPr>
+            </a:p>
+          </p:txBody>
+        </p:sp>
+        <p:sp>
+          <p:nvSpPr>
+            <p:cNvPr id="37" name="ZoneTexte 36">
+              <a:extLst>
+                <a:ext uri="{FF2B5EF4-FFF2-40B4-BE49-F238E27FC236}">
+                  <a16:creationId xmlns:a16="http://schemas.microsoft.com/office/drawing/2014/main" id="{E22259D9-9746-FE9D-943D-AF6E06BE60F4}"/>
+                </a:ext>
+              </a:extLst>
+            </p:cNvPr>
+            <p:cNvSpPr txBox="1">
+              <a:spLocks/>
+            </p:cNvSpPr>
+            <p:nvPr/>
+          </p:nvSpPr>
+          <p:spPr>
+            <a:xfrm>
+              <a:off x="8570574" y="1631612"/>
+              <a:ext cx="1891239" cy="646331"/>
+            </a:xfrm>
+            <a:prstGeom prst="rect">
+              <a:avLst/>
+            </a:prstGeom>
+            <a:noFill/>
+          </p:spPr>
+          <p:txBody>
+            <a:bodyPr wrap="square" rtlCol="0">
+              <a:spAutoFit/>
+            </a:bodyPr>
+            <a:lstStyle/>
+            <a:p>
+              <a:r>
+                <a:rPr lang="fr-FR" sz="1200" dirty="0" err="1">
+                  <a:solidFill>
+                    <a:schemeClr val="bg1"/>
+                  </a:solidFill>
+                  <a:latin typeface="Arial" panose="020B0604020202020204" pitchFamily="34" charset="0"/>
+                  <a:cs typeface="Arial" panose="020B0604020202020204" pitchFamily="34" charset="0"/>
+                </a:rPr>
+                <a:t>Diameter</a:t>
+              </a:r>
+              <a:endParaRPr lang="fr-FR" sz="1200" dirty="0">
+                <a:solidFill>
+                  <a:schemeClr val="bg1"/>
+                </a:solidFill>
+                <a:latin typeface="Arial" panose="020B0604020202020204" pitchFamily="34" charset="0"/>
+                <a:cs typeface="Arial" panose="020B0604020202020204" pitchFamily="34" charset="0"/>
+              </a:endParaRPr>
+            </a:p>
+            <a:p>
+              <a:endParaRPr lang="fr-FR" sz="1200" dirty="0">
+                <a:solidFill>
+                  <a:schemeClr val="bg1"/>
+                </a:solidFill>
+                <a:latin typeface="Arial" panose="020B0604020202020204" pitchFamily="34" charset="0"/>
+                <a:cs typeface="Arial" panose="020B0604020202020204" pitchFamily="34" charset="0"/>
+              </a:endParaRPr>
+            </a:p>
+            <a:p>
+              <a:r>
+                <a:rPr lang="fr-FR" sz="1200" dirty="0" err="1">
+                  <a:solidFill>
+                    <a:schemeClr val="bg1"/>
+                  </a:solidFill>
+                  <a:latin typeface="Arial" panose="020B0604020202020204" pitchFamily="34" charset="0"/>
+                  <a:cs typeface="Arial" panose="020B0604020202020204" pitchFamily="34" charset="0"/>
+                </a:rPr>
+                <a:t>Color</a:t>
+              </a:r>
+              <a:endParaRPr lang="fr-FR" sz="1200" dirty="0">
+                <a:solidFill>
+                  <a:schemeClr val="bg1"/>
+                </a:solidFill>
+                <a:latin typeface="Arial" panose="020B0604020202020204" pitchFamily="34" charset="0"/>
+                <a:cs typeface="Arial" panose="020B0604020202020204" pitchFamily="34" charset="0"/>
+              </a:endParaRPr>
+            </a:p>
+          </p:txBody>
+        </p:sp>
+        <p:pic>
+          <p:nvPicPr>
+            <p:cNvPr id="8" name="Graphique 7" descr="Coche avec un remplissage uni">
+              <a:extLst>
+                <a:ext uri="{FF2B5EF4-FFF2-40B4-BE49-F238E27FC236}">
+                  <a16:creationId xmlns:a16="http://schemas.microsoft.com/office/drawing/2014/main" id="{D80DF378-4A16-E67F-8047-A9C666078D12}"/>
+                </a:ext>
+              </a:extLst>
+            </p:cNvPr>
+            <p:cNvPicPr>
+              <a:picLocks noChangeAspect="1"/>
+            </p:cNvPicPr>
+            <p:nvPr/>
+          </p:nvPicPr>
+          <p:blipFill>
+            <a:blip r:embed="rId3">
+              <a:extLst>
+                <a:ext uri="{28A0092B-C50C-407E-A947-70E740481C1C}">
+                  <a14:useLocalDpi xmlns:a14="http://schemas.microsoft.com/office/drawing/2010/main" val="0"/>
+                </a:ext>
+                <a:ext uri="{96DAC541-7B7A-43D3-8B79-37D633B846F1}">
+                  <asvg:svgBlip xmlns:asvg="http://schemas.microsoft.com/office/drawing/2016/SVG/main" r:embed="rId4"/>
+                </a:ext>
+              </a:extLst>
+            </a:blip>
+            <a:stretch>
+              <a:fillRect/>
+            </a:stretch>
+          </p:blipFill>
+          <p:spPr>
+            <a:xfrm>
+              <a:off x="8382419" y="1718925"/>
+              <a:ext cx="166025" cy="166025"/>
+            </a:xfrm>
+            <a:prstGeom prst="rect">
+              <a:avLst/>
+            </a:prstGeom>
+          </p:spPr>
+        </p:pic>
+        <p:pic>
+          <p:nvPicPr>
+            <p:cNvPr id="11" name="Graphique 10" descr="Fermer avec un remplissage uni">
+              <a:extLst>
+                <a:ext uri="{FF2B5EF4-FFF2-40B4-BE49-F238E27FC236}">
+                  <a16:creationId xmlns:a16="http://schemas.microsoft.com/office/drawing/2014/main" id="{35D1111C-FFD7-C8C7-1843-938EE5417D97}"/>
+                </a:ext>
+              </a:extLst>
+            </p:cNvPr>
+            <p:cNvPicPr>
+              <a:picLocks noChangeAspect="1"/>
+            </p:cNvPicPr>
+            <p:nvPr/>
+          </p:nvPicPr>
+          <p:blipFill>
+            <a:blip r:embed="rId5">
+              <a:extLst>
+                <a:ext uri="{28A0092B-C50C-407E-A947-70E740481C1C}">
+                  <a14:useLocalDpi xmlns:a14="http://schemas.microsoft.com/office/drawing/2010/main" val="0"/>
+                </a:ext>
+                <a:ext uri="{96DAC541-7B7A-43D3-8B79-37D633B846F1}">
+                  <asvg:svgBlip xmlns:asvg="http://schemas.microsoft.com/office/drawing/2016/SVG/main" r:embed="rId6"/>
+                </a:ext>
+              </a:extLst>
+            </a:blip>
+            <a:stretch>
+              <a:fillRect/>
+            </a:stretch>
+          </p:blipFill>
+          <p:spPr>
+            <a:xfrm>
+              <a:off x="8382419" y="2075230"/>
+              <a:ext cx="166025" cy="166025"/>
+            </a:xfrm>
+            <a:prstGeom prst="rect">
+              <a:avLst/>
+            </a:prstGeom>
+          </p:spPr>
+        </p:pic>
+      </p:grpSp>
+      <p:grpSp>
+        <p:nvGrpSpPr>
+          <p:cNvPr id="12" name="Groupe 11">
+            <a:extLst>
+              <a:ext uri="{FF2B5EF4-FFF2-40B4-BE49-F238E27FC236}">
+                <a16:creationId xmlns:a16="http://schemas.microsoft.com/office/drawing/2014/main" id="{468B2288-C844-FE47-55D1-F319CF4DBD2E}"/>
+              </a:ext>
+            </a:extLst>
+          </p:cNvPr>
+          <p:cNvGrpSpPr/>
+          <p:nvPr/>
+        </p:nvGrpSpPr>
+        <p:grpSpPr>
+          <a:xfrm>
+            <a:off x="2342923" y="1340747"/>
+            <a:ext cx="2577657" cy="968738"/>
+            <a:chOff x="1370864" y="1307892"/>
+            <a:chExt cx="2577657" cy="968738"/>
+          </a:xfrm>
+        </p:grpSpPr>
+        <p:sp>
+          <p:nvSpPr>
+            <p:cNvPr id="84" name="ZoneTexte 83">
+              <a:extLst>
+                <a:ext uri="{FF2B5EF4-FFF2-40B4-BE49-F238E27FC236}">
+                  <a16:creationId xmlns:a16="http://schemas.microsoft.com/office/drawing/2014/main" id="{43173BA7-F16A-07E9-EFB0-B061087CA540}"/>
+                </a:ext>
+              </a:extLst>
+            </p:cNvPr>
+            <p:cNvSpPr txBox="1">
+              <a:spLocks/>
+            </p:cNvSpPr>
+            <p:nvPr/>
+          </p:nvSpPr>
+          <p:spPr>
+            <a:xfrm>
+              <a:off x="1370864" y="1307892"/>
+              <a:ext cx="2577657" cy="276999"/>
+            </a:xfrm>
+            <a:prstGeom prst="rect">
+              <a:avLst/>
+            </a:prstGeom>
+            <a:noFill/>
+          </p:spPr>
+          <p:txBody>
+            <a:bodyPr wrap="square" rtlCol="0">
+              <a:spAutoFit/>
+            </a:bodyPr>
+            <a:lstStyle/>
+            <a:p>
+              <a:pPr algn="ctr"/>
+              <a:r>
+                <a:rPr lang="fr-FR" sz="1200" b="1" dirty="0">
+                  <a:solidFill>
+                    <a:schemeClr val="bg1"/>
+                  </a:solidFill>
+                  <a:latin typeface="Arial" panose="020B0604020202020204" pitchFamily="34" charset="0"/>
+                  <a:cs typeface="Arial" panose="020B0604020202020204" pitchFamily="34" charset="0"/>
+                </a:rPr>
+                <a:t>Patient Information </a:t>
+              </a:r>
+              <a:r>
+                <a:rPr lang="fr-FR" sz="1200" b="1" dirty="0" err="1">
+                  <a:solidFill>
+                    <a:schemeClr val="bg1"/>
+                  </a:solidFill>
+                  <a:latin typeface="Arial" panose="020B0604020202020204" pitchFamily="34" charset="0"/>
+                  <a:cs typeface="Arial" panose="020B0604020202020204" pitchFamily="34" charset="0"/>
+                </a:rPr>
+                <a:t>required</a:t>
+              </a:r>
+              <a:endParaRPr lang="fr-FR" sz="1200" b="1" dirty="0">
+                <a:solidFill>
+                  <a:schemeClr val="bg1"/>
+                </a:solidFill>
+                <a:latin typeface="Arial" panose="020B0604020202020204" pitchFamily="34" charset="0"/>
+                <a:cs typeface="Arial" panose="020B0604020202020204" pitchFamily="34" charset="0"/>
+              </a:endParaRPr>
+            </a:p>
+          </p:txBody>
+        </p:sp>
+        <p:sp>
+          <p:nvSpPr>
+            <p:cNvPr id="35" name="ZoneTexte 34">
+              <a:extLst>
+                <a:ext uri="{FF2B5EF4-FFF2-40B4-BE49-F238E27FC236}">
+                  <a16:creationId xmlns:a16="http://schemas.microsoft.com/office/drawing/2014/main" id="{0421E5E3-315B-F72C-470F-5BF33783580E}"/>
+                </a:ext>
+              </a:extLst>
+            </p:cNvPr>
+            <p:cNvSpPr txBox="1">
+              <a:spLocks/>
+            </p:cNvSpPr>
+            <p:nvPr/>
+          </p:nvSpPr>
+          <p:spPr>
+            <a:xfrm>
+              <a:off x="1744225" y="1630299"/>
+              <a:ext cx="2204296" cy="646331"/>
+            </a:xfrm>
+            <a:prstGeom prst="rect">
+              <a:avLst/>
+            </a:prstGeom>
+            <a:noFill/>
+          </p:spPr>
+          <p:txBody>
+            <a:bodyPr wrap="square" rtlCol="0">
+              <a:spAutoFit/>
+            </a:bodyPr>
+            <a:lstStyle/>
+            <a:p>
+              <a:r>
+                <a:rPr lang="fr-FR" sz="1200" dirty="0" err="1">
+                  <a:solidFill>
+                    <a:schemeClr val="bg1"/>
+                  </a:solidFill>
+                  <a:latin typeface="Arial" panose="020B0604020202020204" pitchFamily="34" charset="0"/>
+                  <a:cs typeface="Arial" panose="020B0604020202020204" pitchFamily="34" charset="0"/>
+                </a:rPr>
+                <a:t>Eyes</a:t>
+              </a:r>
+              <a:r>
+                <a:rPr lang="fr-FR" sz="1200" dirty="0">
+                  <a:solidFill>
+                    <a:schemeClr val="bg1"/>
+                  </a:solidFill>
+                  <a:latin typeface="Arial" panose="020B0604020202020204" pitchFamily="34" charset="0"/>
+                  <a:cs typeface="Arial" panose="020B0604020202020204" pitchFamily="34" charset="0"/>
+                </a:rPr>
+                <a:t> </a:t>
+              </a:r>
+              <a:r>
+                <a:rPr lang="fr-FR" sz="1200" dirty="0" err="1">
+                  <a:solidFill>
+                    <a:schemeClr val="bg1"/>
+                  </a:solidFill>
+                  <a:latin typeface="Arial" panose="020B0604020202020204" pitchFamily="34" charset="0"/>
+                  <a:cs typeface="Arial" panose="020B0604020202020204" pitchFamily="34" charset="0"/>
+                </a:rPr>
+                <a:t>color</a:t>
+              </a:r>
+              <a:endParaRPr lang="fr-FR" sz="1200" dirty="0">
+                <a:solidFill>
+                  <a:schemeClr val="bg1"/>
+                </a:solidFill>
+                <a:latin typeface="Arial" panose="020B0604020202020204" pitchFamily="34" charset="0"/>
+                <a:cs typeface="Arial" panose="020B0604020202020204" pitchFamily="34" charset="0"/>
+              </a:endParaRPr>
+            </a:p>
+            <a:p>
+              <a:endParaRPr lang="fr-FR" sz="1200" dirty="0">
+                <a:solidFill>
+                  <a:schemeClr val="bg1"/>
+                </a:solidFill>
+                <a:latin typeface="Arial" panose="020B0604020202020204" pitchFamily="34" charset="0"/>
+                <a:cs typeface="Arial" panose="020B0604020202020204" pitchFamily="34" charset="0"/>
+              </a:endParaRPr>
+            </a:p>
+            <a:p>
+              <a:r>
+                <a:rPr lang="fr-FR" sz="1200" dirty="0" err="1">
+                  <a:solidFill>
+                    <a:schemeClr val="bg1"/>
+                  </a:solidFill>
+                  <a:latin typeface="Arial" panose="020B0604020202020204" pitchFamily="34" charset="0"/>
+                  <a:cs typeface="Arial" panose="020B0604020202020204" pitchFamily="34" charset="0"/>
+                </a:rPr>
+                <a:t>Hairs</a:t>
+              </a:r>
+              <a:r>
+                <a:rPr lang="fr-FR" sz="1200" dirty="0">
+                  <a:solidFill>
+                    <a:schemeClr val="bg1"/>
+                  </a:solidFill>
+                  <a:latin typeface="Arial" panose="020B0604020202020204" pitchFamily="34" charset="0"/>
+                  <a:cs typeface="Arial" panose="020B0604020202020204" pitchFamily="34" charset="0"/>
+                </a:rPr>
+                <a:t> </a:t>
+              </a:r>
+              <a:r>
+                <a:rPr lang="fr-FR" sz="1200" dirty="0" err="1">
+                  <a:solidFill>
+                    <a:schemeClr val="bg1"/>
+                  </a:solidFill>
+                  <a:latin typeface="Arial" panose="020B0604020202020204" pitchFamily="34" charset="0"/>
+                  <a:cs typeface="Arial" panose="020B0604020202020204" pitchFamily="34" charset="0"/>
+                </a:rPr>
+                <a:t>color</a:t>
+              </a:r>
+              <a:endParaRPr lang="fr-FR" sz="1200" dirty="0">
+                <a:solidFill>
+                  <a:schemeClr val="bg1"/>
+                </a:solidFill>
+                <a:latin typeface="Arial" panose="020B0604020202020204" pitchFamily="34" charset="0"/>
+                <a:cs typeface="Arial" panose="020B0604020202020204" pitchFamily="34" charset="0"/>
+              </a:endParaRPr>
+            </a:p>
+          </p:txBody>
+        </p:sp>
+        <p:pic>
+          <p:nvPicPr>
+            <p:cNvPr id="42" name="Graphique 41" descr="Coche avec un remplissage uni">
+              <a:extLst>
+                <a:ext uri="{FF2B5EF4-FFF2-40B4-BE49-F238E27FC236}">
+                  <a16:creationId xmlns:a16="http://schemas.microsoft.com/office/drawing/2014/main" id="{70BB1278-1A12-C142-73F7-746FC2476EA7}"/>
+                </a:ext>
+              </a:extLst>
+            </p:cNvPr>
+            <p:cNvPicPr>
+              <a:picLocks noChangeAspect="1"/>
+            </p:cNvPicPr>
+            <p:nvPr/>
+          </p:nvPicPr>
+          <p:blipFill>
+            <a:blip r:embed="rId3">
+              <a:extLst>
+                <a:ext uri="{28A0092B-C50C-407E-A947-70E740481C1C}">
+                  <a14:useLocalDpi xmlns:a14="http://schemas.microsoft.com/office/drawing/2010/main" val="0"/>
+                </a:ext>
+                <a:ext uri="{96DAC541-7B7A-43D3-8B79-37D633B846F1}">
+                  <asvg:svgBlip xmlns:asvg="http://schemas.microsoft.com/office/drawing/2016/SVG/main" r:embed="rId4"/>
+                </a:ext>
+              </a:extLst>
+            </a:blip>
+            <a:stretch>
+              <a:fillRect/>
+            </a:stretch>
+          </p:blipFill>
+          <p:spPr>
+            <a:xfrm>
+              <a:off x="1578200" y="1682359"/>
+              <a:ext cx="166025" cy="166025"/>
+            </a:xfrm>
+            <a:prstGeom prst="rect">
+              <a:avLst/>
+            </a:prstGeom>
+          </p:spPr>
+        </p:pic>
+        <p:pic>
+          <p:nvPicPr>
+            <p:cNvPr id="43" name="Graphique 42" descr="Coche avec un remplissage uni">
+              <a:extLst>
+                <a:ext uri="{FF2B5EF4-FFF2-40B4-BE49-F238E27FC236}">
+                  <a16:creationId xmlns:a16="http://schemas.microsoft.com/office/drawing/2014/main" id="{6E41483A-52A8-CB9A-6DFF-CF9978A45B37}"/>
+                </a:ext>
+              </a:extLst>
+            </p:cNvPr>
+            <p:cNvPicPr>
+              <a:picLocks noChangeAspect="1"/>
+            </p:cNvPicPr>
+            <p:nvPr/>
+          </p:nvPicPr>
+          <p:blipFill>
+            <a:blip r:embed="rId3">
+              <a:extLst>
+                <a:ext uri="{28A0092B-C50C-407E-A947-70E740481C1C}">
+                  <a14:useLocalDpi xmlns:a14="http://schemas.microsoft.com/office/drawing/2010/main" val="0"/>
+                </a:ext>
+                <a:ext uri="{96DAC541-7B7A-43D3-8B79-37D633B846F1}">
+                  <asvg:svgBlip xmlns:asvg="http://schemas.microsoft.com/office/drawing/2016/SVG/main" r:embed="rId4"/>
+                </a:ext>
+              </a:extLst>
+            </a:blip>
+            <a:stretch>
+              <a:fillRect/>
+            </a:stretch>
+          </p:blipFill>
+          <p:spPr>
+            <a:xfrm>
+              <a:off x="1556070" y="2075230"/>
+              <a:ext cx="166025" cy="166025"/>
+            </a:xfrm>
+            <a:prstGeom prst="rect">
+              <a:avLst/>
+            </a:prstGeom>
+          </p:spPr>
+        </p:pic>
+      </p:grpSp>
     </p:spTree>
     <p:extLst>
       <p:ext uri="{BB962C8B-B14F-4D97-AF65-F5344CB8AC3E}">

</xml_diff>

<commit_message>
logo creation, ai launch view modeled
</commit_message>
<xml_diff>
--- a/app model/Skin app.pptx
+++ b/app model/Skin app.pptx
@@ -17456,13 +17456,13 @@
             </a:extLst>
           </p:cNvPr>
           <p:cNvSpPr>
-            <a:spLocks noGrp="1" noRot="1" noMove="1" noResize="1" noEditPoints="1" noAdjustHandles="1" noChangeArrowheads="1" noChangeShapeType="1"/>
+            <a:spLocks/>
           </p:cNvSpPr>
           <p:nvPr/>
         </p:nvSpPr>
         <p:spPr>
           <a:xfrm>
-            <a:off x="0" y="0"/>
+            <a:off x="0" y="-8754"/>
             <a:ext cx="12192000" cy="6858000"/>
           </a:xfrm>
           <a:prstGeom prst="roundRect">
@@ -17687,256 +17687,6 @@
           </p:txBody>
         </p:sp>
       </p:grpSp>
-      <p:graphicFrame>
-        <p:nvGraphicFramePr>
-          <p:cNvPr id="53" name="Tableau 38">
-            <a:extLst>
-              <a:ext uri="{FF2B5EF4-FFF2-40B4-BE49-F238E27FC236}">
-                <a16:creationId xmlns:a16="http://schemas.microsoft.com/office/drawing/2014/main" id="{8B730156-5B2C-08D0-DC60-6A03A4229707}"/>
-              </a:ext>
-            </a:extLst>
-          </p:cNvPr>
-          <p:cNvGraphicFramePr>
-            <a:graphicFrameLocks noGrp="1"/>
-          </p:cNvGraphicFramePr>
-          <p:nvPr>
-            <p:extLst>
-              <p:ext uri="{D42A27DB-BD31-4B8C-83A1-F6EECF244321}">
-                <p14:modId xmlns:p14="http://schemas.microsoft.com/office/powerpoint/2010/main" val="786403928"/>
-              </p:ext>
-            </p:extLst>
-          </p:nvPr>
-        </p:nvGraphicFramePr>
-        <p:xfrm>
-          <a:off x="1744225" y="747927"/>
-          <a:ext cx="8735472" cy="426720"/>
-        </p:xfrm>
-        <a:graphic>
-          <a:graphicData uri="http://schemas.openxmlformats.org/drawingml/2006/table">
-            <a:tbl>
-              <a:tblPr firstRow="1" bandRow="1">
-                <a:tableStyleId>{2D5ABB26-0587-4C30-8999-92F81FD0307C}</a:tableStyleId>
-              </a:tblPr>
-              <a:tblGrid>
-                <a:gridCol w="2183868">
-                  <a:extLst>
-                    <a:ext uri="{9D8B030D-6E8A-4147-A177-3AD203B41FA5}">
-                      <a16:colId xmlns:a16="http://schemas.microsoft.com/office/drawing/2014/main" val="406760850"/>
-                    </a:ext>
-                  </a:extLst>
-                </a:gridCol>
-                <a:gridCol w="2183868">
-                  <a:extLst>
-                    <a:ext uri="{9D8B030D-6E8A-4147-A177-3AD203B41FA5}">
-                      <a16:colId xmlns:a16="http://schemas.microsoft.com/office/drawing/2014/main" val="2418708713"/>
-                    </a:ext>
-                  </a:extLst>
-                </a:gridCol>
-                <a:gridCol w="2183868">
-                  <a:extLst>
-                    <a:ext uri="{9D8B030D-6E8A-4147-A177-3AD203B41FA5}">
-                      <a16:colId xmlns:a16="http://schemas.microsoft.com/office/drawing/2014/main" val="2484746027"/>
-                    </a:ext>
-                  </a:extLst>
-                </a:gridCol>
-                <a:gridCol w="2183868">
-                  <a:extLst>
-                    <a:ext uri="{9D8B030D-6E8A-4147-A177-3AD203B41FA5}">
-                      <a16:colId xmlns:a16="http://schemas.microsoft.com/office/drawing/2014/main" val="4190157478"/>
-                    </a:ext>
-                  </a:extLst>
-                </a:gridCol>
-              </a:tblGrid>
-              <a:tr h="370840">
-                <a:tc>
-                  <a:txBody>
-                    <a:bodyPr/>
-                    <a:lstStyle/>
-                    <a:p>
-                      <a:r>
-                        <a:rPr lang="fr-FR" sz="1100" dirty="0">
-                          <a:solidFill>
-                            <a:schemeClr val="tx2">
-                              <a:lumMod val="75000"/>
-                            </a:schemeClr>
-                          </a:solidFill>
-                          <a:latin typeface="Arial" panose="020B0604020202020204" pitchFamily="34" charset="0"/>
-                          <a:cs typeface="Arial" panose="020B0604020202020204" pitchFamily="34" charset="0"/>
-                        </a:rPr>
-                        <a:t>Location: </a:t>
-                      </a:r>
-                      <a:r>
-                        <a:rPr lang="fr-FR" sz="1100" dirty="0" err="1">
-                          <a:solidFill>
-                            <a:schemeClr val="tx2">
-                              <a:lumMod val="75000"/>
-                            </a:schemeClr>
-                          </a:solidFill>
-                          <a:latin typeface="Arial" panose="020B0604020202020204" pitchFamily="34" charset="0"/>
-                          <a:cs typeface="Arial" panose="020B0604020202020204" pitchFamily="34" charset="0"/>
-                        </a:rPr>
-                        <a:t>Ear</a:t>
-                      </a:r>
-                      <a:r>
-                        <a:rPr lang="fr-FR" sz="1100" dirty="0">
-                          <a:solidFill>
-                            <a:schemeClr val="tx2">
-                              <a:lumMod val="75000"/>
-                            </a:schemeClr>
-                          </a:solidFill>
-                          <a:latin typeface="Arial" panose="020B0604020202020204" pitchFamily="34" charset="0"/>
-                          <a:cs typeface="Arial" panose="020B0604020202020204" pitchFamily="34" charset="0"/>
-                        </a:rPr>
-                        <a:t> </a:t>
-                      </a:r>
-                      <a:endParaRPr lang="en-US" sz="1100" dirty="0">
-                        <a:solidFill>
-                          <a:schemeClr val="tx2">
-                            <a:lumMod val="75000"/>
-                          </a:schemeClr>
-                        </a:solidFill>
-                      </a:endParaRPr>
-                    </a:p>
-                  </a:txBody>
-                  <a:tcPr/>
-                </a:tc>
-                <a:tc>
-                  <a:txBody>
-                    <a:bodyPr/>
-                    <a:lstStyle/>
-                    <a:p>
-                      <a:r>
-                        <a:rPr lang="fr-FR" sz="1100" dirty="0">
-                          <a:solidFill>
-                            <a:schemeClr val="tx2">
-                              <a:lumMod val="75000"/>
-                            </a:schemeClr>
-                          </a:solidFill>
-                          <a:latin typeface="Arial" panose="020B0604020202020204" pitchFamily="34" charset="0"/>
-                          <a:cs typeface="Arial" panose="020B0604020202020204" pitchFamily="34" charset="0"/>
-                        </a:rPr>
-                        <a:t>Patient ID: 34AD </a:t>
-                      </a:r>
-                      <a:endParaRPr lang="en-US" sz="1100" dirty="0">
-                        <a:solidFill>
-                          <a:schemeClr val="tx2">
-                            <a:lumMod val="75000"/>
-                          </a:schemeClr>
-                        </a:solidFill>
-                      </a:endParaRPr>
-                    </a:p>
-                  </a:txBody>
-                  <a:tcPr/>
-                </a:tc>
-                <a:tc>
-                  <a:txBody>
-                    <a:bodyPr/>
-                    <a:lstStyle/>
-                    <a:p>
-                      <a:r>
-                        <a:rPr lang="fr-FR" sz="1100" dirty="0">
-                          <a:solidFill>
-                            <a:schemeClr val="tx2">
-                              <a:lumMod val="75000"/>
-                            </a:schemeClr>
-                          </a:solidFill>
-                          <a:latin typeface="Arial" panose="020B0604020202020204" pitchFamily="34" charset="0"/>
-                          <a:cs typeface="Arial" panose="020B0604020202020204" pitchFamily="34" charset="0"/>
-                        </a:rPr>
-                        <a:t>Name: Agustin</a:t>
-                      </a:r>
-                      <a:endParaRPr lang="en-US" sz="1100" dirty="0">
-                        <a:solidFill>
-                          <a:schemeClr val="tx2">
-                            <a:lumMod val="75000"/>
-                          </a:schemeClr>
-                        </a:solidFill>
-                      </a:endParaRPr>
-                    </a:p>
-                  </a:txBody>
-                  <a:tcPr/>
-                </a:tc>
-                <a:tc>
-                  <a:txBody>
-                    <a:bodyPr/>
-                    <a:lstStyle/>
-                    <a:p>
-                      <a:pPr marL="0" marR="0" lvl="0" indent="0" algn="l" defTabSz="457200" rtl="0" eaLnBrk="1" fontAlgn="auto" latinLnBrk="0" hangingPunct="1">
-                        <a:lnSpc>
-                          <a:spcPct val="100000"/>
-                        </a:lnSpc>
-                        <a:spcBef>
-                          <a:spcPts val="0"/>
-                        </a:spcBef>
-                        <a:spcAft>
-                          <a:spcPts val="0"/>
-                        </a:spcAft>
-                        <a:buClrTx/>
-                        <a:buSzTx/>
-                        <a:buFontTx/>
-                        <a:buNone/>
-                        <a:tabLst/>
-                        <a:defRPr/>
-                      </a:pPr>
-                      <a:r>
-                        <a:rPr lang="fr-FR" sz="1100" dirty="0">
-                          <a:solidFill>
-                            <a:schemeClr val="tx2">
-                              <a:lumMod val="75000"/>
-                            </a:schemeClr>
-                          </a:solidFill>
-                          <a:latin typeface="Arial" panose="020B0604020202020204" pitchFamily="34" charset="0"/>
-                          <a:cs typeface="Arial" panose="020B0604020202020204" pitchFamily="34" charset="0"/>
-                        </a:rPr>
-                        <a:t>Last </a:t>
-                      </a:r>
-                      <a:r>
-                        <a:rPr lang="fr-FR" sz="1100" dirty="0" err="1">
-                          <a:solidFill>
-                            <a:schemeClr val="tx2">
-                              <a:lumMod val="75000"/>
-                            </a:schemeClr>
-                          </a:solidFill>
-                          <a:latin typeface="Arial" panose="020B0604020202020204" pitchFamily="34" charset="0"/>
-                          <a:cs typeface="Arial" panose="020B0604020202020204" pitchFamily="34" charset="0"/>
-                        </a:rPr>
-                        <a:t>name</a:t>
-                      </a:r>
-                      <a:r>
-                        <a:rPr lang="fr-FR" sz="1100" dirty="0">
-                          <a:solidFill>
-                            <a:schemeClr val="tx2">
-                              <a:lumMod val="75000"/>
-                            </a:schemeClr>
-                          </a:solidFill>
-                          <a:latin typeface="Arial" panose="020B0604020202020204" pitchFamily="34" charset="0"/>
-                          <a:cs typeface="Arial" panose="020B0604020202020204" pitchFamily="34" charset="0"/>
-                        </a:rPr>
-                        <a:t>: CARTAYA</a:t>
-                      </a:r>
-                    </a:p>
-                    <a:p>
-                      <a:endParaRPr lang="en-US" sz="1100" dirty="0">
-                        <a:solidFill>
-                          <a:schemeClr val="tx2">
-                            <a:lumMod val="75000"/>
-                          </a:schemeClr>
-                        </a:solidFill>
-                      </a:endParaRPr>
-                    </a:p>
-                  </a:txBody>
-                  <a:tcPr/>
-                </a:tc>
-                <a:extLst>
-                  <a:ext uri="{0D108BD9-81ED-4DB2-BD59-A6C34878D82A}">
-                    <a16:rowId xmlns:a16="http://schemas.microsoft.com/office/drawing/2014/main" val="2915439410"/>
-                  </a:ext>
-                </a:extLst>
-              </a:tr>
-            </a:tbl>
-          </a:graphicData>
-        </a:graphic>
-      </p:graphicFrame>
       <p:sp>
         <p:nvSpPr>
           <p:cNvPr id="163" name="Rectangle : coins arrondis 162">
@@ -17952,8 +17702,8 @@
         </p:nvSpPr>
         <p:spPr>
           <a:xfrm>
-            <a:off x="3882540" y="5900168"/>
-            <a:ext cx="5103718" cy="587273"/>
+            <a:off x="4660912" y="6156186"/>
+            <a:ext cx="2870176" cy="480920"/>
           </a:xfrm>
           <a:prstGeom prst="roundRect">
             <a:avLst/>
@@ -18002,10 +17752,10 @@
       </p:sp>
       <p:grpSp>
         <p:nvGrpSpPr>
-          <p:cNvPr id="3" name="Groupe 2">
+          <p:cNvPr id="6" name="Groupe 5">
             <a:extLst>
               <a:ext uri="{FF2B5EF4-FFF2-40B4-BE49-F238E27FC236}">
-                <a16:creationId xmlns:a16="http://schemas.microsoft.com/office/drawing/2014/main" id="{D6730B8A-6D59-DA1E-AAD9-EF4141C7FD37}"/>
+                <a16:creationId xmlns:a16="http://schemas.microsoft.com/office/drawing/2014/main" id="{A0607322-9249-BEE5-0B61-FFB319D9ECB0}"/>
               </a:ext>
             </a:extLst>
           </p:cNvPr>
@@ -18014,18 +17764,18 @@
         </p:nvGrpSpPr>
         <p:grpSpPr>
           <a:xfrm>
-            <a:off x="1314503" y="2916949"/>
-            <a:ext cx="9887914" cy="2224116"/>
-            <a:chOff x="1314503" y="2916949"/>
-            <a:chExt cx="9887914" cy="2224116"/>
+            <a:off x="1968766" y="851479"/>
+            <a:ext cx="8254469" cy="1421480"/>
+            <a:chOff x="1946293" y="851479"/>
+            <a:chExt cx="8254469" cy="1421480"/>
           </a:xfrm>
         </p:grpSpPr>
         <p:grpSp>
           <p:nvGrpSpPr>
-            <p:cNvPr id="2" name="Groupe 1">
+            <p:cNvPr id="13" name="Groupe 12">
               <a:extLst>
                 <a:ext uri="{FF2B5EF4-FFF2-40B4-BE49-F238E27FC236}">
-                  <a16:creationId xmlns:a16="http://schemas.microsoft.com/office/drawing/2014/main" id="{E8867095-0D1F-BCEF-CFF4-223F6D0BBA38}"/>
+                  <a16:creationId xmlns:a16="http://schemas.microsoft.com/office/drawing/2014/main" id="{7F770CA5-2524-126E-BC8D-B0D5B2F2F19D}"/>
                 </a:ext>
               </a:extLst>
             </p:cNvPr>
@@ -18034,18 +17784,18 @@
           </p:nvGrpSpPr>
           <p:grpSpPr>
             <a:xfrm>
-              <a:off x="1314503" y="2916949"/>
-              <a:ext cx="9887914" cy="1671374"/>
-              <a:chOff x="1252478" y="2139278"/>
-              <a:chExt cx="9887914" cy="1671374"/>
+              <a:off x="7197900" y="1292989"/>
+              <a:ext cx="3002862" cy="979970"/>
+              <a:chOff x="8014762" y="1297973"/>
+              <a:chExt cx="3002862" cy="979970"/>
             </a:xfrm>
           </p:grpSpPr>
           <p:sp>
             <p:nvSpPr>
-              <p:cNvPr id="55" name="ZoneTexte 54">
+              <p:cNvPr id="36" name="ZoneTexte 35">
                 <a:extLst>
                   <a:ext uri="{FF2B5EF4-FFF2-40B4-BE49-F238E27FC236}">
-                    <a16:creationId xmlns:a16="http://schemas.microsoft.com/office/drawing/2014/main" id="{CD6EFFEF-EE84-6CEF-A737-3416BDC24B92}"/>
+                    <a16:creationId xmlns:a16="http://schemas.microsoft.com/office/drawing/2014/main" id="{BDE65B3D-0DC1-3A16-0536-F1AC86214B3E}"/>
                   </a:ext>
                 </a:extLst>
               </p:cNvPr>
@@ -18056,7 +17806,245 @@
             </p:nvSpPr>
             <p:spPr>
               <a:xfrm>
-                <a:off x="4901147" y="2139278"/>
+                <a:off x="8014762" y="1297973"/>
+                <a:ext cx="3002862" cy="276999"/>
+              </a:xfrm>
+              <a:prstGeom prst="rect">
+                <a:avLst/>
+              </a:prstGeom>
+              <a:noFill/>
+            </p:spPr>
+            <p:txBody>
+              <a:bodyPr wrap="square" rtlCol="0">
+                <a:spAutoFit/>
+              </a:bodyPr>
+              <a:lstStyle/>
+              <a:p>
+                <a:pPr algn="ctr"/>
+                <a:r>
+                  <a:rPr lang="fr-FR" sz="1200" b="1" dirty="0">
+                    <a:solidFill>
+                      <a:schemeClr val="bg1"/>
+                    </a:solidFill>
+                    <a:latin typeface="Arial" panose="020B0604020202020204" pitchFamily="34" charset="0"/>
+                    <a:cs typeface="Arial" panose="020B0604020202020204" pitchFamily="34" charset="0"/>
+                  </a:rPr>
+                  <a:t>Skin </a:t>
+                </a:r>
+                <a:r>
+                  <a:rPr lang="fr-FR" sz="1200" b="1" dirty="0" err="1">
+                    <a:solidFill>
+                      <a:schemeClr val="bg1"/>
+                    </a:solidFill>
+                    <a:latin typeface="Arial" panose="020B0604020202020204" pitchFamily="34" charset="0"/>
+                    <a:cs typeface="Arial" panose="020B0604020202020204" pitchFamily="34" charset="0"/>
+                  </a:rPr>
+                  <a:t>lesion</a:t>
+                </a:r>
+                <a:endParaRPr lang="fr-FR" sz="1200" b="1" dirty="0">
+                  <a:solidFill>
+                    <a:schemeClr val="bg1"/>
+                  </a:solidFill>
+                  <a:latin typeface="Arial" panose="020B0604020202020204" pitchFamily="34" charset="0"/>
+                  <a:cs typeface="Arial" panose="020B0604020202020204" pitchFamily="34" charset="0"/>
+                </a:endParaRPr>
+              </a:p>
+            </p:txBody>
+          </p:sp>
+          <p:sp>
+            <p:nvSpPr>
+              <p:cNvPr id="37" name="ZoneTexte 36">
+                <a:extLst>
+                  <a:ext uri="{FF2B5EF4-FFF2-40B4-BE49-F238E27FC236}">
+                    <a16:creationId xmlns:a16="http://schemas.microsoft.com/office/drawing/2014/main" id="{E22259D9-9746-FE9D-943D-AF6E06BE60F4}"/>
+                  </a:ext>
+                </a:extLst>
+              </p:cNvPr>
+              <p:cNvSpPr txBox="1">
+                <a:spLocks/>
+              </p:cNvSpPr>
+              <p:nvPr/>
+            </p:nvSpPr>
+            <p:spPr>
+              <a:xfrm>
+                <a:off x="8570574" y="1631612"/>
+                <a:ext cx="1891239" cy="646331"/>
+              </a:xfrm>
+              <a:prstGeom prst="rect">
+                <a:avLst/>
+              </a:prstGeom>
+              <a:noFill/>
+            </p:spPr>
+            <p:txBody>
+              <a:bodyPr wrap="square" rtlCol="0">
+                <a:spAutoFit/>
+              </a:bodyPr>
+              <a:lstStyle/>
+              <a:p>
+                <a:r>
+                  <a:rPr lang="fr-FR" sz="1200" dirty="0" err="1">
+                    <a:solidFill>
+                      <a:schemeClr val="bg1"/>
+                    </a:solidFill>
+                    <a:latin typeface="Arial" panose="020B0604020202020204" pitchFamily="34" charset="0"/>
+                    <a:cs typeface="Arial" panose="020B0604020202020204" pitchFamily="34" charset="0"/>
+                  </a:rPr>
+                  <a:t>Diameter</a:t>
+                </a:r>
+                <a:endParaRPr lang="fr-FR" sz="1200" dirty="0">
+                  <a:solidFill>
+                    <a:schemeClr val="bg1"/>
+                  </a:solidFill>
+                  <a:latin typeface="Arial" panose="020B0604020202020204" pitchFamily="34" charset="0"/>
+                  <a:cs typeface="Arial" panose="020B0604020202020204" pitchFamily="34" charset="0"/>
+                </a:endParaRPr>
+              </a:p>
+              <a:p>
+                <a:endParaRPr lang="fr-FR" sz="1200" dirty="0">
+                  <a:solidFill>
+                    <a:schemeClr val="bg1"/>
+                  </a:solidFill>
+                  <a:latin typeface="Arial" panose="020B0604020202020204" pitchFamily="34" charset="0"/>
+                  <a:cs typeface="Arial" panose="020B0604020202020204" pitchFamily="34" charset="0"/>
+                </a:endParaRPr>
+              </a:p>
+              <a:p>
+                <a:r>
+                  <a:rPr lang="fr-FR" sz="1200" dirty="0" err="1">
+                    <a:solidFill>
+                      <a:schemeClr val="bg1"/>
+                    </a:solidFill>
+                    <a:latin typeface="Arial" panose="020B0604020202020204" pitchFamily="34" charset="0"/>
+                    <a:cs typeface="Arial" panose="020B0604020202020204" pitchFamily="34" charset="0"/>
+                  </a:rPr>
+                  <a:t>Color</a:t>
+                </a:r>
+                <a:endParaRPr lang="fr-FR" sz="1200" dirty="0">
+                  <a:solidFill>
+                    <a:schemeClr val="bg1"/>
+                  </a:solidFill>
+                  <a:latin typeface="Arial" panose="020B0604020202020204" pitchFamily="34" charset="0"/>
+                  <a:cs typeface="Arial" panose="020B0604020202020204" pitchFamily="34" charset="0"/>
+                </a:endParaRPr>
+              </a:p>
+            </p:txBody>
+          </p:sp>
+          <p:pic>
+            <p:nvPicPr>
+              <p:cNvPr id="8" name="Graphique 7" descr="Coche avec un remplissage uni">
+                <a:extLst>
+                  <a:ext uri="{FF2B5EF4-FFF2-40B4-BE49-F238E27FC236}">
+                    <a16:creationId xmlns:a16="http://schemas.microsoft.com/office/drawing/2014/main" id="{D80DF378-4A16-E67F-8047-A9C666078D12}"/>
+                  </a:ext>
+                </a:extLst>
+              </p:cNvPr>
+              <p:cNvPicPr>
+                <a:picLocks noChangeAspect="1"/>
+              </p:cNvPicPr>
+              <p:nvPr/>
+            </p:nvPicPr>
+            <p:blipFill>
+              <a:blip r:embed="rId3">
+                <a:extLst>
+                  <a:ext uri="{28A0092B-C50C-407E-A947-70E740481C1C}">
+                    <a14:useLocalDpi xmlns:a14="http://schemas.microsoft.com/office/drawing/2010/main" val="0"/>
+                  </a:ext>
+                  <a:ext uri="{96DAC541-7B7A-43D3-8B79-37D633B846F1}">
+                    <asvg:svgBlip xmlns:asvg="http://schemas.microsoft.com/office/drawing/2016/SVG/main" r:embed="rId4"/>
+                  </a:ext>
+                </a:extLst>
+              </a:blip>
+              <a:stretch>
+                <a:fillRect/>
+              </a:stretch>
+            </p:blipFill>
+            <p:spPr>
+              <a:xfrm>
+                <a:off x="8382419" y="1718925"/>
+                <a:ext cx="166025" cy="166025"/>
+              </a:xfrm>
+              <a:prstGeom prst="rect">
+                <a:avLst/>
+              </a:prstGeom>
+            </p:spPr>
+          </p:pic>
+          <p:pic>
+            <p:nvPicPr>
+              <p:cNvPr id="11" name="Graphique 10" descr="Fermer avec un remplissage uni">
+                <a:extLst>
+                  <a:ext uri="{FF2B5EF4-FFF2-40B4-BE49-F238E27FC236}">
+                    <a16:creationId xmlns:a16="http://schemas.microsoft.com/office/drawing/2014/main" id="{35D1111C-FFD7-C8C7-1843-938EE5417D97}"/>
+                  </a:ext>
+                </a:extLst>
+              </p:cNvPr>
+              <p:cNvPicPr>
+                <a:picLocks noChangeAspect="1"/>
+              </p:cNvPicPr>
+              <p:nvPr/>
+            </p:nvPicPr>
+            <p:blipFill>
+              <a:blip r:embed="rId5">
+                <a:extLst>
+                  <a:ext uri="{28A0092B-C50C-407E-A947-70E740481C1C}">
+                    <a14:useLocalDpi xmlns:a14="http://schemas.microsoft.com/office/drawing/2010/main" val="0"/>
+                  </a:ext>
+                  <a:ext uri="{96DAC541-7B7A-43D3-8B79-37D633B846F1}">
+                    <asvg:svgBlip xmlns:asvg="http://schemas.microsoft.com/office/drawing/2016/SVG/main" r:embed="rId6"/>
+                  </a:ext>
+                </a:extLst>
+              </a:blip>
+              <a:stretch>
+                <a:fillRect/>
+              </a:stretch>
+            </p:blipFill>
+            <p:spPr>
+              <a:xfrm>
+                <a:off x="8382419" y="2075230"/>
+                <a:ext cx="166025" cy="166025"/>
+              </a:xfrm>
+              <a:prstGeom prst="rect">
+                <a:avLst/>
+              </a:prstGeom>
+            </p:spPr>
+          </p:pic>
+        </p:grpSp>
+        <p:grpSp>
+          <p:nvGrpSpPr>
+            <p:cNvPr id="12" name="Groupe 11">
+              <a:extLst>
+                <a:ext uri="{FF2B5EF4-FFF2-40B4-BE49-F238E27FC236}">
+                  <a16:creationId xmlns:a16="http://schemas.microsoft.com/office/drawing/2014/main" id="{468B2288-C844-FE47-55D1-F319CF4DBD2E}"/>
+                </a:ext>
+              </a:extLst>
+            </p:cNvPr>
+            <p:cNvGrpSpPr/>
+            <p:nvPr/>
+          </p:nvGrpSpPr>
+          <p:grpSpPr>
+            <a:xfrm>
+              <a:off x="1946293" y="1298605"/>
+              <a:ext cx="2577657" cy="968738"/>
+              <a:chOff x="1370864" y="1307892"/>
+              <a:chExt cx="2577657" cy="968738"/>
+            </a:xfrm>
+          </p:grpSpPr>
+          <p:sp>
+            <p:nvSpPr>
+              <p:cNvPr id="84" name="ZoneTexte 83">
+                <a:extLst>
+                  <a:ext uri="{FF2B5EF4-FFF2-40B4-BE49-F238E27FC236}">
+                    <a16:creationId xmlns:a16="http://schemas.microsoft.com/office/drawing/2014/main" id="{43173BA7-F16A-07E9-EFB0-B061087CA540}"/>
+                  </a:ext>
+                </a:extLst>
+              </p:cNvPr>
+              <p:cNvSpPr txBox="1">
+                <a:spLocks/>
+              </p:cNvSpPr>
+              <p:nvPr/>
+            </p:nvSpPr>
+            <p:spPr>
+              <a:xfrm>
+                <a:off x="1370864" y="1307892"/>
                 <a:ext cx="2577657" cy="276999"/>
               </a:xfrm>
               <a:prstGeom prst="rect">
@@ -18079,813 +18067,286 @@
                     <a:latin typeface="Arial" panose="020B0604020202020204" pitchFamily="34" charset="0"/>
                     <a:cs typeface="Arial" panose="020B0604020202020204" pitchFamily="34" charset="0"/>
                   </a:rPr>
-                  <a:t>Images to use</a:t>
+                  <a:t>Patient</a:t>
                 </a:r>
               </a:p>
             </p:txBody>
           </p:sp>
-          <p:grpSp>
-            <p:nvGrpSpPr>
-              <p:cNvPr id="108" name="Groupe 107">
+          <p:sp>
+            <p:nvSpPr>
+              <p:cNvPr id="35" name="ZoneTexte 34">
                 <a:extLst>
                   <a:ext uri="{FF2B5EF4-FFF2-40B4-BE49-F238E27FC236}">
-                    <a16:creationId xmlns:a16="http://schemas.microsoft.com/office/drawing/2014/main" id="{0245D009-D38A-5B6B-020E-74EC00C8DBBA}"/>
+                    <a16:creationId xmlns:a16="http://schemas.microsoft.com/office/drawing/2014/main" id="{0421E5E3-315B-F72C-470F-5BF33783580E}"/>
                   </a:ext>
                 </a:extLst>
               </p:cNvPr>
-              <p:cNvGrpSpPr/>
+              <p:cNvSpPr txBox="1">
+                <a:spLocks/>
+              </p:cNvSpPr>
               <p:nvPr/>
-            </p:nvGrpSpPr>
-            <p:grpSpPr>
+            </p:nvSpPr>
+            <p:spPr>
               <a:xfrm>
-                <a:off x="8562735" y="2680408"/>
-                <a:ext cx="2577657" cy="1130244"/>
-                <a:chOff x="8606935" y="4399279"/>
-                <a:chExt cx="2577657" cy="1130244"/>
+                <a:off x="1744225" y="1630299"/>
+                <a:ext cx="2204296" cy="646331"/>
               </a:xfrm>
-            </p:grpSpPr>
-            <p:sp>
-              <p:nvSpPr>
-                <p:cNvPr id="109" name="ZoneTexte 108">
-                  <a:extLst>
-                    <a:ext uri="{FF2B5EF4-FFF2-40B4-BE49-F238E27FC236}">
-                      <a16:creationId xmlns:a16="http://schemas.microsoft.com/office/drawing/2014/main" id="{B36B4B79-5264-20EB-4F9F-23992293D8BC}"/>
-                    </a:ext>
-                  </a:extLst>
-                </p:cNvPr>
-                <p:cNvSpPr txBox="1">
-                  <a:spLocks/>
-                </p:cNvSpPr>
-                <p:nvPr/>
-              </p:nvSpPr>
-              <p:spPr>
-                <a:xfrm>
-                  <a:off x="8606935" y="4399279"/>
-                  <a:ext cx="2577657" cy="276999"/>
-                </a:xfrm>
-                <a:prstGeom prst="rect">
-                  <a:avLst/>
-                </a:prstGeom>
-                <a:noFill/>
-              </p:spPr>
-              <p:txBody>
-                <a:bodyPr wrap="square" rtlCol="0">
-                  <a:spAutoFit/>
-                </a:bodyPr>
-                <a:lstStyle/>
-                <a:p>
-                  <a:pPr algn="ctr"/>
-                  <a:r>
-                    <a:rPr lang="fr-FR" sz="1200" dirty="0" err="1">
-                      <a:solidFill>
-                        <a:schemeClr val="bg1"/>
-                      </a:solidFill>
-                      <a:latin typeface="Arial" panose="020B0604020202020204" pitchFamily="34" charset="0"/>
-                      <a:cs typeface="Arial" panose="020B0604020202020204" pitchFamily="34" charset="0"/>
-                    </a:rPr>
-                    <a:t>Microscopy</a:t>
-                  </a:r>
-                  <a:endParaRPr lang="fr-FR" sz="1200" dirty="0">
+              <a:prstGeom prst="rect">
+                <a:avLst/>
+              </a:prstGeom>
+              <a:noFill/>
+            </p:spPr>
+            <p:txBody>
+              <a:bodyPr wrap="square" rtlCol="0">
+                <a:spAutoFit/>
+              </a:bodyPr>
+              <a:lstStyle/>
+              <a:p>
+                <a:r>
+                  <a:rPr lang="fr-FR" sz="1200" dirty="0">
                     <a:solidFill>
                       <a:schemeClr val="bg1"/>
                     </a:solidFill>
                     <a:latin typeface="Arial" panose="020B0604020202020204" pitchFamily="34" charset="0"/>
                     <a:cs typeface="Arial" panose="020B0604020202020204" pitchFamily="34" charset="0"/>
-                  </a:endParaRPr>
-                </a:p>
-              </p:txBody>
-            </p:sp>
-            <p:grpSp>
-              <p:nvGrpSpPr>
-                <p:cNvPr id="110" name="Groupe 109">
-                  <a:extLst>
-                    <a:ext uri="{FF2B5EF4-FFF2-40B4-BE49-F238E27FC236}">
-                      <a16:creationId xmlns:a16="http://schemas.microsoft.com/office/drawing/2014/main" id="{67CA1B96-0DE1-2FDA-678E-11453B6923B1}"/>
-                    </a:ext>
-                  </a:extLst>
-                </p:cNvPr>
-                <p:cNvGrpSpPr/>
-                <p:nvPr/>
-              </p:nvGrpSpPr>
-              <p:grpSpPr>
-                <a:xfrm>
-                  <a:off x="8681506" y="4809523"/>
-                  <a:ext cx="2428514" cy="720000"/>
-                  <a:chOff x="4149620" y="4669263"/>
-                  <a:chExt cx="2428514" cy="720000"/>
-                </a:xfrm>
-              </p:grpSpPr>
-              <p:sp>
-                <p:nvSpPr>
-                  <p:cNvPr id="111" name="Rectangle : coins arrondis 110">
-                    <a:extLst>
-                      <a:ext uri="{FF2B5EF4-FFF2-40B4-BE49-F238E27FC236}">
-                        <a16:creationId xmlns:a16="http://schemas.microsoft.com/office/drawing/2014/main" id="{28F918D6-A3B9-185F-A924-AC3D64312D42}"/>
-                      </a:ext>
-                    </a:extLst>
-                  </p:cNvPr>
-                  <p:cNvSpPr/>
-                  <p:nvPr/>
-                </p:nvSpPr>
-                <p:spPr>
-                  <a:xfrm>
-                    <a:off x="4149620" y="4669263"/>
-                    <a:ext cx="720000" cy="720000"/>
-                  </a:xfrm>
-                  <a:prstGeom prst="roundRect">
-                    <a:avLst>
-                      <a:gd name="adj" fmla="val 6463"/>
-                    </a:avLst>
-                  </a:prstGeom>
-                  <a:solidFill>
-                    <a:srgbClr val="4696FD"/>
-                  </a:solidFill>
-                  <a:ln>
-                    <a:noFill/>
-                  </a:ln>
-                </p:spPr>
-                <p:style>
-                  <a:lnRef idx="2">
-                    <a:schemeClr val="accent1">
-                      <a:shade val="50000"/>
-                    </a:schemeClr>
-                  </a:lnRef>
-                  <a:fillRef idx="1">
-                    <a:schemeClr val="accent1"/>
-                  </a:fillRef>
-                  <a:effectRef idx="0">
-                    <a:schemeClr val="accent1"/>
-                  </a:effectRef>
-                  <a:fontRef idx="minor">
-                    <a:schemeClr val="lt1"/>
-                  </a:fontRef>
-                </p:style>
-                <p:txBody>
-                  <a:bodyPr rtlCol="0" anchor="ctr"/>
-                  <a:lstStyle/>
-                  <a:p>
-                    <a:pPr algn="ctr"/>
-                    <a:endParaRPr lang="en-US" sz="2000" dirty="0">
-                      <a:latin typeface="Arial" panose="020B0604020202020204" pitchFamily="34" charset="0"/>
-                      <a:cs typeface="Arial" panose="020B0604020202020204" pitchFamily="34" charset="0"/>
-                    </a:endParaRPr>
-                  </a:p>
-                </p:txBody>
-              </p:sp>
-              <p:sp>
-                <p:nvSpPr>
-                  <p:cNvPr id="113" name="Rectangle : coins arrondis 112">
-                    <a:extLst>
-                      <a:ext uri="{FF2B5EF4-FFF2-40B4-BE49-F238E27FC236}">
-                        <a16:creationId xmlns:a16="http://schemas.microsoft.com/office/drawing/2014/main" id="{724E549D-281B-F8A6-D613-3D5A4E4798B9}"/>
-                      </a:ext>
-                    </a:extLst>
-                  </p:cNvPr>
-                  <p:cNvSpPr/>
-                  <p:nvPr/>
-                </p:nvSpPr>
-                <p:spPr>
-                  <a:xfrm>
-                    <a:off x="5003877" y="4669263"/>
-                    <a:ext cx="720000" cy="720000"/>
-                  </a:xfrm>
-                  <a:prstGeom prst="roundRect">
-                    <a:avLst>
-                      <a:gd name="adj" fmla="val 6463"/>
-                    </a:avLst>
-                  </a:prstGeom>
-                  <a:solidFill>
-                    <a:srgbClr val="4696FD"/>
-                  </a:solidFill>
-                  <a:ln>
-                    <a:noFill/>
-                  </a:ln>
-                </p:spPr>
-                <p:style>
-                  <a:lnRef idx="2">
-                    <a:schemeClr val="accent1">
-                      <a:shade val="50000"/>
-                    </a:schemeClr>
-                  </a:lnRef>
-                  <a:fillRef idx="1">
-                    <a:schemeClr val="accent1"/>
-                  </a:fillRef>
-                  <a:effectRef idx="0">
-                    <a:schemeClr val="accent1"/>
-                  </a:effectRef>
-                  <a:fontRef idx="minor">
-                    <a:schemeClr val="lt1"/>
-                  </a:fontRef>
-                </p:style>
-                <p:txBody>
-                  <a:bodyPr rtlCol="0" anchor="ctr"/>
-                  <a:lstStyle/>
-                  <a:p>
-                    <a:pPr algn="ctr"/>
-                    <a:endParaRPr lang="en-US" sz="2000" dirty="0">
-                      <a:latin typeface="Arial" panose="020B0604020202020204" pitchFamily="34" charset="0"/>
-                      <a:cs typeface="Arial" panose="020B0604020202020204" pitchFamily="34" charset="0"/>
-                    </a:endParaRPr>
-                  </a:p>
-                </p:txBody>
-              </p:sp>
-              <p:sp>
-                <p:nvSpPr>
-                  <p:cNvPr id="114" name="Rectangle : coins arrondis 113">
-                    <a:extLst>
-                      <a:ext uri="{FF2B5EF4-FFF2-40B4-BE49-F238E27FC236}">
-                        <a16:creationId xmlns:a16="http://schemas.microsoft.com/office/drawing/2014/main" id="{A9D618AF-2477-7DEA-2563-3A70D203B93B}"/>
-                      </a:ext>
-                    </a:extLst>
-                  </p:cNvPr>
-                  <p:cNvSpPr/>
-                  <p:nvPr/>
-                </p:nvSpPr>
-                <p:spPr>
-                  <a:xfrm>
-                    <a:off x="5858134" y="4669263"/>
-                    <a:ext cx="720000" cy="720000"/>
-                  </a:xfrm>
-                  <a:prstGeom prst="roundRect">
-                    <a:avLst>
-                      <a:gd name="adj" fmla="val 6463"/>
-                    </a:avLst>
-                  </a:prstGeom>
-                  <a:solidFill>
-                    <a:srgbClr val="4696FD"/>
-                  </a:solidFill>
-                  <a:ln>
-                    <a:noFill/>
-                  </a:ln>
-                </p:spPr>
-                <p:style>
-                  <a:lnRef idx="2">
-                    <a:schemeClr val="accent1">
-                      <a:shade val="50000"/>
-                    </a:schemeClr>
-                  </a:lnRef>
-                  <a:fillRef idx="1">
-                    <a:schemeClr val="accent1"/>
-                  </a:fillRef>
-                  <a:effectRef idx="0">
-                    <a:schemeClr val="accent1"/>
-                  </a:effectRef>
-                  <a:fontRef idx="minor">
-                    <a:schemeClr val="lt1"/>
-                  </a:fontRef>
-                </p:style>
-                <p:txBody>
-                  <a:bodyPr rtlCol="0" anchor="ctr"/>
-                  <a:lstStyle/>
-                  <a:p>
-                    <a:pPr algn="ctr"/>
-                    <a:endParaRPr lang="en-US" sz="2000" dirty="0">
-                      <a:latin typeface="Arial" panose="020B0604020202020204" pitchFamily="34" charset="0"/>
-                      <a:cs typeface="Arial" panose="020B0604020202020204" pitchFamily="34" charset="0"/>
-                    </a:endParaRPr>
-                  </a:p>
-                </p:txBody>
-              </p:sp>
-            </p:grpSp>
-          </p:grpSp>
-          <p:grpSp>
-            <p:nvGrpSpPr>
-              <p:cNvPr id="118" name="Groupe 117">
-                <a:extLst>
-                  <a:ext uri="{FF2B5EF4-FFF2-40B4-BE49-F238E27FC236}">
-                    <a16:creationId xmlns:a16="http://schemas.microsoft.com/office/drawing/2014/main" id="{2E5D3605-64D7-5B48-45CA-8F0943AACABE}"/>
-                  </a:ext>
-                </a:extLst>
-              </p:cNvPr>
-              <p:cNvGrpSpPr/>
-              <p:nvPr/>
-            </p:nvGrpSpPr>
-            <p:grpSpPr>
-              <a:xfrm>
-                <a:off x="1252478" y="2680408"/>
-                <a:ext cx="2577657" cy="1130244"/>
-                <a:chOff x="8606935" y="4399279"/>
-                <a:chExt cx="2577657" cy="1130244"/>
-              </a:xfrm>
-            </p:grpSpPr>
-            <p:sp>
-              <p:nvSpPr>
-                <p:cNvPr id="119" name="ZoneTexte 118">
-                  <a:extLst>
-                    <a:ext uri="{FF2B5EF4-FFF2-40B4-BE49-F238E27FC236}">
-                      <a16:creationId xmlns:a16="http://schemas.microsoft.com/office/drawing/2014/main" id="{D3F97421-5323-5AC1-BCFB-44D90431E948}"/>
-                    </a:ext>
-                  </a:extLst>
-                </p:cNvPr>
-                <p:cNvSpPr txBox="1">
-                  <a:spLocks/>
-                </p:cNvSpPr>
-                <p:nvPr/>
-              </p:nvSpPr>
-              <p:spPr>
-                <a:xfrm>
-                  <a:off x="8606935" y="4399279"/>
-                  <a:ext cx="2577657" cy="276999"/>
-                </a:xfrm>
-                <a:prstGeom prst="rect">
-                  <a:avLst/>
-                </a:prstGeom>
-                <a:noFill/>
-              </p:spPr>
-              <p:txBody>
-                <a:bodyPr wrap="square" rtlCol="0">
-                  <a:spAutoFit/>
-                </a:bodyPr>
-                <a:lstStyle/>
-                <a:p>
-                  <a:pPr algn="ctr"/>
-                  <a:r>
-                    <a:rPr lang="fr-FR" sz="1200" dirty="0" err="1">
-                      <a:solidFill>
-                        <a:schemeClr val="bg1"/>
-                      </a:solidFill>
-                      <a:latin typeface="Arial" panose="020B0604020202020204" pitchFamily="34" charset="0"/>
-                      <a:cs typeface="Arial" panose="020B0604020202020204" pitchFamily="34" charset="0"/>
-                    </a:rPr>
-                    <a:t>Medical</a:t>
-                  </a:r>
-                  <a:r>
-                    <a:rPr lang="fr-FR" sz="1200" dirty="0">
-                      <a:solidFill>
-                        <a:schemeClr val="bg1"/>
-                      </a:solidFill>
-                      <a:latin typeface="Arial" panose="020B0604020202020204" pitchFamily="34" charset="0"/>
-                      <a:cs typeface="Arial" panose="020B0604020202020204" pitchFamily="34" charset="0"/>
-                    </a:rPr>
-                    <a:t> image</a:t>
-                  </a:r>
-                </a:p>
-              </p:txBody>
-            </p:sp>
-            <p:grpSp>
-              <p:nvGrpSpPr>
-                <p:cNvPr id="120" name="Groupe 119">
-                  <a:extLst>
-                    <a:ext uri="{FF2B5EF4-FFF2-40B4-BE49-F238E27FC236}">
-                      <a16:creationId xmlns:a16="http://schemas.microsoft.com/office/drawing/2014/main" id="{CC667F76-DF7F-CCF7-9DA8-8934C677152C}"/>
-                    </a:ext>
-                  </a:extLst>
-                </p:cNvPr>
-                <p:cNvGrpSpPr/>
-                <p:nvPr/>
-              </p:nvGrpSpPr>
-              <p:grpSpPr>
-                <a:xfrm>
-                  <a:off x="8681506" y="4809523"/>
-                  <a:ext cx="2428514" cy="720000"/>
-                  <a:chOff x="4149620" y="4669263"/>
-                  <a:chExt cx="2428514" cy="720000"/>
-                </a:xfrm>
-              </p:grpSpPr>
-              <p:sp>
-                <p:nvSpPr>
-                  <p:cNvPr id="121" name="Rectangle : coins arrondis 120">
-                    <a:extLst>
-                      <a:ext uri="{FF2B5EF4-FFF2-40B4-BE49-F238E27FC236}">
-                        <a16:creationId xmlns:a16="http://schemas.microsoft.com/office/drawing/2014/main" id="{84B533E4-ABA4-5441-B2A8-DEF95E08E6F0}"/>
-                      </a:ext>
-                    </a:extLst>
-                  </p:cNvPr>
-                  <p:cNvSpPr/>
-                  <p:nvPr/>
-                </p:nvSpPr>
-                <p:spPr>
-                  <a:xfrm>
-                    <a:off x="4149620" y="4669263"/>
-                    <a:ext cx="720000" cy="720000"/>
-                  </a:xfrm>
-                  <a:prstGeom prst="roundRect">
-                    <a:avLst>
-                      <a:gd name="adj" fmla="val 6463"/>
-                    </a:avLst>
-                  </a:prstGeom>
-                  <a:solidFill>
-                    <a:srgbClr val="4696FD"/>
-                  </a:solidFill>
-                  <a:ln>
-                    <a:noFill/>
-                  </a:ln>
-                </p:spPr>
-                <p:style>
-                  <a:lnRef idx="2">
-                    <a:schemeClr val="accent1">
-                      <a:shade val="50000"/>
-                    </a:schemeClr>
-                  </a:lnRef>
-                  <a:fillRef idx="1">
-                    <a:schemeClr val="accent1"/>
-                  </a:fillRef>
-                  <a:effectRef idx="0">
-                    <a:schemeClr val="accent1"/>
-                  </a:effectRef>
-                  <a:fontRef idx="minor">
-                    <a:schemeClr val="lt1"/>
-                  </a:fontRef>
-                </p:style>
-                <p:txBody>
-                  <a:bodyPr rtlCol="0" anchor="ctr"/>
-                  <a:lstStyle/>
-                  <a:p>
-                    <a:pPr algn="ctr"/>
-                    <a:endParaRPr lang="en-US" sz="2000" dirty="0">
-                      <a:latin typeface="Arial" panose="020B0604020202020204" pitchFamily="34" charset="0"/>
-                      <a:cs typeface="Arial" panose="020B0604020202020204" pitchFamily="34" charset="0"/>
-                    </a:endParaRPr>
-                  </a:p>
-                </p:txBody>
-              </p:sp>
-              <p:sp>
-                <p:nvSpPr>
-                  <p:cNvPr id="122" name="Rectangle : coins arrondis 121">
-                    <a:extLst>
-                      <a:ext uri="{FF2B5EF4-FFF2-40B4-BE49-F238E27FC236}">
-                        <a16:creationId xmlns:a16="http://schemas.microsoft.com/office/drawing/2014/main" id="{E033176C-846E-933A-3FBC-612D9C8493AA}"/>
-                      </a:ext>
-                    </a:extLst>
-                  </p:cNvPr>
-                  <p:cNvSpPr/>
-                  <p:nvPr/>
-                </p:nvSpPr>
-                <p:spPr>
-                  <a:xfrm>
-                    <a:off x="5003877" y="4669263"/>
-                    <a:ext cx="720000" cy="720000"/>
-                  </a:xfrm>
-                  <a:prstGeom prst="roundRect">
-                    <a:avLst>
-                      <a:gd name="adj" fmla="val 6463"/>
-                    </a:avLst>
-                  </a:prstGeom>
-                  <a:solidFill>
-                    <a:srgbClr val="4696FD"/>
-                  </a:solidFill>
-                  <a:ln>
-                    <a:noFill/>
-                  </a:ln>
-                </p:spPr>
-                <p:style>
-                  <a:lnRef idx="2">
-                    <a:schemeClr val="accent1">
-                      <a:shade val="50000"/>
-                    </a:schemeClr>
-                  </a:lnRef>
-                  <a:fillRef idx="1">
-                    <a:schemeClr val="accent1"/>
-                  </a:fillRef>
-                  <a:effectRef idx="0">
-                    <a:schemeClr val="accent1"/>
-                  </a:effectRef>
-                  <a:fontRef idx="minor">
-                    <a:schemeClr val="lt1"/>
-                  </a:fontRef>
-                </p:style>
-                <p:txBody>
-                  <a:bodyPr rtlCol="0" anchor="ctr"/>
-                  <a:lstStyle/>
-                  <a:p>
-                    <a:pPr algn="ctr"/>
-                    <a:endParaRPr lang="en-US" sz="2000" dirty="0">
-                      <a:latin typeface="Arial" panose="020B0604020202020204" pitchFamily="34" charset="0"/>
-                      <a:cs typeface="Arial" panose="020B0604020202020204" pitchFamily="34" charset="0"/>
-                    </a:endParaRPr>
-                  </a:p>
-                </p:txBody>
-              </p:sp>
-              <p:sp>
-                <p:nvSpPr>
-                  <p:cNvPr id="123" name="Rectangle : coins arrondis 122">
-                    <a:extLst>
-                      <a:ext uri="{FF2B5EF4-FFF2-40B4-BE49-F238E27FC236}">
-                        <a16:creationId xmlns:a16="http://schemas.microsoft.com/office/drawing/2014/main" id="{6BB638C8-A5F0-F050-B72B-A8CBC35E833B}"/>
-                      </a:ext>
-                    </a:extLst>
-                  </p:cNvPr>
-                  <p:cNvSpPr/>
-                  <p:nvPr/>
-                </p:nvSpPr>
-                <p:spPr>
-                  <a:xfrm>
-                    <a:off x="5858134" y="4669263"/>
-                    <a:ext cx="720000" cy="720000"/>
-                  </a:xfrm>
-                  <a:prstGeom prst="roundRect">
-                    <a:avLst>
-                      <a:gd name="adj" fmla="val 6463"/>
-                    </a:avLst>
-                  </a:prstGeom>
-                  <a:solidFill>
-                    <a:srgbClr val="4696FD"/>
-                  </a:solidFill>
-                  <a:ln>
-                    <a:noFill/>
-                  </a:ln>
-                </p:spPr>
-                <p:style>
-                  <a:lnRef idx="2">
-                    <a:schemeClr val="accent1">
-                      <a:shade val="50000"/>
-                    </a:schemeClr>
-                  </a:lnRef>
-                  <a:fillRef idx="1">
-                    <a:schemeClr val="accent1"/>
-                  </a:fillRef>
-                  <a:effectRef idx="0">
-                    <a:schemeClr val="accent1"/>
-                  </a:effectRef>
-                  <a:fontRef idx="minor">
-                    <a:schemeClr val="lt1"/>
-                  </a:fontRef>
-                </p:style>
-                <p:txBody>
-                  <a:bodyPr rtlCol="0" anchor="ctr"/>
-                  <a:lstStyle/>
-                  <a:p>
-                    <a:pPr algn="ctr"/>
-                    <a:endParaRPr lang="en-US" sz="2000" dirty="0">
-                      <a:latin typeface="Arial" panose="020B0604020202020204" pitchFamily="34" charset="0"/>
-                      <a:cs typeface="Arial" panose="020B0604020202020204" pitchFamily="34" charset="0"/>
-                    </a:endParaRPr>
-                  </a:p>
-                </p:txBody>
-              </p:sp>
-            </p:grpSp>
-          </p:grpSp>
-          <p:grpSp>
-            <p:nvGrpSpPr>
-              <p:cNvPr id="124" name="Groupe 123">
-                <a:extLst>
-                  <a:ext uri="{FF2B5EF4-FFF2-40B4-BE49-F238E27FC236}">
-                    <a16:creationId xmlns:a16="http://schemas.microsoft.com/office/drawing/2014/main" id="{4895C669-E852-8476-AC7C-E2A7F1EA7E9F}"/>
-                  </a:ext>
-                </a:extLst>
-              </p:cNvPr>
-              <p:cNvGrpSpPr/>
-              <p:nvPr/>
-            </p:nvGrpSpPr>
-            <p:grpSpPr>
-              <a:xfrm>
-                <a:off x="4907606" y="2680408"/>
-                <a:ext cx="2577657" cy="1130244"/>
-                <a:chOff x="8606935" y="4399279"/>
-                <a:chExt cx="2577657" cy="1130244"/>
-              </a:xfrm>
-            </p:grpSpPr>
-            <p:sp>
-              <p:nvSpPr>
-                <p:cNvPr id="125" name="ZoneTexte 124">
-                  <a:extLst>
-                    <a:ext uri="{FF2B5EF4-FFF2-40B4-BE49-F238E27FC236}">
-                      <a16:creationId xmlns:a16="http://schemas.microsoft.com/office/drawing/2014/main" id="{A5FBE681-2483-D932-1962-9D35174F8039}"/>
-                    </a:ext>
-                  </a:extLst>
-                </p:cNvPr>
-                <p:cNvSpPr txBox="1">
-                  <a:spLocks/>
-                </p:cNvSpPr>
-                <p:nvPr/>
-              </p:nvSpPr>
-              <p:spPr>
-                <a:xfrm>
-                  <a:off x="8606935" y="4399279"/>
-                  <a:ext cx="2577657" cy="276999"/>
-                </a:xfrm>
-                <a:prstGeom prst="rect">
-                  <a:avLst/>
-                </a:prstGeom>
-                <a:noFill/>
-              </p:spPr>
-              <p:txBody>
-                <a:bodyPr wrap="square" rtlCol="0">
-                  <a:spAutoFit/>
-                </a:bodyPr>
-                <a:lstStyle/>
-                <a:p>
-                  <a:pPr algn="ctr"/>
-                  <a:r>
-                    <a:rPr lang="fr-FR" sz="1200" dirty="0" err="1">
-                      <a:solidFill>
-                        <a:schemeClr val="bg1"/>
-                      </a:solidFill>
-                      <a:latin typeface="Arial" panose="020B0604020202020204" pitchFamily="34" charset="0"/>
-                      <a:cs typeface="Arial" panose="020B0604020202020204" pitchFamily="34" charset="0"/>
-                    </a:rPr>
-                    <a:t>Dermatoscopy</a:t>
-                  </a:r>
-                  <a:endParaRPr lang="fr-FR" sz="1200" dirty="0">
+                  </a:rPr>
+                  <a:t>Eye </a:t>
+                </a:r>
+                <a:r>
+                  <a:rPr lang="fr-FR" sz="1200" dirty="0" err="1">
                     <a:solidFill>
                       <a:schemeClr val="bg1"/>
                     </a:solidFill>
                     <a:latin typeface="Arial" panose="020B0604020202020204" pitchFamily="34" charset="0"/>
                     <a:cs typeface="Arial" panose="020B0604020202020204" pitchFamily="34" charset="0"/>
-                  </a:endParaRPr>
-                </a:p>
-              </p:txBody>
-            </p:sp>
-            <p:grpSp>
-              <p:nvGrpSpPr>
-                <p:cNvPr id="126" name="Groupe 125">
-                  <a:extLst>
-                    <a:ext uri="{FF2B5EF4-FFF2-40B4-BE49-F238E27FC236}">
-                      <a16:creationId xmlns:a16="http://schemas.microsoft.com/office/drawing/2014/main" id="{C50F49C0-D15D-2770-B16F-588BE6D9566F}"/>
-                    </a:ext>
-                  </a:extLst>
-                </p:cNvPr>
-                <p:cNvGrpSpPr/>
-                <p:nvPr/>
-              </p:nvGrpSpPr>
-              <p:grpSpPr>
-                <a:xfrm>
-                  <a:off x="8681506" y="4809523"/>
-                  <a:ext cx="2428514" cy="720000"/>
-                  <a:chOff x="4149620" y="4669263"/>
-                  <a:chExt cx="2428514" cy="720000"/>
-                </a:xfrm>
-              </p:grpSpPr>
-              <p:sp>
-                <p:nvSpPr>
-                  <p:cNvPr id="127" name="Rectangle : coins arrondis 126">
-                    <a:extLst>
-                      <a:ext uri="{FF2B5EF4-FFF2-40B4-BE49-F238E27FC236}">
-                        <a16:creationId xmlns:a16="http://schemas.microsoft.com/office/drawing/2014/main" id="{4CCEDF04-29B9-102F-A03C-0D67D9D5AE26}"/>
-                      </a:ext>
-                    </a:extLst>
-                  </p:cNvPr>
-                  <p:cNvSpPr/>
-                  <p:nvPr/>
-                </p:nvSpPr>
-                <p:spPr>
-                  <a:xfrm>
-                    <a:off x="4149620" y="4669263"/>
-                    <a:ext cx="720000" cy="720000"/>
-                  </a:xfrm>
-                  <a:prstGeom prst="roundRect">
-                    <a:avLst>
-                      <a:gd name="adj" fmla="val 6463"/>
-                    </a:avLst>
-                  </a:prstGeom>
+                  </a:rPr>
+                  <a:t>color</a:t>
+                </a:r>
+                <a:endParaRPr lang="fr-FR" sz="1200" dirty="0">
                   <a:solidFill>
-                    <a:srgbClr val="4696FD"/>
+                    <a:schemeClr val="bg1"/>
                   </a:solidFill>
-                  <a:ln>
-                    <a:noFill/>
-                  </a:ln>
-                </p:spPr>
-                <p:style>
-                  <a:lnRef idx="2">
-                    <a:schemeClr val="accent1">
-                      <a:shade val="50000"/>
-                    </a:schemeClr>
-                  </a:lnRef>
-                  <a:fillRef idx="1">
-                    <a:schemeClr val="accent1"/>
-                  </a:fillRef>
-                  <a:effectRef idx="0">
-                    <a:schemeClr val="accent1"/>
-                  </a:effectRef>
-                  <a:fontRef idx="minor">
-                    <a:schemeClr val="lt1"/>
-                  </a:fontRef>
-                </p:style>
-                <p:txBody>
-                  <a:bodyPr rtlCol="0" anchor="ctr"/>
-                  <a:lstStyle/>
-                  <a:p>
-                    <a:pPr algn="ctr"/>
-                    <a:endParaRPr lang="en-US" sz="2000" dirty="0">
-                      <a:latin typeface="Arial" panose="020B0604020202020204" pitchFamily="34" charset="0"/>
-                      <a:cs typeface="Arial" panose="020B0604020202020204" pitchFamily="34" charset="0"/>
-                    </a:endParaRPr>
-                  </a:p>
-                </p:txBody>
-              </p:sp>
-              <p:sp>
-                <p:nvSpPr>
-                  <p:cNvPr id="128" name="Rectangle : coins arrondis 127">
-                    <a:extLst>
-                      <a:ext uri="{FF2B5EF4-FFF2-40B4-BE49-F238E27FC236}">
-                        <a16:creationId xmlns:a16="http://schemas.microsoft.com/office/drawing/2014/main" id="{96F34227-215B-37CC-72A9-B35A9FE7C2CA}"/>
-                      </a:ext>
-                    </a:extLst>
-                  </p:cNvPr>
-                  <p:cNvSpPr/>
-                  <p:nvPr/>
-                </p:nvSpPr>
-                <p:spPr>
-                  <a:xfrm>
-                    <a:off x="5003877" y="4669263"/>
-                    <a:ext cx="720000" cy="720000"/>
-                  </a:xfrm>
-                  <a:prstGeom prst="roundRect">
-                    <a:avLst>
-                      <a:gd name="adj" fmla="val 6463"/>
-                    </a:avLst>
-                  </a:prstGeom>
+                  <a:latin typeface="Arial" panose="020B0604020202020204" pitchFamily="34" charset="0"/>
+                  <a:cs typeface="Arial" panose="020B0604020202020204" pitchFamily="34" charset="0"/>
+                </a:endParaRPr>
+              </a:p>
+              <a:p>
+                <a:endParaRPr lang="fr-FR" sz="1200" dirty="0">
                   <a:solidFill>
-                    <a:srgbClr val="4696FD"/>
+                    <a:schemeClr val="bg1"/>
                   </a:solidFill>
-                  <a:ln>
-                    <a:noFill/>
-                  </a:ln>
-                </p:spPr>
-                <p:style>
-                  <a:lnRef idx="2">
-                    <a:schemeClr val="accent1">
-                      <a:shade val="50000"/>
-                    </a:schemeClr>
-                  </a:lnRef>
-                  <a:fillRef idx="1">
-                    <a:schemeClr val="accent1"/>
-                  </a:fillRef>
-                  <a:effectRef idx="0">
-                    <a:schemeClr val="accent1"/>
-                  </a:effectRef>
-                  <a:fontRef idx="minor">
-                    <a:schemeClr val="lt1"/>
-                  </a:fontRef>
-                </p:style>
-                <p:txBody>
-                  <a:bodyPr rtlCol="0" anchor="ctr"/>
-                  <a:lstStyle/>
-                  <a:p>
-                    <a:pPr algn="ctr"/>
-                    <a:endParaRPr lang="en-US" sz="2000" dirty="0">
-                      <a:latin typeface="Arial" panose="020B0604020202020204" pitchFamily="34" charset="0"/>
-                      <a:cs typeface="Arial" panose="020B0604020202020204" pitchFamily="34" charset="0"/>
-                    </a:endParaRPr>
-                  </a:p>
-                </p:txBody>
-              </p:sp>
-              <p:sp>
-                <p:nvSpPr>
-                  <p:cNvPr id="129" name="Rectangle : coins arrondis 128">
-                    <a:extLst>
-                      <a:ext uri="{FF2B5EF4-FFF2-40B4-BE49-F238E27FC236}">
-                        <a16:creationId xmlns:a16="http://schemas.microsoft.com/office/drawing/2014/main" id="{748B9BB0-43A5-81B4-A6DE-64DE66C9F072}"/>
-                      </a:ext>
-                    </a:extLst>
-                  </p:cNvPr>
-                  <p:cNvSpPr/>
-                  <p:nvPr/>
-                </p:nvSpPr>
-                <p:spPr>
-                  <a:xfrm>
-                    <a:off x="5858134" y="4669263"/>
-                    <a:ext cx="720000" cy="720000"/>
-                  </a:xfrm>
-                  <a:prstGeom prst="roundRect">
-                    <a:avLst>
-                      <a:gd name="adj" fmla="val 6463"/>
-                    </a:avLst>
-                  </a:prstGeom>
+                  <a:latin typeface="Arial" panose="020B0604020202020204" pitchFamily="34" charset="0"/>
+                  <a:cs typeface="Arial" panose="020B0604020202020204" pitchFamily="34" charset="0"/>
+                </a:endParaRPr>
+              </a:p>
+              <a:p>
+                <a:r>
+                  <a:rPr lang="fr-FR" sz="1200" dirty="0" err="1">
+                    <a:solidFill>
+                      <a:schemeClr val="bg1"/>
+                    </a:solidFill>
+                    <a:latin typeface="Arial" panose="020B0604020202020204" pitchFamily="34" charset="0"/>
+                    <a:cs typeface="Arial" panose="020B0604020202020204" pitchFamily="34" charset="0"/>
+                  </a:rPr>
+                  <a:t>Hair</a:t>
+                </a:r>
+                <a:r>
+                  <a:rPr lang="fr-FR" sz="1200" dirty="0">
+                    <a:solidFill>
+                      <a:schemeClr val="bg1"/>
+                    </a:solidFill>
+                    <a:latin typeface="Arial" panose="020B0604020202020204" pitchFamily="34" charset="0"/>
+                    <a:cs typeface="Arial" panose="020B0604020202020204" pitchFamily="34" charset="0"/>
+                  </a:rPr>
+                  <a:t> </a:t>
+                </a:r>
+                <a:r>
+                  <a:rPr lang="fr-FR" sz="1200" dirty="0" err="1">
+                    <a:solidFill>
+                      <a:schemeClr val="bg1"/>
+                    </a:solidFill>
+                    <a:latin typeface="Arial" panose="020B0604020202020204" pitchFamily="34" charset="0"/>
+                    <a:cs typeface="Arial" panose="020B0604020202020204" pitchFamily="34" charset="0"/>
+                  </a:rPr>
+                  <a:t>color</a:t>
+                </a:r>
+                <a:endParaRPr lang="fr-FR" sz="1200" dirty="0">
                   <a:solidFill>
-                    <a:srgbClr val="4696FD"/>
+                    <a:schemeClr val="bg1"/>
                   </a:solidFill>
-                  <a:ln>
-                    <a:noFill/>
-                  </a:ln>
-                </p:spPr>
-                <p:style>
-                  <a:lnRef idx="2">
-                    <a:schemeClr val="accent1">
-                      <a:shade val="50000"/>
-                    </a:schemeClr>
-                  </a:lnRef>
-                  <a:fillRef idx="1">
-                    <a:schemeClr val="accent1"/>
-                  </a:fillRef>
-                  <a:effectRef idx="0">
-                    <a:schemeClr val="accent1"/>
-                  </a:effectRef>
-                  <a:fontRef idx="minor">
-                    <a:schemeClr val="lt1"/>
-                  </a:fontRef>
-                </p:style>
-                <p:txBody>
-                  <a:bodyPr rtlCol="0" anchor="ctr"/>
-                  <a:lstStyle/>
-                  <a:p>
-                    <a:pPr algn="ctr"/>
-                    <a:endParaRPr lang="en-US" sz="2000" dirty="0">
-                      <a:latin typeface="Arial" panose="020B0604020202020204" pitchFamily="34" charset="0"/>
-                      <a:cs typeface="Arial" panose="020B0604020202020204" pitchFamily="34" charset="0"/>
-                    </a:endParaRPr>
-                  </a:p>
-                </p:txBody>
-              </p:sp>
-            </p:grpSp>
-          </p:grpSp>
+                  <a:latin typeface="Arial" panose="020B0604020202020204" pitchFamily="34" charset="0"/>
+                  <a:cs typeface="Arial" panose="020B0604020202020204" pitchFamily="34" charset="0"/>
+                </a:endParaRPr>
+              </a:p>
+            </p:txBody>
+          </p:sp>
+          <p:pic>
+            <p:nvPicPr>
+              <p:cNvPr id="42" name="Graphique 41" descr="Coche avec un remplissage uni">
+                <a:extLst>
+                  <a:ext uri="{FF2B5EF4-FFF2-40B4-BE49-F238E27FC236}">
+                    <a16:creationId xmlns:a16="http://schemas.microsoft.com/office/drawing/2014/main" id="{70BB1278-1A12-C142-73F7-746FC2476EA7}"/>
+                  </a:ext>
+                </a:extLst>
+              </p:cNvPr>
+              <p:cNvPicPr>
+                <a:picLocks noChangeAspect="1"/>
+              </p:cNvPicPr>
+              <p:nvPr/>
+            </p:nvPicPr>
+            <p:blipFill>
+              <a:blip r:embed="rId3">
+                <a:extLst>
+                  <a:ext uri="{28A0092B-C50C-407E-A947-70E740481C1C}">
+                    <a14:useLocalDpi xmlns:a14="http://schemas.microsoft.com/office/drawing/2010/main" val="0"/>
+                  </a:ext>
+                  <a:ext uri="{96DAC541-7B7A-43D3-8B79-37D633B846F1}">
+                    <asvg:svgBlip xmlns:asvg="http://schemas.microsoft.com/office/drawing/2016/SVG/main" r:embed="rId4"/>
+                  </a:ext>
+                </a:extLst>
+              </a:blip>
+              <a:stretch>
+                <a:fillRect/>
+              </a:stretch>
+            </p:blipFill>
+            <p:spPr>
+              <a:xfrm>
+                <a:off x="1578200" y="1682359"/>
+                <a:ext cx="166025" cy="166025"/>
+              </a:xfrm>
+              <a:prstGeom prst="rect">
+                <a:avLst/>
+              </a:prstGeom>
+            </p:spPr>
+          </p:pic>
+          <p:pic>
+            <p:nvPicPr>
+              <p:cNvPr id="43" name="Graphique 42" descr="Coche avec un remplissage uni">
+                <a:extLst>
+                  <a:ext uri="{FF2B5EF4-FFF2-40B4-BE49-F238E27FC236}">
+                    <a16:creationId xmlns:a16="http://schemas.microsoft.com/office/drawing/2014/main" id="{6E41483A-52A8-CB9A-6DFF-CF9978A45B37}"/>
+                  </a:ext>
+                </a:extLst>
+              </p:cNvPr>
+              <p:cNvPicPr>
+                <a:picLocks noChangeAspect="1"/>
+              </p:cNvPicPr>
+              <p:nvPr/>
+            </p:nvPicPr>
+            <p:blipFill>
+              <a:blip r:embed="rId3">
+                <a:extLst>
+                  <a:ext uri="{28A0092B-C50C-407E-A947-70E740481C1C}">
+                    <a14:useLocalDpi xmlns:a14="http://schemas.microsoft.com/office/drawing/2010/main" val="0"/>
+                  </a:ext>
+                  <a:ext uri="{96DAC541-7B7A-43D3-8B79-37D633B846F1}">
+                    <asvg:svgBlip xmlns:asvg="http://schemas.microsoft.com/office/drawing/2016/SVG/main" r:embed="rId4"/>
+                  </a:ext>
+                </a:extLst>
+              </a:blip>
+              <a:stretch>
+                <a:fillRect/>
+              </a:stretch>
+            </p:blipFill>
+            <p:spPr>
+              <a:xfrm>
+                <a:off x="1556070" y="2075230"/>
+                <a:ext cx="166025" cy="166025"/>
+              </a:xfrm>
+              <a:prstGeom prst="rect">
+                <a:avLst/>
+              </a:prstGeom>
+            </p:spPr>
+          </p:pic>
         </p:grpSp>
         <p:sp>
           <p:nvSpPr>
-            <p:cNvPr id="164" name="Rectangle : coins arrondis 163">
+            <p:cNvPr id="44" name="ZoneTexte 43">
               <a:extLst>
                 <a:ext uri="{FF2B5EF4-FFF2-40B4-BE49-F238E27FC236}">
-                  <a16:creationId xmlns:a16="http://schemas.microsoft.com/office/drawing/2014/main" id="{0FC897DA-B9B2-8850-0E6D-FB5A1C2D6414}"/>
+                  <a16:creationId xmlns:a16="http://schemas.microsoft.com/office/drawing/2014/main" id="{4B8D5A2C-56B8-2DDE-F84B-245434DF1D50}"/>
+                </a:ext>
+              </a:extLst>
+            </p:cNvPr>
+            <p:cNvSpPr txBox="1">
+              <a:spLocks/>
+            </p:cNvSpPr>
+            <p:nvPr/>
+          </p:nvSpPr>
+          <p:spPr>
+            <a:xfrm>
+              <a:off x="4585290" y="851479"/>
+              <a:ext cx="2577657" cy="276999"/>
+            </a:xfrm>
+            <a:prstGeom prst="rect">
+              <a:avLst/>
+            </a:prstGeom>
+            <a:noFill/>
+          </p:spPr>
+          <p:txBody>
+            <a:bodyPr wrap="square" rtlCol="0">
+              <a:spAutoFit/>
+            </a:bodyPr>
+            <a:lstStyle/>
+            <a:p>
+              <a:pPr algn="ctr"/>
+              <a:r>
+                <a:rPr lang="fr-FR" sz="1200" b="1" dirty="0">
+                  <a:solidFill>
+                    <a:schemeClr val="bg1"/>
+                  </a:solidFill>
+                  <a:latin typeface="Arial" panose="020B0604020202020204" pitchFamily="34" charset="0"/>
+                  <a:cs typeface="Arial" panose="020B0604020202020204" pitchFamily="34" charset="0"/>
+                </a:rPr>
+                <a:t>Information </a:t>
+              </a:r>
+              <a:r>
+                <a:rPr lang="fr-FR" sz="1200" b="1" dirty="0" err="1">
+                  <a:solidFill>
+                    <a:schemeClr val="bg1"/>
+                  </a:solidFill>
+                  <a:latin typeface="Arial" panose="020B0604020202020204" pitchFamily="34" charset="0"/>
+                  <a:cs typeface="Arial" panose="020B0604020202020204" pitchFamily="34" charset="0"/>
+                </a:rPr>
+                <a:t>required</a:t>
+              </a:r>
+              <a:endParaRPr lang="fr-FR" sz="1200" b="1" dirty="0">
+                <a:solidFill>
+                  <a:schemeClr val="bg1"/>
+                </a:solidFill>
+                <a:latin typeface="Arial" panose="020B0604020202020204" pitchFamily="34" charset="0"/>
+                <a:cs typeface="Arial" panose="020B0604020202020204" pitchFamily="34" charset="0"/>
+              </a:endParaRPr>
+            </a:p>
+          </p:txBody>
+        </p:sp>
+      </p:grpSp>
+      <p:grpSp>
+        <p:nvGrpSpPr>
+          <p:cNvPr id="46" name="Groupe 45">
+            <a:extLst>
+              <a:ext uri="{FF2B5EF4-FFF2-40B4-BE49-F238E27FC236}">
+                <a16:creationId xmlns:a16="http://schemas.microsoft.com/office/drawing/2014/main" id="{C1D3E07A-D678-3720-8F43-CB20A7DA1CAA}"/>
+              </a:ext>
+            </a:extLst>
+          </p:cNvPr>
+          <p:cNvGrpSpPr/>
+          <p:nvPr/>
+        </p:nvGrpSpPr>
+        <p:grpSpPr>
+          <a:xfrm>
+            <a:off x="9733547" y="0"/>
+            <a:ext cx="2458452" cy="587273"/>
+            <a:chOff x="9733547" y="0"/>
+            <a:chExt cx="2458452" cy="587273"/>
+          </a:xfrm>
+        </p:grpSpPr>
+        <p:sp>
+          <p:nvSpPr>
+            <p:cNvPr id="47" name="Rectangle : avec coin arrondi 46">
+              <a:extLst>
+                <a:ext uri="{FF2B5EF4-FFF2-40B4-BE49-F238E27FC236}">
+                  <a16:creationId xmlns:a16="http://schemas.microsoft.com/office/drawing/2014/main" id="{D3D28095-F287-E66B-3BA8-4B31B67F8C8B}"/>
                 </a:ext>
               </a:extLst>
             </p:cNvPr>
@@ -18893,20 +18354,17 @@
             <p:nvPr/>
           </p:nvSpPr>
           <p:spPr>
-            <a:xfrm>
-              <a:off x="5766344" y="4781065"/>
-              <a:ext cx="1024837" cy="360000"/>
+            <a:xfrm flipH="1" flipV="1">
+              <a:off x="9733547" y="0"/>
+              <a:ext cx="2458452" cy="587273"/>
             </a:xfrm>
-            <a:prstGeom prst="roundRect">
+            <a:prstGeom prst="round1Rect">
               <a:avLst>
-                <a:gd name="adj" fmla="val 6463"/>
+                <a:gd name="adj" fmla="val 8065"/>
               </a:avLst>
             </a:prstGeom>
             <a:solidFill>
-              <a:schemeClr val="accent1">
-                <a:lumMod val="60000"/>
-                <a:lumOff val="40000"/>
-              </a:schemeClr>
+              <a:srgbClr val="4696FD"/>
             </a:solidFill>
             <a:ln>
               <a:noFill/>
@@ -18933,225 +18391,16 @@
             <a:lstStyle/>
             <a:p>
               <a:pPr algn="ctr"/>
-              <a:r>
-                <a:rPr lang="fr-FR" sz="1100" b="1" dirty="0" err="1">
-                  <a:latin typeface="Arial" panose="020B0604020202020204" pitchFamily="34" charset="0"/>
-                  <a:cs typeface="Arial" panose="020B0604020202020204" pitchFamily="34" charset="0"/>
-                </a:rPr>
-                <a:t>Add</a:t>
-              </a:r>
-              <a:endParaRPr lang="en-US" sz="1100" b="1" dirty="0">
-                <a:latin typeface="Arial" panose="020B0604020202020204" pitchFamily="34" charset="0"/>
-                <a:cs typeface="Arial" panose="020B0604020202020204" pitchFamily="34" charset="0"/>
-              </a:endParaRPr>
+              <a:endParaRPr lang="en-US" dirty="0"/>
             </a:p>
           </p:txBody>
         </p:sp>
         <p:sp>
           <p:nvSpPr>
-            <p:cNvPr id="165" name="Rectangle : coins arrondis 164">
+            <p:cNvPr id="48" name="ZoneTexte 47">
               <a:extLst>
                 <a:ext uri="{FF2B5EF4-FFF2-40B4-BE49-F238E27FC236}">
-                  <a16:creationId xmlns:a16="http://schemas.microsoft.com/office/drawing/2014/main" id="{92B716A7-06F4-8F33-9B6C-AF4B4A8D5B0A}"/>
-                </a:ext>
-              </a:extLst>
-            </p:cNvPr>
-            <p:cNvSpPr/>
-            <p:nvPr/>
-          </p:nvSpPr>
-          <p:spPr>
-            <a:xfrm>
-              <a:off x="9401169" y="4781065"/>
-              <a:ext cx="1024837" cy="360000"/>
-            </a:xfrm>
-            <a:prstGeom prst="roundRect">
-              <a:avLst>
-                <a:gd name="adj" fmla="val 6463"/>
-              </a:avLst>
-            </a:prstGeom>
-            <a:solidFill>
-              <a:schemeClr val="accent1">
-                <a:lumMod val="60000"/>
-                <a:lumOff val="40000"/>
-              </a:schemeClr>
-            </a:solidFill>
-            <a:ln>
-              <a:noFill/>
-            </a:ln>
-          </p:spPr>
-          <p:style>
-            <a:lnRef idx="2">
-              <a:schemeClr val="accent1">
-                <a:shade val="50000"/>
-              </a:schemeClr>
-            </a:lnRef>
-            <a:fillRef idx="1">
-              <a:schemeClr val="accent1"/>
-            </a:fillRef>
-            <a:effectRef idx="0">
-              <a:schemeClr val="accent1"/>
-            </a:effectRef>
-            <a:fontRef idx="minor">
-              <a:schemeClr val="lt1"/>
-            </a:fontRef>
-          </p:style>
-          <p:txBody>
-            <a:bodyPr rtlCol="0" anchor="ctr"/>
-            <a:lstStyle/>
-            <a:p>
-              <a:pPr algn="ctr"/>
-              <a:r>
-                <a:rPr lang="fr-FR" sz="1100" b="1" dirty="0" err="1">
-                  <a:latin typeface="Arial" panose="020B0604020202020204" pitchFamily="34" charset="0"/>
-                  <a:cs typeface="Arial" panose="020B0604020202020204" pitchFamily="34" charset="0"/>
-                </a:rPr>
-                <a:t>Add</a:t>
-              </a:r>
-              <a:endParaRPr lang="en-US" sz="1100" b="1" dirty="0">
-                <a:latin typeface="Arial" panose="020B0604020202020204" pitchFamily="34" charset="0"/>
-                <a:cs typeface="Arial" panose="020B0604020202020204" pitchFamily="34" charset="0"/>
-              </a:endParaRPr>
-            </a:p>
-          </p:txBody>
-        </p:sp>
-        <p:sp>
-          <p:nvSpPr>
-            <p:cNvPr id="166" name="Rectangle : coins arrondis 165">
-              <a:extLst>
-                <a:ext uri="{FF2B5EF4-FFF2-40B4-BE49-F238E27FC236}">
-                  <a16:creationId xmlns:a16="http://schemas.microsoft.com/office/drawing/2014/main" id="{55547FE0-6538-4269-E7F3-FB51FFD3F58C}"/>
-                </a:ext>
-              </a:extLst>
-            </p:cNvPr>
-            <p:cNvSpPr/>
-            <p:nvPr/>
-          </p:nvSpPr>
-          <p:spPr>
-            <a:xfrm>
-              <a:off x="2131519" y="4781065"/>
-              <a:ext cx="1024837" cy="360000"/>
-            </a:xfrm>
-            <a:prstGeom prst="roundRect">
-              <a:avLst>
-                <a:gd name="adj" fmla="val 6463"/>
-              </a:avLst>
-            </a:prstGeom>
-            <a:solidFill>
-              <a:schemeClr val="accent1">
-                <a:lumMod val="60000"/>
-                <a:lumOff val="40000"/>
-              </a:schemeClr>
-            </a:solidFill>
-            <a:ln>
-              <a:noFill/>
-            </a:ln>
-          </p:spPr>
-          <p:style>
-            <a:lnRef idx="2">
-              <a:schemeClr val="accent1">
-                <a:shade val="50000"/>
-              </a:schemeClr>
-            </a:lnRef>
-            <a:fillRef idx="1">
-              <a:schemeClr val="accent1"/>
-            </a:fillRef>
-            <a:effectRef idx="0">
-              <a:schemeClr val="accent1"/>
-            </a:effectRef>
-            <a:fontRef idx="minor">
-              <a:schemeClr val="lt1"/>
-            </a:fontRef>
-          </p:style>
-          <p:txBody>
-            <a:bodyPr rtlCol="0" anchor="ctr"/>
-            <a:lstStyle/>
-            <a:p>
-              <a:pPr algn="ctr"/>
-              <a:r>
-                <a:rPr lang="fr-FR" sz="1100" b="1" dirty="0" err="1">
-                  <a:latin typeface="Arial" panose="020B0604020202020204" pitchFamily="34" charset="0"/>
-                  <a:cs typeface="Arial" panose="020B0604020202020204" pitchFamily="34" charset="0"/>
-                </a:rPr>
-                <a:t>Add</a:t>
-              </a:r>
-              <a:endParaRPr lang="en-US" sz="1100" b="1" dirty="0">
-                <a:latin typeface="Arial" panose="020B0604020202020204" pitchFamily="34" charset="0"/>
-                <a:cs typeface="Arial" panose="020B0604020202020204" pitchFamily="34" charset="0"/>
-              </a:endParaRPr>
-            </a:p>
-          </p:txBody>
-        </p:sp>
-      </p:grpSp>
-      <p:sp>
-        <p:nvSpPr>
-          <p:cNvPr id="7" name="ZoneTexte 6">
-            <a:extLst>
-              <a:ext uri="{FF2B5EF4-FFF2-40B4-BE49-F238E27FC236}">
-                <a16:creationId xmlns:a16="http://schemas.microsoft.com/office/drawing/2014/main" id="{FD277683-29A4-E1BF-3AAE-0221067165AE}"/>
-              </a:ext>
-            </a:extLst>
-          </p:cNvPr>
-          <p:cNvSpPr txBox="1"/>
-          <p:nvPr/>
-        </p:nvSpPr>
-        <p:spPr>
-          <a:xfrm>
-            <a:off x="10924231" y="162634"/>
-            <a:ext cx="1901228" cy="553998"/>
-          </a:xfrm>
-          <a:prstGeom prst="rect">
-            <a:avLst/>
-          </a:prstGeom>
-          <a:noFill/>
-        </p:spPr>
-        <p:txBody>
-          <a:bodyPr wrap="square" rtlCol="0">
-            <a:spAutoFit/>
-          </a:bodyPr>
-          <a:lstStyle/>
-          <a:p>
-            <a:r>
-              <a:rPr lang="en-US" sz="1200" u="sng" dirty="0">
-                <a:solidFill>
-                  <a:srgbClr val="0070C0"/>
-                </a:solidFill>
-                <a:latin typeface="Arial" panose="020B0604020202020204" pitchFamily="34" charset="0"/>
-                <a:cs typeface="Arial" panose="020B0604020202020204" pitchFamily="34" charset="0"/>
-              </a:rPr>
-              <a:t>About AI - 1</a:t>
-            </a:r>
-          </a:p>
-          <a:p>
-            <a:endParaRPr lang="en-US" dirty="0"/>
-          </a:p>
-        </p:txBody>
-      </p:sp>
-      <p:grpSp>
-        <p:nvGrpSpPr>
-          <p:cNvPr id="13" name="Groupe 12">
-            <a:extLst>
-              <a:ext uri="{FF2B5EF4-FFF2-40B4-BE49-F238E27FC236}">
-                <a16:creationId xmlns:a16="http://schemas.microsoft.com/office/drawing/2014/main" id="{7F770CA5-2524-126E-BC8D-B0D5B2F2F19D}"/>
-              </a:ext>
-            </a:extLst>
-          </p:cNvPr>
-          <p:cNvGrpSpPr/>
-          <p:nvPr/>
-        </p:nvGrpSpPr>
-        <p:grpSpPr>
-          <a:xfrm>
-            <a:off x="7557900" y="1294140"/>
-            <a:ext cx="3002862" cy="979970"/>
-            <a:chOff x="8014762" y="1297973"/>
-            <a:chExt cx="3002862" cy="979970"/>
-          </a:xfrm>
-        </p:grpSpPr>
-        <p:sp>
-          <p:nvSpPr>
-            <p:cNvPr id="36" name="ZoneTexte 35">
-              <a:extLst>
-                <a:ext uri="{FF2B5EF4-FFF2-40B4-BE49-F238E27FC236}">
-                  <a16:creationId xmlns:a16="http://schemas.microsoft.com/office/drawing/2014/main" id="{BDE65B3D-0DC1-3A16-0536-F1AC86214B3E}"/>
+                  <a16:creationId xmlns:a16="http://schemas.microsoft.com/office/drawing/2014/main" id="{61A36911-3BFD-F170-BE7B-659F06A8F1F1}"/>
                 </a:ext>
               </a:extLst>
             </p:cNvPr>
@@ -19162,8 +18411,8 @@
           </p:nvSpPr>
           <p:spPr>
             <a:xfrm>
-              <a:off x="8014762" y="1297973"/>
-              <a:ext cx="3002862" cy="276999"/>
+              <a:off x="9794179" y="122281"/>
+              <a:ext cx="2333181" cy="307777"/>
             </a:xfrm>
             <a:prstGeom prst="rect">
               <a:avLst/>
@@ -19178,510 +18427,1345 @@
             <a:p>
               <a:pPr algn="ctr"/>
               <a:r>
-                <a:rPr lang="fr-FR" sz="1200" b="1" dirty="0">
-                  <a:solidFill>
-                    <a:schemeClr val="bg1"/>
-                  </a:solidFill>
+                <a:rPr lang="fr-FR" sz="1400" dirty="0" err="1">
                   <a:latin typeface="Arial" panose="020B0604020202020204" pitchFamily="34" charset="0"/>
                   <a:cs typeface="Arial" panose="020B0604020202020204" pitchFamily="34" charset="0"/>
                 </a:rPr>
-                <a:t>Skin </a:t>
+                <a:t>Learn</a:t>
               </a:r>
               <a:r>
-                <a:rPr lang="fr-FR" sz="1200" b="1" dirty="0" err="1">
-                  <a:solidFill>
-                    <a:schemeClr val="bg1"/>
-                  </a:solidFill>
+                <a:rPr lang="fr-FR" sz="1400" dirty="0">
                   <a:latin typeface="Arial" panose="020B0604020202020204" pitchFamily="34" charset="0"/>
                   <a:cs typeface="Arial" panose="020B0604020202020204" pitchFamily="34" charset="0"/>
                 </a:rPr>
-                <a:t>lesion</a:t>
+                <a:t> more</a:t>
               </a:r>
-              <a:r>
-                <a:rPr lang="fr-FR" sz="1200" b="1" dirty="0">
-                  <a:solidFill>
-                    <a:schemeClr val="bg1"/>
-                  </a:solidFill>
-                  <a:latin typeface="Arial" panose="020B0604020202020204" pitchFamily="34" charset="0"/>
-                  <a:cs typeface="Arial" panose="020B0604020202020204" pitchFamily="34" charset="0"/>
-                </a:rPr>
-                <a:t> </a:t>
-              </a:r>
-              <a:r>
-                <a:rPr lang="fr-FR" sz="1200" b="1" dirty="0" err="1">
-                  <a:solidFill>
-                    <a:schemeClr val="bg1"/>
-                  </a:solidFill>
-                  <a:latin typeface="Arial" panose="020B0604020202020204" pitchFamily="34" charset="0"/>
-                  <a:cs typeface="Arial" panose="020B0604020202020204" pitchFamily="34" charset="0"/>
-                </a:rPr>
-                <a:t>caracteristics</a:t>
-              </a:r>
-              <a:r>
-                <a:rPr lang="fr-FR" sz="1200" b="1" dirty="0">
-                  <a:solidFill>
-                    <a:schemeClr val="bg1"/>
-                  </a:solidFill>
-                  <a:latin typeface="Arial" panose="020B0604020202020204" pitchFamily="34" charset="0"/>
-                  <a:cs typeface="Arial" panose="020B0604020202020204" pitchFamily="34" charset="0"/>
-                </a:rPr>
-                <a:t> </a:t>
-              </a:r>
-              <a:r>
-                <a:rPr lang="fr-FR" sz="1200" b="1" dirty="0" err="1">
-                  <a:solidFill>
-                    <a:schemeClr val="bg1"/>
-                  </a:solidFill>
-                  <a:latin typeface="Arial" panose="020B0604020202020204" pitchFamily="34" charset="0"/>
-                  <a:cs typeface="Arial" panose="020B0604020202020204" pitchFamily="34" charset="0"/>
-                </a:rPr>
-                <a:t>requires</a:t>
-              </a:r>
-              <a:endParaRPr lang="fr-FR" sz="1200" b="1" dirty="0">
+            </a:p>
+          </p:txBody>
+        </p:sp>
+      </p:grpSp>
+      <p:graphicFrame>
+        <p:nvGraphicFramePr>
+          <p:cNvPr id="9" name="Tableau 13">
+            <a:extLst>
+              <a:ext uri="{FF2B5EF4-FFF2-40B4-BE49-F238E27FC236}">
+                <a16:creationId xmlns:a16="http://schemas.microsoft.com/office/drawing/2014/main" id="{F40622B8-BA24-3AFB-7623-479A58FC90A6}"/>
+              </a:ext>
+            </a:extLst>
+          </p:cNvPr>
+          <p:cNvGraphicFramePr>
+            <a:graphicFrameLocks noGrp="1"/>
+          </p:cNvGraphicFramePr>
+          <p:nvPr>
+            <p:extLst>
+              <p:ext uri="{D42A27DB-BD31-4B8C-83A1-F6EECF244321}">
+                <p14:modId xmlns:p14="http://schemas.microsoft.com/office/powerpoint/2010/main" val="4091021807"/>
+              </p:ext>
+            </p:extLst>
+          </p:nvPr>
+        </p:nvGraphicFramePr>
+        <p:xfrm>
+          <a:off x="1832591" y="3740896"/>
+          <a:ext cx="8128000" cy="2001520"/>
+        </p:xfrm>
+        <a:graphic>
+          <a:graphicData uri="http://schemas.openxmlformats.org/drawingml/2006/table">
+            <a:tbl>
+              <a:tblPr firstRow="1" bandRow="1">
+                <a:tableStyleId>{5C22544A-7EE6-4342-B048-85BDC9FD1C3A}</a:tableStyleId>
+              </a:tblPr>
+              <a:tblGrid>
+                <a:gridCol w="2032000">
+                  <a:extLst>
+                    <a:ext uri="{9D8B030D-6E8A-4147-A177-3AD203B41FA5}">
+                      <a16:colId xmlns:a16="http://schemas.microsoft.com/office/drawing/2014/main" val="2618624866"/>
+                    </a:ext>
+                  </a:extLst>
+                </a:gridCol>
+                <a:gridCol w="2032000">
+                  <a:extLst>
+                    <a:ext uri="{9D8B030D-6E8A-4147-A177-3AD203B41FA5}">
+                      <a16:colId xmlns:a16="http://schemas.microsoft.com/office/drawing/2014/main" val="3585698622"/>
+                    </a:ext>
+                  </a:extLst>
+                </a:gridCol>
+                <a:gridCol w="2032000">
+                  <a:extLst>
+                    <a:ext uri="{9D8B030D-6E8A-4147-A177-3AD203B41FA5}">
+                      <a16:colId xmlns:a16="http://schemas.microsoft.com/office/drawing/2014/main" val="3201907401"/>
+                    </a:ext>
+                  </a:extLst>
+                </a:gridCol>
+                <a:gridCol w="2032000">
+                  <a:extLst>
+                    <a:ext uri="{9D8B030D-6E8A-4147-A177-3AD203B41FA5}">
+                      <a16:colId xmlns:a16="http://schemas.microsoft.com/office/drawing/2014/main" val="24305379"/>
+                    </a:ext>
+                  </a:extLst>
+                </a:gridCol>
+              </a:tblGrid>
+              <a:tr h="370840">
+                <a:tc>
+                  <a:txBody>
+                    <a:bodyPr/>
+                    <a:lstStyle/>
+                    <a:p>
+                      <a:r>
+                        <a:rPr lang="fr-FR" sz="1400" b="0" dirty="0">
+                          <a:solidFill>
+                            <a:schemeClr val="bg2">
+                              <a:lumMod val="75000"/>
+                              <a:lumOff val="25000"/>
+                            </a:schemeClr>
+                          </a:solidFill>
+                          <a:latin typeface="Arial" panose="020B0604020202020204" pitchFamily="34" charset="0"/>
+                          <a:cs typeface="Arial" panose="020B0604020202020204" pitchFamily="34" charset="0"/>
+                        </a:rPr>
+                        <a:t>Name image</a:t>
+                      </a:r>
+                      <a:endParaRPr lang="en-US" sz="1400" b="0" dirty="0">
+                        <a:solidFill>
+                          <a:schemeClr val="bg2">
+                            <a:lumMod val="75000"/>
+                            <a:lumOff val="25000"/>
+                          </a:schemeClr>
+                        </a:solidFill>
+                        <a:latin typeface="Arial" panose="020B0604020202020204" pitchFamily="34" charset="0"/>
+                        <a:cs typeface="Arial" panose="020B0604020202020204" pitchFamily="34" charset="0"/>
+                      </a:endParaRPr>
+                    </a:p>
+                  </a:txBody>
+                  <a:tcPr>
+                    <a:lnT w="12700" cap="flat" cmpd="sng" algn="ctr">
+                      <a:solidFill>
+                        <a:schemeClr val="tx1"/>
+                      </a:solidFill>
+                      <a:prstDash val="solid"/>
+                      <a:round/>
+                      <a:headEnd type="none" w="med" len="med"/>
+                      <a:tailEnd type="none" w="med" len="med"/>
+                    </a:lnT>
+                    <a:lnB w="12700" cap="flat" cmpd="sng" algn="ctr">
+                      <a:solidFill>
+                        <a:schemeClr val="bg2">
+                          <a:lumMod val="50000"/>
+                          <a:lumOff val="50000"/>
+                        </a:schemeClr>
+                      </a:solidFill>
+                      <a:prstDash val="solid"/>
+                      <a:round/>
+                      <a:headEnd type="none" w="med" len="med"/>
+                      <a:tailEnd type="none" w="med" len="med"/>
+                    </a:lnB>
+                    <a:noFill/>
+                  </a:tcPr>
+                </a:tc>
+                <a:tc>
+                  <a:txBody>
+                    <a:bodyPr/>
+                    <a:lstStyle/>
+                    <a:p>
+                      <a:pPr algn="ctr"/>
+                      <a:r>
+                        <a:rPr lang="fr-FR" sz="1400" b="0" dirty="0">
+                          <a:solidFill>
+                            <a:schemeClr val="bg2">
+                              <a:lumMod val="75000"/>
+                              <a:lumOff val="25000"/>
+                            </a:schemeClr>
+                          </a:solidFill>
+                          <a:latin typeface="Arial" panose="020B0604020202020204" pitchFamily="34" charset="0"/>
+                          <a:cs typeface="Arial" panose="020B0604020202020204" pitchFamily="34" charset="0"/>
+                        </a:rPr>
+                        <a:t>Min </a:t>
+                      </a:r>
+                      <a:r>
+                        <a:rPr lang="fr-FR" sz="1400" b="0" dirty="0" err="1">
+                          <a:solidFill>
+                            <a:schemeClr val="bg2">
+                              <a:lumMod val="75000"/>
+                              <a:lumOff val="25000"/>
+                            </a:schemeClr>
+                          </a:solidFill>
+                          <a:latin typeface="Arial" panose="020B0604020202020204" pitchFamily="34" charset="0"/>
+                          <a:cs typeface="Arial" panose="020B0604020202020204" pitchFamily="34" charset="0"/>
+                        </a:rPr>
+                        <a:t>required</a:t>
+                      </a:r>
+                      <a:endParaRPr lang="en-US" sz="1400" b="0" dirty="0">
+                        <a:solidFill>
+                          <a:schemeClr val="bg2">
+                            <a:lumMod val="75000"/>
+                            <a:lumOff val="25000"/>
+                          </a:schemeClr>
+                        </a:solidFill>
+                        <a:latin typeface="Arial" panose="020B0604020202020204" pitchFamily="34" charset="0"/>
+                        <a:cs typeface="Arial" panose="020B0604020202020204" pitchFamily="34" charset="0"/>
+                      </a:endParaRPr>
+                    </a:p>
+                  </a:txBody>
+                  <a:tcPr>
+                    <a:lnT w="12700" cap="flat" cmpd="sng" algn="ctr">
+                      <a:solidFill>
+                        <a:schemeClr val="tx1"/>
+                      </a:solidFill>
+                      <a:prstDash val="solid"/>
+                      <a:round/>
+                      <a:headEnd type="none" w="med" len="med"/>
+                      <a:tailEnd type="none" w="med" len="med"/>
+                    </a:lnT>
+                    <a:lnB w="12700" cap="flat" cmpd="sng" algn="ctr">
+                      <a:solidFill>
+                        <a:schemeClr val="bg2">
+                          <a:lumMod val="50000"/>
+                          <a:lumOff val="50000"/>
+                        </a:schemeClr>
+                      </a:solidFill>
+                      <a:prstDash val="solid"/>
+                      <a:round/>
+                      <a:headEnd type="none" w="med" len="med"/>
+                      <a:tailEnd type="none" w="med" len="med"/>
+                    </a:lnB>
+                    <a:noFill/>
+                  </a:tcPr>
+                </a:tc>
+                <a:tc>
+                  <a:txBody>
+                    <a:bodyPr/>
+                    <a:lstStyle/>
+                    <a:p>
+                      <a:pPr algn="ctr"/>
+                      <a:r>
+                        <a:rPr lang="fr-FR" sz="1400" b="0" dirty="0">
+                          <a:solidFill>
+                            <a:schemeClr val="bg2">
+                              <a:lumMod val="75000"/>
+                              <a:lumOff val="25000"/>
+                            </a:schemeClr>
+                          </a:solidFill>
+                          <a:latin typeface="Arial" panose="020B0604020202020204" pitchFamily="34" charset="0"/>
+                          <a:cs typeface="Arial" panose="020B0604020202020204" pitchFamily="34" charset="0"/>
+                        </a:rPr>
+                        <a:t>Max</a:t>
+                      </a:r>
+                      <a:endParaRPr lang="en-US" sz="1400" b="0" dirty="0">
+                        <a:solidFill>
+                          <a:schemeClr val="bg2">
+                            <a:lumMod val="75000"/>
+                            <a:lumOff val="25000"/>
+                          </a:schemeClr>
+                        </a:solidFill>
+                        <a:latin typeface="Arial" panose="020B0604020202020204" pitchFamily="34" charset="0"/>
+                        <a:cs typeface="Arial" panose="020B0604020202020204" pitchFamily="34" charset="0"/>
+                      </a:endParaRPr>
+                    </a:p>
+                  </a:txBody>
+                  <a:tcPr>
+                    <a:lnT w="12700" cap="flat" cmpd="sng" algn="ctr">
+                      <a:solidFill>
+                        <a:schemeClr val="tx1"/>
+                      </a:solidFill>
+                      <a:prstDash val="solid"/>
+                      <a:round/>
+                      <a:headEnd type="none" w="med" len="med"/>
+                      <a:tailEnd type="none" w="med" len="med"/>
+                    </a:lnT>
+                    <a:lnB w="12700" cap="flat" cmpd="sng" algn="ctr">
+                      <a:solidFill>
+                        <a:schemeClr val="bg2">
+                          <a:lumMod val="50000"/>
+                          <a:lumOff val="50000"/>
+                        </a:schemeClr>
+                      </a:solidFill>
+                      <a:prstDash val="solid"/>
+                      <a:round/>
+                      <a:headEnd type="none" w="med" len="med"/>
+                      <a:tailEnd type="none" w="med" len="med"/>
+                    </a:lnB>
+                    <a:noFill/>
+                  </a:tcPr>
+                </a:tc>
+                <a:tc>
+                  <a:txBody>
+                    <a:bodyPr/>
+                    <a:lstStyle/>
+                    <a:p>
+                      <a:pPr algn="ctr"/>
+                      <a:r>
+                        <a:rPr lang="fr-FR" sz="1400" b="0" dirty="0" err="1">
+                          <a:solidFill>
+                            <a:schemeClr val="bg2">
+                              <a:lumMod val="75000"/>
+                              <a:lumOff val="25000"/>
+                            </a:schemeClr>
+                          </a:solidFill>
+                          <a:latin typeface="Arial" panose="020B0604020202020204" pitchFamily="34" charset="0"/>
+                          <a:cs typeface="Arial" panose="020B0604020202020204" pitchFamily="34" charset="0"/>
+                        </a:rPr>
+                        <a:t>Selected</a:t>
+                      </a:r>
+                      <a:endParaRPr lang="fr-FR" sz="1400" b="0" dirty="0">
+                        <a:solidFill>
+                          <a:schemeClr val="bg2">
+                            <a:lumMod val="75000"/>
+                            <a:lumOff val="25000"/>
+                          </a:schemeClr>
+                        </a:solidFill>
+                        <a:latin typeface="Arial" panose="020B0604020202020204" pitchFamily="34" charset="0"/>
+                        <a:cs typeface="Arial" panose="020B0604020202020204" pitchFamily="34" charset="0"/>
+                      </a:endParaRPr>
+                    </a:p>
+                    <a:p>
+                      <a:pPr algn="ctr"/>
+                      <a:endParaRPr lang="fr-FR" sz="1400" b="0" dirty="0">
+                        <a:solidFill>
+                          <a:schemeClr val="bg2">
+                            <a:lumMod val="75000"/>
+                            <a:lumOff val="25000"/>
+                          </a:schemeClr>
+                        </a:solidFill>
+                        <a:latin typeface="Arial" panose="020B0604020202020204" pitchFamily="34" charset="0"/>
+                        <a:cs typeface="Arial" panose="020B0604020202020204" pitchFamily="34" charset="0"/>
+                      </a:endParaRPr>
+                    </a:p>
+                  </a:txBody>
+                  <a:tcPr>
+                    <a:lnT w="12700" cap="flat" cmpd="sng" algn="ctr">
+                      <a:solidFill>
+                        <a:schemeClr val="tx1"/>
+                      </a:solidFill>
+                      <a:prstDash val="solid"/>
+                      <a:round/>
+                      <a:headEnd type="none" w="med" len="med"/>
+                      <a:tailEnd type="none" w="med" len="med"/>
+                    </a:lnT>
+                    <a:lnB w="12700" cap="flat" cmpd="sng" algn="ctr">
+                      <a:solidFill>
+                        <a:schemeClr val="bg2">
+                          <a:lumMod val="50000"/>
+                          <a:lumOff val="50000"/>
+                        </a:schemeClr>
+                      </a:solidFill>
+                      <a:prstDash val="solid"/>
+                      <a:round/>
+                      <a:headEnd type="none" w="med" len="med"/>
+                      <a:tailEnd type="none" w="med" len="med"/>
+                    </a:lnB>
+                    <a:noFill/>
+                  </a:tcPr>
+                </a:tc>
+                <a:extLst>
+                  <a:ext uri="{0D108BD9-81ED-4DB2-BD59-A6C34878D82A}">
+                    <a16:rowId xmlns:a16="http://schemas.microsoft.com/office/drawing/2014/main" val="1015080944"/>
+                  </a:ext>
+                </a:extLst>
+              </a:tr>
+              <a:tr h="370840">
+                <a:tc>
+                  <a:txBody>
+                    <a:bodyPr/>
+                    <a:lstStyle/>
+                    <a:p>
+                      <a:r>
+                        <a:rPr lang="fr-FR" sz="1200" b="0" dirty="0" err="1">
+                          <a:solidFill>
+                            <a:schemeClr val="bg2">
+                              <a:lumMod val="75000"/>
+                              <a:lumOff val="25000"/>
+                            </a:schemeClr>
+                          </a:solidFill>
+                          <a:latin typeface="Arial" panose="020B0604020202020204" pitchFamily="34" charset="0"/>
+                          <a:cs typeface="Arial" panose="020B0604020202020204" pitchFamily="34" charset="0"/>
+                        </a:rPr>
+                        <a:t>Dermatoscopy</a:t>
+                      </a:r>
+                      <a:endParaRPr lang="en-US" sz="1200" b="0" dirty="0">
+                        <a:solidFill>
+                          <a:schemeClr val="bg2">
+                            <a:lumMod val="75000"/>
+                            <a:lumOff val="25000"/>
+                          </a:schemeClr>
+                        </a:solidFill>
+                        <a:latin typeface="Arial" panose="020B0604020202020204" pitchFamily="34" charset="0"/>
+                        <a:cs typeface="Arial" panose="020B0604020202020204" pitchFamily="34" charset="0"/>
+                      </a:endParaRPr>
+                    </a:p>
+                  </a:txBody>
+                  <a:tcPr anchor="ctr">
+                    <a:lnT w="12700" cap="flat" cmpd="sng" algn="ctr">
+                      <a:solidFill>
+                        <a:schemeClr val="bg2">
+                          <a:lumMod val="50000"/>
+                          <a:lumOff val="50000"/>
+                        </a:schemeClr>
+                      </a:solidFill>
+                      <a:prstDash val="solid"/>
+                      <a:round/>
+                      <a:headEnd type="none" w="med" len="med"/>
+                      <a:tailEnd type="none" w="med" len="med"/>
+                    </a:lnT>
+                    <a:lnB w="12700" cap="flat" cmpd="sng" algn="ctr">
+                      <a:solidFill>
+                        <a:schemeClr val="bg2">
+                          <a:lumMod val="50000"/>
+                          <a:lumOff val="50000"/>
+                        </a:schemeClr>
+                      </a:solidFill>
+                      <a:prstDash val="solid"/>
+                      <a:round/>
+                      <a:headEnd type="none" w="med" len="med"/>
+                      <a:tailEnd type="none" w="med" len="med"/>
+                    </a:lnB>
+                    <a:noFill/>
+                  </a:tcPr>
+                </a:tc>
+                <a:tc>
+                  <a:txBody>
+                    <a:bodyPr/>
+                    <a:lstStyle/>
+                    <a:p>
+                      <a:pPr algn="ctr"/>
+                      <a:r>
+                        <a:rPr lang="fr-FR" sz="1200" b="0" dirty="0">
+                          <a:solidFill>
+                            <a:schemeClr val="bg2">
+                              <a:lumMod val="75000"/>
+                              <a:lumOff val="25000"/>
+                            </a:schemeClr>
+                          </a:solidFill>
+                          <a:latin typeface="Arial" panose="020B0604020202020204" pitchFamily="34" charset="0"/>
+                          <a:cs typeface="Arial" panose="020B0604020202020204" pitchFamily="34" charset="0"/>
+                        </a:rPr>
+                        <a:t>2</a:t>
+                      </a:r>
+                      <a:endParaRPr lang="en-US" sz="1200" b="0" dirty="0">
+                        <a:solidFill>
+                          <a:schemeClr val="bg2">
+                            <a:lumMod val="75000"/>
+                            <a:lumOff val="25000"/>
+                          </a:schemeClr>
+                        </a:solidFill>
+                        <a:latin typeface="Arial" panose="020B0604020202020204" pitchFamily="34" charset="0"/>
+                        <a:cs typeface="Arial" panose="020B0604020202020204" pitchFamily="34" charset="0"/>
+                      </a:endParaRPr>
+                    </a:p>
+                  </a:txBody>
+                  <a:tcPr anchor="ctr">
+                    <a:lnT w="12700" cap="flat" cmpd="sng" algn="ctr">
+                      <a:solidFill>
+                        <a:schemeClr val="bg2">
+                          <a:lumMod val="50000"/>
+                          <a:lumOff val="50000"/>
+                        </a:schemeClr>
+                      </a:solidFill>
+                      <a:prstDash val="solid"/>
+                      <a:round/>
+                      <a:headEnd type="none" w="med" len="med"/>
+                      <a:tailEnd type="none" w="med" len="med"/>
+                    </a:lnT>
+                    <a:lnB w="12700" cap="flat" cmpd="sng" algn="ctr">
+                      <a:solidFill>
+                        <a:schemeClr val="bg2">
+                          <a:lumMod val="50000"/>
+                          <a:lumOff val="50000"/>
+                        </a:schemeClr>
+                      </a:solidFill>
+                      <a:prstDash val="solid"/>
+                      <a:round/>
+                      <a:headEnd type="none" w="med" len="med"/>
+                      <a:tailEnd type="none" w="med" len="med"/>
+                    </a:lnB>
+                    <a:noFill/>
+                  </a:tcPr>
+                </a:tc>
+                <a:tc>
+                  <a:txBody>
+                    <a:bodyPr/>
+                    <a:lstStyle/>
+                    <a:p>
+                      <a:pPr algn="ctr"/>
+                      <a:r>
+                        <a:rPr lang="fr-FR" sz="1200" b="0" dirty="0">
+                          <a:solidFill>
+                            <a:schemeClr val="bg2">
+                              <a:lumMod val="75000"/>
+                              <a:lumOff val="25000"/>
+                            </a:schemeClr>
+                          </a:solidFill>
+                          <a:latin typeface="Arial" panose="020B0604020202020204" pitchFamily="34" charset="0"/>
+                          <a:cs typeface="Arial" panose="020B0604020202020204" pitchFamily="34" charset="0"/>
+                        </a:rPr>
+                        <a:t>4</a:t>
+                      </a:r>
+                      <a:endParaRPr lang="en-US" sz="1200" b="0" dirty="0">
+                        <a:solidFill>
+                          <a:schemeClr val="bg2">
+                            <a:lumMod val="75000"/>
+                            <a:lumOff val="25000"/>
+                          </a:schemeClr>
+                        </a:solidFill>
+                        <a:latin typeface="Arial" panose="020B0604020202020204" pitchFamily="34" charset="0"/>
+                        <a:cs typeface="Arial" panose="020B0604020202020204" pitchFamily="34" charset="0"/>
+                      </a:endParaRPr>
+                    </a:p>
+                  </a:txBody>
+                  <a:tcPr anchor="ctr">
+                    <a:lnT w="12700" cap="flat" cmpd="sng" algn="ctr">
+                      <a:solidFill>
+                        <a:schemeClr val="bg2">
+                          <a:lumMod val="50000"/>
+                          <a:lumOff val="50000"/>
+                        </a:schemeClr>
+                      </a:solidFill>
+                      <a:prstDash val="solid"/>
+                      <a:round/>
+                      <a:headEnd type="none" w="med" len="med"/>
+                      <a:tailEnd type="none" w="med" len="med"/>
+                    </a:lnT>
+                    <a:lnB w="12700" cap="flat" cmpd="sng" algn="ctr">
+                      <a:solidFill>
+                        <a:schemeClr val="bg2">
+                          <a:lumMod val="50000"/>
+                          <a:lumOff val="50000"/>
+                        </a:schemeClr>
+                      </a:solidFill>
+                      <a:prstDash val="solid"/>
+                      <a:round/>
+                      <a:headEnd type="none" w="med" len="med"/>
+                      <a:tailEnd type="none" w="med" len="med"/>
+                    </a:lnB>
+                    <a:noFill/>
+                  </a:tcPr>
+                </a:tc>
+                <a:tc>
+                  <a:txBody>
+                    <a:bodyPr/>
+                    <a:lstStyle/>
+                    <a:p>
+                      <a:pPr algn="ctr"/>
+                      <a:r>
+                        <a:rPr lang="fr-FR" sz="1200" b="0" dirty="0">
+                          <a:solidFill>
+                            <a:schemeClr val="bg2">
+                              <a:lumMod val="75000"/>
+                              <a:lumOff val="25000"/>
+                            </a:schemeClr>
+                          </a:solidFill>
+                          <a:latin typeface="Arial" panose="020B0604020202020204" pitchFamily="34" charset="0"/>
+                          <a:cs typeface="Arial" panose="020B0604020202020204" pitchFamily="34" charset="0"/>
+                        </a:rPr>
+                        <a:t>1</a:t>
+                      </a:r>
+                    </a:p>
+                  </a:txBody>
+                  <a:tcPr anchor="ctr">
+                    <a:lnT w="12700" cap="flat" cmpd="sng" algn="ctr">
+                      <a:solidFill>
+                        <a:schemeClr val="bg2">
+                          <a:lumMod val="50000"/>
+                          <a:lumOff val="50000"/>
+                        </a:schemeClr>
+                      </a:solidFill>
+                      <a:prstDash val="solid"/>
+                      <a:round/>
+                      <a:headEnd type="none" w="med" len="med"/>
+                      <a:tailEnd type="none" w="med" len="med"/>
+                    </a:lnT>
+                    <a:lnB w="12700" cap="flat" cmpd="sng" algn="ctr">
+                      <a:solidFill>
+                        <a:schemeClr val="bg2">
+                          <a:lumMod val="50000"/>
+                          <a:lumOff val="50000"/>
+                        </a:schemeClr>
+                      </a:solidFill>
+                      <a:prstDash val="solid"/>
+                      <a:round/>
+                      <a:headEnd type="none" w="med" len="med"/>
+                      <a:tailEnd type="none" w="med" len="med"/>
+                    </a:lnB>
+                    <a:noFill/>
+                  </a:tcPr>
+                </a:tc>
+                <a:extLst>
+                  <a:ext uri="{0D108BD9-81ED-4DB2-BD59-A6C34878D82A}">
+                    <a16:rowId xmlns:a16="http://schemas.microsoft.com/office/drawing/2014/main" val="969726278"/>
+                  </a:ext>
+                </a:extLst>
+              </a:tr>
+              <a:tr h="370840">
+                <a:tc>
+                  <a:txBody>
+                    <a:bodyPr/>
+                    <a:lstStyle/>
+                    <a:p>
+                      <a:r>
+                        <a:rPr lang="fr-FR" sz="1200" b="0" dirty="0" err="1">
+                          <a:solidFill>
+                            <a:schemeClr val="bg2">
+                              <a:lumMod val="75000"/>
+                              <a:lumOff val="25000"/>
+                            </a:schemeClr>
+                          </a:solidFill>
+                          <a:latin typeface="Arial" panose="020B0604020202020204" pitchFamily="34" charset="0"/>
+                          <a:cs typeface="Arial" panose="020B0604020202020204" pitchFamily="34" charset="0"/>
+                        </a:rPr>
+                        <a:t>Microscopy</a:t>
+                      </a:r>
+                      <a:endParaRPr lang="en-US" sz="1200" b="0" dirty="0">
+                        <a:solidFill>
+                          <a:schemeClr val="bg2">
+                            <a:lumMod val="75000"/>
+                            <a:lumOff val="25000"/>
+                          </a:schemeClr>
+                        </a:solidFill>
+                        <a:latin typeface="Arial" panose="020B0604020202020204" pitchFamily="34" charset="0"/>
+                        <a:cs typeface="Arial" panose="020B0604020202020204" pitchFamily="34" charset="0"/>
+                      </a:endParaRPr>
+                    </a:p>
+                  </a:txBody>
+                  <a:tcPr anchor="ctr">
+                    <a:lnT w="12700" cap="flat" cmpd="sng" algn="ctr">
+                      <a:solidFill>
+                        <a:schemeClr val="bg2">
+                          <a:lumMod val="50000"/>
+                          <a:lumOff val="50000"/>
+                        </a:schemeClr>
+                      </a:solidFill>
+                      <a:prstDash val="solid"/>
+                      <a:round/>
+                      <a:headEnd type="none" w="med" len="med"/>
+                      <a:tailEnd type="none" w="med" len="med"/>
+                    </a:lnT>
+                    <a:lnB w="12700" cap="flat" cmpd="sng" algn="ctr">
+                      <a:solidFill>
+                        <a:schemeClr val="bg2">
+                          <a:lumMod val="50000"/>
+                          <a:lumOff val="50000"/>
+                        </a:schemeClr>
+                      </a:solidFill>
+                      <a:prstDash val="solid"/>
+                      <a:round/>
+                      <a:headEnd type="none" w="med" len="med"/>
+                      <a:tailEnd type="none" w="med" len="med"/>
+                    </a:lnB>
+                    <a:noFill/>
+                  </a:tcPr>
+                </a:tc>
+                <a:tc>
+                  <a:txBody>
+                    <a:bodyPr/>
+                    <a:lstStyle/>
+                    <a:p>
+                      <a:pPr algn="ctr"/>
+                      <a:r>
+                        <a:rPr lang="fr-FR" sz="1200" b="0" dirty="0">
+                          <a:solidFill>
+                            <a:schemeClr val="bg2">
+                              <a:lumMod val="75000"/>
+                              <a:lumOff val="25000"/>
+                            </a:schemeClr>
+                          </a:solidFill>
+                          <a:latin typeface="Arial" panose="020B0604020202020204" pitchFamily="34" charset="0"/>
+                          <a:cs typeface="Arial" panose="020B0604020202020204" pitchFamily="34" charset="0"/>
+                        </a:rPr>
+                        <a:t>5</a:t>
+                      </a:r>
+                      <a:endParaRPr lang="en-US" sz="1200" b="0" dirty="0">
+                        <a:solidFill>
+                          <a:schemeClr val="bg2">
+                            <a:lumMod val="75000"/>
+                            <a:lumOff val="25000"/>
+                          </a:schemeClr>
+                        </a:solidFill>
+                        <a:latin typeface="Arial" panose="020B0604020202020204" pitchFamily="34" charset="0"/>
+                        <a:cs typeface="Arial" panose="020B0604020202020204" pitchFamily="34" charset="0"/>
+                      </a:endParaRPr>
+                    </a:p>
+                  </a:txBody>
+                  <a:tcPr anchor="ctr">
+                    <a:lnT w="12700" cap="flat" cmpd="sng" algn="ctr">
+                      <a:solidFill>
+                        <a:schemeClr val="bg2">
+                          <a:lumMod val="50000"/>
+                          <a:lumOff val="50000"/>
+                        </a:schemeClr>
+                      </a:solidFill>
+                      <a:prstDash val="solid"/>
+                      <a:round/>
+                      <a:headEnd type="none" w="med" len="med"/>
+                      <a:tailEnd type="none" w="med" len="med"/>
+                    </a:lnT>
+                    <a:lnB w="12700" cap="flat" cmpd="sng" algn="ctr">
+                      <a:solidFill>
+                        <a:schemeClr val="bg2">
+                          <a:lumMod val="50000"/>
+                          <a:lumOff val="50000"/>
+                        </a:schemeClr>
+                      </a:solidFill>
+                      <a:prstDash val="solid"/>
+                      <a:round/>
+                      <a:headEnd type="none" w="med" len="med"/>
+                      <a:tailEnd type="none" w="med" len="med"/>
+                    </a:lnB>
+                    <a:noFill/>
+                  </a:tcPr>
+                </a:tc>
+                <a:tc>
+                  <a:txBody>
+                    <a:bodyPr/>
+                    <a:lstStyle/>
+                    <a:p>
+                      <a:pPr algn="ctr"/>
+                      <a:r>
+                        <a:rPr lang="fr-FR" sz="1200" b="0" dirty="0">
+                          <a:solidFill>
+                            <a:schemeClr val="bg2">
+                              <a:lumMod val="75000"/>
+                              <a:lumOff val="25000"/>
+                            </a:schemeClr>
+                          </a:solidFill>
+                          <a:latin typeface="Arial" panose="020B0604020202020204" pitchFamily="34" charset="0"/>
+                          <a:cs typeface="Arial" panose="020B0604020202020204" pitchFamily="34" charset="0"/>
+                        </a:rPr>
+                        <a:t>10</a:t>
+                      </a:r>
+                      <a:endParaRPr lang="en-US" sz="1200" b="0" dirty="0">
+                        <a:solidFill>
+                          <a:schemeClr val="bg2">
+                            <a:lumMod val="75000"/>
+                            <a:lumOff val="25000"/>
+                          </a:schemeClr>
+                        </a:solidFill>
+                        <a:latin typeface="Arial" panose="020B0604020202020204" pitchFamily="34" charset="0"/>
+                        <a:cs typeface="Arial" panose="020B0604020202020204" pitchFamily="34" charset="0"/>
+                      </a:endParaRPr>
+                    </a:p>
+                  </a:txBody>
+                  <a:tcPr anchor="ctr">
+                    <a:lnT w="12700" cap="flat" cmpd="sng" algn="ctr">
+                      <a:solidFill>
+                        <a:schemeClr val="bg2">
+                          <a:lumMod val="50000"/>
+                          <a:lumOff val="50000"/>
+                        </a:schemeClr>
+                      </a:solidFill>
+                      <a:prstDash val="solid"/>
+                      <a:round/>
+                      <a:headEnd type="none" w="med" len="med"/>
+                      <a:tailEnd type="none" w="med" len="med"/>
+                    </a:lnT>
+                    <a:lnB w="12700" cap="flat" cmpd="sng" algn="ctr">
+                      <a:solidFill>
+                        <a:schemeClr val="bg2">
+                          <a:lumMod val="50000"/>
+                          <a:lumOff val="50000"/>
+                        </a:schemeClr>
+                      </a:solidFill>
+                      <a:prstDash val="solid"/>
+                      <a:round/>
+                      <a:headEnd type="none" w="med" len="med"/>
+                      <a:tailEnd type="none" w="med" len="med"/>
+                    </a:lnB>
+                    <a:noFill/>
+                  </a:tcPr>
+                </a:tc>
+                <a:tc>
+                  <a:txBody>
+                    <a:bodyPr/>
+                    <a:lstStyle/>
+                    <a:p>
+                      <a:pPr algn="ctr"/>
+                      <a:r>
+                        <a:rPr lang="fr-FR" sz="1200" b="0" dirty="0">
+                          <a:solidFill>
+                            <a:schemeClr val="bg2">
+                              <a:lumMod val="75000"/>
+                              <a:lumOff val="25000"/>
+                            </a:schemeClr>
+                          </a:solidFill>
+                          <a:latin typeface="Arial" panose="020B0604020202020204" pitchFamily="34" charset="0"/>
+                          <a:cs typeface="Arial" panose="020B0604020202020204" pitchFamily="34" charset="0"/>
+                        </a:rPr>
+                        <a:t>3</a:t>
+                      </a:r>
+                    </a:p>
+                  </a:txBody>
+                  <a:tcPr anchor="ctr">
+                    <a:lnT w="12700" cap="flat" cmpd="sng" algn="ctr">
+                      <a:solidFill>
+                        <a:schemeClr val="bg2">
+                          <a:lumMod val="50000"/>
+                          <a:lumOff val="50000"/>
+                        </a:schemeClr>
+                      </a:solidFill>
+                      <a:prstDash val="solid"/>
+                      <a:round/>
+                      <a:headEnd type="none" w="med" len="med"/>
+                      <a:tailEnd type="none" w="med" len="med"/>
+                    </a:lnT>
+                    <a:lnB w="12700" cap="flat" cmpd="sng" algn="ctr">
+                      <a:solidFill>
+                        <a:schemeClr val="bg2">
+                          <a:lumMod val="50000"/>
+                          <a:lumOff val="50000"/>
+                        </a:schemeClr>
+                      </a:solidFill>
+                      <a:prstDash val="solid"/>
+                      <a:round/>
+                      <a:headEnd type="none" w="med" len="med"/>
+                      <a:tailEnd type="none" w="med" len="med"/>
+                    </a:lnB>
+                    <a:noFill/>
+                  </a:tcPr>
+                </a:tc>
+                <a:extLst>
+                  <a:ext uri="{0D108BD9-81ED-4DB2-BD59-A6C34878D82A}">
+                    <a16:rowId xmlns:a16="http://schemas.microsoft.com/office/drawing/2014/main" val="1601983398"/>
+                  </a:ext>
+                </a:extLst>
+              </a:tr>
+              <a:tr h="370840">
+                <a:tc>
+                  <a:txBody>
+                    <a:bodyPr/>
+                    <a:lstStyle/>
+                    <a:p>
+                      <a:r>
+                        <a:rPr lang="fr-FR" sz="1200" b="0" dirty="0" err="1">
+                          <a:solidFill>
+                            <a:schemeClr val="bg2">
+                              <a:lumMod val="75000"/>
+                              <a:lumOff val="25000"/>
+                            </a:schemeClr>
+                          </a:solidFill>
+                          <a:latin typeface="Arial" panose="020B0604020202020204" pitchFamily="34" charset="0"/>
+                          <a:cs typeface="Arial" panose="020B0604020202020204" pitchFamily="34" charset="0"/>
+                        </a:rPr>
+                        <a:t>Medical</a:t>
+                      </a:r>
+                      <a:r>
+                        <a:rPr lang="fr-FR" sz="1200" b="0" dirty="0">
+                          <a:solidFill>
+                            <a:schemeClr val="bg2">
+                              <a:lumMod val="75000"/>
+                              <a:lumOff val="25000"/>
+                            </a:schemeClr>
+                          </a:solidFill>
+                          <a:latin typeface="Arial" panose="020B0604020202020204" pitchFamily="34" charset="0"/>
+                          <a:cs typeface="Arial" panose="020B0604020202020204" pitchFamily="34" charset="0"/>
+                        </a:rPr>
+                        <a:t> image</a:t>
+                      </a:r>
+                      <a:endParaRPr lang="en-US" sz="1200" b="0" dirty="0">
+                        <a:solidFill>
+                          <a:schemeClr val="bg2">
+                            <a:lumMod val="75000"/>
+                            <a:lumOff val="25000"/>
+                          </a:schemeClr>
+                        </a:solidFill>
+                        <a:latin typeface="Arial" panose="020B0604020202020204" pitchFamily="34" charset="0"/>
+                        <a:cs typeface="Arial" panose="020B0604020202020204" pitchFamily="34" charset="0"/>
+                      </a:endParaRPr>
+                    </a:p>
+                  </a:txBody>
+                  <a:tcPr anchor="ctr">
+                    <a:lnT w="12700" cap="flat" cmpd="sng" algn="ctr">
+                      <a:solidFill>
+                        <a:schemeClr val="bg2">
+                          <a:lumMod val="50000"/>
+                          <a:lumOff val="50000"/>
+                        </a:schemeClr>
+                      </a:solidFill>
+                      <a:prstDash val="solid"/>
+                      <a:round/>
+                      <a:headEnd type="none" w="med" len="med"/>
+                      <a:tailEnd type="none" w="med" len="med"/>
+                    </a:lnT>
+                    <a:lnB w="12700" cap="flat" cmpd="sng" algn="ctr">
+                      <a:solidFill>
+                        <a:schemeClr val="bg2">
+                          <a:lumMod val="50000"/>
+                          <a:lumOff val="50000"/>
+                        </a:schemeClr>
+                      </a:solidFill>
+                      <a:prstDash val="solid"/>
+                      <a:round/>
+                      <a:headEnd type="none" w="med" len="med"/>
+                      <a:tailEnd type="none" w="med" len="med"/>
+                    </a:lnB>
+                    <a:noFill/>
+                  </a:tcPr>
+                </a:tc>
+                <a:tc>
+                  <a:txBody>
+                    <a:bodyPr/>
+                    <a:lstStyle/>
+                    <a:p>
+                      <a:pPr algn="ctr"/>
+                      <a:r>
+                        <a:rPr lang="fr-FR" sz="1200" b="0" dirty="0">
+                          <a:solidFill>
+                            <a:schemeClr val="bg2">
+                              <a:lumMod val="75000"/>
+                              <a:lumOff val="25000"/>
+                            </a:schemeClr>
+                          </a:solidFill>
+                          <a:latin typeface="Arial" panose="020B0604020202020204" pitchFamily="34" charset="0"/>
+                          <a:cs typeface="Arial" panose="020B0604020202020204" pitchFamily="34" charset="0"/>
+                        </a:rPr>
+                        <a:t>0</a:t>
+                      </a:r>
+                      <a:endParaRPr lang="en-US" sz="1200" b="0" dirty="0">
+                        <a:solidFill>
+                          <a:schemeClr val="bg2">
+                            <a:lumMod val="75000"/>
+                            <a:lumOff val="25000"/>
+                          </a:schemeClr>
+                        </a:solidFill>
+                        <a:latin typeface="Arial" panose="020B0604020202020204" pitchFamily="34" charset="0"/>
+                        <a:cs typeface="Arial" panose="020B0604020202020204" pitchFamily="34" charset="0"/>
+                      </a:endParaRPr>
+                    </a:p>
+                  </a:txBody>
+                  <a:tcPr anchor="ctr">
+                    <a:lnT w="12700" cap="flat" cmpd="sng" algn="ctr">
+                      <a:solidFill>
+                        <a:schemeClr val="bg2">
+                          <a:lumMod val="50000"/>
+                          <a:lumOff val="50000"/>
+                        </a:schemeClr>
+                      </a:solidFill>
+                      <a:prstDash val="solid"/>
+                      <a:round/>
+                      <a:headEnd type="none" w="med" len="med"/>
+                      <a:tailEnd type="none" w="med" len="med"/>
+                    </a:lnT>
+                    <a:lnB w="12700" cap="flat" cmpd="sng" algn="ctr">
+                      <a:solidFill>
+                        <a:schemeClr val="bg2">
+                          <a:lumMod val="50000"/>
+                          <a:lumOff val="50000"/>
+                        </a:schemeClr>
+                      </a:solidFill>
+                      <a:prstDash val="solid"/>
+                      <a:round/>
+                      <a:headEnd type="none" w="med" len="med"/>
+                      <a:tailEnd type="none" w="med" len="med"/>
+                    </a:lnB>
+                    <a:noFill/>
+                  </a:tcPr>
+                </a:tc>
+                <a:tc>
+                  <a:txBody>
+                    <a:bodyPr/>
+                    <a:lstStyle/>
+                    <a:p>
+                      <a:pPr algn="ctr"/>
+                      <a:r>
+                        <a:rPr lang="fr-FR" sz="1200" b="0" dirty="0">
+                          <a:solidFill>
+                            <a:schemeClr val="bg2">
+                              <a:lumMod val="75000"/>
+                              <a:lumOff val="25000"/>
+                            </a:schemeClr>
+                          </a:solidFill>
+                          <a:latin typeface="Arial" panose="020B0604020202020204" pitchFamily="34" charset="0"/>
+                          <a:cs typeface="Arial" panose="020B0604020202020204" pitchFamily="34" charset="0"/>
+                        </a:rPr>
+                        <a:t>1</a:t>
+                      </a:r>
+                      <a:endParaRPr lang="en-US" sz="1200" b="0" dirty="0">
+                        <a:solidFill>
+                          <a:schemeClr val="bg2">
+                            <a:lumMod val="75000"/>
+                            <a:lumOff val="25000"/>
+                          </a:schemeClr>
+                        </a:solidFill>
+                        <a:latin typeface="Arial" panose="020B0604020202020204" pitchFamily="34" charset="0"/>
+                        <a:cs typeface="Arial" panose="020B0604020202020204" pitchFamily="34" charset="0"/>
+                      </a:endParaRPr>
+                    </a:p>
+                  </a:txBody>
+                  <a:tcPr anchor="ctr">
+                    <a:lnT w="12700" cap="flat" cmpd="sng" algn="ctr">
+                      <a:solidFill>
+                        <a:schemeClr val="bg2">
+                          <a:lumMod val="50000"/>
+                          <a:lumOff val="50000"/>
+                        </a:schemeClr>
+                      </a:solidFill>
+                      <a:prstDash val="solid"/>
+                      <a:round/>
+                      <a:headEnd type="none" w="med" len="med"/>
+                      <a:tailEnd type="none" w="med" len="med"/>
+                    </a:lnT>
+                    <a:lnB w="12700" cap="flat" cmpd="sng" algn="ctr">
+                      <a:solidFill>
+                        <a:schemeClr val="bg2">
+                          <a:lumMod val="50000"/>
+                          <a:lumOff val="50000"/>
+                        </a:schemeClr>
+                      </a:solidFill>
+                      <a:prstDash val="solid"/>
+                      <a:round/>
+                      <a:headEnd type="none" w="med" len="med"/>
+                      <a:tailEnd type="none" w="med" len="med"/>
+                    </a:lnB>
+                    <a:noFill/>
+                  </a:tcPr>
+                </a:tc>
+                <a:tc>
+                  <a:txBody>
+                    <a:bodyPr/>
+                    <a:lstStyle/>
+                    <a:p>
+                      <a:pPr algn="ctr"/>
+                      <a:r>
+                        <a:rPr lang="fr-FR" sz="1200" b="0" dirty="0">
+                          <a:solidFill>
+                            <a:schemeClr val="bg2">
+                              <a:lumMod val="75000"/>
+                              <a:lumOff val="25000"/>
+                            </a:schemeClr>
+                          </a:solidFill>
+                          <a:latin typeface="Arial" panose="020B0604020202020204" pitchFamily="34" charset="0"/>
+                          <a:cs typeface="Arial" panose="020B0604020202020204" pitchFamily="34" charset="0"/>
+                        </a:rPr>
+                        <a:t>0</a:t>
+                      </a:r>
+                    </a:p>
+                  </a:txBody>
+                  <a:tcPr anchor="ctr">
+                    <a:lnT w="12700" cap="flat" cmpd="sng" algn="ctr">
+                      <a:solidFill>
+                        <a:schemeClr val="bg2">
+                          <a:lumMod val="50000"/>
+                          <a:lumOff val="50000"/>
+                        </a:schemeClr>
+                      </a:solidFill>
+                      <a:prstDash val="solid"/>
+                      <a:round/>
+                      <a:headEnd type="none" w="med" len="med"/>
+                      <a:tailEnd type="none" w="med" len="med"/>
+                    </a:lnT>
+                    <a:lnB w="12700" cap="flat" cmpd="sng" algn="ctr">
+                      <a:solidFill>
+                        <a:schemeClr val="bg2">
+                          <a:lumMod val="50000"/>
+                          <a:lumOff val="50000"/>
+                        </a:schemeClr>
+                      </a:solidFill>
+                      <a:prstDash val="solid"/>
+                      <a:round/>
+                      <a:headEnd type="none" w="med" len="med"/>
+                      <a:tailEnd type="none" w="med" len="med"/>
+                    </a:lnB>
+                    <a:noFill/>
+                  </a:tcPr>
+                </a:tc>
+                <a:extLst>
+                  <a:ext uri="{0D108BD9-81ED-4DB2-BD59-A6C34878D82A}">
+                    <a16:rowId xmlns:a16="http://schemas.microsoft.com/office/drawing/2014/main" val="396915676"/>
+                  </a:ext>
+                </a:extLst>
+              </a:tr>
+              <a:tr h="370840">
+                <a:tc>
+                  <a:txBody>
+                    <a:bodyPr/>
+                    <a:lstStyle/>
+                    <a:p>
+                      <a:r>
+                        <a:rPr lang="fr-FR" sz="1200" b="0" dirty="0" err="1">
+                          <a:solidFill>
+                            <a:schemeClr val="bg2">
+                              <a:lumMod val="75000"/>
+                              <a:lumOff val="25000"/>
+                            </a:schemeClr>
+                          </a:solidFill>
+                          <a:latin typeface="Arial" panose="020B0604020202020204" pitchFamily="34" charset="0"/>
+                          <a:cs typeface="Arial" panose="020B0604020202020204" pitchFamily="34" charset="0"/>
+                        </a:rPr>
+                        <a:t>Other</a:t>
+                      </a:r>
+                      <a:endParaRPr lang="en-US" sz="1200" b="0" dirty="0">
+                        <a:solidFill>
+                          <a:schemeClr val="bg2">
+                            <a:lumMod val="75000"/>
+                            <a:lumOff val="25000"/>
+                          </a:schemeClr>
+                        </a:solidFill>
+                        <a:latin typeface="Arial" panose="020B0604020202020204" pitchFamily="34" charset="0"/>
+                        <a:cs typeface="Arial" panose="020B0604020202020204" pitchFamily="34" charset="0"/>
+                      </a:endParaRPr>
+                    </a:p>
+                  </a:txBody>
+                  <a:tcPr anchor="ctr">
+                    <a:lnT w="12700" cap="flat" cmpd="sng" algn="ctr">
+                      <a:solidFill>
+                        <a:schemeClr val="bg2">
+                          <a:lumMod val="50000"/>
+                          <a:lumOff val="50000"/>
+                        </a:schemeClr>
+                      </a:solidFill>
+                      <a:prstDash val="solid"/>
+                      <a:round/>
+                      <a:headEnd type="none" w="med" len="med"/>
+                      <a:tailEnd type="none" w="med" len="med"/>
+                    </a:lnT>
+                    <a:lnB w="12700" cap="flat" cmpd="sng" algn="ctr">
+                      <a:solidFill>
+                        <a:schemeClr val="bg2">
+                          <a:lumMod val="50000"/>
+                          <a:lumOff val="50000"/>
+                        </a:schemeClr>
+                      </a:solidFill>
+                      <a:prstDash val="solid"/>
+                      <a:round/>
+                      <a:headEnd type="none" w="med" len="med"/>
+                      <a:tailEnd type="none" w="med" len="med"/>
+                    </a:lnB>
+                    <a:noFill/>
+                  </a:tcPr>
+                </a:tc>
+                <a:tc>
+                  <a:txBody>
+                    <a:bodyPr/>
+                    <a:lstStyle/>
+                    <a:p>
+                      <a:pPr algn="ctr"/>
+                      <a:r>
+                        <a:rPr lang="fr-FR" sz="1200" b="0" dirty="0">
+                          <a:solidFill>
+                            <a:schemeClr val="bg2">
+                              <a:lumMod val="75000"/>
+                              <a:lumOff val="25000"/>
+                            </a:schemeClr>
+                          </a:solidFill>
+                          <a:latin typeface="Arial" panose="020B0604020202020204" pitchFamily="34" charset="0"/>
+                          <a:cs typeface="Arial" panose="020B0604020202020204" pitchFamily="34" charset="0"/>
+                        </a:rPr>
+                        <a:t>1</a:t>
+                      </a:r>
+                      <a:endParaRPr lang="en-US" sz="1200" b="0" dirty="0">
+                        <a:solidFill>
+                          <a:schemeClr val="bg2">
+                            <a:lumMod val="75000"/>
+                            <a:lumOff val="25000"/>
+                          </a:schemeClr>
+                        </a:solidFill>
+                        <a:latin typeface="Arial" panose="020B0604020202020204" pitchFamily="34" charset="0"/>
+                        <a:cs typeface="Arial" panose="020B0604020202020204" pitchFamily="34" charset="0"/>
+                      </a:endParaRPr>
+                    </a:p>
+                  </a:txBody>
+                  <a:tcPr anchor="ctr">
+                    <a:lnT w="12700" cap="flat" cmpd="sng" algn="ctr">
+                      <a:solidFill>
+                        <a:schemeClr val="bg2">
+                          <a:lumMod val="50000"/>
+                          <a:lumOff val="50000"/>
+                        </a:schemeClr>
+                      </a:solidFill>
+                      <a:prstDash val="solid"/>
+                      <a:round/>
+                      <a:headEnd type="none" w="med" len="med"/>
+                      <a:tailEnd type="none" w="med" len="med"/>
+                    </a:lnT>
+                    <a:lnB w="12700" cap="flat" cmpd="sng" algn="ctr">
+                      <a:solidFill>
+                        <a:schemeClr val="bg2">
+                          <a:lumMod val="50000"/>
+                          <a:lumOff val="50000"/>
+                        </a:schemeClr>
+                      </a:solidFill>
+                      <a:prstDash val="solid"/>
+                      <a:round/>
+                      <a:headEnd type="none" w="med" len="med"/>
+                      <a:tailEnd type="none" w="med" len="med"/>
+                    </a:lnB>
+                    <a:noFill/>
+                  </a:tcPr>
+                </a:tc>
+                <a:tc>
+                  <a:txBody>
+                    <a:bodyPr/>
+                    <a:lstStyle/>
+                    <a:p>
+                      <a:pPr algn="ctr"/>
+                      <a:r>
+                        <a:rPr lang="fr-FR" sz="1200" b="0" dirty="0">
+                          <a:solidFill>
+                            <a:schemeClr val="bg2">
+                              <a:lumMod val="75000"/>
+                              <a:lumOff val="25000"/>
+                            </a:schemeClr>
+                          </a:solidFill>
+                          <a:latin typeface="Arial" panose="020B0604020202020204" pitchFamily="34" charset="0"/>
+                          <a:cs typeface="Arial" panose="020B0604020202020204" pitchFamily="34" charset="0"/>
+                        </a:rPr>
+                        <a:t>1</a:t>
+                      </a:r>
+                      <a:endParaRPr lang="en-US" sz="1200" b="0" dirty="0">
+                        <a:solidFill>
+                          <a:schemeClr val="bg2">
+                            <a:lumMod val="75000"/>
+                            <a:lumOff val="25000"/>
+                          </a:schemeClr>
+                        </a:solidFill>
+                        <a:latin typeface="Arial" panose="020B0604020202020204" pitchFamily="34" charset="0"/>
+                        <a:cs typeface="Arial" panose="020B0604020202020204" pitchFamily="34" charset="0"/>
+                      </a:endParaRPr>
+                    </a:p>
+                  </a:txBody>
+                  <a:tcPr anchor="ctr">
+                    <a:lnT w="12700" cap="flat" cmpd="sng" algn="ctr">
+                      <a:solidFill>
+                        <a:schemeClr val="bg2">
+                          <a:lumMod val="50000"/>
+                          <a:lumOff val="50000"/>
+                        </a:schemeClr>
+                      </a:solidFill>
+                      <a:prstDash val="solid"/>
+                      <a:round/>
+                      <a:headEnd type="none" w="med" len="med"/>
+                      <a:tailEnd type="none" w="med" len="med"/>
+                    </a:lnT>
+                    <a:lnB w="12700" cap="flat" cmpd="sng" algn="ctr">
+                      <a:solidFill>
+                        <a:schemeClr val="bg2">
+                          <a:lumMod val="50000"/>
+                          <a:lumOff val="50000"/>
+                        </a:schemeClr>
+                      </a:solidFill>
+                      <a:prstDash val="solid"/>
+                      <a:round/>
+                      <a:headEnd type="none" w="med" len="med"/>
+                      <a:tailEnd type="none" w="med" len="med"/>
+                    </a:lnB>
+                    <a:noFill/>
+                  </a:tcPr>
+                </a:tc>
+                <a:tc>
+                  <a:txBody>
+                    <a:bodyPr/>
+                    <a:lstStyle/>
+                    <a:p>
+                      <a:pPr algn="ctr"/>
+                      <a:r>
+                        <a:rPr lang="fr-FR" sz="1200" b="0" dirty="0">
+                          <a:solidFill>
+                            <a:schemeClr val="bg2">
+                              <a:lumMod val="75000"/>
+                              <a:lumOff val="25000"/>
+                            </a:schemeClr>
+                          </a:solidFill>
+                          <a:latin typeface="Arial" panose="020B0604020202020204" pitchFamily="34" charset="0"/>
+                          <a:cs typeface="Arial" panose="020B0604020202020204" pitchFamily="34" charset="0"/>
+                        </a:rPr>
+                        <a:t>0</a:t>
+                      </a:r>
+                    </a:p>
+                  </a:txBody>
+                  <a:tcPr anchor="ctr">
+                    <a:lnT w="12700" cap="flat" cmpd="sng" algn="ctr">
+                      <a:solidFill>
+                        <a:schemeClr val="bg2">
+                          <a:lumMod val="50000"/>
+                          <a:lumOff val="50000"/>
+                        </a:schemeClr>
+                      </a:solidFill>
+                      <a:prstDash val="solid"/>
+                      <a:round/>
+                      <a:headEnd type="none" w="med" len="med"/>
+                      <a:tailEnd type="none" w="med" len="med"/>
+                    </a:lnT>
+                    <a:lnB w="12700" cap="flat" cmpd="sng" algn="ctr">
+                      <a:solidFill>
+                        <a:schemeClr val="bg2">
+                          <a:lumMod val="50000"/>
+                          <a:lumOff val="50000"/>
+                        </a:schemeClr>
+                      </a:solidFill>
+                      <a:prstDash val="solid"/>
+                      <a:round/>
+                      <a:headEnd type="none" w="med" len="med"/>
+                      <a:tailEnd type="none" w="med" len="med"/>
+                    </a:lnB>
+                    <a:noFill/>
+                  </a:tcPr>
+                </a:tc>
+                <a:extLst>
+                  <a:ext uri="{0D108BD9-81ED-4DB2-BD59-A6C34878D82A}">
+                    <a16:rowId xmlns:a16="http://schemas.microsoft.com/office/drawing/2014/main" val="4271470605"/>
+                  </a:ext>
+                </a:extLst>
+              </a:tr>
+            </a:tbl>
+          </a:graphicData>
+        </a:graphic>
+      </p:graphicFrame>
+      <p:sp>
+        <p:nvSpPr>
+          <p:cNvPr id="51" name="ZoneTexte 50">
+            <a:extLst>
+              <a:ext uri="{FF2B5EF4-FFF2-40B4-BE49-F238E27FC236}">
+                <a16:creationId xmlns:a16="http://schemas.microsoft.com/office/drawing/2014/main" id="{C24F6ADF-1E87-E550-6A8E-1695882CD12F}"/>
+              </a:ext>
+            </a:extLst>
+          </p:cNvPr>
+          <p:cNvSpPr txBox="1">
+            <a:spLocks/>
+          </p:cNvSpPr>
+          <p:nvPr/>
+        </p:nvSpPr>
+        <p:spPr>
+          <a:xfrm>
+            <a:off x="4546423" y="3065859"/>
+            <a:ext cx="2577657" cy="276999"/>
+          </a:xfrm>
+          <a:prstGeom prst="rect">
+            <a:avLst/>
+          </a:prstGeom>
+          <a:noFill/>
+        </p:spPr>
+        <p:txBody>
+          <a:bodyPr wrap="square" rtlCol="0">
+            <a:spAutoFit/>
+          </a:bodyPr>
+          <a:lstStyle/>
+          <a:p>
+            <a:pPr algn="ctr"/>
+            <a:r>
+              <a:rPr lang="fr-FR" sz="1200" b="1" dirty="0">
                 <a:solidFill>
                   <a:schemeClr val="bg1"/>
                 </a:solidFill>
                 <a:latin typeface="Arial" panose="020B0604020202020204" pitchFamily="34" charset="0"/>
                 <a:cs typeface="Arial" panose="020B0604020202020204" pitchFamily="34" charset="0"/>
-              </a:endParaRPr>
-            </a:p>
-          </p:txBody>
-        </p:sp>
-        <p:sp>
-          <p:nvSpPr>
-            <p:cNvPr id="37" name="ZoneTexte 36">
-              <a:extLst>
-                <a:ext uri="{FF2B5EF4-FFF2-40B4-BE49-F238E27FC236}">
-                  <a16:creationId xmlns:a16="http://schemas.microsoft.com/office/drawing/2014/main" id="{E22259D9-9746-FE9D-943D-AF6E06BE60F4}"/>
-                </a:ext>
-              </a:extLst>
-            </p:cNvPr>
-            <p:cNvSpPr txBox="1">
-              <a:spLocks/>
-            </p:cNvSpPr>
-            <p:nvPr/>
-          </p:nvSpPr>
-          <p:spPr>
-            <a:xfrm>
-              <a:off x="8570574" y="1631612"/>
-              <a:ext cx="1891239" cy="646331"/>
-            </a:xfrm>
-            <a:prstGeom prst="rect">
-              <a:avLst/>
-            </a:prstGeom>
-            <a:noFill/>
-          </p:spPr>
-          <p:txBody>
-            <a:bodyPr wrap="square" rtlCol="0">
-              <a:spAutoFit/>
-            </a:bodyPr>
-            <a:lstStyle/>
-            <a:p>
-              <a:r>
-                <a:rPr lang="fr-FR" sz="1200" dirty="0" err="1">
-                  <a:solidFill>
-                    <a:schemeClr val="bg1"/>
-                  </a:solidFill>
-                  <a:latin typeface="Arial" panose="020B0604020202020204" pitchFamily="34" charset="0"/>
-                  <a:cs typeface="Arial" panose="020B0604020202020204" pitchFamily="34" charset="0"/>
-                </a:rPr>
-                <a:t>Diameter</a:t>
-              </a:r>
-              <a:endParaRPr lang="fr-FR" sz="1200" dirty="0">
+              </a:rPr>
+              <a:t>Images </a:t>
+            </a:r>
+            <a:r>
+              <a:rPr lang="fr-FR" sz="1200" b="1" dirty="0" err="1">
                 <a:solidFill>
                   <a:schemeClr val="bg1"/>
                 </a:solidFill>
                 <a:latin typeface="Arial" panose="020B0604020202020204" pitchFamily="34" charset="0"/>
                 <a:cs typeface="Arial" panose="020B0604020202020204" pitchFamily="34" charset="0"/>
-              </a:endParaRPr>
-            </a:p>
-            <a:p>
-              <a:endParaRPr lang="fr-FR" sz="1200" dirty="0">
-                <a:solidFill>
-                  <a:schemeClr val="bg1"/>
-                </a:solidFill>
-                <a:latin typeface="Arial" panose="020B0604020202020204" pitchFamily="34" charset="0"/>
-                <a:cs typeface="Arial" panose="020B0604020202020204" pitchFamily="34" charset="0"/>
-              </a:endParaRPr>
-            </a:p>
-            <a:p>
-              <a:r>
-                <a:rPr lang="fr-FR" sz="1200" dirty="0" err="1">
-                  <a:solidFill>
-                    <a:schemeClr val="bg1"/>
-                  </a:solidFill>
-                  <a:latin typeface="Arial" panose="020B0604020202020204" pitchFamily="34" charset="0"/>
-                  <a:cs typeface="Arial" panose="020B0604020202020204" pitchFamily="34" charset="0"/>
-                </a:rPr>
-                <a:t>Color</a:t>
-              </a:r>
-              <a:endParaRPr lang="fr-FR" sz="1200" dirty="0">
-                <a:solidFill>
-                  <a:schemeClr val="bg1"/>
-                </a:solidFill>
-                <a:latin typeface="Arial" panose="020B0604020202020204" pitchFamily="34" charset="0"/>
-                <a:cs typeface="Arial" panose="020B0604020202020204" pitchFamily="34" charset="0"/>
-              </a:endParaRPr>
-            </a:p>
-          </p:txBody>
-        </p:sp>
-        <p:pic>
-          <p:nvPicPr>
-            <p:cNvPr id="8" name="Graphique 7" descr="Coche avec un remplissage uni">
-              <a:extLst>
-                <a:ext uri="{FF2B5EF4-FFF2-40B4-BE49-F238E27FC236}">
-                  <a16:creationId xmlns:a16="http://schemas.microsoft.com/office/drawing/2014/main" id="{D80DF378-4A16-E67F-8047-A9C666078D12}"/>
-                </a:ext>
-              </a:extLst>
-            </p:cNvPr>
-            <p:cNvPicPr>
-              <a:picLocks noChangeAspect="1"/>
-            </p:cNvPicPr>
-            <p:nvPr/>
-          </p:nvPicPr>
-          <p:blipFill>
-            <a:blip r:embed="rId3">
-              <a:extLst>
-                <a:ext uri="{28A0092B-C50C-407E-A947-70E740481C1C}">
-                  <a14:useLocalDpi xmlns:a14="http://schemas.microsoft.com/office/drawing/2010/main" val="0"/>
-                </a:ext>
-                <a:ext uri="{96DAC541-7B7A-43D3-8B79-37D633B846F1}">
-                  <asvg:svgBlip xmlns:asvg="http://schemas.microsoft.com/office/drawing/2016/SVG/main" r:embed="rId4"/>
-                </a:ext>
-              </a:extLst>
-            </a:blip>
-            <a:stretch>
-              <a:fillRect/>
-            </a:stretch>
-          </p:blipFill>
-          <p:spPr>
-            <a:xfrm>
-              <a:off x="8382419" y="1718925"/>
-              <a:ext cx="166025" cy="166025"/>
-            </a:xfrm>
-            <a:prstGeom prst="rect">
-              <a:avLst/>
-            </a:prstGeom>
-          </p:spPr>
-        </p:pic>
-        <p:pic>
-          <p:nvPicPr>
-            <p:cNvPr id="11" name="Graphique 10" descr="Fermer avec un remplissage uni">
-              <a:extLst>
-                <a:ext uri="{FF2B5EF4-FFF2-40B4-BE49-F238E27FC236}">
-                  <a16:creationId xmlns:a16="http://schemas.microsoft.com/office/drawing/2014/main" id="{35D1111C-FFD7-C8C7-1843-938EE5417D97}"/>
-                </a:ext>
-              </a:extLst>
-            </p:cNvPr>
-            <p:cNvPicPr>
-              <a:picLocks noChangeAspect="1"/>
-            </p:cNvPicPr>
-            <p:nvPr/>
-          </p:nvPicPr>
-          <p:blipFill>
-            <a:blip r:embed="rId5">
-              <a:extLst>
-                <a:ext uri="{28A0092B-C50C-407E-A947-70E740481C1C}">
-                  <a14:useLocalDpi xmlns:a14="http://schemas.microsoft.com/office/drawing/2010/main" val="0"/>
-                </a:ext>
-                <a:ext uri="{96DAC541-7B7A-43D3-8B79-37D633B846F1}">
-                  <asvg:svgBlip xmlns:asvg="http://schemas.microsoft.com/office/drawing/2016/SVG/main" r:embed="rId6"/>
-                </a:ext>
-              </a:extLst>
-            </a:blip>
-            <a:stretch>
-              <a:fillRect/>
-            </a:stretch>
-          </p:blipFill>
-          <p:spPr>
-            <a:xfrm>
-              <a:off x="8382419" y="2075230"/>
-              <a:ext cx="166025" cy="166025"/>
-            </a:xfrm>
-            <a:prstGeom prst="rect">
-              <a:avLst/>
-            </a:prstGeom>
-          </p:spPr>
-        </p:pic>
-      </p:grpSp>
-      <p:grpSp>
-        <p:nvGrpSpPr>
-          <p:cNvPr id="12" name="Groupe 11">
-            <a:extLst>
-              <a:ext uri="{FF2B5EF4-FFF2-40B4-BE49-F238E27FC236}">
-                <a16:creationId xmlns:a16="http://schemas.microsoft.com/office/drawing/2014/main" id="{468B2288-C844-FE47-55D1-F319CF4DBD2E}"/>
-              </a:ext>
-            </a:extLst>
-          </p:cNvPr>
-          <p:cNvGrpSpPr/>
-          <p:nvPr/>
-        </p:nvGrpSpPr>
-        <p:grpSpPr>
-          <a:xfrm>
-            <a:off x="2342923" y="1340747"/>
-            <a:ext cx="2577657" cy="968738"/>
-            <a:chOff x="1370864" y="1307892"/>
-            <a:chExt cx="2577657" cy="968738"/>
-          </a:xfrm>
-        </p:grpSpPr>
-        <p:sp>
-          <p:nvSpPr>
-            <p:cNvPr id="84" name="ZoneTexte 83">
-              <a:extLst>
-                <a:ext uri="{FF2B5EF4-FFF2-40B4-BE49-F238E27FC236}">
-                  <a16:creationId xmlns:a16="http://schemas.microsoft.com/office/drawing/2014/main" id="{43173BA7-F16A-07E9-EFB0-B061087CA540}"/>
-                </a:ext>
-              </a:extLst>
-            </p:cNvPr>
-            <p:cNvSpPr txBox="1">
-              <a:spLocks/>
-            </p:cNvSpPr>
-            <p:nvPr/>
-          </p:nvSpPr>
-          <p:spPr>
-            <a:xfrm>
-              <a:off x="1370864" y="1307892"/>
-              <a:ext cx="2577657" cy="276999"/>
-            </a:xfrm>
-            <a:prstGeom prst="rect">
-              <a:avLst/>
-            </a:prstGeom>
-            <a:noFill/>
-          </p:spPr>
-          <p:txBody>
-            <a:bodyPr wrap="square" rtlCol="0">
-              <a:spAutoFit/>
-            </a:bodyPr>
-            <a:lstStyle/>
-            <a:p>
-              <a:pPr algn="ctr"/>
-              <a:r>
-                <a:rPr lang="fr-FR" sz="1200" b="1" dirty="0">
-                  <a:solidFill>
-                    <a:schemeClr val="bg1"/>
-                  </a:solidFill>
-                  <a:latin typeface="Arial" panose="020B0604020202020204" pitchFamily="34" charset="0"/>
-                  <a:cs typeface="Arial" panose="020B0604020202020204" pitchFamily="34" charset="0"/>
-                </a:rPr>
-                <a:t>Patient Information </a:t>
-              </a:r>
-              <a:r>
-                <a:rPr lang="fr-FR" sz="1200" b="1" dirty="0" err="1">
-                  <a:solidFill>
-                    <a:schemeClr val="bg1"/>
-                  </a:solidFill>
-                  <a:latin typeface="Arial" panose="020B0604020202020204" pitchFamily="34" charset="0"/>
-                  <a:cs typeface="Arial" panose="020B0604020202020204" pitchFamily="34" charset="0"/>
-                </a:rPr>
-                <a:t>required</a:t>
-              </a:r>
-              <a:endParaRPr lang="fr-FR" sz="1200" b="1" dirty="0">
-                <a:solidFill>
-                  <a:schemeClr val="bg1"/>
-                </a:solidFill>
-                <a:latin typeface="Arial" panose="020B0604020202020204" pitchFamily="34" charset="0"/>
-                <a:cs typeface="Arial" panose="020B0604020202020204" pitchFamily="34" charset="0"/>
-              </a:endParaRPr>
-            </a:p>
-          </p:txBody>
-        </p:sp>
-        <p:sp>
-          <p:nvSpPr>
-            <p:cNvPr id="35" name="ZoneTexte 34">
-              <a:extLst>
-                <a:ext uri="{FF2B5EF4-FFF2-40B4-BE49-F238E27FC236}">
-                  <a16:creationId xmlns:a16="http://schemas.microsoft.com/office/drawing/2014/main" id="{0421E5E3-315B-F72C-470F-5BF33783580E}"/>
-                </a:ext>
-              </a:extLst>
-            </p:cNvPr>
-            <p:cNvSpPr txBox="1">
-              <a:spLocks/>
-            </p:cNvSpPr>
-            <p:nvPr/>
-          </p:nvSpPr>
-          <p:spPr>
-            <a:xfrm>
-              <a:off x="1744225" y="1630299"/>
-              <a:ext cx="2204296" cy="646331"/>
-            </a:xfrm>
-            <a:prstGeom prst="rect">
-              <a:avLst/>
-            </a:prstGeom>
-            <a:noFill/>
-          </p:spPr>
-          <p:txBody>
-            <a:bodyPr wrap="square" rtlCol="0">
-              <a:spAutoFit/>
-            </a:bodyPr>
-            <a:lstStyle/>
-            <a:p>
-              <a:r>
-                <a:rPr lang="fr-FR" sz="1200" dirty="0" err="1">
-                  <a:solidFill>
-                    <a:schemeClr val="bg1"/>
-                  </a:solidFill>
-                  <a:latin typeface="Arial" panose="020B0604020202020204" pitchFamily="34" charset="0"/>
-                  <a:cs typeface="Arial" panose="020B0604020202020204" pitchFamily="34" charset="0"/>
-                </a:rPr>
-                <a:t>Eyes</a:t>
-              </a:r>
-              <a:r>
-                <a:rPr lang="fr-FR" sz="1200" dirty="0">
-                  <a:solidFill>
-                    <a:schemeClr val="bg1"/>
-                  </a:solidFill>
-                  <a:latin typeface="Arial" panose="020B0604020202020204" pitchFamily="34" charset="0"/>
-                  <a:cs typeface="Arial" panose="020B0604020202020204" pitchFamily="34" charset="0"/>
-                </a:rPr>
-                <a:t> </a:t>
-              </a:r>
-              <a:r>
-                <a:rPr lang="fr-FR" sz="1200" dirty="0" err="1">
-                  <a:solidFill>
-                    <a:schemeClr val="bg1"/>
-                  </a:solidFill>
-                  <a:latin typeface="Arial" panose="020B0604020202020204" pitchFamily="34" charset="0"/>
-                  <a:cs typeface="Arial" panose="020B0604020202020204" pitchFamily="34" charset="0"/>
-                </a:rPr>
-                <a:t>color</a:t>
-              </a:r>
-              <a:endParaRPr lang="fr-FR" sz="1200" dirty="0">
-                <a:solidFill>
-                  <a:schemeClr val="bg1"/>
-                </a:solidFill>
-                <a:latin typeface="Arial" panose="020B0604020202020204" pitchFamily="34" charset="0"/>
-                <a:cs typeface="Arial" panose="020B0604020202020204" pitchFamily="34" charset="0"/>
-              </a:endParaRPr>
-            </a:p>
-            <a:p>
-              <a:endParaRPr lang="fr-FR" sz="1200" dirty="0">
-                <a:solidFill>
-                  <a:schemeClr val="bg1"/>
-                </a:solidFill>
-                <a:latin typeface="Arial" panose="020B0604020202020204" pitchFamily="34" charset="0"/>
-                <a:cs typeface="Arial" panose="020B0604020202020204" pitchFamily="34" charset="0"/>
-              </a:endParaRPr>
-            </a:p>
-            <a:p>
-              <a:r>
-                <a:rPr lang="fr-FR" sz="1200" dirty="0" err="1">
-                  <a:solidFill>
-                    <a:schemeClr val="bg1"/>
-                  </a:solidFill>
-                  <a:latin typeface="Arial" panose="020B0604020202020204" pitchFamily="34" charset="0"/>
-                  <a:cs typeface="Arial" panose="020B0604020202020204" pitchFamily="34" charset="0"/>
-                </a:rPr>
-                <a:t>Hairs</a:t>
-              </a:r>
-              <a:r>
-                <a:rPr lang="fr-FR" sz="1200" dirty="0">
-                  <a:solidFill>
-                    <a:schemeClr val="bg1"/>
-                  </a:solidFill>
-                  <a:latin typeface="Arial" panose="020B0604020202020204" pitchFamily="34" charset="0"/>
-                  <a:cs typeface="Arial" panose="020B0604020202020204" pitchFamily="34" charset="0"/>
-                </a:rPr>
-                <a:t> </a:t>
-              </a:r>
-              <a:r>
-                <a:rPr lang="fr-FR" sz="1200" dirty="0" err="1">
-                  <a:solidFill>
-                    <a:schemeClr val="bg1"/>
-                  </a:solidFill>
-                  <a:latin typeface="Arial" panose="020B0604020202020204" pitchFamily="34" charset="0"/>
-                  <a:cs typeface="Arial" panose="020B0604020202020204" pitchFamily="34" charset="0"/>
-                </a:rPr>
-                <a:t>color</a:t>
-              </a:r>
-              <a:endParaRPr lang="fr-FR" sz="1200" dirty="0">
-                <a:solidFill>
-                  <a:schemeClr val="bg1"/>
-                </a:solidFill>
-                <a:latin typeface="Arial" panose="020B0604020202020204" pitchFamily="34" charset="0"/>
-                <a:cs typeface="Arial" panose="020B0604020202020204" pitchFamily="34" charset="0"/>
-              </a:endParaRPr>
-            </a:p>
-          </p:txBody>
-        </p:sp>
-        <p:pic>
-          <p:nvPicPr>
-            <p:cNvPr id="42" name="Graphique 41" descr="Coche avec un remplissage uni">
-              <a:extLst>
-                <a:ext uri="{FF2B5EF4-FFF2-40B4-BE49-F238E27FC236}">
-                  <a16:creationId xmlns:a16="http://schemas.microsoft.com/office/drawing/2014/main" id="{70BB1278-1A12-C142-73F7-746FC2476EA7}"/>
-                </a:ext>
-              </a:extLst>
-            </p:cNvPr>
-            <p:cNvPicPr>
-              <a:picLocks noChangeAspect="1"/>
-            </p:cNvPicPr>
-            <p:nvPr/>
-          </p:nvPicPr>
-          <p:blipFill>
-            <a:blip r:embed="rId3">
-              <a:extLst>
-                <a:ext uri="{28A0092B-C50C-407E-A947-70E740481C1C}">
-                  <a14:useLocalDpi xmlns:a14="http://schemas.microsoft.com/office/drawing/2010/main" val="0"/>
-                </a:ext>
-                <a:ext uri="{96DAC541-7B7A-43D3-8B79-37D633B846F1}">
-                  <asvg:svgBlip xmlns:asvg="http://schemas.microsoft.com/office/drawing/2016/SVG/main" r:embed="rId4"/>
-                </a:ext>
-              </a:extLst>
-            </a:blip>
-            <a:stretch>
-              <a:fillRect/>
-            </a:stretch>
-          </p:blipFill>
-          <p:spPr>
-            <a:xfrm>
-              <a:off x="1578200" y="1682359"/>
-              <a:ext cx="166025" cy="166025"/>
-            </a:xfrm>
-            <a:prstGeom prst="rect">
-              <a:avLst/>
-            </a:prstGeom>
-          </p:spPr>
-        </p:pic>
-        <p:pic>
-          <p:nvPicPr>
-            <p:cNvPr id="43" name="Graphique 42" descr="Coche avec un remplissage uni">
-              <a:extLst>
-                <a:ext uri="{FF2B5EF4-FFF2-40B4-BE49-F238E27FC236}">
-                  <a16:creationId xmlns:a16="http://schemas.microsoft.com/office/drawing/2014/main" id="{6E41483A-52A8-CB9A-6DFF-CF9978A45B37}"/>
-                </a:ext>
-              </a:extLst>
-            </p:cNvPr>
-            <p:cNvPicPr>
-              <a:picLocks noChangeAspect="1"/>
-            </p:cNvPicPr>
-            <p:nvPr/>
-          </p:nvPicPr>
-          <p:blipFill>
-            <a:blip r:embed="rId3">
-              <a:extLst>
-                <a:ext uri="{28A0092B-C50C-407E-A947-70E740481C1C}">
-                  <a14:useLocalDpi xmlns:a14="http://schemas.microsoft.com/office/drawing/2010/main" val="0"/>
-                </a:ext>
-                <a:ext uri="{96DAC541-7B7A-43D3-8B79-37D633B846F1}">
-                  <asvg:svgBlip xmlns:asvg="http://schemas.microsoft.com/office/drawing/2016/SVG/main" r:embed="rId4"/>
-                </a:ext>
-              </a:extLst>
-            </a:blip>
-            <a:stretch>
-              <a:fillRect/>
-            </a:stretch>
-          </p:blipFill>
-          <p:spPr>
-            <a:xfrm>
-              <a:off x="1556070" y="2075230"/>
-              <a:ext cx="166025" cy="166025"/>
-            </a:xfrm>
-            <a:prstGeom prst="rect">
-              <a:avLst/>
-            </a:prstGeom>
-          </p:spPr>
-        </p:pic>
-      </p:grpSp>
+              </a:rPr>
+              <a:t>required</a:t>
+            </a:r>
+            <a:endParaRPr lang="fr-FR" sz="1200" b="1" dirty="0">
+              <a:solidFill>
+                <a:schemeClr val="bg1"/>
+              </a:solidFill>
+              <a:latin typeface="Arial" panose="020B0604020202020204" pitchFamily="34" charset="0"/>
+              <a:cs typeface="Arial" panose="020B0604020202020204" pitchFamily="34" charset="0"/>
+            </a:endParaRPr>
+          </a:p>
+        </p:txBody>
+      </p:sp>
     </p:spTree>
     <p:extLst>
       <p:ext uri="{BB962C8B-B14F-4D97-AF65-F5344CB8AC3E}">

</xml_diff>

<commit_message>
ai lauch view working, images view started
</commit_message>
<xml_diff>
--- a/app model/Skin app.pptx
+++ b/app model/Skin app.pptx
@@ -209,7 +209,7 @@
           <a:p>
             <a:fld id="{768E3510-DC99-4FCD-8D19-DD2BADF14EF2}" type="datetimeFigureOut">
               <a:rPr lang="en-US" smtClean="0"/>
-              <a:t>8/3/2022</a:t>
+              <a:t>8/4/2022</a:t>
             </a:fld>
             <a:endParaRPr lang="en-US"/>
           </a:p>
@@ -1730,7 +1730,7 @@
           <a:p>
             <a:fld id="{0FE4FEEF-F4C3-4882-B5BB-2F3842E66E27}" type="datetimeFigureOut">
               <a:rPr lang="en-US" smtClean="0"/>
-              <a:t>8/3/2022</a:t>
+              <a:t>8/4/2022</a:t>
             </a:fld>
             <a:endParaRPr lang="en-US"/>
           </a:p>
@@ -2028,7 +2028,7 @@
           <a:p>
             <a:fld id="{0FE4FEEF-F4C3-4882-B5BB-2F3842E66E27}" type="datetimeFigureOut">
               <a:rPr lang="en-US" smtClean="0"/>
-              <a:t>8/3/2022</a:t>
+              <a:t>8/4/2022</a:t>
             </a:fld>
             <a:endParaRPr lang="en-US"/>
           </a:p>
@@ -2220,7 +2220,7 @@
           <a:p>
             <a:fld id="{0FE4FEEF-F4C3-4882-B5BB-2F3842E66E27}" type="datetimeFigureOut">
               <a:rPr lang="en-US" smtClean="0"/>
-              <a:t>8/3/2022</a:t>
+              <a:t>8/4/2022</a:t>
             </a:fld>
             <a:endParaRPr lang="en-US"/>
           </a:p>
@@ -2481,7 +2481,7 @@
           <a:p>
             <a:fld id="{0FE4FEEF-F4C3-4882-B5BB-2F3842E66E27}" type="datetimeFigureOut">
               <a:rPr lang="en-US" smtClean="0"/>
-              <a:t>8/3/2022</a:t>
+              <a:t>8/4/2022</a:t>
             </a:fld>
             <a:endParaRPr lang="en-US"/>
           </a:p>
@@ -2905,7 +2905,7 @@
           <a:p>
             <a:fld id="{0FE4FEEF-F4C3-4882-B5BB-2F3842E66E27}" type="datetimeFigureOut">
               <a:rPr lang="en-US" smtClean="0"/>
-              <a:t>8/3/2022</a:t>
+              <a:t>8/4/2022</a:t>
             </a:fld>
             <a:endParaRPr lang="en-US"/>
           </a:p>
@@ -3442,7 +3442,7 @@
           <a:p>
             <a:fld id="{0FE4FEEF-F4C3-4882-B5BB-2F3842E66E27}" type="datetimeFigureOut">
               <a:rPr lang="en-US" smtClean="0"/>
-              <a:t>8/3/2022</a:t>
+              <a:t>8/4/2022</a:t>
             </a:fld>
             <a:endParaRPr lang="en-US"/>
           </a:p>
@@ -4306,7 +4306,7 @@
           <a:p>
             <a:fld id="{0FE4FEEF-F4C3-4882-B5BB-2F3842E66E27}" type="datetimeFigureOut">
               <a:rPr lang="en-US" smtClean="0"/>
-              <a:t>8/3/2022</a:t>
+              <a:t>8/4/2022</a:t>
             </a:fld>
             <a:endParaRPr lang="en-US"/>
           </a:p>
@@ -4476,7 +4476,7 @@
           <a:p>
             <a:fld id="{0FE4FEEF-F4C3-4882-B5BB-2F3842E66E27}" type="datetimeFigureOut">
               <a:rPr lang="en-US" smtClean="0"/>
-              <a:t>8/3/2022</a:t>
+              <a:t>8/4/2022</a:t>
             </a:fld>
             <a:endParaRPr lang="en-US"/>
           </a:p>
@@ -4660,7 +4660,7 @@
           <a:p>
             <a:fld id="{0FE4FEEF-F4C3-4882-B5BB-2F3842E66E27}" type="datetimeFigureOut">
               <a:rPr lang="en-US" smtClean="0"/>
-              <a:t>8/3/2022</a:t>
+              <a:t>8/4/2022</a:t>
             </a:fld>
             <a:endParaRPr lang="en-US"/>
           </a:p>
@@ -4830,7 +4830,7 @@
           <a:p>
             <a:fld id="{0FE4FEEF-F4C3-4882-B5BB-2F3842E66E27}" type="datetimeFigureOut">
               <a:rPr lang="en-US" smtClean="0"/>
-              <a:t>8/3/2022</a:t>
+              <a:t>8/4/2022</a:t>
             </a:fld>
             <a:endParaRPr lang="en-US"/>
           </a:p>
@@ -5074,7 +5074,7 @@
           <a:p>
             <a:fld id="{0FE4FEEF-F4C3-4882-B5BB-2F3842E66E27}" type="datetimeFigureOut">
               <a:rPr lang="en-US" smtClean="0"/>
-              <a:t>8/3/2022</a:t>
+              <a:t>8/4/2022</a:t>
             </a:fld>
             <a:endParaRPr lang="en-US"/>
           </a:p>
@@ -5310,7 +5310,7 @@
           <a:p>
             <a:fld id="{0FE4FEEF-F4C3-4882-B5BB-2F3842E66E27}" type="datetimeFigureOut">
               <a:rPr lang="en-US" smtClean="0"/>
-              <a:t>8/3/2022</a:t>
+              <a:t>8/4/2022</a:t>
             </a:fld>
             <a:endParaRPr lang="en-US"/>
           </a:p>
@@ -5776,7 +5776,7 @@
           <a:p>
             <a:fld id="{0FE4FEEF-F4C3-4882-B5BB-2F3842E66E27}" type="datetimeFigureOut">
               <a:rPr lang="en-US" smtClean="0"/>
-              <a:t>8/3/2022</a:t>
+              <a:t>8/4/2022</a:t>
             </a:fld>
             <a:endParaRPr lang="en-US"/>
           </a:p>
@@ -5894,7 +5894,7 @@
           <a:p>
             <a:fld id="{0FE4FEEF-F4C3-4882-B5BB-2F3842E66E27}" type="datetimeFigureOut">
               <a:rPr lang="en-US" smtClean="0"/>
-              <a:t>8/3/2022</a:t>
+              <a:t>8/4/2022</a:t>
             </a:fld>
             <a:endParaRPr lang="en-US"/>
           </a:p>
@@ -5989,7 +5989,7 @@
           <a:p>
             <a:fld id="{0FE4FEEF-F4C3-4882-B5BB-2F3842E66E27}" type="datetimeFigureOut">
               <a:rPr lang="en-US" smtClean="0"/>
-              <a:t>8/3/2022</a:t>
+              <a:t>8/4/2022</a:t>
             </a:fld>
             <a:endParaRPr lang="en-US"/>
           </a:p>
@@ -6244,7 +6244,7 @@
           <a:p>
             <a:fld id="{0FE4FEEF-F4C3-4882-B5BB-2F3842E66E27}" type="datetimeFigureOut">
               <a:rPr lang="en-US" smtClean="0"/>
-              <a:t>8/3/2022</a:t>
+              <a:t>8/4/2022</a:t>
             </a:fld>
             <a:endParaRPr lang="en-US"/>
           </a:p>
@@ -6544,7 +6544,7 @@
           <a:p>
             <a:fld id="{0FE4FEEF-F4C3-4882-B5BB-2F3842E66E27}" type="datetimeFigureOut">
               <a:rPr lang="en-US" smtClean="0"/>
-              <a:t>8/3/2022</a:t>
+              <a:t>8/4/2022</a:t>
             </a:fld>
             <a:endParaRPr lang="en-US"/>
           </a:p>
@@ -6778,7 +6778,7 @@
           <a:p>
             <a:fld id="{0FE4FEEF-F4C3-4882-B5BB-2F3842E66E27}" type="datetimeFigureOut">
               <a:rPr lang="en-US" smtClean="0"/>
-              <a:t>8/3/2022</a:t>
+              <a:t>8/4/2022</a:t>
             </a:fld>
             <a:endParaRPr lang="en-US"/>
           </a:p>
@@ -14435,8 +14435,8 @@
         </p:nvSpPr>
         <p:spPr>
           <a:xfrm>
-            <a:off x="7049848" y="87192"/>
-            <a:ext cx="822661" cy="338554"/>
+            <a:off x="7032216" y="87192"/>
+            <a:ext cx="857927" cy="338554"/>
           </a:xfrm>
           <a:prstGeom prst="rect">
             <a:avLst/>
@@ -14466,7 +14466,7 @@
                 <a:latin typeface="Arial" panose="020B0604020202020204" pitchFamily="34" charset="0"/>
                 <a:cs typeface="Arial" panose="020B0604020202020204" pitchFamily="34" charset="0"/>
               </a:rPr>
-              <a:t>Photos</a:t>
+              <a:t>Images</a:t>
             </a:r>
           </a:p>
         </p:txBody>

</xml_diff>